<commit_message>
[mod] Finish dynamic and static vertex buffer refreshing.
</commit_message>
<xml_diff>
--- a/Doc/Note/Design/EngineDesign.pptx
+++ b/Doc/Note/Design/EngineDesign.pptx
@@ -198,7 +198,7 @@
           <a:p>
             <a:fld id="{8550266C-EB3A-46FF-9DFF-1D300318D93B}" type="datetimeFigureOut">
               <a:rPr lang="zh-TW" altLang="en-US" smtClean="0"/>
-              <a:t>2019/7/5</a:t>
+              <a:t>2019/7/7</a:t>
             </a:fld>
             <a:endParaRPr lang="zh-TW" altLang="en-US"/>
           </a:p>
@@ -696,7 +696,7 @@
           <a:p>
             <a:fld id="{59C7DAA9-8306-4CC9-B992-C0A037804617}" type="datetimeFigureOut">
               <a:rPr lang="zh-TW" altLang="en-US" smtClean="0"/>
-              <a:t>2019/7/5</a:t>
+              <a:t>2019/7/7</a:t>
             </a:fld>
             <a:endParaRPr lang="zh-TW" altLang="en-US"/>
           </a:p>
@@ -894,7 +894,7 @@
           <a:p>
             <a:fld id="{59C7DAA9-8306-4CC9-B992-C0A037804617}" type="datetimeFigureOut">
               <a:rPr lang="zh-TW" altLang="en-US" smtClean="0"/>
-              <a:t>2019/7/5</a:t>
+              <a:t>2019/7/7</a:t>
             </a:fld>
             <a:endParaRPr lang="zh-TW" altLang="en-US"/>
           </a:p>
@@ -1102,7 +1102,7 @@
           <a:p>
             <a:fld id="{59C7DAA9-8306-4CC9-B992-C0A037804617}" type="datetimeFigureOut">
               <a:rPr lang="zh-TW" altLang="en-US" smtClean="0"/>
-              <a:t>2019/7/5</a:t>
+              <a:t>2019/7/7</a:t>
             </a:fld>
             <a:endParaRPr lang="zh-TW" altLang="en-US"/>
           </a:p>
@@ -1300,7 +1300,7 @@
           <a:p>
             <a:fld id="{59C7DAA9-8306-4CC9-B992-C0A037804617}" type="datetimeFigureOut">
               <a:rPr lang="zh-TW" altLang="en-US" smtClean="0"/>
-              <a:t>2019/7/5</a:t>
+              <a:t>2019/7/7</a:t>
             </a:fld>
             <a:endParaRPr lang="zh-TW" altLang="en-US"/>
           </a:p>
@@ -1575,7 +1575,7 @@
           <a:p>
             <a:fld id="{59C7DAA9-8306-4CC9-B992-C0A037804617}" type="datetimeFigureOut">
               <a:rPr lang="zh-TW" altLang="en-US" smtClean="0"/>
-              <a:t>2019/7/5</a:t>
+              <a:t>2019/7/7</a:t>
             </a:fld>
             <a:endParaRPr lang="zh-TW" altLang="en-US"/>
           </a:p>
@@ -1840,7 +1840,7 @@
           <a:p>
             <a:fld id="{59C7DAA9-8306-4CC9-B992-C0A037804617}" type="datetimeFigureOut">
               <a:rPr lang="zh-TW" altLang="en-US" smtClean="0"/>
-              <a:t>2019/7/5</a:t>
+              <a:t>2019/7/7</a:t>
             </a:fld>
             <a:endParaRPr lang="zh-TW" altLang="en-US"/>
           </a:p>
@@ -2252,7 +2252,7 @@
           <a:p>
             <a:fld id="{59C7DAA9-8306-4CC9-B992-C0A037804617}" type="datetimeFigureOut">
               <a:rPr lang="zh-TW" altLang="en-US" smtClean="0"/>
-              <a:t>2019/7/5</a:t>
+              <a:t>2019/7/7</a:t>
             </a:fld>
             <a:endParaRPr lang="zh-TW" altLang="en-US"/>
           </a:p>
@@ -2393,7 +2393,7 @@
           <a:p>
             <a:fld id="{59C7DAA9-8306-4CC9-B992-C0A037804617}" type="datetimeFigureOut">
               <a:rPr lang="zh-TW" altLang="en-US" smtClean="0"/>
-              <a:t>2019/7/5</a:t>
+              <a:t>2019/7/7</a:t>
             </a:fld>
             <a:endParaRPr lang="zh-TW" altLang="en-US"/>
           </a:p>
@@ -2506,7 +2506,7 @@
           <a:p>
             <a:fld id="{59C7DAA9-8306-4CC9-B992-C0A037804617}" type="datetimeFigureOut">
               <a:rPr lang="zh-TW" altLang="en-US" smtClean="0"/>
-              <a:t>2019/7/5</a:t>
+              <a:t>2019/7/7</a:t>
             </a:fld>
             <a:endParaRPr lang="zh-TW" altLang="en-US"/>
           </a:p>
@@ -2817,7 +2817,7 @@
           <a:p>
             <a:fld id="{59C7DAA9-8306-4CC9-B992-C0A037804617}" type="datetimeFigureOut">
               <a:rPr lang="zh-TW" altLang="en-US" smtClean="0"/>
-              <a:t>2019/7/5</a:t>
+              <a:t>2019/7/7</a:t>
             </a:fld>
             <a:endParaRPr lang="zh-TW" altLang="en-US"/>
           </a:p>
@@ -3105,7 +3105,7 @@
           <a:p>
             <a:fld id="{59C7DAA9-8306-4CC9-B992-C0A037804617}" type="datetimeFigureOut">
               <a:rPr lang="zh-TW" altLang="en-US" smtClean="0"/>
-              <a:t>2019/7/5</a:t>
+              <a:t>2019/7/7</a:t>
             </a:fld>
             <a:endParaRPr lang="zh-TW" altLang="en-US"/>
           </a:p>
@@ -3346,7 +3346,7 @@
           <a:p>
             <a:fld id="{59C7DAA9-8306-4CC9-B992-C0A037804617}" type="datetimeFigureOut">
               <a:rPr lang="zh-TW" altLang="en-US" smtClean="0"/>
-              <a:t>2019/7/5</a:t>
+              <a:t>2019/7/7</a:t>
             </a:fld>
             <a:endParaRPr lang="zh-TW" altLang="en-US"/>
           </a:p>
@@ -3886,108 +3886,20 @@
       </p:sp>
       <p:sp>
         <p:nvSpPr>
-          <p:cNvPr id="4" name="矩形 3">
-            <a:extLst>
-              <a:ext uri="{FF2B5EF4-FFF2-40B4-BE49-F238E27FC236}">
-                <a16:creationId xmlns:a16="http://schemas.microsoft.com/office/drawing/2014/main" id="{54121B23-9C6A-46DE-927F-49CFDF8596E2}"/>
-              </a:ext>
-            </a:extLst>
-          </p:cNvPr>
-          <p:cNvSpPr/>
+          <p:cNvPr id="5" name="文字方塊 4">
+            <a:extLst>
+              <a:ext uri="{FF2B5EF4-FFF2-40B4-BE49-F238E27FC236}">
+                <a16:creationId xmlns:a16="http://schemas.microsoft.com/office/drawing/2014/main" id="{742E149B-4D70-4DD8-9AB6-CB986A4C6143}"/>
+              </a:ext>
+            </a:extLst>
+          </p:cNvPr>
+          <p:cNvSpPr txBox="1"/>
           <p:nvPr/>
         </p:nvSpPr>
         <p:spPr>
           <a:xfrm>
-            <a:off x="986856" y="1772100"/>
-            <a:ext cx="3428126" cy="328198"/>
-          </a:xfrm>
-          <a:prstGeom prst="rect">
-            <a:avLst/>
-          </a:prstGeom>
-          <a:noFill/>
-          <a:ln w="38100">
-            <a:solidFill>
-              <a:schemeClr val="tx1"/>
-            </a:solidFill>
-          </a:ln>
-        </p:spPr>
-        <p:style>
-          <a:lnRef idx="2">
-            <a:schemeClr val="accent1">
-              <a:shade val="50000"/>
-            </a:schemeClr>
-          </a:lnRef>
-          <a:fillRef idx="1">
-            <a:schemeClr val="accent1"/>
-          </a:fillRef>
-          <a:effectRef idx="0">
-            <a:schemeClr val="accent1"/>
-          </a:effectRef>
-          <a:fontRef idx="minor">
-            <a:schemeClr val="lt1"/>
-          </a:fontRef>
-        </p:style>
-        <p:txBody>
-          <a:bodyPr rtlCol="0" anchor="ctr"/>
-          <a:lstStyle/>
-          <a:p>
-            <a:pPr algn="ctr"/>
-            <a:r>
-              <a:rPr lang="en-US" altLang="zh-TW" sz="1000" dirty="0" err="1">
-                <a:solidFill>
-                  <a:schemeClr val="tx1"/>
-                </a:solidFill>
-              </a:rPr>
-              <a:t>Ckeck</a:t>
-            </a:r>
-            <a:r>
-              <a:rPr lang="en-US" altLang="zh-TW" sz="1000" dirty="0">
-                <a:solidFill>
-                  <a:schemeClr val="tx1"/>
-                </a:solidFill>
-              </a:rPr>
-              <a:t> </a:t>
-            </a:r>
-            <a:r>
-              <a:rPr lang="en-US" altLang="zh-TW" sz="1000" dirty="0" err="1">
-                <a:solidFill>
-                  <a:schemeClr val="tx1"/>
-                </a:solidFill>
-              </a:rPr>
-              <a:t>BufferHandle</a:t>
-            </a:r>
-            <a:r>
-              <a:rPr lang="en-US" altLang="zh-TW" sz="1000" dirty="0">
-                <a:solidFill>
-                  <a:schemeClr val="tx1"/>
-                </a:solidFill>
-              </a:rPr>
-              <a:t> is 0 or not</a:t>
-            </a:r>
-            <a:endParaRPr lang="zh-TW" altLang="en-US" sz="1000" dirty="0">
-              <a:solidFill>
-                <a:schemeClr val="tx1"/>
-              </a:solidFill>
-            </a:endParaRPr>
-          </a:p>
-        </p:txBody>
-      </p:sp>
-      <p:sp>
-        <p:nvSpPr>
-          <p:cNvPr id="5" name="文字方塊 4">
-            <a:extLst>
-              <a:ext uri="{FF2B5EF4-FFF2-40B4-BE49-F238E27FC236}">
-                <a16:creationId xmlns:a16="http://schemas.microsoft.com/office/drawing/2014/main" id="{742E149B-4D70-4DD8-9AB6-CB986A4C6143}"/>
-              </a:ext>
-            </a:extLst>
-          </p:cNvPr>
-          <p:cNvSpPr txBox="1"/>
-          <p:nvPr/>
-        </p:nvSpPr>
-        <p:spPr>
-          <a:xfrm>
-            <a:off x="711199" y="1052945"/>
-            <a:ext cx="2299855" cy="369332"/>
+            <a:off x="840286" y="681311"/>
+            <a:ext cx="4642036" cy="369332"/>
           </a:xfrm>
           <a:prstGeom prst="rect">
             <a:avLst/>
@@ -4008,245 +3920,38 @@
               <a:rPr lang="en-US" altLang="zh-TW" dirty="0" err="1"/>
               <a:t>RefreshData</a:t>
             </a:r>
+            <a:r>
+              <a:rPr lang="zh-TW" altLang="en-US" dirty="0"/>
+              <a:t> </a:t>
+            </a:r>
+            <a:r>
+              <a:rPr lang="en-US" altLang="zh-TW" dirty="0"/>
+              <a:t>for </a:t>
+            </a:r>
+            <a:r>
+              <a:rPr lang="en-US" altLang="zh-TW" dirty="0" err="1"/>
+              <a:t>DynamicVertexBuffer</a:t>
+            </a:r>
             <a:endParaRPr lang="zh-TW" altLang="en-US" dirty="0"/>
           </a:p>
         </p:txBody>
       </p:sp>
-      <p:cxnSp>
-        <p:nvCxnSpPr>
-          <p:cNvPr id="8" name="直線單箭頭接點 7">
-            <a:extLst>
-              <a:ext uri="{FF2B5EF4-FFF2-40B4-BE49-F238E27FC236}">
-                <a16:creationId xmlns:a16="http://schemas.microsoft.com/office/drawing/2014/main" id="{A2924F2B-BAF2-4F69-9B2F-0226FD0A1410}"/>
-              </a:ext>
-            </a:extLst>
-          </p:cNvPr>
-          <p:cNvCxnSpPr>
-            <a:cxnSpLocks/>
-            <a:stCxn id="4" idx="2"/>
-          </p:cNvCxnSpPr>
-          <p:nvPr/>
-        </p:nvCxnSpPr>
-        <p:spPr>
-          <a:xfrm flipH="1">
-            <a:off x="2697019" y="2100298"/>
-            <a:ext cx="3900" cy="254975"/>
-          </a:xfrm>
-          <a:prstGeom prst="straightConnector1">
-            <a:avLst/>
-          </a:prstGeom>
-          <a:ln w="38100">
-            <a:solidFill>
-              <a:schemeClr val="tx1"/>
-            </a:solidFill>
-            <a:tailEnd type="triangle"/>
-          </a:ln>
-        </p:spPr>
-        <p:style>
-          <a:lnRef idx="1">
-            <a:schemeClr val="accent1"/>
-          </a:lnRef>
-          <a:fillRef idx="0">
-            <a:schemeClr val="accent1"/>
-          </a:fillRef>
-          <a:effectRef idx="0">
-            <a:schemeClr val="accent1"/>
-          </a:effectRef>
-          <a:fontRef idx="minor">
-            <a:schemeClr val="tx1"/>
-          </a:fontRef>
-        </p:style>
-      </p:cxnSp>
-      <p:sp>
-        <p:nvSpPr>
-          <p:cNvPr id="9" name="菱形 8">
-            <a:extLst>
-              <a:ext uri="{FF2B5EF4-FFF2-40B4-BE49-F238E27FC236}">
-                <a16:creationId xmlns:a16="http://schemas.microsoft.com/office/drawing/2014/main" id="{36101DE4-A20A-480A-9A7F-6EAFAFEF8131}"/>
-              </a:ext>
-            </a:extLst>
-          </p:cNvPr>
-          <p:cNvSpPr/>
+      <p:sp>
+        <p:nvSpPr>
+          <p:cNvPr id="24" name="文字方塊 23">
+            <a:extLst>
+              <a:ext uri="{FF2B5EF4-FFF2-40B4-BE49-F238E27FC236}">
+                <a16:creationId xmlns:a16="http://schemas.microsoft.com/office/drawing/2014/main" id="{24E311BC-CF98-461F-814B-7E109D5C82F9}"/>
+              </a:ext>
+            </a:extLst>
+          </p:cNvPr>
+          <p:cNvSpPr txBox="1"/>
           <p:nvPr/>
         </p:nvSpPr>
         <p:spPr>
           <a:xfrm>
-            <a:off x="1274618" y="2336879"/>
-            <a:ext cx="2844800" cy="896368"/>
-          </a:xfrm>
-          <a:prstGeom prst="diamond">
-            <a:avLst/>
-          </a:prstGeom>
-          <a:noFill/>
-          <a:ln w="38100">
-            <a:solidFill>
-              <a:schemeClr val="tx1"/>
-            </a:solidFill>
-          </a:ln>
-        </p:spPr>
-        <p:style>
-          <a:lnRef idx="2">
-            <a:schemeClr val="accent1">
-              <a:shade val="50000"/>
-            </a:schemeClr>
-          </a:lnRef>
-          <a:fillRef idx="1">
-            <a:schemeClr val="accent1"/>
-          </a:fillRef>
-          <a:effectRef idx="0">
-            <a:schemeClr val="accent1"/>
-          </a:effectRef>
-          <a:fontRef idx="minor">
-            <a:schemeClr val="lt1"/>
-          </a:fontRef>
-        </p:style>
-        <p:txBody>
-          <a:bodyPr rtlCol="0" anchor="ctr"/>
-          <a:lstStyle/>
-          <a:p>
-            <a:pPr algn="ctr"/>
-            <a:r>
-              <a:rPr lang="en-US" altLang="zh-TW" sz="1000" dirty="0">
-                <a:solidFill>
-                  <a:schemeClr val="tx1"/>
-                </a:solidFill>
-              </a:rPr>
-              <a:t>Is buffer handle null?</a:t>
-            </a:r>
-            <a:endParaRPr lang="zh-TW" altLang="en-US" sz="1000" dirty="0">
-              <a:solidFill>
-                <a:schemeClr val="tx1"/>
-              </a:solidFill>
-            </a:endParaRPr>
-          </a:p>
-        </p:txBody>
-      </p:sp>
-      <p:cxnSp>
-        <p:nvCxnSpPr>
-          <p:cNvPr id="12" name="直線單箭頭接點 11">
-            <a:extLst>
-              <a:ext uri="{FF2B5EF4-FFF2-40B4-BE49-F238E27FC236}">
-                <a16:creationId xmlns:a16="http://schemas.microsoft.com/office/drawing/2014/main" id="{6AD4E8C0-67CD-4C61-9F57-6FA20D4DAEED}"/>
-              </a:ext>
-            </a:extLst>
-          </p:cNvPr>
-          <p:cNvCxnSpPr>
-            <a:cxnSpLocks/>
-            <a:stCxn id="9" idx="2"/>
-            <a:endCxn id="18" idx="0"/>
-          </p:cNvCxnSpPr>
-          <p:nvPr/>
-        </p:nvCxnSpPr>
-        <p:spPr>
-          <a:xfrm flipH="1">
-            <a:off x="2693994" y="3233247"/>
-            <a:ext cx="3024" cy="419194"/>
-          </a:xfrm>
-          <a:prstGeom prst="straightConnector1">
-            <a:avLst/>
-          </a:prstGeom>
-          <a:ln w="38100">
-            <a:solidFill>
-              <a:schemeClr val="tx1"/>
-            </a:solidFill>
-            <a:tailEnd type="triangle"/>
-          </a:ln>
-        </p:spPr>
-        <p:style>
-          <a:lnRef idx="1">
-            <a:schemeClr val="accent1"/>
-          </a:lnRef>
-          <a:fillRef idx="0">
-            <a:schemeClr val="accent1"/>
-          </a:fillRef>
-          <a:effectRef idx="0">
-            <a:schemeClr val="accent1"/>
-          </a:effectRef>
-          <a:fontRef idx="minor">
-            <a:schemeClr val="tx1"/>
-          </a:fontRef>
-        </p:style>
-      </p:cxnSp>
-      <p:sp>
-        <p:nvSpPr>
-          <p:cNvPr id="17" name="矩形 16">
-            <a:extLst>
-              <a:ext uri="{FF2B5EF4-FFF2-40B4-BE49-F238E27FC236}">
-                <a16:creationId xmlns:a16="http://schemas.microsoft.com/office/drawing/2014/main" id="{4D1A1250-84E8-4312-BBE3-DBB340C390B4}"/>
-              </a:ext>
-            </a:extLst>
-          </p:cNvPr>
-          <p:cNvSpPr/>
-          <p:nvPr/>
-        </p:nvSpPr>
-        <p:spPr>
-          <a:xfrm>
-            <a:off x="973004" y="5087332"/>
-            <a:ext cx="3441977" cy="332737"/>
-          </a:xfrm>
-          <a:prstGeom prst="rect">
-            <a:avLst/>
-          </a:prstGeom>
-          <a:noFill/>
-          <a:ln w="38100">
-            <a:solidFill>
-              <a:schemeClr val="tx1"/>
-            </a:solidFill>
-          </a:ln>
-        </p:spPr>
-        <p:style>
-          <a:lnRef idx="2">
-            <a:schemeClr val="accent1">
-              <a:shade val="50000"/>
-            </a:schemeClr>
-          </a:lnRef>
-          <a:fillRef idx="1">
-            <a:schemeClr val="accent1"/>
-          </a:fillRef>
-          <a:effectRef idx="0">
-            <a:schemeClr val="accent1"/>
-          </a:effectRef>
-          <a:fontRef idx="minor">
-            <a:schemeClr val="lt1"/>
-          </a:fontRef>
-        </p:style>
-        <p:txBody>
-          <a:bodyPr rtlCol="0" anchor="ctr"/>
-          <a:lstStyle/>
-          <a:p>
-            <a:pPr algn="ctr"/>
-            <a:r>
-              <a:rPr lang="en-US" altLang="zh-TW" sz="1000" dirty="0">
-                <a:solidFill>
-                  <a:schemeClr val="tx1"/>
-                </a:solidFill>
-              </a:rPr>
-              <a:t>Destroy buffer and release memory</a:t>
-            </a:r>
-            <a:endParaRPr lang="zh-TW" altLang="en-US" sz="1000" dirty="0">
-              <a:solidFill>
-                <a:schemeClr val="tx1"/>
-              </a:solidFill>
-            </a:endParaRPr>
-          </a:p>
-        </p:txBody>
-      </p:sp>
-      <p:sp>
-        <p:nvSpPr>
-          <p:cNvPr id="20" name="文字方塊 19">
-            <a:extLst>
-              <a:ext uri="{FF2B5EF4-FFF2-40B4-BE49-F238E27FC236}">
-                <a16:creationId xmlns:a16="http://schemas.microsoft.com/office/drawing/2014/main" id="{DB954364-904E-4768-96AD-F662A18A25E1}"/>
-              </a:ext>
-            </a:extLst>
-          </p:cNvPr>
-          <p:cNvSpPr txBox="1"/>
-          <p:nvPr/>
-        </p:nvSpPr>
-        <p:spPr>
-          <a:xfrm>
-            <a:off x="2724548" y="3286540"/>
-            <a:ext cx="484885" cy="246221"/>
+            <a:off x="7180438" y="681311"/>
+            <a:ext cx="4642036" cy="369332"/>
           </a:xfrm>
           <a:prstGeom prst="rect">
             <a:avLst/>
@@ -4260,545 +3965,1891 @@
           <a:lstStyle/>
           <a:p>
             <a:r>
-              <a:rPr lang="en-US" altLang="zh-TW" sz="1000" dirty="0"/>
-              <a:t>No</a:t>
-            </a:r>
-            <a:endParaRPr lang="zh-TW" altLang="en-US" sz="1000" dirty="0"/>
-          </a:p>
-        </p:txBody>
-      </p:sp>
-      <p:sp>
-        <p:nvSpPr>
-          <p:cNvPr id="21" name="文字方塊 20">
-            <a:extLst>
-              <a:ext uri="{FF2B5EF4-FFF2-40B4-BE49-F238E27FC236}">
-                <a16:creationId xmlns:a16="http://schemas.microsoft.com/office/drawing/2014/main" id="{090D3404-C21C-4353-865B-F89AED6854A1}"/>
-              </a:ext>
-            </a:extLst>
-          </p:cNvPr>
-          <p:cNvSpPr txBox="1"/>
+              <a:rPr lang="en-US" altLang="zh-TW" dirty="0"/>
+              <a:t>Function </a:t>
+            </a:r>
+            <a:r>
+              <a:rPr lang="en-US" altLang="zh-TW" dirty="0" err="1"/>
+              <a:t>RefreshData</a:t>
+            </a:r>
+            <a:r>
+              <a:rPr lang="zh-TW" altLang="en-US" dirty="0"/>
+              <a:t> </a:t>
+            </a:r>
+            <a:r>
+              <a:rPr lang="en-US" altLang="zh-TW" dirty="0"/>
+              <a:t>for </a:t>
+            </a:r>
+            <a:r>
+              <a:rPr lang="en-US" altLang="zh-TW" dirty="0" err="1"/>
+              <a:t>StaticVertexBuffer</a:t>
+            </a:r>
+            <a:endParaRPr lang="zh-TW" altLang="en-US" dirty="0"/>
+          </a:p>
+        </p:txBody>
+      </p:sp>
+      <p:grpSp>
+        <p:nvGrpSpPr>
+          <p:cNvPr id="78" name="群組 77">
+            <a:extLst>
+              <a:ext uri="{FF2B5EF4-FFF2-40B4-BE49-F238E27FC236}">
+                <a16:creationId xmlns:a16="http://schemas.microsoft.com/office/drawing/2014/main" id="{AB0ACBBA-5A3B-4FE5-8ACB-730A5F244A76}"/>
+              </a:ext>
+            </a:extLst>
+          </p:cNvPr>
+          <p:cNvGrpSpPr/>
           <p:nvPr/>
-        </p:nvSpPr>
-        <p:spPr>
+        </p:nvGrpSpPr>
+        <p:grpSpPr>
           <a:xfrm>
-            <a:off x="1019296" y="2485548"/>
-            <a:ext cx="480111" cy="246221"/>
+            <a:off x="461520" y="1179955"/>
+            <a:ext cx="5438335" cy="5362888"/>
+            <a:chOff x="461520" y="1179955"/>
+            <a:chExt cx="5438335" cy="5362888"/>
           </a:xfrm>
-          <a:prstGeom prst="rect">
-            <a:avLst/>
-          </a:prstGeom>
-          <a:noFill/>
-        </p:spPr>
-        <p:txBody>
-          <a:bodyPr wrap="square" rtlCol="0">
-            <a:spAutoFit/>
-          </a:bodyPr>
-          <a:lstStyle/>
-          <a:p>
-            <a:r>
-              <a:rPr lang="en-US" altLang="zh-TW" sz="1000" dirty="0"/>
-              <a:t>Yes</a:t>
-            </a:r>
-            <a:endParaRPr lang="zh-TW" altLang="en-US" sz="1200" dirty="0"/>
-          </a:p>
-        </p:txBody>
-      </p:sp>
-      <p:sp>
-        <p:nvSpPr>
-          <p:cNvPr id="25" name="矩形 24">
-            <a:extLst>
-              <a:ext uri="{FF2B5EF4-FFF2-40B4-BE49-F238E27FC236}">
-                <a16:creationId xmlns:a16="http://schemas.microsoft.com/office/drawing/2014/main" id="{4D1B714A-EF98-4861-8F96-D6A29B196549}"/>
-              </a:ext>
-            </a:extLst>
-          </p:cNvPr>
-          <p:cNvSpPr/>
-          <p:nvPr/>
-        </p:nvSpPr>
-        <p:spPr>
-          <a:xfrm>
-            <a:off x="973004" y="5710453"/>
-            <a:ext cx="3437354" cy="332737"/>
-          </a:xfrm>
-          <a:prstGeom prst="rect">
-            <a:avLst/>
-          </a:prstGeom>
-          <a:noFill/>
-          <a:ln w="38100">
-            <a:solidFill>
-              <a:schemeClr val="tx1"/>
-            </a:solidFill>
-          </a:ln>
-        </p:spPr>
-        <p:style>
-          <a:lnRef idx="2">
-            <a:schemeClr val="accent1">
-              <a:shade val="50000"/>
-            </a:schemeClr>
-          </a:lnRef>
-          <a:fillRef idx="1">
-            <a:schemeClr val="accent1"/>
-          </a:fillRef>
-          <a:effectRef idx="0">
-            <a:schemeClr val="accent1"/>
-          </a:effectRef>
-          <a:fontRef idx="minor">
-            <a:schemeClr val="lt1"/>
-          </a:fontRef>
-        </p:style>
-        <p:txBody>
-          <a:bodyPr rtlCol="0" anchor="ctr"/>
-          <a:lstStyle/>
-          <a:p>
-            <a:pPr algn="ctr"/>
-            <a:r>
-              <a:rPr lang="en-US" altLang="zh-TW" sz="1000" dirty="0">
+        </p:grpSpPr>
+        <p:sp>
+          <p:nvSpPr>
+            <p:cNvPr id="4" name="矩形 3">
+              <a:extLst>
+                <a:ext uri="{FF2B5EF4-FFF2-40B4-BE49-F238E27FC236}">
+                  <a16:creationId xmlns:a16="http://schemas.microsoft.com/office/drawing/2014/main" id="{54121B23-9C6A-46DE-927F-49CFDF8596E2}"/>
+                </a:ext>
+              </a:extLst>
+            </p:cNvPr>
+            <p:cNvSpPr/>
+            <p:nvPr/>
+          </p:nvSpPr>
+          <p:spPr>
+            <a:xfrm>
+              <a:off x="475373" y="1360370"/>
+              <a:ext cx="3428126" cy="328198"/>
+            </a:xfrm>
+            <a:prstGeom prst="rect">
+              <a:avLst/>
+            </a:prstGeom>
+            <a:noFill/>
+            <a:ln w="38100">
+              <a:solidFill>
+                <a:schemeClr val="tx1"/>
+              </a:solidFill>
+            </a:ln>
+          </p:spPr>
+          <p:style>
+            <a:lnRef idx="2">
+              <a:schemeClr val="accent1">
+                <a:shade val="50000"/>
+              </a:schemeClr>
+            </a:lnRef>
+            <a:fillRef idx="1">
+              <a:schemeClr val="accent1"/>
+            </a:fillRef>
+            <a:effectRef idx="0">
+              <a:schemeClr val="accent1"/>
+            </a:effectRef>
+            <a:fontRef idx="minor">
+              <a:schemeClr val="lt1"/>
+            </a:fontRef>
+          </p:style>
+          <p:txBody>
+            <a:bodyPr rtlCol="0" anchor="ctr"/>
+            <a:lstStyle/>
+            <a:p>
+              <a:pPr algn="ctr"/>
+              <a:r>
+                <a:rPr lang="en-US" altLang="zh-TW" sz="1000" dirty="0" err="1">
+                  <a:solidFill>
+                    <a:schemeClr val="tx1"/>
+                  </a:solidFill>
+                </a:rPr>
+                <a:t>Ckeck</a:t>
+              </a:r>
+              <a:r>
+                <a:rPr lang="en-US" altLang="zh-TW" sz="1000" dirty="0">
+                  <a:solidFill>
+                    <a:schemeClr val="tx1"/>
+                  </a:solidFill>
+                </a:rPr>
+                <a:t> </a:t>
+              </a:r>
+              <a:r>
+                <a:rPr lang="en-US" altLang="zh-TW" sz="1000" dirty="0" err="1">
+                  <a:solidFill>
+                    <a:schemeClr val="tx1"/>
+                  </a:solidFill>
+                </a:rPr>
+                <a:t>BufferHandle</a:t>
+              </a:r>
+              <a:r>
+                <a:rPr lang="en-US" altLang="zh-TW" sz="1000" dirty="0">
+                  <a:solidFill>
+                    <a:schemeClr val="tx1"/>
+                  </a:solidFill>
+                </a:rPr>
+                <a:t> is 0 or not</a:t>
+              </a:r>
+              <a:endParaRPr lang="zh-TW" altLang="en-US" sz="1000" dirty="0">
                 <a:solidFill>
                   <a:schemeClr val="tx1"/>
                 </a:solidFill>
-              </a:rPr>
-              <a:t>Create new one</a:t>
-            </a:r>
-            <a:endParaRPr lang="zh-TW" altLang="en-US" sz="1000" dirty="0">
+              </a:endParaRPr>
+            </a:p>
+          </p:txBody>
+        </p:sp>
+        <p:cxnSp>
+          <p:nvCxnSpPr>
+            <p:cNvPr id="8" name="直線單箭頭接點 7">
+              <a:extLst>
+                <a:ext uri="{FF2B5EF4-FFF2-40B4-BE49-F238E27FC236}">
+                  <a16:creationId xmlns:a16="http://schemas.microsoft.com/office/drawing/2014/main" id="{A2924F2B-BAF2-4F69-9B2F-0226FD0A1410}"/>
+                </a:ext>
+              </a:extLst>
+            </p:cNvPr>
+            <p:cNvCxnSpPr>
+              <a:cxnSpLocks/>
+              <a:stCxn id="4" idx="2"/>
+            </p:cNvCxnSpPr>
+            <p:nvPr/>
+          </p:nvCxnSpPr>
+          <p:spPr>
+            <a:xfrm flipH="1">
+              <a:off x="2185536" y="1688568"/>
+              <a:ext cx="3900" cy="254975"/>
+            </a:xfrm>
+            <a:prstGeom prst="straightConnector1">
+              <a:avLst/>
+            </a:prstGeom>
+            <a:ln w="38100">
               <a:solidFill>
                 <a:schemeClr val="tx1"/>
               </a:solidFill>
-            </a:endParaRPr>
-          </a:p>
-        </p:txBody>
-      </p:sp>
-      <p:cxnSp>
-        <p:nvCxnSpPr>
-          <p:cNvPr id="28" name="直線單箭頭接點 27">
-            <a:extLst>
-              <a:ext uri="{FF2B5EF4-FFF2-40B4-BE49-F238E27FC236}">
-                <a16:creationId xmlns:a16="http://schemas.microsoft.com/office/drawing/2014/main" id="{D6212E94-363D-4066-9EC9-AE1F73ABD614}"/>
-              </a:ext>
-            </a:extLst>
-          </p:cNvPr>
-          <p:cNvCxnSpPr>
-            <a:cxnSpLocks/>
-            <a:stCxn id="17" idx="2"/>
-            <a:endCxn id="25" idx="0"/>
-          </p:cNvCxnSpPr>
-          <p:nvPr/>
-        </p:nvCxnSpPr>
-        <p:spPr>
-          <a:xfrm flipH="1">
-            <a:off x="2691681" y="5420069"/>
-            <a:ext cx="2312" cy="290384"/>
-          </a:xfrm>
-          <a:prstGeom prst="straightConnector1">
-            <a:avLst/>
-          </a:prstGeom>
-          <a:ln w="38100">
-            <a:solidFill>
+              <a:tailEnd type="triangle"/>
+            </a:ln>
+          </p:spPr>
+          <p:style>
+            <a:lnRef idx="1">
+              <a:schemeClr val="accent1"/>
+            </a:lnRef>
+            <a:fillRef idx="0">
+              <a:schemeClr val="accent1"/>
+            </a:fillRef>
+            <a:effectRef idx="0">
+              <a:schemeClr val="accent1"/>
+            </a:effectRef>
+            <a:fontRef idx="minor">
               <a:schemeClr val="tx1"/>
-            </a:solidFill>
-            <a:tailEnd type="triangle"/>
-          </a:ln>
-        </p:spPr>
-        <p:style>
-          <a:lnRef idx="1">
-            <a:schemeClr val="accent1"/>
-          </a:lnRef>
-          <a:fillRef idx="0">
-            <a:schemeClr val="accent1"/>
-          </a:fillRef>
-          <a:effectRef idx="0">
-            <a:schemeClr val="accent1"/>
-          </a:effectRef>
-          <a:fontRef idx="minor">
-            <a:schemeClr val="tx1"/>
-          </a:fontRef>
-        </p:style>
-      </p:cxnSp>
-      <p:cxnSp>
-        <p:nvCxnSpPr>
-          <p:cNvPr id="36" name="接點: 肘形 35">
-            <a:extLst>
-              <a:ext uri="{FF2B5EF4-FFF2-40B4-BE49-F238E27FC236}">
-                <a16:creationId xmlns:a16="http://schemas.microsoft.com/office/drawing/2014/main" id="{437C143D-297A-4228-9C51-19493288CBF2}"/>
-              </a:ext>
-            </a:extLst>
-          </p:cNvPr>
-          <p:cNvCxnSpPr>
-            <a:cxnSpLocks/>
-            <a:stCxn id="9" idx="1"/>
-            <a:endCxn id="25" idx="1"/>
-          </p:cNvCxnSpPr>
-          <p:nvPr/>
-        </p:nvCxnSpPr>
-        <p:spPr>
-          <a:xfrm rot="10800000" flipV="1">
-            <a:off x="973004" y="2785062"/>
-            <a:ext cx="301614" cy="3091759"/>
-          </a:xfrm>
-          <a:prstGeom prst="bentConnector3">
-            <a:avLst>
-              <a:gd name="adj1" fmla="val 175792"/>
-            </a:avLst>
-          </a:prstGeom>
-          <a:ln w="38100">
-            <a:solidFill>
-              <a:schemeClr val="tx1"/>
-            </a:solidFill>
-            <a:tailEnd type="triangle"/>
-          </a:ln>
-        </p:spPr>
-        <p:style>
-          <a:lnRef idx="1">
-            <a:schemeClr val="accent1"/>
-          </a:lnRef>
-          <a:fillRef idx="0">
-            <a:schemeClr val="accent1"/>
-          </a:fillRef>
-          <a:effectRef idx="0">
-            <a:schemeClr val="accent1"/>
-          </a:effectRef>
-          <a:fontRef idx="minor">
-            <a:schemeClr val="tx1"/>
-          </a:fontRef>
-        </p:style>
-      </p:cxnSp>
-      <p:sp>
-        <p:nvSpPr>
-          <p:cNvPr id="18" name="矩形 17">
-            <a:extLst>
-              <a:ext uri="{FF2B5EF4-FFF2-40B4-BE49-F238E27FC236}">
-                <a16:creationId xmlns:a16="http://schemas.microsoft.com/office/drawing/2014/main" id="{FABDA4C0-6255-4A1A-8252-AF987408F1C0}"/>
-              </a:ext>
-            </a:extLst>
-          </p:cNvPr>
-          <p:cNvSpPr/>
-          <p:nvPr/>
-        </p:nvSpPr>
-        <p:spPr>
-          <a:xfrm>
-            <a:off x="973005" y="3652441"/>
-            <a:ext cx="3441977" cy="369332"/>
-          </a:xfrm>
-          <a:prstGeom prst="rect">
-            <a:avLst/>
-          </a:prstGeom>
-          <a:noFill/>
-          <a:ln w="38100">
-            <a:solidFill>
-              <a:schemeClr val="tx1"/>
-            </a:solidFill>
-          </a:ln>
-        </p:spPr>
-        <p:style>
-          <a:lnRef idx="2">
-            <a:schemeClr val="accent1">
-              <a:shade val="50000"/>
-            </a:schemeClr>
-          </a:lnRef>
-          <a:fillRef idx="1">
-            <a:schemeClr val="accent1"/>
-          </a:fillRef>
-          <a:effectRef idx="0">
-            <a:schemeClr val="accent1"/>
-          </a:effectRef>
-          <a:fontRef idx="minor">
-            <a:schemeClr val="lt1"/>
-          </a:fontRef>
-        </p:style>
-        <p:txBody>
-          <a:bodyPr rtlCol="0" anchor="ctr"/>
-          <a:lstStyle/>
-          <a:p>
-            <a:pPr algn="ctr"/>
-            <a:r>
-              <a:rPr lang="en-US" altLang="zh-TW" sz="1000" dirty="0">
+            </a:fontRef>
+          </p:style>
+        </p:cxnSp>
+        <p:sp>
+          <p:nvSpPr>
+            <p:cNvPr id="9" name="菱形 8">
+              <a:extLst>
+                <a:ext uri="{FF2B5EF4-FFF2-40B4-BE49-F238E27FC236}">
+                  <a16:creationId xmlns:a16="http://schemas.microsoft.com/office/drawing/2014/main" id="{36101DE4-A20A-480A-9A7F-6EAFAFEF8131}"/>
+                </a:ext>
+              </a:extLst>
+            </p:cNvPr>
+            <p:cNvSpPr/>
+            <p:nvPr/>
+          </p:nvSpPr>
+          <p:spPr>
+            <a:xfrm>
+              <a:off x="763135" y="1925149"/>
+              <a:ext cx="2844800" cy="896368"/>
+            </a:xfrm>
+            <a:prstGeom prst="diamond">
+              <a:avLst/>
+            </a:prstGeom>
+            <a:noFill/>
+            <a:ln w="38100">
+              <a:solidFill>
+                <a:schemeClr val="tx1"/>
+              </a:solidFill>
+            </a:ln>
+          </p:spPr>
+          <p:style>
+            <a:lnRef idx="2">
+              <a:schemeClr val="accent1">
+                <a:shade val="50000"/>
+              </a:schemeClr>
+            </a:lnRef>
+            <a:fillRef idx="1">
+              <a:schemeClr val="accent1"/>
+            </a:fillRef>
+            <a:effectRef idx="0">
+              <a:schemeClr val="accent1"/>
+            </a:effectRef>
+            <a:fontRef idx="minor">
+              <a:schemeClr val="lt1"/>
+            </a:fontRef>
+          </p:style>
+          <p:txBody>
+            <a:bodyPr rtlCol="0" anchor="ctr"/>
+            <a:lstStyle/>
+            <a:p>
+              <a:pPr algn="ctr"/>
+              <a:r>
+                <a:rPr lang="en-US" altLang="zh-TW" sz="1000" dirty="0">
+                  <a:solidFill>
+                    <a:schemeClr val="tx1"/>
+                  </a:solidFill>
+                </a:rPr>
+                <a:t>Is buffer handle null?</a:t>
+              </a:r>
+              <a:endParaRPr lang="zh-TW" altLang="en-US" sz="1000" dirty="0">
                 <a:solidFill>
                   <a:schemeClr val="tx1"/>
                 </a:solidFill>
-              </a:rPr>
-              <a:t>Compare current buffer size and new buffer size.</a:t>
-            </a:r>
-            <a:endParaRPr lang="zh-TW" altLang="en-US" sz="1000" dirty="0">
+              </a:endParaRPr>
+            </a:p>
+          </p:txBody>
+        </p:sp>
+        <p:cxnSp>
+          <p:nvCxnSpPr>
+            <p:cNvPr id="12" name="直線單箭頭接點 11">
+              <a:extLst>
+                <a:ext uri="{FF2B5EF4-FFF2-40B4-BE49-F238E27FC236}">
+                  <a16:creationId xmlns:a16="http://schemas.microsoft.com/office/drawing/2014/main" id="{6AD4E8C0-67CD-4C61-9F57-6FA20D4DAEED}"/>
+                </a:ext>
+              </a:extLst>
+            </p:cNvPr>
+            <p:cNvCxnSpPr>
+              <a:cxnSpLocks/>
+              <a:stCxn id="9" idx="2"/>
+              <a:endCxn id="18" idx="0"/>
+            </p:cNvCxnSpPr>
+            <p:nvPr/>
+          </p:nvCxnSpPr>
+          <p:spPr>
+            <a:xfrm flipH="1">
+              <a:off x="2182511" y="2821517"/>
+              <a:ext cx="3024" cy="419194"/>
+            </a:xfrm>
+            <a:prstGeom prst="straightConnector1">
+              <a:avLst/>
+            </a:prstGeom>
+            <a:ln w="38100">
               <a:solidFill>
                 <a:schemeClr val="tx1"/>
               </a:solidFill>
-            </a:endParaRPr>
-          </a:p>
-        </p:txBody>
-      </p:sp>
-      <p:sp>
-        <p:nvSpPr>
-          <p:cNvPr id="22" name="菱形 21">
-            <a:extLst>
-              <a:ext uri="{FF2B5EF4-FFF2-40B4-BE49-F238E27FC236}">
-                <a16:creationId xmlns:a16="http://schemas.microsoft.com/office/drawing/2014/main" id="{6EF627EE-48A4-4B4A-A28A-E2C63D6C2149}"/>
-              </a:ext>
-            </a:extLst>
-          </p:cNvPr>
-          <p:cNvSpPr/>
-          <p:nvPr/>
-        </p:nvSpPr>
-        <p:spPr>
-          <a:xfrm>
-            <a:off x="3566538" y="4105168"/>
-            <a:ext cx="2844800" cy="1077134"/>
-          </a:xfrm>
-          <a:prstGeom prst="diamond">
-            <a:avLst/>
-          </a:prstGeom>
-          <a:noFill/>
-          <a:ln w="38100">
-            <a:solidFill>
+              <a:tailEnd type="triangle"/>
+            </a:ln>
+          </p:spPr>
+          <p:style>
+            <a:lnRef idx="1">
+              <a:schemeClr val="accent1"/>
+            </a:lnRef>
+            <a:fillRef idx="0">
+              <a:schemeClr val="accent1"/>
+            </a:fillRef>
+            <a:effectRef idx="0">
+              <a:schemeClr val="accent1"/>
+            </a:effectRef>
+            <a:fontRef idx="minor">
               <a:schemeClr val="tx1"/>
-            </a:solidFill>
-          </a:ln>
-        </p:spPr>
-        <p:style>
-          <a:lnRef idx="2">
-            <a:schemeClr val="accent1">
-              <a:shade val="50000"/>
-            </a:schemeClr>
-          </a:lnRef>
-          <a:fillRef idx="1">
-            <a:schemeClr val="accent1"/>
-          </a:fillRef>
-          <a:effectRef idx="0">
-            <a:schemeClr val="accent1"/>
-          </a:effectRef>
-          <a:fontRef idx="minor">
-            <a:schemeClr val="lt1"/>
-          </a:fontRef>
-        </p:style>
-        <p:txBody>
-          <a:bodyPr rtlCol="0" anchor="ctr"/>
-          <a:lstStyle/>
-          <a:p>
-            <a:pPr algn="ctr"/>
-            <a:r>
-              <a:rPr lang="en-US" altLang="zh-TW" sz="1000" dirty="0">
+            </a:fontRef>
+          </p:style>
+        </p:cxnSp>
+        <p:sp>
+          <p:nvSpPr>
+            <p:cNvPr id="17" name="矩形 16">
+              <a:extLst>
+                <a:ext uri="{FF2B5EF4-FFF2-40B4-BE49-F238E27FC236}">
+                  <a16:creationId xmlns:a16="http://schemas.microsoft.com/office/drawing/2014/main" id="{4D1A1250-84E8-4312-BBE3-DBB340C390B4}"/>
+                </a:ext>
+              </a:extLst>
+            </p:cNvPr>
+            <p:cNvSpPr/>
+            <p:nvPr/>
+          </p:nvSpPr>
+          <p:spPr>
+            <a:xfrm>
+              <a:off x="461521" y="4675602"/>
+              <a:ext cx="3441977" cy="332737"/>
+            </a:xfrm>
+            <a:prstGeom prst="rect">
+              <a:avLst/>
+            </a:prstGeom>
+            <a:noFill/>
+            <a:ln w="38100">
+              <a:solidFill>
+                <a:schemeClr val="tx1"/>
+              </a:solidFill>
+            </a:ln>
+          </p:spPr>
+          <p:style>
+            <a:lnRef idx="2">
+              <a:schemeClr val="accent1">
+                <a:shade val="50000"/>
+              </a:schemeClr>
+            </a:lnRef>
+            <a:fillRef idx="1">
+              <a:schemeClr val="accent1"/>
+            </a:fillRef>
+            <a:effectRef idx="0">
+              <a:schemeClr val="accent1"/>
+            </a:effectRef>
+            <a:fontRef idx="minor">
+              <a:schemeClr val="lt1"/>
+            </a:fontRef>
+          </p:style>
+          <p:txBody>
+            <a:bodyPr rtlCol="0" anchor="ctr"/>
+            <a:lstStyle/>
+            <a:p>
+              <a:pPr algn="ctr"/>
+              <a:r>
+                <a:rPr lang="en-US" altLang="zh-TW" sz="1000" dirty="0">
+                  <a:solidFill>
+                    <a:schemeClr val="tx1"/>
+                  </a:solidFill>
+                </a:rPr>
+                <a:t>Destroy buffer and release memory</a:t>
+              </a:r>
+              <a:endParaRPr lang="zh-TW" altLang="en-US" sz="1000" dirty="0">
                 <a:solidFill>
                   <a:schemeClr val="tx1"/>
                 </a:solidFill>
-              </a:rPr>
-              <a:t>Is current buffer size smaller than new size?</a:t>
-            </a:r>
-            <a:endParaRPr lang="zh-TW" altLang="en-US" sz="1000" dirty="0">
+              </a:endParaRPr>
+            </a:p>
+          </p:txBody>
+        </p:sp>
+        <p:sp>
+          <p:nvSpPr>
+            <p:cNvPr id="20" name="文字方塊 19">
+              <a:extLst>
+                <a:ext uri="{FF2B5EF4-FFF2-40B4-BE49-F238E27FC236}">
+                  <a16:creationId xmlns:a16="http://schemas.microsoft.com/office/drawing/2014/main" id="{DB954364-904E-4768-96AD-F662A18A25E1}"/>
+                </a:ext>
+              </a:extLst>
+            </p:cNvPr>
+            <p:cNvSpPr txBox="1"/>
+            <p:nvPr/>
+          </p:nvSpPr>
+          <p:spPr>
+            <a:xfrm>
+              <a:off x="2213065" y="2874810"/>
+              <a:ext cx="484885" cy="246221"/>
+            </a:xfrm>
+            <a:prstGeom prst="rect">
+              <a:avLst/>
+            </a:prstGeom>
+            <a:noFill/>
+          </p:spPr>
+          <p:txBody>
+            <a:bodyPr wrap="square" rtlCol="0">
+              <a:spAutoFit/>
+            </a:bodyPr>
+            <a:lstStyle/>
+            <a:p>
+              <a:r>
+                <a:rPr lang="en-US" altLang="zh-TW" sz="1000" dirty="0"/>
+                <a:t>No</a:t>
+              </a:r>
+              <a:endParaRPr lang="zh-TW" altLang="en-US" sz="1000" dirty="0"/>
+            </a:p>
+          </p:txBody>
+        </p:sp>
+        <p:sp>
+          <p:nvSpPr>
+            <p:cNvPr id="21" name="文字方塊 20">
+              <a:extLst>
+                <a:ext uri="{FF2B5EF4-FFF2-40B4-BE49-F238E27FC236}">
+                  <a16:creationId xmlns:a16="http://schemas.microsoft.com/office/drawing/2014/main" id="{090D3404-C21C-4353-865B-F89AED6854A1}"/>
+                </a:ext>
+              </a:extLst>
+            </p:cNvPr>
+            <p:cNvSpPr txBox="1"/>
+            <p:nvPr/>
+          </p:nvSpPr>
+          <p:spPr>
+            <a:xfrm>
+              <a:off x="507813" y="2073818"/>
+              <a:ext cx="480111" cy="246221"/>
+            </a:xfrm>
+            <a:prstGeom prst="rect">
+              <a:avLst/>
+            </a:prstGeom>
+            <a:noFill/>
+          </p:spPr>
+          <p:txBody>
+            <a:bodyPr wrap="square" rtlCol="0">
+              <a:spAutoFit/>
+            </a:bodyPr>
+            <a:lstStyle/>
+            <a:p>
+              <a:r>
+                <a:rPr lang="en-US" altLang="zh-TW" sz="1000" dirty="0"/>
+                <a:t>Yes</a:t>
+              </a:r>
+              <a:endParaRPr lang="zh-TW" altLang="en-US" sz="1200" dirty="0"/>
+            </a:p>
+          </p:txBody>
+        </p:sp>
+        <p:sp>
+          <p:nvSpPr>
+            <p:cNvPr id="25" name="矩形 24">
+              <a:extLst>
+                <a:ext uri="{FF2B5EF4-FFF2-40B4-BE49-F238E27FC236}">
+                  <a16:creationId xmlns:a16="http://schemas.microsoft.com/office/drawing/2014/main" id="{4D1B714A-EF98-4861-8F96-D6A29B196549}"/>
+                </a:ext>
+              </a:extLst>
+            </p:cNvPr>
+            <p:cNvSpPr/>
+            <p:nvPr/>
+          </p:nvSpPr>
+          <p:spPr>
+            <a:xfrm>
+              <a:off x="461521" y="5298723"/>
+              <a:ext cx="3437354" cy="332737"/>
+            </a:xfrm>
+            <a:prstGeom prst="rect">
+              <a:avLst/>
+            </a:prstGeom>
+            <a:noFill/>
+            <a:ln w="38100">
               <a:solidFill>
                 <a:schemeClr val="tx1"/>
               </a:solidFill>
-            </a:endParaRPr>
-          </a:p>
-        </p:txBody>
-      </p:sp>
-      <p:cxnSp>
-        <p:nvCxnSpPr>
-          <p:cNvPr id="23" name="接點: 肘形 22">
-            <a:extLst>
-              <a:ext uri="{FF2B5EF4-FFF2-40B4-BE49-F238E27FC236}">
-                <a16:creationId xmlns:a16="http://schemas.microsoft.com/office/drawing/2014/main" id="{97D14BAA-E92C-4245-8CC9-F1A5FF29341C}"/>
-              </a:ext>
-            </a:extLst>
-          </p:cNvPr>
-          <p:cNvCxnSpPr>
-            <a:cxnSpLocks/>
-            <a:stCxn id="18" idx="3"/>
-            <a:endCxn id="22" idx="0"/>
-          </p:cNvCxnSpPr>
+            </a:ln>
+          </p:spPr>
+          <p:style>
+            <a:lnRef idx="2">
+              <a:schemeClr val="accent1">
+                <a:shade val="50000"/>
+              </a:schemeClr>
+            </a:lnRef>
+            <a:fillRef idx="1">
+              <a:schemeClr val="accent1"/>
+            </a:fillRef>
+            <a:effectRef idx="0">
+              <a:schemeClr val="accent1"/>
+            </a:effectRef>
+            <a:fontRef idx="minor">
+              <a:schemeClr val="lt1"/>
+            </a:fontRef>
+          </p:style>
+          <p:txBody>
+            <a:bodyPr rtlCol="0" anchor="ctr"/>
+            <a:lstStyle/>
+            <a:p>
+              <a:pPr algn="ctr"/>
+              <a:r>
+                <a:rPr lang="en-US" altLang="zh-TW" sz="1000" dirty="0">
+                  <a:solidFill>
+                    <a:schemeClr val="tx1"/>
+                  </a:solidFill>
+                </a:rPr>
+                <a:t>Create new one</a:t>
+              </a:r>
+              <a:endParaRPr lang="zh-TW" altLang="en-US" sz="1000" dirty="0">
+                <a:solidFill>
+                  <a:schemeClr val="tx1"/>
+                </a:solidFill>
+              </a:endParaRPr>
+            </a:p>
+          </p:txBody>
+        </p:sp>
+        <p:cxnSp>
+          <p:nvCxnSpPr>
+            <p:cNvPr id="28" name="直線單箭頭接點 27">
+              <a:extLst>
+                <a:ext uri="{FF2B5EF4-FFF2-40B4-BE49-F238E27FC236}">
+                  <a16:creationId xmlns:a16="http://schemas.microsoft.com/office/drawing/2014/main" id="{D6212E94-363D-4066-9EC9-AE1F73ABD614}"/>
+                </a:ext>
+              </a:extLst>
+            </p:cNvPr>
+            <p:cNvCxnSpPr>
+              <a:cxnSpLocks/>
+              <a:stCxn id="17" idx="2"/>
+              <a:endCxn id="25" idx="0"/>
+            </p:cNvCxnSpPr>
+            <p:nvPr/>
+          </p:nvCxnSpPr>
+          <p:spPr>
+            <a:xfrm flipH="1">
+              <a:off x="2180198" y="5008339"/>
+              <a:ext cx="2312" cy="290384"/>
+            </a:xfrm>
+            <a:prstGeom prst="straightConnector1">
+              <a:avLst/>
+            </a:prstGeom>
+            <a:ln w="38100">
+              <a:solidFill>
+                <a:schemeClr val="tx1"/>
+              </a:solidFill>
+              <a:tailEnd type="triangle"/>
+            </a:ln>
+          </p:spPr>
+          <p:style>
+            <a:lnRef idx="1">
+              <a:schemeClr val="accent1"/>
+            </a:lnRef>
+            <a:fillRef idx="0">
+              <a:schemeClr val="accent1"/>
+            </a:fillRef>
+            <a:effectRef idx="0">
+              <a:schemeClr val="accent1"/>
+            </a:effectRef>
+            <a:fontRef idx="minor">
+              <a:schemeClr val="tx1"/>
+            </a:fontRef>
+          </p:style>
+        </p:cxnSp>
+        <p:cxnSp>
+          <p:nvCxnSpPr>
+            <p:cNvPr id="36" name="接點: 肘形 35">
+              <a:extLst>
+                <a:ext uri="{FF2B5EF4-FFF2-40B4-BE49-F238E27FC236}">
+                  <a16:creationId xmlns:a16="http://schemas.microsoft.com/office/drawing/2014/main" id="{437C143D-297A-4228-9C51-19493288CBF2}"/>
+                </a:ext>
+              </a:extLst>
+            </p:cNvPr>
+            <p:cNvCxnSpPr>
+              <a:cxnSpLocks/>
+              <a:stCxn id="9" idx="1"/>
+              <a:endCxn id="25" idx="1"/>
+            </p:cNvCxnSpPr>
+            <p:nvPr/>
+          </p:nvCxnSpPr>
+          <p:spPr>
+            <a:xfrm rot="10800000" flipV="1">
+              <a:off x="461521" y="2373332"/>
+              <a:ext cx="301614" cy="3091759"/>
+            </a:xfrm>
+            <a:prstGeom prst="bentConnector3">
+              <a:avLst>
+                <a:gd name="adj1" fmla="val 175792"/>
+              </a:avLst>
+            </a:prstGeom>
+            <a:ln w="38100">
+              <a:solidFill>
+                <a:schemeClr val="tx1"/>
+              </a:solidFill>
+              <a:tailEnd type="triangle"/>
+            </a:ln>
+          </p:spPr>
+          <p:style>
+            <a:lnRef idx="1">
+              <a:schemeClr val="accent1"/>
+            </a:lnRef>
+            <a:fillRef idx="0">
+              <a:schemeClr val="accent1"/>
+            </a:fillRef>
+            <a:effectRef idx="0">
+              <a:schemeClr val="accent1"/>
+            </a:effectRef>
+            <a:fontRef idx="minor">
+              <a:schemeClr val="tx1"/>
+            </a:fontRef>
+          </p:style>
+        </p:cxnSp>
+        <p:sp>
+          <p:nvSpPr>
+            <p:cNvPr id="18" name="矩形 17">
+              <a:extLst>
+                <a:ext uri="{FF2B5EF4-FFF2-40B4-BE49-F238E27FC236}">
+                  <a16:creationId xmlns:a16="http://schemas.microsoft.com/office/drawing/2014/main" id="{FABDA4C0-6255-4A1A-8252-AF987408F1C0}"/>
+                </a:ext>
+              </a:extLst>
+            </p:cNvPr>
+            <p:cNvSpPr/>
+            <p:nvPr/>
+          </p:nvSpPr>
+          <p:spPr>
+            <a:xfrm>
+              <a:off x="461522" y="3240711"/>
+              <a:ext cx="3441977" cy="369332"/>
+            </a:xfrm>
+            <a:prstGeom prst="rect">
+              <a:avLst/>
+            </a:prstGeom>
+            <a:noFill/>
+            <a:ln w="38100">
+              <a:solidFill>
+                <a:schemeClr val="tx1"/>
+              </a:solidFill>
+            </a:ln>
+          </p:spPr>
+          <p:style>
+            <a:lnRef idx="2">
+              <a:schemeClr val="accent1">
+                <a:shade val="50000"/>
+              </a:schemeClr>
+            </a:lnRef>
+            <a:fillRef idx="1">
+              <a:schemeClr val="accent1"/>
+            </a:fillRef>
+            <a:effectRef idx="0">
+              <a:schemeClr val="accent1"/>
+            </a:effectRef>
+            <a:fontRef idx="minor">
+              <a:schemeClr val="lt1"/>
+            </a:fontRef>
+          </p:style>
+          <p:txBody>
+            <a:bodyPr rtlCol="0" anchor="ctr"/>
+            <a:lstStyle/>
+            <a:p>
+              <a:pPr algn="ctr"/>
+              <a:r>
+                <a:rPr lang="en-US" altLang="zh-TW" sz="1000" dirty="0">
+                  <a:solidFill>
+                    <a:schemeClr val="tx1"/>
+                  </a:solidFill>
+                </a:rPr>
+                <a:t>Compare current buffer size and new buffer size.</a:t>
+              </a:r>
+              <a:endParaRPr lang="zh-TW" altLang="en-US" sz="1000" dirty="0">
+                <a:solidFill>
+                  <a:schemeClr val="tx1"/>
+                </a:solidFill>
+              </a:endParaRPr>
+            </a:p>
+          </p:txBody>
+        </p:sp>
+        <p:sp>
+          <p:nvSpPr>
+            <p:cNvPr id="22" name="菱形 21">
+              <a:extLst>
+                <a:ext uri="{FF2B5EF4-FFF2-40B4-BE49-F238E27FC236}">
+                  <a16:creationId xmlns:a16="http://schemas.microsoft.com/office/drawing/2014/main" id="{6EF627EE-48A4-4B4A-A28A-E2C63D6C2149}"/>
+                </a:ext>
+              </a:extLst>
+            </p:cNvPr>
+            <p:cNvSpPr/>
+            <p:nvPr/>
+          </p:nvSpPr>
+          <p:spPr>
+            <a:xfrm>
+              <a:off x="3055055" y="3693438"/>
+              <a:ext cx="2844800" cy="1077134"/>
+            </a:xfrm>
+            <a:prstGeom prst="diamond">
+              <a:avLst/>
+            </a:prstGeom>
+            <a:noFill/>
+            <a:ln w="38100">
+              <a:solidFill>
+                <a:schemeClr val="tx1"/>
+              </a:solidFill>
+            </a:ln>
+          </p:spPr>
+          <p:style>
+            <a:lnRef idx="2">
+              <a:schemeClr val="accent1">
+                <a:shade val="50000"/>
+              </a:schemeClr>
+            </a:lnRef>
+            <a:fillRef idx="1">
+              <a:schemeClr val="accent1"/>
+            </a:fillRef>
+            <a:effectRef idx="0">
+              <a:schemeClr val="accent1"/>
+            </a:effectRef>
+            <a:fontRef idx="minor">
+              <a:schemeClr val="lt1"/>
+            </a:fontRef>
+          </p:style>
+          <p:txBody>
+            <a:bodyPr rtlCol="0" anchor="ctr"/>
+            <a:lstStyle/>
+            <a:p>
+              <a:pPr algn="ctr"/>
+              <a:r>
+                <a:rPr lang="en-US" altLang="zh-TW" sz="1000" dirty="0">
+                  <a:solidFill>
+                    <a:schemeClr val="tx1"/>
+                  </a:solidFill>
+                </a:rPr>
+                <a:t>Is current buffer size smaller than new size?</a:t>
+              </a:r>
+              <a:endParaRPr lang="zh-TW" altLang="en-US" sz="1000" dirty="0">
+                <a:solidFill>
+                  <a:schemeClr val="tx1"/>
+                </a:solidFill>
+              </a:endParaRPr>
+            </a:p>
+          </p:txBody>
+        </p:sp>
+        <p:cxnSp>
+          <p:nvCxnSpPr>
+            <p:cNvPr id="23" name="接點: 肘形 22">
+              <a:extLst>
+                <a:ext uri="{FF2B5EF4-FFF2-40B4-BE49-F238E27FC236}">
+                  <a16:creationId xmlns:a16="http://schemas.microsoft.com/office/drawing/2014/main" id="{97D14BAA-E92C-4245-8CC9-F1A5FF29341C}"/>
+                </a:ext>
+              </a:extLst>
+            </p:cNvPr>
+            <p:cNvCxnSpPr>
+              <a:cxnSpLocks/>
+              <a:stCxn id="18" idx="3"/>
+              <a:endCxn id="22" idx="0"/>
+            </p:cNvCxnSpPr>
+            <p:nvPr/>
+          </p:nvCxnSpPr>
+          <p:spPr>
+            <a:xfrm>
+              <a:off x="3903499" y="3425377"/>
+              <a:ext cx="573956" cy="268061"/>
+            </a:xfrm>
+            <a:prstGeom prst="bentConnector2">
+              <a:avLst/>
+            </a:prstGeom>
+            <a:ln w="38100">
+              <a:solidFill>
+                <a:schemeClr val="tx1"/>
+              </a:solidFill>
+              <a:tailEnd type="triangle"/>
+            </a:ln>
+          </p:spPr>
+          <p:style>
+            <a:lnRef idx="1">
+              <a:schemeClr val="accent1"/>
+            </a:lnRef>
+            <a:fillRef idx="0">
+              <a:schemeClr val="accent1"/>
+            </a:fillRef>
+            <a:effectRef idx="0">
+              <a:schemeClr val="accent1"/>
+            </a:effectRef>
+            <a:fontRef idx="minor">
+              <a:schemeClr val="tx1"/>
+            </a:fontRef>
+          </p:style>
+        </p:cxnSp>
+        <p:cxnSp>
+          <p:nvCxnSpPr>
+            <p:cNvPr id="40" name="接點: 肘形 39">
+              <a:extLst>
+                <a:ext uri="{FF2B5EF4-FFF2-40B4-BE49-F238E27FC236}">
+                  <a16:creationId xmlns:a16="http://schemas.microsoft.com/office/drawing/2014/main" id="{8E1BB32D-E65C-4CD9-BFE0-9EEBDADE904D}"/>
+                </a:ext>
+              </a:extLst>
+            </p:cNvPr>
+            <p:cNvCxnSpPr>
+              <a:cxnSpLocks/>
+              <a:stCxn id="22" idx="2"/>
+            </p:cNvCxnSpPr>
+            <p:nvPr/>
+          </p:nvCxnSpPr>
+          <p:spPr>
+            <a:xfrm rot="5400000">
+              <a:off x="2812927" y="4135532"/>
+              <a:ext cx="1029489" cy="2299569"/>
+            </a:xfrm>
+            <a:prstGeom prst="bentConnector2">
+              <a:avLst/>
+            </a:prstGeom>
+            <a:ln w="38100">
+              <a:solidFill>
+                <a:schemeClr val="tx1"/>
+              </a:solidFill>
+              <a:tailEnd type="triangle"/>
+            </a:ln>
+          </p:spPr>
+          <p:style>
+            <a:lnRef idx="1">
+              <a:schemeClr val="accent1"/>
+            </a:lnRef>
+            <a:fillRef idx="0">
+              <a:schemeClr val="accent1"/>
+            </a:fillRef>
+            <a:effectRef idx="0">
+              <a:schemeClr val="accent1"/>
+            </a:effectRef>
+            <a:fontRef idx="minor">
+              <a:schemeClr val="tx1"/>
+            </a:fontRef>
+          </p:style>
+        </p:cxnSp>
+        <p:sp>
+          <p:nvSpPr>
+            <p:cNvPr id="43" name="文字方塊 42">
+              <a:extLst>
+                <a:ext uri="{FF2B5EF4-FFF2-40B4-BE49-F238E27FC236}">
+                  <a16:creationId xmlns:a16="http://schemas.microsoft.com/office/drawing/2014/main" id="{DE437A75-1F9F-46FC-8C5E-69D17EDE0291}"/>
+                </a:ext>
+              </a:extLst>
+            </p:cNvPr>
+            <p:cNvSpPr txBox="1"/>
+            <p:nvPr/>
+          </p:nvSpPr>
+          <p:spPr>
+            <a:xfrm>
+              <a:off x="4463603" y="4870321"/>
+              <a:ext cx="484885" cy="246221"/>
+            </a:xfrm>
+            <a:prstGeom prst="rect">
+              <a:avLst/>
+            </a:prstGeom>
+            <a:noFill/>
+          </p:spPr>
+          <p:txBody>
+            <a:bodyPr wrap="square" rtlCol="0">
+              <a:spAutoFit/>
+            </a:bodyPr>
+            <a:lstStyle/>
+            <a:p>
+              <a:r>
+                <a:rPr lang="en-US" altLang="zh-TW" sz="1000" dirty="0"/>
+                <a:t>No</a:t>
+              </a:r>
+              <a:endParaRPr lang="zh-TW" altLang="en-US" sz="1000" dirty="0"/>
+            </a:p>
+          </p:txBody>
+        </p:sp>
+        <p:cxnSp>
+          <p:nvCxnSpPr>
+            <p:cNvPr id="44" name="接點: 肘形 43">
+              <a:extLst>
+                <a:ext uri="{FF2B5EF4-FFF2-40B4-BE49-F238E27FC236}">
+                  <a16:creationId xmlns:a16="http://schemas.microsoft.com/office/drawing/2014/main" id="{4E3CBDD9-4AE0-4601-954F-01478892CDC2}"/>
+                </a:ext>
+              </a:extLst>
+            </p:cNvPr>
+            <p:cNvCxnSpPr>
+              <a:cxnSpLocks/>
+              <a:stCxn id="22" idx="1"/>
+              <a:endCxn id="17" idx="0"/>
+            </p:cNvCxnSpPr>
+            <p:nvPr/>
+          </p:nvCxnSpPr>
+          <p:spPr>
+            <a:xfrm rot="10800000" flipV="1">
+              <a:off x="2182511" y="4232004"/>
+              <a:ext cx="872545" cy="443597"/>
+            </a:xfrm>
+            <a:prstGeom prst="bentConnector2">
+              <a:avLst/>
+            </a:prstGeom>
+            <a:ln w="38100">
+              <a:solidFill>
+                <a:schemeClr val="tx1"/>
+              </a:solidFill>
+              <a:tailEnd type="triangle"/>
+            </a:ln>
+          </p:spPr>
+          <p:style>
+            <a:lnRef idx="1">
+              <a:schemeClr val="accent1"/>
+            </a:lnRef>
+            <a:fillRef idx="0">
+              <a:schemeClr val="accent1"/>
+            </a:fillRef>
+            <a:effectRef idx="0">
+              <a:schemeClr val="accent1"/>
+            </a:effectRef>
+            <a:fontRef idx="minor">
+              <a:schemeClr val="tx1"/>
+            </a:fontRef>
+          </p:style>
+        </p:cxnSp>
+        <p:sp>
+          <p:nvSpPr>
+            <p:cNvPr id="48" name="文字方塊 47">
+              <a:extLst>
+                <a:ext uri="{FF2B5EF4-FFF2-40B4-BE49-F238E27FC236}">
+                  <a16:creationId xmlns:a16="http://schemas.microsoft.com/office/drawing/2014/main" id="{DB9C473C-AA63-4083-B70B-F2BD3C33A323}"/>
+                </a:ext>
+              </a:extLst>
+            </p:cNvPr>
+            <p:cNvSpPr txBox="1"/>
+            <p:nvPr/>
+          </p:nvSpPr>
+          <p:spPr>
+            <a:xfrm>
+              <a:off x="2622473" y="3943800"/>
+              <a:ext cx="480111" cy="246221"/>
+            </a:xfrm>
+            <a:prstGeom prst="rect">
+              <a:avLst/>
+            </a:prstGeom>
+            <a:noFill/>
+          </p:spPr>
+          <p:txBody>
+            <a:bodyPr wrap="square" rtlCol="0">
+              <a:spAutoFit/>
+            </a:bodyPr>
+            <a:lstStyle/>
+            <a:p>
+              <a:r>
+                <a:rPr lang="en-US" altLang="zh-TW" sz="1000" dirty="0"/>
+                <a:t>Yes</a:t>
+              </a:r>
+              <a:endParaRPr lang="zh-TW" altLang="en-US" sz="1200" dirty="0"/>
+            </a:p>
+          </p:txBody>
+        </p:sp>
+        <p:sp>
+          <p:nvSpPr>
+            <p:cNvPr id="50" name="矩形 49">
+              <a:extLst>
+                <a:ext uri="{FF2B5EF4-FFF2-40B4-BE49-F238E27FC236}">
+                  <a16:creationId xmlns:a16="http://schemas.microsoft.com/office/drawing/2014/main" id="{8378BDF9-3729-4BE3-80FA-D9C996450B55}"/>
+                </a:ext>
+              </a:extLst>
+            </p:cNvPr>
+            <p:cNvSpPr/>
+            <p:nvPr/>
+          </p:nvSpPr>
+          <p:spPr>
+            <a:xfrm>
+              <a:off x="461520" y="5968662"/>
+              <a:ext cx="3437354" cy="332737"/>
+            </a:xfrm>
+            <a:prstGeom prst="rect">
+              <a:avLst/>
+            </a:prstGeom>
+            <a:noFill/>
+            <a:ln w="38100">
+              <a:solidFill>
+                <a:schemeClr val="tx1"/>
+              </a:solidFill>
+            </a:ln>
+          </p:spPr>
+          <p:style>
+            <a:lnRef idx="2">
+              <a:schemeClr val="accent1">
+                <a:shade val="50000"/>
+              </a:schemeClr>
+            </a:lnRef>
+            <a:fillRef idx="1">
+              <a:schemeClr val="accent1"/>
+            </a:fillRef>
+            <a:effectRef idx="0">
+              <a:schemeClr val="accent1"/>
+            </a:effectRef>
+            <a:fontRef idx="minor">
+              <a:schemeClr val="lt1"/>
+            </a:fontRef>
+          </p:style>
+          <p:txBody>
+            <a:bodyPr rtlCol="0" anchor="ctr"/>
+            <a:lstStyle/>
+            <a:p>
+              <a:pPr algn="ctr"/>
+              <a:r>
+                <a:rPr lang="en-US" altLang="zh-TW" sz="1000" dirty="0">
+                  <a:solidFill>
+                    <a:schemeClr val="tx1"/>
+                  </a:solidFill>
+                </a:rPr>
+                <a:t>Refresh data when buffer handle and memory handle are both null handle.</a:t>
+              </a:r>
+              <a:endParaRPr lang="zh-TW" altLang="en-US" sz="1000" dirty="0">
+                <a:solidFill>
+                  <a:schemeClr val="tx1"/>
+                </a:solidFill>
+              </a:endParaRPr>
+            </a:p>
+          </p:txBody>
+        </p:sp>
+        <p:cxnSp>
+          <p:nvCxnSpPr>
+            <p:cNvPr id="51" name="直線單箭頭接點 50">
+              <a:extLst>
+                <a:ext uri="{FF2B5EF4-FFF2-40B4-BE49-F238E27FC236}">
+                  <a16:creationId xmlns:a16="http://schemas.microsoft.com/office/drawing/2014/main" id="{934C0B8D-165C-4422-888A-09D06CC0816E}"/>
+                </a:ext>
+              </a:extLst>
+            </p:cNvPr>
+            <p:cNvCxnSpPr>
+              <a:cxnSpLocks/>
+              <a:stCxn id="25" idx="2"/>
+              <a:endCxn id="50" idx="0"/>
+            </p:cNvCxnSpPr>
+            <p:nvPr/>
+          </p:nvCxnSpPr>
+          <p:spPr>
+            <a:xfrm flipH="1">
+              <a:off x="2180197" y="5631460"/>
+              <a:ext cx="1" cy="337202"/>
+            </a:xfrm>
+            <a:prstGeom prst="straightConnector1">
+              <a:avLst/>
+            </a:prstGeom>
+            <a:ln w="38100">
+              <a:solidFill>
+                <a:schemeClr val="tx1"/>
+              </a:solidFill>
+              <a:tailEnd type="triangle"/>
+            </a:ln>
+          </p:spPr>
+          <p:style>
+            <a:lnRef idx="1">
+              <a:schemeClr val="accent1"/>
+            </a:lnRef>
+            <a:fillRef idx="0">
+              <a:schemeClr val="accent1"/>
+            </a:fillRef>
+            <a:effectRef idx="0">
+              <a:schemeClr val="accent1"/>
+            </a:effectRef>
+            <a:fontRef idx="minor">
+              <a:schemeClr val="tx1"/>
+            </a:fontRef>
+          </p:style>
+        </p:cxnSp>
+        <p:cxnSp>
+          <p:nvCxnSpPr>
+            <p:cNvPr id="72" name="直線單箭頭接點 71">
+              <a:extLst>
+                <a:ext uri="{FF2B5EF4-FFF2-40B4-BE49-F238E27FC236}">
+                  <a16:creationId xmlns:a16="http://schemas.microsoft.com/office/drawing/2014/main" id="{11F36B25-AD3A-4D2E-8501-CCF281119381}"/>
+                </a:ext>
+              </a:extLst>
+            </p:cNvPr>
+            <p:cNvCxnSpPr>
+              <a:cxnSpLocks/>
+              <a:stCxn id="50" idx="2"/>
+            </p:cNvCxnSpPr>
+            <p:nvPr/>
+          </p:nvCxnSpPr>
+          <p:spPr>
+            <a:xfrm flipH="1">
+              <a:off x="2177887" y="6301399"/>
+              <a:ext cx="2310" cy="241444"/>
+            </a:xfrm>
+            <a:prstGeom prst="straightConnector1">
+              <a:avLst/>
+            </a:prstGeom>
+            <a:ln w="38100">
+              <a:solidFill>
+                <a:schemeClr val="tx1"/>
+              </a:solidFill>
+              <a:tailEnd type="triangle"/>
+            </a:ln>
+          </p:spPr>
+          <p:style>
+            <a:lnRef idx="1">
+              <a:schemeClr val="accent1"/>
+            </a:lnRef>
+            <a:fillRef idx="0">
+              <a:schemeClr val="accent1"/>
+            </a:fillRef>
+            <a:effectRef idx="0">
+              <a:schemeClr val="accent1"/>
+            </a:effectRef>
+            <a:fontRef idx="minor">
+              <a:schemeClr val="tx1"/>
+            </a:fontRef>
+          </p:style>
+        </p:cxnSp>
+        <p:cxnSp>
+          <p:nvCxnSpPr>
+            <p:cNvPr id="75" name="直線單箭頭接點 74">
+              <a:extLst>
+                <a:ext uri="{FF2B5EF4-FFF2-40B4-BE49-F238E27FC236}">
+                  <a16:creationId xmlns:a16="http://schemas.microsoft.com/office/drawing/2014/main" id="{D9633314-7D3C-44E3-898D-7479AA45A7AD}"/>
+                </a:ext>
+              </a:extLst>
+            </p:cNvPr>
+            <p:cNvCxnSpPr>
+              <a:cxnSpLocks/>
+              <a:endCxn id="4" idx="0"/>
+            </p:cNvCxnSpPr>
+            <p:nvPr/>
+          </p:nvCxnSpPr>
+          <p:spPr>
+            <a:xfrm>
+              <a:off x="2185535" y="1179955"/>
+              <a:ext cx="3901" cy="180415"/>
+            </a:xfrm>
+            <a:prstGeom prst="straightConnector1">
+              <a:avLst/>
+            </a:prstGeom>
+            <a:ln w="38100">
+              <a:solidFill>
+                <a:schemeClr val="tx1"/>
+              </a:solidFill>
+              <a:tailEnd type="triangle"/>
+            </a:ln>
+          </p:spPr>
+          <p:style>
+            <a:lnRef idx="1">
+              <a:schemeClr val="accent1"/>
+            </a:lnRef>
+            <a:fillRef idx="0">
+              <a:schemeClr val="accent1"/>
+            </a:fillRef>
+            <a:effectRef idx="0">
+              <a:schemeClr val="accent1"/>
+            </a:effectRef>
+            <a:fontRef idx="minor">
+              <a:schemeClr val="tx1"/>
+            </a:fontRef>
+          </p:style>
+        </p:cxnSp>
+      </p:grpSp>
+      <p:grpSp>
+        <p:nvGrpSpPr>
+          <p:cNvPr id="111" name="群組 110">
+            <a:extLst>
+              <a:ext uri="{FF2B5EF4-FFF2-40B4-BE49-F238E27FC236}">
+                <a16:creationId xmlns:a16="http://schemas.microsoft.com/office/drawing/2014/main" id="{AB4CEEEC-C554-4887-9BB7-A0552066925A}"/>
+              </a:ext>
+            </a:extLst>
+          </p:cNvPr>
+          <p:cNvGrpSpPr/>
           <p:nvPr/>
-        </p:nvCxnSpPr>
-        <p:spPr>
+        </p:nvGrpSpPr>
+        <p:grpSpPr>
           <a:xfrm>
-            <a:off x="4414982" y="3837107"/>
-            <a:ext cx="573956" cy="268061"/>
+            <a:off x="7072266" y="1103025"/>
+            <a:ext cx="4424317" cy="2840775"/>
+            <a:chOff x="7072266" y="1103025"/>
+            <a:chExt cx="4424317" cy="2840775"/>
           </a:xfrm>
-          <a:prstGeom prst="bentConnector2">
-            <a:avLst/>
-          </a:prstGeom>
-          <a:ln w="38100">
-            <a:solidFill>
+        </p:grpSpPr>
+        <p:sp>
+          <p:nvSpPr>
+            <p:cNvPr id="27" name="矩形 26">
+              <a:extLst>
+                <a:ext uri="{FF2B5EF4-FFF2-40B4-BE49-F238E27FC236}">
+                  <a16:creationId xmlns:a16="http://schemas.microsoft.com/office/drawing/2014/main" id="{6B855020-FA30-4780-908C-1E0CFF7FCC18}"/>
+                </a:ext>
+              </a:extLst>
+            </p:cNvPr>
+            <p:cNvSpPr/>
+            <p:nvPr/>
+          </p:nvSpPr>
+          <p:spPr>
+            <a:xfrm>
+              <a:off x="7072266" y="1322723"/>
+              <a:ext cx="3030551" cy="328198"/>
+            </a:xfrm>
+            <a:prstGeom prst="rect">
+              <a:avLst/>
+            </a:prstGeom>
+            <a:noFill/>
+            <a:ln w="38100">
+              <a:solidFill>
+                <a:schemeClr val="tx1"/>
+              </a:solidFill>
+            </a:ln>
+          </p:spPr>
+          <p:style>
+            <a:lnRef idx="2">
+              <a:schemeClr val="accent1">
+                <a:shade val="50000"/>
+              </a:schemeClr>
+            </a:lnRef>
+            <a:fillRef idx="1">
+              <a:schemeClr val="accent1"/>
+            </a:fillRef>
+            <a:effectRef idx="0">
+              <a:schemeClr val="accent1"/>
+            </a:effectRef>
+            <a:fontRef idx="minor">
+              <a:schemeClr val="lt1"/>
+            </a:fontRef>
+          </p:style>
+          <p:txBody>
+            <a:bodyPr rtlCol="0" anchor="ctr"/>
+            <a:lstStyle/>
+            <a:p>
+              <a:pPr algn="ctr"/>
+              <a:r>
+                <a:rPr lang="en-US" altLang="zh-TW" sz="1000" dirty="0" err="1">
+                  <a:solidFill>
+                    <a:schemeClr val="tx1"/>
+                  </a:solidFill>
+                </a:rPr>
+                <a:t>Ckeck</a:t>
+              </a:r>
+              <a:r>
+                <a:rPr lang="en-US" altLang="zh-TW" sz="1000" dirty="0">
+                  <a:solidFill>
+                    <a:schemeClr val="tx1"/>
+                  </a:solidFill>
+                </a:rPr>
+                <a:t> </a:t>
+              </a:r>
+              <a:r>
+                <a:rPr lang="en-US" altLang="zh-TW" sz="1000" dirty="0" err="1">
+                  <a:solidFill>
+                    <a:schemeClr val="tx1"/>
+                  </a:solidFill>
+                </a:rPr>
+                <a:t>BufferHandle</a:t>
+              </a:r>
+              <a:r>
+                <a:rPr lang="en-US" altLang="zh-TW" sz="1000" dirty="0">
+                  <a:solidFill>
+                    <a:schemeClr val="tx1"/>
+                  </a:solidFill>
+                </a:rPr>
+                <a:t> is initialized or not?</a:t>
+              </a:r>
+            </a:p>
+            <a:p>
+              <a:pPr algn="ctr"/>
+              <a:r>
+                <a:rPr lang="en-US" altLang="zh-TW" sz="1000" dirty="0">
+                  <a:solidFill>
+                    <a:schemeClr val="tx1"/>
+                  </a:solidFill>
+                </a:rPr>
+                <a:t>(buffer handle is null handle represent uninitialized)</a:t>
+              </a:r>
+              <a:endParaRPr lang="zh-TW" altLang="en-US" sz="1000" dirty="0">
+                <a:solidFill>
+                  <a:schemeClr val="tx1"/>
+                </a:solidFill>
+              </a:endParaRPr>
+            </a:p>
+          </p:txBody>
+        </p:sp>
+        <p:cxnSp>
+          <p:nvCxnSpPr>
+            <p:cNvPr id="29" name="直線單箭頭接點 28">
+              <a:extLst>
+                <a:ext uri="{FF2B5EF4-FFF2-40B4-BE49-F238E27FC236}">
+                  <a16:creationId xmlns:a16="http://schemas.microsoft.com/office/drawing/2014/main" id="{C66C8EE0-6781-41B5-8813-390A27C0ABBA}"/>
+                </a:ext>
+              </a:extLst>
+            </p:cNvPr>
+            <p:cNvCxnSpPr>
+              <a:cxnSpLocks/>
+              <a:stCxn id="27" idx="2"/>
+              <a:endCxn id="30" idx="0"/>
+            </p:cNvCxnSpPr>
+            <p:nvPr/>
+          </p:nvCxnSpPr>
+          <p:spPr>
+            <a:xfrm>
+              <a:off x="8587542" y="1650921"/>
+              <a:ext cx="1502" cy="236581"/>
+            </a:xfrm>
+            <a:prstGeom prst="straightConnector1">
+              <a:avLst/>
+            </a:prstGeom>
+            <a:ln w="38100">
+              <a:solidFill>
+                <a:schemeClr val="tx1"/>
+              </a:solidFill>
+              <a:tailEnd type="triangle"/>
+            </a:ln>
+          </p:spPr>
+          <p:style>
+            <a:lnRef idx="1">
+              <a:schemeClr val="accent1"/>
+            </a:lnRef>
+            <a:fillRef idx="0">
+              <a:schemeClr val="accent1"/>
+            </a:fillRef>
+            <a:effectRef idx="0">
+              <a:schemeClr val="accent1"/>
+            </a:effectRef>
+            <a:fontRef idx="minor">
               <a:schemeClr val="tx1"/>
-            </a:solidFill>
-            <a:tailEnd type="triangle"/>
-          </a:ln>
-        </p:spPr>
-        <p:style>
-          <a:lnRef idx="1">
-            <a:schemeClr val="accent1"/>
-          </a:lnRef>
-          <a:fillRef idx="0">
-            <a:schemeClr val="accent1"/>
-          </a:fillRef>
-          <a:effectRef idx="0">
-            <a:schemeClr val="accent1"/>
-          </a:effectRef>
-          <a:fontRef idx="minor">
-            <a:schemeClr val="tx1"/>
-          </a:fontRef>
-        </p:style>
-      </p:cxnSp>
-      <p:cxnSp>
-        <p:nvCxnSpPr>
-          <p:cNvPr id="40" name="接點: 肘形 39">
-            <a:extLst>
-              <a:ext uri="{FF2B5EF4-FFF2-40B4-BE49-F238E27FC236}">
-                <a16:creationId xmlns:a16="http://schemas.microsoft.com/office/drawing/2014/main" id="{8E1BB32D-E65C-4CD9-BFE0-9EEBDADE904D}"/>
-              </a:ext>
-            </a:extLst>
-          </p:cNvPr>
-          <p:cNvCxnSpPr>
-            <a:cxnSpLocks/>
-            <a:stCxn id="22" idx="2"/>
-            <a:endCxn id="25" idx="3"/>
-          </p:cNvCxnSpPr>
-          <p:nvPr/>
-        </p:nvCxnSpPr>
-        <p:spPr>
-          <a:xfrm rot="5400000">
-            <a:off x="4352388" y="5240272"/>
-            <a:ext cx="694520" cy="578580"/>
-          </a:xfrm>
-          <a:prstGeom prst="bentConnector2">
-            <a:avLst/>
-          </a:prstGeom>
-          <a:ln w="38100">
-            <a:solidFill>
+            </a:fontRef>
+          </p:style>
+        </p:cxnSp>
+        <p:sp>
+          <p:nvSpPr>
+            <p:cNvPr id="30" name="菱形 29">
+              <a:extLst>
+                <a:ext uri="{FF2B5EF4-FFF2-40B4-BE49-F238E27FC236}">
+                  <a16:creationId xmlns:a16="http://schemas.microsoft.com/office/drawing/2014/main" id="{06B3870A-A040-4857-87E0-5971AC623529}"/>
+                </a:ext>
+              </a:extLst>
+            </p:cNvPr>
+            <p:cNvSpPr/>
+            <p:nvPr/>
+          </p:nvSpPr>
+          <p:spPr>
+            <a:xfrm>
+              <a:off x="7166644" y="1887502"/>
+              <a:ext cx="2844800" cy="896368"/>
+            </a:xfrm>
+            <a:prstGeom prst="diamond">
+              <a:avLst/>
+            </a:prstGeom>
+            <a:noFill/>
+            <a:ln w="38100">
+              <a:solidFill>
+                <a:schemeClr val="tx1"/>
+              </a:solidFill>
+            </a:ln>
+          </p:spPr>
+          <p:style>
+            <a:lnRef idx="2">
+              <a:schemeClr val="accent1">
+                <a:shade val="50000"/>
+              </a:schemeClr>
+            </a:lnRef>
+            <a:fillRef idx="1">
+              <a:schemeClr val="accent1"/>
+            </a:fillRef>
+            <a:effectRef idx="0">
+              <a:schemeClr val="accent1"/>
+            </a:effectRef>
+            <a:fontRef idx="minor">
+              <a:schemeClr val="lt1"/>
+            </a:fontRef>
+          </p:style>
+          <p:txBody>
+            <a:bodyPr rtlCol="0" anchor="ctr"/>
+            <a:lstStyle/>
+            <a:p>
+              <a:pPr algn="ctr"/>
+              <a:r>
+                <a:rPr lang="en-US" altLang="zh-TW" sz="1000" dirty="0">
+                  <a:solidFill>
+                    <a:schemeClr val="tx1"/>
+                  </a:solidFill>
+                </a:rPr>
+                <a:t>Is buffer handle null?</a:t>
+              </a:r>
+              <a:endParaRPr lang="zh-TW" altLang="en-US" sz="1000" dirty="0">
+                <a:solidFill>
+                  <a:schemeClr val="tx1"/>
+                </a:solidFill>
+              </a:endParaRPr>
+            </a:p>
+          </p:txBody>
+        </p:sp>
+        <p:sp>
+          <p:nvSpPr>
+            <p:cNvPr id="33" name="文字方塊 32">
+              <a:extLst>
+                <a:ext uri="{FF2B5EF4-FFF2-40B4-BE49-F238E27FC236}">
+                  <a16:creationId xmlns:a16="http://schemas.microsoft.com/office/drawing/2014/main" id="{2342B696-3865-40C4-B984-6DA76D5977A0}"/>
+                </a:ext>
+              </a:extLst>
+            </p:cNvPr>
+            <p:cNvSpPr txBox="1"/>
+            <p:nvPr/>
+          </p:nvSpPr>
+          <p:spPr>
+            <a:xfrm>
+              <a:off x="10055687" y="2072982"/>
+              <a:ext cx="484885" cy="246221"/>
+            </a:xfrm>
+            <a:prstGeom prst="rect">
+              <a:avLst/>
+            </a:prstGeom>
+            <a:noFill/>
+          </p:spPr>
+          <p:txBody>
+            <a:bodyPr wrap="square" rtlCol="0">
+              <a:spAutoFit/>
+            </a:bodyPr>
+            <a:lstStyle/>
+            <a:p>
+              <a:r>
+                <a:rPr lang="en-US" altLang="zh-TW" sz="1000" dirty="0"/>
+                <a:t>Yes</a:t>
+              </a:r>
+              <a:endParaRPr lang="zh-TW" altLang="en-US" sz="1000" dirty="0"/>
+            </a:p>
+          </p:txBody>
+        </p:sp>
+        <p:sp>
+          <p:nvSpPr>
+            <p:cNvPr id="34" name="文字方塊 33">
+              <a:extLst>
+                <a:ext uri="{FF2B5EF4-FFF2-40B4-BE49-F238E27FC236}">
+                  <a16:creationId xmlns:a16="http://schemas.microsoft.com/office/drawing/2014/main" id="{06B75FEB-B4CE-469F-89B6-265C83E9908F}"/>
+                </a:ext>
+              </a:extLst>
+            </p:cNvPr>
+            <p:cNvSpPr txBox="1"/>
+            <p:nvPr/>
+          </p:nvSpPr>
+          <p:spPr>
+            <a:xfrm>
+              <a:off x="8248335" y="2860093"/>
+              <a:ext cx="480111" cy="246221"/>
+            </a:xfrm>
+            <a:prstGeom prst="rect">
+              <a:avLst/>
+            </a:prstGeom>
+            <a:noFill/>
+          </p:spPr>
+          <p:txBody>
+            <a:bodyPr wrap="square" rtlCol="0">
+              <a:spAutoFit/>
+            </a:bodyPr>
+            <a:lstStyle/>
+            <a:p>
+              <a:r>
+                <a:rPr lang="en-US" altLang="zh-TW" sz="1000" dirty="0"/>
+                <a:t>No</a:t>
+              </a:r>
+              <a:endParaRPr lang="zh-TW" altLang="en-US" sz="1200" dirty="0"/>
+            </a:p>
+          </p:txBody>
+        </p:sp>
+        <p:sp>
+          <p:nvSpPr>
+            <p:cNvPr id="35" name="矩形 34">
+              <a:extLst>
+                <a:ext uri="{FF2B5EF4-FFF2-40B4-BE49-F238E27FC236}">
+                  <a16:creationId xmlns:a16="http://schemas.microsoft.com/office/drawing/2014/main" id="{9EBB5EA8-8320-4C70-B026-063D7471C3C2}"/>
+                </a:ext>
+              </a:extLst>
+            </p:cNvPr>
+            <p:cNvSpPr/>
+            <p:nvPr/>
+          </p:nvSpPr>
+          <p:spPr>
+            <a:xfrm>
+              <a:off x="9809825" y="2736983"/>
+              <a:ext cx="1686758" cy="332737"/>
+            </a:xfrm>
+            <a:prstGeom prst="rect">
+              <a:avLst/>
+            </a:prstGeom>
+            <a:noFill/>
+            <a:ln w="38100">
+              <a:solidFill>
+                <a:schemeClr val="tx1"/>
+              </a:solidFill>
+            </a:ln>
+          </p:spPr>
+          <p:style>
+            <a:lnRef idx="2">
+              <a:schemeClr val="accent1">
+                <a:shade val="50000"/>
+              </a:schemeClr>
+            </a:lnRef>
+            <a:fillRef idx="1">
+              <a:schemeClr val="accent1"/>
+            </a:fillRef>
+            <a:effectRef idx="0">
+              <a:schemeClr val="accent1"/>
+            </a:effectRef>
+            <a:fontRef idx="minor">
+              <a:schemeClr val="lt1"/>
+            </a:fontRef>
+          </p:style>
+          <p:txBody>
+            <a:bodyPr rtlCol="0" anchor="ctr"/>
+            <a:lstStyle/>
+            <a:p>
+              <a:pPr algn="ctr"/>
+              <a:r>
+                <a:rPr lang="en-US" altLang="zh-TW" sz="1000" dirty="0">
+                  <a:solidFill>
+                    <a:schemeClr val="tx1"/>
+                  </a:solidFill>
+                </a:rPr>
+                <a:t>Create new buffer.</a:t>
+              </a:r>
+              <a:endParaRPr lang="zh-TW" altLang="en-US" sz="1000" dirty="0">
+                <a:solidFill>
+                  <a:schemeClr val="tx1"/>
+                </a:solidFill>
+              </a:endParaRPr>
+            </a:p>
+          </p:txBody>
+        </p:sp>
+        <p:cxnSp>
+          <p:nvCxnSpPr>
+            <p:cNvPr id="60" name="接點: 肘形 59">
+              <a:extLst>
+                <a:ext uri="{FF2B5EF4-FFF2-40B4-BE49-F238E27FC236}">
+                  <a16:creationId xmlns:a16="http://schemas.microsoft.com/office/drawing/2014/main" id="{9D06D988-AC0B-471F-9ACB-7C07D21D0697}"/>
+                </a:ext>
+              </a:extLst>
+            </p:cNvPr>
+            <p:cNvCxnSpPr>
+              <a:cxnSpLocks/>
+              <a:stCxn id="30" idx="3"/>
+              <a:endCxn id="35" idx="0"/>
+            </p:cNvCxnSpPr>
+            <p:nvPr/>
+          </p:nvCxnSpPr>
+          <p:spPr>
+            <a:xfrm>
+              <a:off x="10011444" y="2335686"/>
+              <a:ext cx="641760" cy="401297"/>
+            </a:xfrm>
+            <a:prstGeom prst="bentConnector2">
+              <a:avLst/>
+            </a:prstGeom>
+            <a:ln w="38100">
+              <a:solidFill>
+                <a:schemeClr val="tx1"/>
+              </a:solidFill>
+              <a:tailEnd type="triangle"/>
+            </a:ln>
+          </p:spPr>
+          <p:style>
+            <a:lnRef idx="1">
+              <a:schemeClr val="accent1"/>
+            </a:lnRef>
+            <a:fillRef idx="0">
+              <a:schemeClr val="accent1"/>
+            </a:fillRef>
+            <a:effectRef idx="0">
+              <a:schemeClr val="accent1"/>
+            </a:effectRef>
+            <a:fontRef idx="minor">
               <a:schemeClr val="tx1"/>
-            </a:solidFill>
-            <a:tailEnd type="triangle"/>
-          </a:ln>
-        </p:spPr>
-        <p:style>
-          <a:lnRef idx="1">
-            <a:schemeClr val="accent1"/>
-          </a:lnRef>
-          <a:fillRef idx="0">
-            <a:schemeClr val="accent1"/>
-          </a:fillRef>
-          <a:effectRef idx="0">
-            <a:schemeClr val="accent1"/>
-          </a:effectRef>
-          <a:fontRef idx="minor">
-            <a:schemeClr val="tx1"/>
-          </a:fontRef>
-        </p:style>
-      </p:cxnSp>
-      <p:sp>
-        <p:nvSpPr>
-          <p:cNvPr id="43" name="文字方塊 42">
-            <a:extLst>
-              <a:ext uri="{FF2B5EF4-FFF2-40B4-BE49-F238E27FC236}">
-                <a16:creationId xmlns:a16="http://schemas.microsoft.com/office/drawing/2014/main" id="{DE437A75-1F9F-46FC-8C5E-69D17EDE0291}"/>
-              </a:ext>
-            </a:extLst>
-          </p:cNvPr>
-          <p:cNvSpPr txBox="1"/>
-          <p:nvPr/>
-        </p:nvSpPr>
-        <p:spPr>
-          <a:xfrm>
-            <a:off x="4975086" y="5282051"/>
-            <a:ext cx="484885" cy="246221"/>
-          </a:xfrm>
-          <a:prstGeom prst="rect">
-            <a:avLst/>
-          </a:prstGeom>
-          <a:noFill/>
-        </p:spPr>
-        <p:txBody>
-          <a:bodyPr wrap="square" rtlCol="0">
-            <a:spAutoFit/>
-          </a:bodyPr>
-          <a:lstStyle/>
-          <a:p>
-            <a:r>
-              <a:rPr lang="en-US" altLang="zh-TW" sz="1000" dirty="0"/>
-              <a:t>No</a:t>
-            </a:r>
-            <a:endParaRPr lang="zh-TW" altLang="en-US" sz="1000" dirty="0"/>
-          </a:p>
-        </p:txBody>
-      </p:sp>
-      <p:cxnSp>
-        <p:nvCxnSpPr>
-          <p:cNvPr id="44" name="接點: 肘形 43">
-            <a:extLst>
-              <a:ext uri="{FF2B5EF4-FFF2-40B4-BE49-F238E27FC236}">
-                <a16:creationId xmlns:a16="http://schemas.microsoft.com/office/drawing/2014/main" id="{4E3CBDD9-4AE0-4601-954F-01478892CDC2}"/>
-              </a:ext>
-            </a:extLst>
-          </p:cNvPr>
-          <p:cNvCxnSpPr>
-            <a:cxnSpLocks/>
-            <a:stCxn id="22" idx="1"/>
-            <a:endCxn id="17" idx="0"/>
-          </p:cNvCxnSpPr>
-          <p:nvPr/>
-        </p:nvCxnSpPr>
-        <p:spPr>
-          <a:xfrm rot="10800000" flipV="1">
-            <a:off x="2693994" y="4643734"/>
-            <a:ext cx="872545" cy="443597"/>
-          </a:xfrm>
-          <a:prstGeom prst="bentConnector2">
-            <a:avLst/>
-          </a:prstGeom>
-          <a:ln w="38100">
-            <a:solidFill>
+            </a:fontRef>
+          </p:style>
+        </p:cxnSp>
+        <p:cxnSp>
+          <p:nvCxnSpPr>
+            <p:cNvPr id="66" name="直線單箭頭接點 65">
+              <a:extLst>
+                <a:ext uri="{FF2B5EF4-FFF2-40B4-BE49-F238E27FC236}">
+                  <a16:creationId xmlns:a16="http://schemas.microsoft.com/office/drawing/2014/main" id="{C3A9BDBF-28BC-4D3F-8A56-E4B49585A1FC}"/>
+                </a:ext>
+              </a:extLst>
+            </p:cNvPr>
+            <p:cNvCxnSpPr>
+              <a:cxnSpLocks/>
+              <a:stCxn id="30" idx="2"/>
+              <a:endCxn id="89" idx="0"/>
+            </p:cNvCxnSpPr>
+            <p:nvPr/>
+          </p:nvCxnSpPr>
+          <p:spPr>
+            <a:xfrm>
+              <a:off x="8589044" y="2783870"/>
+              <a:ext cx="0" cy="449969"/>
+            </a:xfrm>
+            <a:prstGeom prst="straightConnector1">
+              <a:avLst/>
+            </a:prstGeom>
+            <a:ln w="38100">
+              <a:solidFill>
+                <a:schemeClr val="tx1"/>
+              </a:solidFill>
+              <a:tailEnd type="triangle"/>
+            </a:ln>
+          </p:spPr>
+          <p:style>
+            <a:lnRef idx="1">
+              <a:schemeClr val="accent1"/>
+            </a:lnRef>
+            <a:fillRef idx="0">
+              <a:schemeClr val="accent1"/>
+            </a:fillRef>
+            <a:effectRef idx="0">
+              <a:schemeClr val="accent1"/>
+            </a:effectRef>
+            <a:fontRef idx="minor">
               <a:schemeClr val="tx1"/>
-            </a:solidFill>
-            <a:tailEnd type="triangle"/>
-          </a:ln>
-        </p:spPr>
-        <p:style>
-          <a:lnRef idx="1">
-            <a:schemeClr val="accent1"/>
-          </a:lnRef>
-          <a:fillRef idx="0">
-            <a:schemeClr val="accent1"/>
-          </a:fillRef>
-          <a:effectRef idx="0">
-            <a:schemeClr val="accent1"/>
-          </a:effectRef>
-          <a:fontRef idx="minor">
-            <a:schemeClr val="tx1"/>
-          </a:fontRef>
-        </p:style>
-      </p:cxnSp>
-      <p:sp>
-        <p:nvSpPr>
-          <p:cNvPr id="48" name="文字方塊 47">
-            <a:extLst>
-              <a:ext uri="{FF2B5EF4-FFF2-40B4-BE49-F238E27FC236}">
-                <a16:creationId xmlns:a16="http://schemas.microsoft.com/office/drawing/2014/main" id="{DB9C473C-AA63-4083-B70B-F2BD3C33A323}"/>
-              </a:ext>
-            </a:extLst>
-          </p:cNvPr>
-          <p:cNvSpPr txBox="1"/>
-          <p:nvPr/>
-        </p:nvSpPr>
-        <p:spPr>
-          <a:xfrm>
-            <a:off x="3133956" y="4355530"/>
-            <a:ext cx="480111" cy="246221"/>
-          </a:xfrm>
-          <a:prstGeom prst="rect">
-            <a:avLst/>
-          </a:prstGeom>
-          <a:noFill/>
-        </p:spPr>
-        <p:txBody>
-          <a:bodyPr wrap="square" rtlCol="0">
-            <a:spAutoFit/>
-          </a:bodyPr>
-          <a:lstStyle/>
-          <a:p>
-            <a:r>
-              <a:rPr lang="en-US" altLang="zh-TW" sz="1000" dirty="0"/>
-              <a:t>Yes</a:t>
-            </a:r>
-            <a:endParaRPr lang="zh-TW" altLang="en-US" sz="1200" dirty="0"/>
-          </a:p>
-        </p:txBody>
-      </p:sp>
+            </a:fontRef>
+          </p:style>
+        </p:cxnSp>
+        <p:cxnSp>
+          <p:nvCxnSpPr>
+            <p:cNvPr id="79" name="直線單箭頭接點 78">
+              <a:extLst>
+                <a:ext uri="{FF2B5EF4-FFF2-40B4-BE49-F238E27FC236}">
+                  <a16:creationId xmlns:a16="http://schemas.microsoft.com/office/drawing/2014/main" id="{C09EA6CD-389F-4B0F-A82D-1914D466BE1E}"/>
+                </a:ext>
+              </a:extLst>
+            </p:cNvPr>
+            <p:cNvCxnSpPr>
+              <a:cxnSpLocks/>
+              <a:endCxn id="27" idx="0"/>
+            </p:cNvCxnSpPr>
+            <p:nvPr/>
+          </p:nvCxnSpPr>
+          <p:spPr>
+            <a:xfrm>
+              <a:off x="8587541" y="1103025"/>
+              <a:ext cx="1" cy="219698"/>
+            </a:xfrm>
+            <a:prstGeom prst="straightConnector1">
+              <a:avLst/>
+            </a:prstGeom>
+            <a:ln w="38100">
+              <a:solidFill>
+                <a:schemeClr val="tx1"/>
+              </a:solidFill>
+              <a:tailEnd type="triangle"/>
+            </a:ln>
+          </p:spPr>
+          <p:style>
+            <a:lnRef idx="1">
+              <a:schemeClr val="accent1"/>
+            </a:lnRef>
+            <a:fillRef idx="0">
+              <a:schemeClr val="accent1"/>
+            </a:fillRef>
+            <a:effectRef idx="0">
+              <a:schemeClr val="accent1"/>
+            </a:effectRef>
+            <a:fontRef idx="minor">
+              <a:schemeClr val="tx1"/>
+            </a:fontRef>
+          </p:style>
+        </p:cxnSp>
+        <p:cxnSp>
+          <p:nvCxnSpPr>
+            <p:cNvPr id="84" name="直線單箭頭接點 83">
+              <a:extLst>
+                <a:ext uri="{FF2B5EF4-FFF2-40B4-BE49-F238E27FC236}">
+                  <a16:creationId xmlns:a16="http://schemas.microsoft.com/office/drawing/2014/main" id="{F5931E76-863E-471A-80F0-F62D852D23F5}"/>
+                </a:ext>
+              </a:extLst>
+            </p:cNvPr>
+            <p:cNvCxnSpPr>
+              <a:cxnSpLocks/>
+              <a:stCxn id="35" idx="2"/>
+              <a:endCxn id="87" idx="0"/>
+            </p:cNvCxnSpPr>
+            <p:nvPr/>
+          </p:nvCxnSpPr>
+          <p:spPr>
+            <a:xfrm>
+              <a:off x="10653204" y="3069720"/>
+              <a:ext cx="0" cy="157017"/>
+            </a:xfrm>
+            <a:prstGeom prst="straightConnector1">
+              <a:avLst/>
+            </a:prstGeom>
+            <a:ln w="38100">
+              <a:solidFill>
+                <a:schemeClr val="tx1"/>
+              </a:solidFill>
+              <a:tailEnd type="triangle"/>
+            </a:ln>
+          </p:spPr>
+          <p:style>
+            <a:lnRef idx="1">
+              <a:schemeClr val="accent1"/>
+            </a:lnRef>
+            <a:fillRef idx="0">
+              <a:schemeClr val="accent1"/>
+            </a:fillRef>
+            <a:effectRef idx="0">
+              <a:schemeClr val="accent1"/>
+            </a:effectRef>
+            <a:fontRef idx="minor">
+              <a:schemeClr val="tx1"/>
+            </a:fontRef>
+          </p:style>
+        </p:cxnSp>
+        <p:sp>
+          <p:nvSpPr>
+            <p:cNvPr id="87" name="矩形 86">
+              <a:extLst>
+                <a:ext uri="{FF2B5EF4-FFF2-40B4-BE49-F238E27FC236}">
+                  <a16:creationId xmlns:a16="http://schemas.microsoft.com/office/drawing/2014/main" id="{C1D846B3-D8BA-4C1E-937A-6B752B5D5B35}"/>
+                </a:ext>
+              </a:extLst>
+            </p:cNvPr>
+            <p:cNvSpPr/>
+            <p:nvPr/>
+          </p:nvSpPr>
+          <p:spPr>
+            <a:xfrm>
+              <a:off x="9809825" y="3226737"/>
+              <a:ext cx="1686758" cy="332737"/>
+            </a:xfrm>
+            <a:prstGeom prst="rect">
+              <a:avLst/>
+            </a:prstGeom>
+            <a:noFill/>
+            <a:ln w="38100">
+              <a:solidFill>
+                <a:schemeClr val="tx1"/>
+              </a:solidFill>
+            </a:ln>
+          </p:spPr>
+          <p:style>
+            <a:lnRef idx="2">
+              <a:schemeClr val="accent1">
+                <a:shade val="50000"/>
+              </a:schemeClr>
+            </a:lnRef>
+            <a:fillRef idx="1">
+              <a:schemeClr val="accent1"/>
+            </a:fillRef>
+            <a:effectRef idx="0">
+              <a:schemeClr val="accent1"/>
+            </a:effectRef>
+            <a:fontRef idx="minor">
+              <a:schemeClr val="lt1"/>
+            </a:fontRef>
+          </p:style>
+          <p:txBody>
+            <a:bodyPr rtlCol="0" anchor="ctr"/>
+            <a:lstStyle/>
+            <a:p>
+              <a:pPr algn="ctr"/>
+              <a:r>
+                <a:rPr lang="en-US" altLang="zh-TW" sz="1000" dirty="0">
+                  <a:solidFill>
+                    <a:schemeClr val="tx1"/>
+                  </a:solidFill>
+                </a:rPr>
+                <a:t>Refresh data.</a:t>
+              </a:r>
+              <a:endParaRPr lang="zh-TW" altLang="en-US" sz="1000" dirty="0">
+                <a:solidFill>
+                  <a:schemeClr val="tx1"/>
+                </a:solidFill>
+              </a:endParaRPr>
+            </a:p>
+          </p:txBody>
+        </p:sp>
+        <p:sp>
+          <p:nvSpPr>
+            <p:cNvPr id="89" name="矩形 88">
+              <a:extLst>
+                <a:ext uri="{FF2B5EF4-FFF2-40B4-BE49-F238E27FC236}">
+                  <a16:creationId xmlns:a16="http://schemas.microsoft.com/office/drawing/2014/main" id="{9DE1E879-8791-4B81-AE21-765A2D76FBF4}"/>
+                </a:ext>
+              </a:extLst>
+            </p:cNvPr>
+            <p:cNvSpPr/>
+            <p:nvPr/>
+          </p:nvSpPr>
+          <p:spPr>
+            <a:xfrm>
+              <a:off x="7647361" y="3233839"/>
+              <a:ext cx="1883365" cy="332737"/>
+            </a:xfrm>
+            <a:prstGeom prst="rect">
+              <a:avLst/>
+            </a:prstGeom>
+            <a:noFill/>
+            <a:ln w="38100">
+              <a:solidFill>
+                <a:schemeClr val="tx1"/>
+              </a:solidFill>
+            </a:ln>
+          </p:spPr>
+          <p:style>
+            <a:lnRef idx="2">
+              <a:schemeClr val="accent1">
+                <a:shade val="50000"/>
+              </a:schemeClr>
+            </a:lnRef>
+            <a:fillRef idx="1">
+              <a:schemeClr val="accent1"/>
+            </a:fillRef>
+            <a:effectRef idx="0">
+              <a:schemeClr val="accent1"/>
+            </a:effectRef>
+            <a:fontRef idx="minor">
+              <a:schemeClr val="lt1"/>
+            </a:fontRef>
+          </p:style>
+          <p:txBody>
+            <a:bodyPr rtlCol="0" anchor="ctr"/>
+            <a:lstStyle/>
+            <a:p>
+              <a:pPr algn="ctr"/>
+              <a:r>
+                <a:rPr lang="en-US" altLang="zh-TW" sz="1000" dirty="0">
+                  <a:solidFill>
+                    <a:schemeClr val="tx1"/>
+                  </a:solidFill>
+                </a:rPr>
+                <a:t>Show warning log.</a:t>
+              </a:r>
+              <a:endParaRPr lang="zh-TW" altLang="en-US" sz="1000" dirty="0">
+                <a:solidFill>
+                  <a:schemeClr val="tx1"/>
+                </a:solidFill>
+              </a:endParaRPr>
+            </a:p>
+          </p:txBody>
+        </p:sp>
+        <p:cxnSp>
+          <p:nvCxnSpPr>
+            <p:cNvPr id="99" name="直線單箭頭接點 98">
+              <a:extLst>
+                <a:ext uri="{FF2B5EF4-FFF2-40B4-BE49-F238E27FC236}">
+                  <a16:creationId xmlns:a16="http://schemas.microsoft.com/office/drawing/2014/main" id="{00FF4D21-D839-4150-8A7C-DB7F7A32E334}"/>
+                </a:ext>
+              </a:extLst>
+            </p:cNvPr>
+            <p:cNvCxnSpPr>
+              <a:cxnSpLocks/>
+              <a:stCxn id="89" idx="2"/>
+            </p:cNvCxnSpPr>
+            <p:nvPr/>
+          </p:nvCxnSpPr>
+          <p:spPr>
+            <a:xfrm>
+              <a:off x="8589044" y="3566576"/>
+              <a:ext cx="0" cy="377224"/>
+            </a:xfrm>
+            <a:prstGeom prst="straightConnector1">
+              <a:avLst/>
+            </a:prstGeom>
+            <a:ln w="38100">
+              <a:solidFill>
+                <a:schemeClr val="tx1"/>
+              </a:solidFill>
+              <a:tailEnd type="triangle"/>
+            </a:ln>
+          </p:spPr>
+          <p:style>
+            <a:lnRef idx="1">
+              <a:schemeClr val="accent1"/>
+            </a:lnRef>
+            <a:fillRef idx="0">
+              <a:schemeClr val="accent1"/>
+            </a:fillRef>
+            <a:effectRef idx="0">
+              <a:schemeClr val="accent1"/>
+            </a:effectRef>
+            <a:fontRef idx="minor">
+              <a:schemeClr val="tx1"/>
+            </a:fontRef>
+          </p:style>
+        </p:cxnSp>
+        <p:cxnSp>
+          <p:nvCxnSpPr>
+            <p:cNvPr id="104" name="接點: 肘形 103">
+              <a:extLst>
+                <a:ext uri="{FF2B5EF4-FFF2-40B4-BE49-F238E27FC236}">
+                  <a16:creationId xmlns:a16="http://schemas.microsoft.com/office/drawing/2014/main" id="{C8B07251-3037-4FE8-A8C6-366CCF68138B}"/>
+                </a:ext>
+              </a:extLst>
+            </p:cNvPr>
+            <p:cNvCxnSpPr>
+              <a:cxnSpLocks/>
+              <a:stCxn id="87" idx="2"/>
+            </p:cNvCxnSpPr>
+            <p:nvPr/>
+          </p:nvCxnSpPr>
+          <p:spPr>
+            <a:xfrm rot="5400000">
+              <a:off x="9518829" y="2620813"/>
+              <a:ext cx="195714" cy="2073037"/>
+            </a:xfrm>
+            <a:prstGeom prst="bentConnector2">
+              <a:avLst/>
+            </a:prstGeom>
+            <a:ln w="38100">
+              <a:solidFill>
+                <a:schemeClr val="tx1"/>
+              </a:solidFill>
+              <a:tailEnd type="triangle"/>
+            </a:ln>
+          </p:spPr>
+          <p:style>
+            <a:lnRef idx="1">
+              <a:schemeClr val="accent1"/>
+            </a:lnRef>
+            <a:fillRef idx="0">
+              <a:schemeClr val="accent1"/>
+            </a:fillRef>
+            <a:effectRef idx="0">
+              <a:schemeClr val="accent1"/>
+            </a:effectRef>
+            <a:fontRef idx="minor">
+              <a:schemeClr val="tx1"/>
+            </a:fontRef>
+          </p:style>
+        </p:cxnSp>
+      </p:grpSp>
     </p:spTree>
     <p:extLst>
       <p:ext uri="{BB962C8B-B14F-4D97-AF65-F5344CB8AC3E}">

</xml_diff>

<commit_message>
[Add] Modify sample for rendering by its color and depth buffer.
</commit_message>
<xml_diff>
--- a/Doc/Note/Design/EngineDesign.pptx
+++ b/Doc/Note/Design/EngineDesign.pptx
@@ -5,11 +5,12 @@
     <p:sldMasterId id="2147483648" r:id="rId1"/>
   </p:sldMasterIdLst>
   <p:notesMasterIdLst>
-    <p:notesMasterId r:id="rId4"/>
+    <p:notesMasterId r:id="rId5"/>
   </p:notesMasterIdLst>
   <p:sldIdLst>
     <p:sldId id="256" r:id="rId2"/>
     <p:sldId id="257" r:id="rId3"/>
+    <p:sldId id="258" r:id="rId4"/>
   </p:sldIdLst>
   <p:sldSz cx="12192000" cy="6858000"/>
   <p:notesSz cx="6858000" cy="9144000"/>
@@ -110,7 +111,7 @@
   </p:defaultTextStyle>
   <p:extLst>
     <p:ext uri="{EFAFB233-063F-42B5-8137-9DF3F51BA10A}">
-      <p15:sldGuideLst xmlns:p15="http://schemas.microsoft.com/office/powerpoint/2012/main"/>
+      <p15:sldGuideLst xmlns:p15="http://schemas.microsoft.com/office/powerpoint/2012/main" xmlns=""/>
     </p:ext>
   </p:extLst>
 </p:presentation>
@@ -198,7 +199,7 @@
           <a:p>
             <a:fld id="{8550266C-EB3A-46FF-9DFF-1D300318D93B}" type="datetimeFigureOut">
               <a:rPr lang="zh-TW" altLang="en-US" smtClean="0"/>
-              <a:t>2019/7/7</a:t>
+              <a:t>2019/8/31</a:t>
             </a:fld>
             <a:endParaRPr lang="zh-TW" altLang="en-US"/>
           </a:p>
@@ -571,7 +572,7 @@
           <p:cNvPr id="2" name="標題 1">
             <a:extLst>
               <a:ext uri="{FF2B5EF4-FFF2-40B4-BE49-F238E27FC236}">
-                <a16:creationId xmlns:a16="http://schemas.microsoft.com/office/drawing/2014/main" id="{0C516B4D-3316-46BC-9344-537CC87784CB}"/>
+                <a16:creationId xmlns:a16="http://schemas.microsoft.com/office/drawing/2014/main" xmlns="" id="{0C516B4D-3316-46BC-9344-537CC87784CB}"/>
               </a:ext>
             </a:extLst>
           </p:cNvPr>
@@ -608,7 +609,7 @@
           <p:cNvPr id="3" name="副標題 2">
             <a:extLst>
               <a:ext uri="{FF2B5EF4-FFF2-40B4-BE49-F238E27FC236}">
-                <a16:creationId xmlns:a16="http://schemas.microsoft.com/office/drawing/2014/main" id="{72EE86F2-8686-4A62-A85E-07F6C9FCA25F}"/>
+                <a16:creationId xmlns:a16="http://schemas.microsoft.com/office/drawing/2014/main" xmlns="" id="{72EE86F2-8686-4A62-A85E-07F6C9FCA25F}"/>
               </a:ext>
             </a:extLst>
           </p:cNvPr>
@@ -678,7 +679,7 @@
           <p:cNvPr id="4" name="日期版面配置區 3">
             <a:extLst>
               <a:ext uri="{FF2B5EF4-FFF2-40B4-BE49-F238E27FC236}">
-                <a16:creationId xmlns:a16="http://schemas.microsoft.com/office/drawing/2014/main" id="{9C92E66C-42E5-42AA-A106-2AFD080FBDF3}"/>
+                <a16:creationId xmlns:a16="http://schemas.microsoft.com/office/drawing/2014/main" xmlns="" id="{9C92E66C-42E5-42AA-A106-2AFD080FBDF3}"/>
               </a:ext>
             </a:extLst>
           </p:cNvPr>
@@ -696,7 +697,7 @@
           <a:p>
             <a:fld id="{59C7DAA9-8306-4CC9-B992-C0A037804617}" type="datetimeFigureOut">
               <a:rPr lang="zh-TW" altLang="en-US" smtClean="0"/>
-              <a:t>2019/7/7</a:t>
+              <a:t>2019/8/31</a:t>
             </a:fld>
             <a:endParaRPr lang="zh-TW" altLang="en-US"/>
           </a:p>
@@ -707,7 +708,7 @@
           <p:cNvPr id="5" name="頁尾版面配置區 4">
             <a:extLst>
               <a:ext uri="{FF2B5EF4-FFF2-40B4-BE49-F238E27FC236}">
-                <a16:creationId xmlns:a16="http://schemas.microsoft.com/office/drawing/2014/main" id="{2CBA3547-A09E-41D2-897A-FEE4F023B01E}"/>
+                <a16:creationId xmlns:a16="http://schemas.microsoft.com/office/drawing/2014/main" xmlns="" id="{2CBA3547-A09E-41D2-897A-FEE4F023B01E}"/>
               </a:ext>
             </a:extLst>
           </p:cNvPr>
@@ -732,7 +733,7 @@
           <p:cNvPr id="6" name="投影片編號版面配置區 5">
             <a:extLst>
               <a:ext uri="{FF2B5EF4-FFF2-40B4-BE49-F238E27FC236}">
-                <a16:creationId xmlns:a16="http://schemas.microsoft.com/office/drawing/2014/main" id="{2D894FC3-461E-4527-8E46-D1FCCC62A802}"/>
+                <a16:creationId xmlns:a16="http://schemas.microsoft.com/office/drawing/2014/main" xmlns="" id="{2D894FC3-461E-4527-8E46-D1FCCC62A802}"/>
               </a:ext>
             </a:extLst>
           </p:cNvPr>
@@ -791,7 +792,7 @@
           <p:cNvPr id="2" name="標題 1">
             <a:extLst>
               <a:ext uri="{FF2B5EF4-FFF2-40B4-BE49-F238E27FC236}">
-                <a16:creationId xmlns:a16="http://schemas.microsoft.com/office/drawing/2014/main" id="{0516A69B-B404-4DD9-B723-718747C40536}"/>
+                <a16:creationId xmlns:a16="http://schemas.microsoft.com/office/drawing/2014/main" xmlns="" id="{0516A69B-B404-4DD9-B723-718747C40536}"/>
               </a:ext>
             </a:extLst>
           </p:cNvPr>
@@ -819,7 +820,7 @@
           <p:cNvPr id="3" name="直排文字版面配置區 2">
             <a:extLst>
               <a:ext uri="{FF2B5EF4-FFF2-40B4-BE49-F238E27FC236}">
-                <a16:creationId xmlns:a16="http://schemas.microsoft.com/office/drawing/2014/main" id="{1E7C6CBF-A902-4F43-A7BA-AA56411639E3}"/>
+                <a16:creationId xmlns:a16="http://schemas.microsoft.com/office/drawing/2014/main" xmlns="" id="{1E7C6CBF-A902-4F43-A7BA-AA56411639E3}"/>
               </a:ext>
             </a:extLst>
           </p:cNvPr>
@@ -876,7 +877,7 @@
           <p:cNvPr id="4" name="日期版面配置區 3">
             <a:extLst>
               <a:ext uri="{FF2B5EF4-FFF2-40B4-BE49-F238E27FC236}">
-                <a16:creationId xmlns:a16="http://schemas.microsoft.com/office/drawing/2014/main" id="{07FC21E9-751C-4844-A903-3A1C9C07576A}"/>
+                <a16:creationId xmlns:a16="http://schemas.microsoft.com/office/drawing/2014/main" xmlns="" id="{07FC21E9-751C-4844-A903-3A1C9C07576A}"/>
               </a:ext>
             </a:extLst>
           </p:cNvPr>
@@ -894,7 +895,7 @@
           <a:p>
             <a:fld id="{59C7DAA9-8306-4CC9-B992-C0A037804617}" type="datetimeFigureOut">
               <a:rPr lang="zh-TW" altLang="en-US" smtClean="0"/>
-              <a:t>2019/7/7</a:t>
+              <a:t>2019/8/31</a:t>
             </a:fld>
             <a:endParaRPr lang="zh-TW" altLang="en-US"/>
           </a:p>
@@ -905,7 +906,7 @@
           <p:cNvPr id="5" name="頁尾版面配置區 4">
             <a:extLst>
               <a:ext uri="{FF2B5EF4-FFF2-40B4-BE49-F238E27FC236}">
-                <a16:creationId xmlns:a16="http://schemas.microsoft.com/office/drawing/2014/main" id="{5C497F2D-B2AB-4692-9723-2211EAA23066}"/>
+                <a16:creationId xmlns:a16="http://schemas.microsoft.com/office/drawing/2014/main" xmlns="" id="{5C497F2D-B2AB-4692-9723-2211EAA23066}"/>
               </a:ext>
             </a:extLst>
           </p:cNvPr>
@@ -930,7 +931,7 @@
           <p:cNvPr id="6" name="投影片編號版面配置區 5">
             <a:extLst>
               <a:ext uri="{FF2B5EF4-FFF2-40B4-BE49-F238E27FC236}">
-                <a16:creationId xmlns:a16="http://schemas.microsoft.com/office/drawing/2014/main" id="{A0A32C88-0219-4558-97DA-278BE282F735}"/>
+                <a16:creationId xmlns:a16="http://schemas.microsoft.com/office/drawing/2014/main" xmlns="" id="{A0A32C88-0219-4558-97DA-278BE282F735}"/>
               </a:ext>
             </a:extLst>
           </p:cNvPr>
@@ -989,7 +990,7 @@
           <p:cNvPr id="2" name="直排標題 1">
             <a:extLst>
               <a:ext uri="{FF2B5EF4-FFF2-40B4-BE49-F238E27FC236}">
-                <a16:creationId xmlns:a16="http://schemas.microsoft.com/office/drawing/2014/main" id="{4AE2E3AC-4F7A-4EBF-AB50-4D0F889F0C8E}"/>
+                <a16:creationId xmlns:a16="http://schemas.microsoft.com/office/drawing/2014/main" xmlns="" id="{4AE2E3AC-4F7A-4EBF-AB50-4D0F889F0C8E}"/>
               </a:ext>
             </a:extLst>
           </p:cNvPr>
@@ -1022,7 +1023,7 @@
           <p:cNvPr id="3" name="直排文字版面配置區 2">
             <a:extLst>
               <a:ext uri="{FF2B5EF4-FFF2-40B4-BE49-F238E27FC236}">
-                <a16:creationId xmlns:a16="http://schemas.microsoft.com/office/drawing/2014/main" id="{D64421F3-D7B4-429B-A87F-90C18ED39F13}"/>
+                <a16:creationId xmlns:a16="http://schemas.microsoft.com/office/drawing/2014/main" xmlns="" id="{D64421F3-D7B4-429B-A87F-90C18ED39F13}"/>
               </a:ext>
             </a:extLst>
           </p:cNvPr>
@@ -1084,7 +1085,7 @@
           <p:cNvPr id="4" name="日期版面配置區 3">
             <a:extLst>
               <a:ext uri="{FF2B5EF4-FFF2-40B4-BE49-F238E27FC236}">
-                <a16:creationId xmlns:a16="http://schemas.microsoft.com/office/drawing/2014/main" id="{E868421B-0C98-4ED7-8AA9-C0A086F08CBC}"/>
+                <a16:creationId xmlns:a16="http://schemas.microsoft.com/office/drawing/2014/main" xmlns="" id="{E868421B-0C98-4ED7-8AA9-C0A086F08CBC}"/>
               </a:ext>
             </a:extLst>
           </p:cNvPr>
@@ -1102,7 +1103,7 @@
           <a:p>
             <a:fld id="{59C7DAA9-8306-4CC9-B992-C0A037804617}" type="datetimeFigureOut">
               <a:rPr lang="zh-TW" altLang="en-US" smtClean="0"/>
-              <a:t>2019/7/7</a:t>
+              <a:t>2019/8/31</a:t>
             </a:fld>
             <a:endParaRPr lang="zh-TW" altLang="en-US"/>
           </a:p>
@@ -1113,7 +1114,7 @@
           <p:cNvPr id="5" name="頁尾版面配置區 4">
             <a:extLst>
               <a:ext uri="{FF2B5EF4-FFF2-40B4-BE49-F238E27FC236}">
-                <a16:creationId xmlns:a16="http://schemas.microsoft.com/office/drawing/2014/main" id="{BA234719-FA55-440E-BDDE-C6585C904A61}"/>
+                <a16:creationId xmlns:a16="http://schemas.microsoft.com/office/drawing/2014/main" xmlns="" id="{BA234719-FA55-440E-BDDE-C6585C904A61}"/>
               </a:ext>
             </a:extLst>
           </p:cNvPr>
@@ -1138,7 +1139,7 @@
           <p:cNvPr id="6" name="投影片編號版面配置區 5">
             <a:extLst>
               <a:ext uri="{FF2B5EF4-FFF2-40B4-BE49-F238E27FC236}">
-                <a16:creationId xmlns:a16="http://schemas.microsoft.com/office/drawing/2014/main" id="{7AB382A4-D21C-418E-AA80-261EC0B5A4E3}"/>
+                <a16:creationId xmlns:a16="http://schemas.microsoft.com/office/drawing/2014/main" xmlns="" id="{7AB382A4-D21C-418E-AA80-261EC0B5A4E3}"/>
               </a:ext>
             </a:extLst>
           </p:cNvPr>
@@ -1197,7 +1198,7 @@
           <p:cNvPr id="2" name="標題 1">
             <a:extLst>
               <a:ext uri="{FF2B5EF4-FFF2-40B4-BE49-F238E27FC236}">
-                <a16:creationId xmlns:a16="http://schemas.microsoft.com/office/drawing/2014/main" id="{4A82D6DB-CDCC-4D3A-9710-721D3CB7A649}"/>
+                <a16:creationId xmlns:a16="http://schemas.microsoft.com/office/drawing/2014/main" xmlns="" id="{4A82D6DB-CDCC-4D3A-9710-721D3CB7A649}"/>
               </a:ext>
             </a:extLst>
           </p:cNvPr>
@@ -1225,7 +1226,7 @@
           <p:cNvPr id="3" name="內容版面配置區 2">
             <a:extLst>
               <a:ext uri="{FF2B5EF4-FFF2-40B4-BE49-F238E27FC236}">
-                <a16:creationId xmlns:a16="http://schemas.microsoft.com/office/drawing/2014/main" id="{9CEB30C5-0321-46CC-8009-A1516B0FAE17}"/>
+                <a16:creationId xmlns:a16="http://schemas.microsoft.com/office/drawing/2014/main" xmlns="" id="{9CEB30C5-0321-46CC-8009-A1516B0FAE17}"/>
               </a:ext>
             </a:extLst>
           </p:cNvPr>
@@ -1282,7 +1283,7 @@
           <p:cNvPr id="4" name="日期版面配置區 3">
             <a:extLst>
               <a:ext uri="{FF2B5EF4-FFF2-40B4-BE49-F238E27FC236}">
-                <a16:creationId xmlns:a16="http://schemas.microsoft.com/office/drawing/2014/main" id="{CBF96F2D-C0CA-47F6-901F-1198C6331300}"/>
+                <a16:creationId xmlns:a16="http://schemas.microsoft.com/office/drawing/2014/main" xmlns="" id="{CBF96F2D-C0CA-47F6-901F-1198C6331300}"/>
               </a:ext>
             </a:extLst>
           </p:cNvPr>
@@ -1300,7 +1301,7 @@
           <a:p>
             <a:fld id="{59C7DAA9-8306-4CC9-B992-C0A037804617}" type="datetimeFigureOut">
               <a:rPr lang="zh-TW" altLang="en-US" smtClean="0"/>
-              <a:t>2019/7/7</a:t>
+              <a:t>2019/8/31</a:t>
             </a:fld>
             <a:endParaRPr lang="zh-TW" altLang="en-US"/>
           </a:p>
@@ -1311,7 +1312,7 @@
           <p:cNvPr id="5" name="頁尾版面配置區 4">
             <a:extLst>
               <a:ext uri="{FF2B5EF4-FFF2-40B4-BE49-F238E27FC236}">
-                <a16:creationId xmlns:a16="http://schemas.microsoft.com/office/drawing/2014/main" id="{E0255B2D-C3E2-4484-8EC4-3ACF4220C2A9}"/>
+                <a16:creationId xmlns:a16="http://schemas.microsoft.com/office/drawing/2014/main" xmlns="" id="{E0255B2D-C3E2-4484-8EC4-3ACF4220C2A9}"/>
               </a:ext>
             </a:extLst>
           </p:cNvPr>
@@ -1336,7 +1337,7 @@
           <p:cNvPr id="6" name="投影片編號版面配置區 5">
             <a:extLst>
               <a:ext uri="{FF2B5EF4-FFF2-40B4-BE49-F238E27FC236}">
-                <a16:creationId xmlns:a16="http://schemas.microsoft.com/office/drawing/2014/main" id="{26B801E0-F738-449C-8EE0-BC427D33679C}"/>
+                <a16:creationId xmlns:a16="http://schemas.microsoft.com/office/drawing/2014/main" xmlns="" id="{26B801E0-F738-449C-8EE0-BC427D33679C}"/>
               </a:ext>
             </a:extLst>
           </p:cNvPr>
@@ -1395,7 +1396,7 @@
           <p:cNvPr id="2" name="標題 1">
             <a:extLst>
               <a:ext uri="{FF2B5EF4-FFF2-40B4-BE49-F238E27FC236}">
-                <a16:creationId xmlns:a16="http://schemas.microsoft.com/office/drawing/2014/main" id="{09D3F9C8-F6E2-46B1-ACC2-BA074F37FEAE}"/>
+                <a16:creationId xmlns:a16="http://schemas.microsoft.com/office/drawing/2014/main" xmlns="" id="{09D3F9C8-F6E2-46B1-ACC2-BA074F37FEAE}"/>
               </a:ext>
             </a:extLst>
           </p:cNvPr>
@@ -1432,7 +1433,7 @@
           <p:cNvPr id="3" name="文字版面配置區 2">
             <a:extLst>
               <a:ext uri="{FF2B5EF4-FFF2-40B4-BE49-F238E27FC236}">
-                <a16:creationId xmlns:a16="http://schemas.microsoft.com/office/drawing/2014/main" id="{4F104A6A-7161-4D98-B4FB-3DB3E061F756}"/>
+                <a16:creationId xmlns:a16="http://schemas.microsoft.com/office/drawing/2014/main" xmlns="" id="{4F104A6A-7161-4D98-B4FB-3DB3E061F756}"/>
               </a:ext>
             </a:extLst>
           </p:cNvPr>
@@ -1557,7 +1558,7 @@
           <p:cNvPr id="4" name="日期版面配置區 3">
             <a:extLst>
               <a:ext uri="{FF2B5EF4-FFF2-40B4-BE49-F238E27FC236}">
-                <a16:creationId xmlns:a16="http://schemas.microsoft.com/office/drawing/2014/main" id="{BB88AF4B-F516-421D-888B-1D89035B3709}"/>
+                <a16:creationId xmlns:a16="http://schemas.microsoft.com/office/drawing/2014/main" xmlns="" id="{BB88AF4B-F516-421D-888B-1D89035B3709}"/>
               </a:ext>
             </a:extLst>
           </p:cNvPr>
@@ -1575,7 +1576,7 @@
           <a:p>
             <a:fld id="{59C7DAA9-8306-4CC9-B992-C0A037804617}" type="datetimeFigureOut">
               <a:rPr lang="zh-TW" altLang="en-US" smtClean="0"/>
-              <a:t>2019/7/7</a:t>
+              <a:t>2019/8/31</a:t>
             </a:fld>
             <a:endParaRPr lang="zh-TW" altLang="en-US"/>
           </a:p>
@@ -1586,7 +1587,7 @@
           <p:cNvPr id="5" name="頁尾版面配置區 4">
             <a:extLst>
               <a:ext uri="{FF2B5EF4-FFF2-40B4-BE49-F238E27FC236}">
-                <a16:creationId xmlns:a16="http://schemas.microsoft.com/office/drawing/2014/main" id="{41C9937E-90BD-4DDF-87FF-A2654D97BE36}"/>
+                <a16:creationId xmlns:a16="http://schemas.microsoft.com/office/drawing/2014/main" xmlns="" id="{41C9937E-90BD-4DDF-87FF-A2654D97BE36}"/>
               </a:ext>
             </a:extLst>
           </p:cNvPr>
@@ -1611,7 +1612,7 @@
           <p:cNvPr id="6" name="投影片編號版面配置區 5">
             <a:extLst>
               <a:ext uri="{FF2B5EF4-FFF2-40B4-BE49-F238E27FC236}">
-                <a16:creationId xmlns:a16="http://schemas.microsoft.com/office/drawing/2014/main" id="{269F0460-86E4-452D-9A62-2FE381039E38}"/>
+                <a16:creationId xmlns:a16="http://schemas.microsoft.com/office/drawing/2014/main" xmlns="" id="{269F0460-86E4-452D-9A62-2FE381039E38}"/>
               </a:ext>
             </a:extLst>
           </p:cNvPr>
@@ -1670,7 +1671,7 @@
           <p:cNvPr id="2" name="標題 1">
             <a:extLst>
               <a:ext uri="{FF2B5EF4-FFF2-40B4-BE49-F238E27FC236}">
-                <a16:creationId xmlns:a16="http://schemas.microsoft.com/office/drawing/2014/main" id="{B9965988-71B4-4438-AB9C-E946BCF3AFD0}"/>
+                <a16:creationId xmlns:a16="http://schemas.microsoft.com/office/drawing/2014/main" xmlns="" id="{B9965988-71B4-4438-AB9C-E946BCF3AFD0}"/>
               </a:ext>
             </a:extLst>
           </p:cNvPr>
@@ -1698,7 +1699,7 @@
           <p:cNvPr id="3" name="內容版面配置區 2">
             <a:extLst>
               <a:ext uri="{FF2B5EF4-FFF2-40B4-BE49-F238E27FC236}">
-                <a16:creationId xmlns:a16="http://schemas.microsoft.com/office/drawing/2014/main" id="{BCF54ED3-1742-49E2-A3B0-8088FAF212BE}"/>
+                <a16:creationId xmlns:a16="http://schemas.microsoft.com/office/drawing/2014/main" xmlns="" id="{BCF54ED3-1742-49E2-A3B0-8088FAF212BE}"/>
               </a:ext>
             </a:extLst>
           </p:cNvPr>
@@ -1760,7 +1761,7 @@
           <p:cNvPr id="4" name="內容版面配置區 3">
             <a:extLst>
               <a:ext uri="{FF2B5EF4-FFF2-40B4-BE49-F238E27FC236}">
-                <a16:creationId xmlns:a16="http://schemas.microsoft.com/office/drawing/2014/main" id="{F802AAC5-4AEE-428D-B1E0-4121001506DB}"/>
+                <a16:creationId xmlns:a16="http://schemas.microsoft.com/office/drawing/2014/main" xmlns="" id="{F802AAC5-4AEE-428D-B1E0-4121001506DB}"/>
               </a:ext>
             </a:extLst>
           </p:cNvPr>
@@ -1822,7 +1823,7 @@
           <p:cNvPr id="5" name="日期版面配置區 4">
             <a:extLst>
               <a:ext uri="{FF2B5EF4-FFF2-40B4-BE49-F238E27FC236}">
-                <a16:creationId xmlns:a16="http://schemas.microsoft.com/office/drawing/2014/main" id="{C5942496-D4C1-4F4B-8D37-B5BA79EC3F26}"/>
+                <a16:creationId xmlns:a16="http://schemas.microsoft.com/office/drawing/2014/main" xmlns="" id="{C5942496-D4C1-4F4B-8D37-B5BA79EC3F26}"/>
               </a:ext>
             </a:extLst>
           </p:cNvPr>
@@ -1840,7 +1841,7 @@
           <a:p>
             <a:fld id="{59C7DAA9-8306-4CC9-B992-C0A037804617}" type="datetimeFigureOut">
               <a:rPr lang="zh-TW" altLang="en-US" smtClean="0"/>
-              <a:t>2019/7/7</a:t>
+              <a:t>2019/8/31</a:t>
             </a:fld>
             <a:endParaRPr lang="zh-TW" altLang="en-US"/>
           </a:p>
@@ -1851,7 +1852,7 @@
           <p:cNvPr id="6" name="頁尾版面配置區 5">
             <a:extLst>
               <a:ext uri="{FF2B5EF4-FFF2-40B4-BE49-F238E27FC236}">
-                <a16:creationId xmlns:a16="http://schemas.microsoft.com/office/drawing/2014/main" id="{986F8353-E73C-4FA6-A7BE-D8598C83CA4F}"/>
+                <a16:creationId xmlns:a16="http://schemas.microsoft.com/office/drawing/2014/main" xmlns="" id="{986F8353-E73C-4FA6-A7BE-D8598C83CA4F}"/>
               </a:ext>
             </a:extLst>
           </p:cNvPr>
@@ -1876,7 +1877,7 @@
           <p:cNvPr id="7" name="投影片編號版面配置區 6">
             <a:extLst>
               <a:ext uri="{FF2B5EF4-FFF2-40B4-BE49-F238E27FC236}">
-                <a16:creationId xmlns:a16="http://schemas.microsoft.com/office/drawing/2014/main" id="{5048B33D-4B8A-4D30-864B-38D1AC0A1B72}"/>
+                <a16:creationId xmlns:a16="http://schemas.microsoft.com/office/drawing/2014/main" xmlns="" id="{5048B33D-4B8A-4D30-864B-38D1AC0A1B72}"/>
               </a:ext>
             </a:extLst>
           </p:cNvPr>
@@ -1935,7 +1936,7 @@
           <p:cNvPr id="2" name="標題 1">
             <a:extLst>
               <a:ext uri="{FF2B5EF4-FFF2-40B4-BE49-F238E27FC236}">
-                <a16:creationId xmlns:a16="http://schemas.microsoft.com/office/drawing/2014/main" id="{40747F3A-4449-4E3B-8666-C12CE98E33B5}"/>
+                <a16:creationId xmlns:a16="http://schemas.microsoft.com/office/drawing/2014/main" xmlns="" id="{40747F3A-4449-4E3B-8666-C12CE98E33B5}"/>
               </a:ext>
             </a:extLst>
           </p:cNvPr>
@@ -1968,7 +1969,7 @@
           <p:cNvPr id="3" name="文字版面配置區 2">
             <a:extLst>
               <a:ext uri="{FF2B5EF4-FFF2-40B4-BE49-F238E27FC236}">
-                <a16:creationId xmlns:a16="http://schemas.microsoft.com/office/drawing/2014/main" id="{2BD40F0D-44FE-463E-808C-92C8751EC3FB}"/>
+                <a16:creationId xmlns:a16="http://schemas.microsoft.com/office/drawing/2014/main" xmlns="" id="{2BD40F0D-44FE-463E-808C-92C8751EC3FB}"/>
               </a:ext>
             </a:extLst>
           </p:cNvPr>
@@ -2039,7 +2040,7 @@
           <p:cNvPr id="4" name="內容版面配置區 3">
             <a:extLst>
               <a:ext uri="{FF2B5EF4-FFF2-40B4-BE49-F238E27FC236}">
-                <a16:creationId xmlns:a16="http://schemas.microsoft.com/office/drawing/2014/main" id="{902B8175-1DD8-4A3C-8638-9AF79BDEDBC8}"/>
+                <a16:creationId xmlns:a16="http://schemas.microsoft.com/office/drawing/2014/main" xmlns="" id="{902B8175-1DD8-4A3C-8638-9AF79BDEDBC8}"/>
               </a:ext>
             </a:extLst>
           </p:cNvPr>
@@ -2101,7 +2102,7 @@
           <p:cNvPr id="5" name="文字版面配置區 4">
             <a:extLst>
               <a:ext uri="{FF2B5EF4-FFF2-40B4-BE49-F238E27FC236}">
-                <a16:creationId xmlns:a16="http://schemas.microsoft.com/office/drawing/2014/main" id="{258B2401-E620-4DE6-8DEE-A79D2E9F0D77}"/>
+                <a16:creationId xmlns:a16="http://schemas.microsoft.com/office/drawing/2014/main" xmlns="" id="{258B2401-E620-4DE6-8DEE-A79D2E9F0D77}"/>
               </a:ext>
             </a:extLst>
           </p:cNvPr>
@@ -2172,7 +2173,7 @@
           <p:cNvPr id="6" name="內容版面配置區 5">
             <a:extLst>
               <a:ext uri="{FF2B5EF4-FFF2-40B4-BE49-F238E27FC236}">
-                <a16:creationId xmlns:a16="http://schemas.microsoft.com/office/drawing/2014/main" id="{621FCFEF-3E9E-4BEE-A71E-DE2AC2E932C8}"/>
+                <a16:creationId xmlns:a16="http://schemas.microsoft.com/office/drawing/2014/main" xmlns="" id="{621FCFEF-3E9E-4BEE-A71E-DE2AC2E932C8}"/>
               </a:ext>
             </a:extLst>
           </p:cNvPr>
@@ -2234,7 +2235,7 @@
           <p:cNvPr id="7" name="日期版面配置區 6">
             <a:extLst>
               <a:ext uri="{FF2B5EF4-FFF2-40B4-BE49-F238E27FC236}">
-                <a16:creationId xmlns:a16="http://schemas.microsoft.com/office/drawing/2014/main" id="{8C3BE562-AB3E-4C84-B8F6-8D0A9447582C}"/>
+                <a16:creationId xmlns:a16="http://schemas.microsoft.com/office/drawing/2014/main" xmlns="" id="{8C3BE562-AB3E-4C84-B8F6-8D0A9447582C}"/>
               </a:ext>
             </a:extLst>
           </p:cNvPr>
@@ -2252,7 +2253,7 @@
           <a:p>
             <a:fld id="{59C7DAA9-8306-4CC9-B992-C0A037804617}" type="datetimeFigureOut">
               <a:rPr lang="zh-TW" altLang="en-US" smtClean="0"/>
-              <a:t>2019/7/7</a:t>
+              <a:t>2019/8/31</a:t>
             </a:fld>
             <a:endParaRPr lang="zh-TW" altLang="en-US"/>
           </a:p>
@@ -2263,7 +2264,7 @@
           <p:cNvPr id="8" name="頁尾版面配置區 7">
             <a:extLst>
               <a:ext uri="{FF2B5EF4-FFF2-40B4-BE49-F238E27FC236}">
-                <a16:creationId xmlns:a16="http://schemas.microsoft.com/office/drawing/2014/main" id="{15951EF1-1194-4466-9809-8F2A7F42BB06}"/>
+                <a16:creationId xmlns:a16="http://schemas.microsoft.com/office/drawing/2014/main" xmlns="" id="{15951EF1-1194-4466-9809-8F2A7F42BB06}"/>
               </a:ext>
             </a:extLst>
           </p:cNvPr>
@@ -2288,7 +2289,7 @@
           <p:cNvPr id="9" name="投影片編號版面配置區 8">
             <a:extLst>
               <a:ext uri="{FF2B5EF4-FFF2-40B4-BE49-F238E27FC236}">
-                <a16:creationId xmlns:a16="http://schemas.microsoft.com/office/drawing/2014/main" id="{4953749B-2C91-4D7B-868E-A27F4E9ED8D6}"/>
+                <a16:creationId xmlns:a16="http://schemas.microsoft.com/office/drawing/2014/main" xmlns="" id="{4953749B-2C91-4D7B-868E-A27F4E9ED8D6}"/>
               </a:ext>
             </a:extLst>
           </p:cNvPr>
@@ -2347,7 +2348,7 @@
           <p:cNvPr id="2" name="標題 1">
             <a:extLst>
               <a:ext uri="{FF2B5EF4-FFF2-40B4-BE49-F238E27FC236}">
-                <a16:creationId xmlns:a16="http://schemas.microsoft.com/office/drawing/2014/main" id="{CDB10691-DE01-4CAE-B91F-AD4A0EF2BD1A}"/>
+                <a16:creationId xmlns:a16="http://schemas.microsoft.com/office/drawing/2014/main" xmlns="" id="{CDB10691-DE01-4CAE-B91F-AD4A0EF2BD1A}"/>
               </a:ext>
             </a:extLst>
           </p:cNvPr>
@@ -2375,7 +2376,7 @@
           <p:cNvPr id="3" name="日期版面配置區 2">
             <a:extLst>
               <a:ext uri="{FF2B5EF4-FFF2-40B4-BE49-F238E27FC236}">
-                <a16:creationId xmlns:a16="http://schemas.microsoft.com/office/drawing/2014/main" id="{3DC68FB3-F31D-4B9A-9E35-CE8B8A174EB1}"/>
+                <a16:creationId xmlns:a16="http://schemas.microsoft.com/office/drawing/2014/main" xmlns="" id="{3DC68FB3-F31D-4B9A-9E35-CE8B8A174EB1}"/>
               </a:ext>
             </a:extLst>
           </p:cNvPr>
@@ -2393,7 +2394,7 @@
           <a:p>
             <a:fld id="{59C7DAA9-8306-4CC9-B992-C0A037804617}" type="datetimeFigureOut">
               <a:rPr lang="zh-TW" altLang="en-US" smtClean="0"/>
-              <a:t>2019/7/7</a:t>
+              <a:t>2019/8/31</a:t>
             </a:fld>
             <a:endParaRPr lang="zh-TW" altLang="en-US"/>
           </a:p>
@@ -2404,7 +2405,7 @@
           <p:cNvPr id="4" name="頁尾版面配置區 3">
             <a:extLst>
               <a:ext uri="{FF2B5EF4-FFF2-40B4-BE49-F238E27FC236}">
-                <a16:creationId xmlns:a16="http://schemas.microsoft.com/office/drawing/2014/main" id="{6F2668D9-B4DB-4C06-8126-771783812945}"/>
+                <a16:creationId xmlns:a16="http://schemas.microsoft.com/office/drawing/2014/main" xmlns="" id="{6F2668D9-B4DB-4C06-8126-771783812945}"/>
               </a:ext>
             </a:extLst>
           </p:cNvPr>
@@ -2429,7 +2430,7 @@
           <p:cNvPr id="5" name="投影片編號版面配置區 4">
             <a:extLst>
               <a:ext uri="{FF2B5EF4-FFF2-40B4-BE49-F238E27FC236}">
-                <a16:creationId xmlns:a16="http://schemas.microsoft.com/office/drawing/2014/main" id="{62B11C53-DBA8-44E3-B8ED-14688E97438C}"/>
+                <a16:creationId xmlns:a16="http://schemas.microsoft.com/office/drawing/2014/main" xmlns="" id="{62B11C53-DBA8-44E3-B8ED-14688E97438C}"/>
               </a:ext>
             </a:extLst>
           </p:cNvPr>
@@ -2488,7 +2489,7 @@
           <p:cNvPr id="2" name="日期版面配置區 1">
             <a:extLst>
               <a:ext uri="{FF2B5EF4-FFF2-40B4-BE49-F238E27FC236}">
-                <a16:creationId xmlns:a16="http://schemas.microsoft.com/office/drawing/2014/main" id="{DAAEBBB1-06E9-4666-A914-28CCD284A0DB}"/>
+                <a16:creationId xmlns:a16="http://schemas.microsoft.com/office/drawing/2014/main" xmlns="" id="{DAAEBBB1-06E9-4666-A914-28CCD284A0DB}"/>
               </a:ext>
             </a:extLst>
           </p:cNvPr>
@@ -2506,7 +2507,7 @@
           <a:p>
             <a:fld id="{59C7DAA9-8306-4CC9-B992-C0A037804617}" type="datetimeFigureOut">
               <a:rPr lang="zh-TW" altLang="en-US" smtClean="0"/>
-              <a:t>2019/7/7</a:t>
+              <a:t>2019/8/31</a:t>
             </a:fld>
             <a:endParaRPr lang="zh-TW" altLang="en-US"/>
           </a:p>
@@ -2517,7 +2518,7 @@
           <p:cNvPr id="3" name="頁尾版面配置區 2">
             <a:extLst>
               <a:ext uri="{FF2B5EF4-FFF2-40B4-BE49-F238E27FC236}">
-                <a16:creationId xmlns:a16="http://schemas.microsoft.com/office/drawing/2014/main" id="{2DBFBC50-ACC6-4172-89C9-E07D9A15BC53}"/>
+                <a16:creationId xmlns:a16="http://schemas.microsoft.com/office/drawing/2014/main" xmlns="" id="{2DBFBC50-ACC6-4172-89C9-E07D9A15BC53}"/>
               </a:ext>
             </a:extLst>
           </p:cNvPr>
@@ -2542,7 +2543,7 @@
           <p:cNvPr id="4" name="投影片編號版面配置區 3">
             <a:extLst>
               <a:ext uri="{FF2B5EF4-FFF2-40B4-BE49-F238E27FC236}">
-                <a16:creationId xmlns:a16="http://schemas.microsoft.com/office/drawing/2014/main" id="{3C36042B-6960-413D-89ED-09F613BB854C}"/>
+                <a16:creationId xmlns:a16="http://schemas.microsoft.com/office/drawing/2014/main" xmlns="" id="{3C36042B-6960-413D-89ED-09F613BB854C}"/>
               </a:ext>
             </a:extLst>
           </p:cNvPr>
@@ -2601,7 +2602,7 @@
           <p:cNvPr id="2" name="標題 1">
             <a:extLst>
               <a:ext uri="{FF2B5EF4-FFF2-40B4-BE49-F238E27FC236}">
-                <a16:creationId xmlns:a16="http://schemas.microsoft.com/office/drawing/2014/main" id="{9524E8F1-5ED5-4ECB-A966-E28072C10118}"/>
+                <a16:creationId xmlns:a16="http://schemas.microsoft.com/office/drawing/2014/main" xmlns="" id="{9524E8F1-5ED5-4ECB-A966-E28072C10118}"/>
               </a:ext>
             </a:extLst>
           </p:cNvPr>
@@ -2638,7 +2639,7 @@
           <p:cNvPr id="3" name="內容版面配置區 2">
             <a:extLst>
               <a:ext uri="{FF2B5EF4-FFF2-40B4-BE49-F238E27FC236}">
-                <a16:creationId xmlns:a16="http://schemas.microsoft.com/office/drawing/2014/main" id="{DC285F6C-EF86-43D1-8009-A028CEEC1612}"/>
+                <a16:creationId xmlns:a16="http://schemas.microsoft.com/office/drawing/2014/main" xmlns="" id="{DC285F6C-EF86-43D1-8009-A028CEEC1612}"/>
               </a:ext>
             </a:extLst>
           </p:cNvPr>
@@ -2728,7 +2729,7 @@
           <p:cNvPr id="4" name="文字版面配置區 3">
             <a:extLst>
               <a:ext uri="{FF2B5EF4-FFF2-40B4-BE49-F238E27FC236}">
-                <a16:creationId xmlns:a16="http://schemas.microsoft.com/office/drawing/2014/main" id="{44560070-00D6-4C16-A46D-633D564FCD93}"/>
+                <a16:creationId xmlns:a16="http://schemas.microsoft.com/office/drawing/2014/main" xmlns="" id="{44560070-00D6-4C16-A46D-633D564FCD93}"/>
               </a:ext>
             </a:extLst>
           </p:cNvPr>
@@ -2799,7 +2800,7 @@
           <p:cNvPr id="5" name="日期版面配置區 4">
             <a:extLst>
               <a:ext uri="{FF2B5EF4-FFF2-40B4-BE49-F238E27FC236}">
-                <a16:creationId xmlns:a16="http://schemas.microsoft.com/office/drawing/2014/main" id="{879CA0D0-60C5-4326-BCE3-7376887FC928}"/>
+                <a16:creationId xmlns:a16="http://schemas.microsoft.com/office/drawing/2014/main" xmlns="" id="{879CA0D0-60C5-4326-BCE3-7376887FC928}"/>
               </a:ext>
             </a:extLst>
           </p:cNvPr>
@@ -2817,7 +2818,7 @@
           <a:p>
             <a:fld id="{59C7DAA9-8306-4CC9-B992-C0A037804617}" type="datetimeFigureOut">
               <a:rPr lang="zh-TW" altLang="en-US" smtClean="0"/>
-              <a:t>2019/7/7</a:t>
+              <a:t>2019/8/31</a:t>
             </a:fld>
             <a:endParaRPr lang="zh-TW" altLang="en-US"/>
           </a:p>
@@ -2828,7 +2829,7 @@
           <p:cNvPr id="6" name="頁尾版面配置區 5">
             <a:extLst>
               <a:ext uri="{FF2B5EF4-FFF2-40B4-BE49-F238E27FC236}">
-                <a16:creationId xmlns:a16="http://schemas.microsoft.com/office/drawing/2014/main" id="{ADF3FDCD-DE9D-4610-91A4-BDF87D53713B}"/>
+                <a16:creationId xmlns:a16="http://schemas.microsoft.com/office/drawing/2014/main" xmlns="" id="{ADF3FDCD-DE9D-4610-91A4-BDF87D53713B}"/>
               </a:ext>
             </a:extLst>
           </p:cNvPr>
@@ -2853,7 +2854,7 @@
           <p:cNvPr id="7" name="投影片編號版面配置區 6">
             <a:extLst>
               <a:ext uri="{FF2B5EF4-FFF2-40B4-BE49-F238E27FC236}">
-                <a16:creationId xmlns:a16="http://schemas.microsoft.com/office/drawing/2014/main" id="{B1D1DBB4-BE93-4F57-A9BF-79D6F82668EF}"/>
+                <a16:creationId xmlns:a16="http://schemas.microsoft.com/office/drawing/2014/main" xmlns="" id="{B1D1DBB4-BE93-4F57-A9BF-79D6F82668EF}"/>
               </a:ext>
             </a:extLst>
           </p:cNvPr>
@@ -2912,7 +2913,7 @@
           <p:cNvPr id="2" name="標題 1">
             <a:extLst>
               <a:ext uri="{FF2B5EF4-FFF2-40B4-BE49-F238E27FC236}">
-                <a16:creationId xmlns:a16="http://schemas.microsoft.com/office/drawing/2014/main" id="{FB4B43BA-3855-41E0-B63B-0B529EB2021A}"/>
+                <a16:creationId xmlns:a16="http://schemas.microsoft.com/office/drawing/2014/main" xmlns="" id="{FB4B43BA-3855-41E0-B63B-0B529EB2021A}"/>
               </a:ext>
             </a:extLst>
           </p:cNvPr>
@@ -2949,7 +2950,7 @@
           <p:cNvPr id="3" name="圖片版面配置區 2">
             <a:extLst>
               <a:ext uri="{FF2B5EF4-FFF2-40B4-BE49-F238E27FC236}">
-                <a16:creationId xmlns:a16="http://schemas.microsoft.com/office/drawing/2014/main" id="{E0978B20-E708-4CBC-B256-908A8D8B7104}"/>
+                <a16:creationId xmlns:a16="http://schemas.microsoft.com/office/drawing/2014/main" xmlns="" id="{E0978B20-E708-4CBC-B256-908A8D8B7104}"/>
               </a:ext>
             </a:extLst>
           </p:cNvPr>
@@ -3016,7 +3017,7 @@
           <p:cNvPr id="4" name="文字版面配置區 3">
             <a:extLst>
               <a:ext uri="{FF2B5EF4-FFF2-40B4-BE49-F238E27FC236}">
-                <a16:creationId xmlns:a16="http://schemas.microsoft.com/office/drawing/2014/main" id="{6F910D0E-630F-4E34-88E9-E11DD0353E91}"/>
+                <a16:creationId xmlns:a16="http://schemas.microsoft.com/office/drawing/2014/main" xmlns="" id="{6F910D0E-630F-4E34-88E9-E11DD0353E91}"/>
               </a:ext>
             </a:extLst>
           </p:cNvPr>
@@ -3087,7 +3088,7 @@
           <p:cNvPr id="5" name="日期版面配置區 4">
             <a:extLst>
               <a:ext uri="{FF2B5EF4-FFF2-40B4-BE49-F238E27FC236}">
-                <a16:creationId xmlns:a16="http://schemas.microsoft.com/office/drawing/2014/main" id="{5DCA3F04-E960-4402-B854-F134203E69E7}"/>
+                <a16:creationId xmlns:a16="http://schemas.microsoft.com/office/drawing/2014/main" xmlns="" id="{5DCA3F04-E960-4402-B854-F134203E69E7}"/>
               </a:ext>
             </a:extLst>
           </p:cNvPr>
@@ -3105,7 +3106,7 @@
           <a:p>
             <a:fld id="{59C7DAA9-8306-4CC9-B992-C0A037804617}" type="datetimeFigureOut">
               <a:rPr lang="zh-TW" altLang="en-US" smtClean="0"/>
-              <a:t>2019/7/7</a:t>
+              <a:t>2019/8/31</a:t>
             </a:fld>
             <a:endParaRPr lang="zh-TW" altLang="en-US"/>
           </a:p>
@@ -3116,7 +3117,7 @@
           <p:cNvPr id="6" name="頁尾版面配置區 5">
             <a:extLst>
               <a:ext uri="{FF2B5EF4-FFF2-40B4-BE49-F238E27FC236}">
-                <a16:creationId xmlns:a16="http://schemas.microsoft.com/office/drawing/2014/main" id="{E7A58D44-BA13-4C92-B385-450E5965AD66}"/>
+                <a16:creationId xmlns:a16="http://schemas.microsoft.com/office/drawing/2014/main" xmlns="" id="{E7A58D44-BA13-4C92-B385-450E5965AD66}"/>
               </a:ext>
             </a:extLst>
           </p:cNvPr>
@@ -3141,7 +3142,7 @@
           <p:cNvPr id="7" name="投影片編號版面配置區 6">
             <a:extLst>
               <a:ext uri="{FF2B5EF4-FFF2-40B4-BE49-F238E27FC236}">
-                <a16:creationId xmlns:a16="http://schemas.microsoft.com/office/drawing/2014/main" id="{A1589C99-E582-49FA-B9A6-4EF7BAF02426}"/>
+                <a16:creationId xmlns:a16="http://schemas.microsoft.com/office/drawing/2014/main" xmlns="" id="{A1589C99-E582-49FA-B9A6-4EF7BAF02426}"/>
               </a:ext>
             </a:extLst>
           </p:cNvPr>
@@ -3205,7 +3206,7 @@
           <p:cNvPr id="2" name="標題版面配置區 1">
             <a:extLst>
               <a:ext uri="{FF2B5EF4-FFF2-40B4-BE49-F238E27FC236}">
-                <a16:creationId xmlns:a16="http://schemas.microsoft.com/office/drawing/2014/main" id="{F0A41766-EBFF-444D-AAAE-F1468069A306}"/>
+                <a16:creationId xmlns:a16="http://schemas.microsoft.com/office/drawing/2014/main" xmlns="" id="{F0A41766-EBFF-444D-AAAE-F1468069A306}"/>
               </a:ext>
             </a:extLst>
           </p:cNvPr>
@@ -3243,7 +3244,7 @@
           <p:cNvPr id="3" name="文字版面配置區 2">
             <a:extLst>
               <a:ext uri="{FF2B5EF4-FFF2-40B4-BE49-F238E27FC236}">
-                <a16:creationId xmlns:a16="http://schemas.microsoft.com/office/drawing/2014/main" id="{1651DCAF-343D-4DC9-AFCA-3B97C4E9C45E}"/>
+                <a16:creationId xmlns:a16="http://schemas.microsoft.com/office/drawing/2014/main" xmlns="" id="{1651DCAF-343D-4DC9-AFCA-3B97C4E9C45E}"/>
               </a:ext>
             </a:extLst>
           </p:cNvPr>
@@ -3310,7 +3311,7 @@
           <p:cNvPr id="4" name="日期版面配置區 3">
             <a:extLst>
               <a:ext uri="{FF2B5EF4-FFF2-40B4-BE49-F238E27FC236}">
-                <a16:creationId xmlns:a16="http://schemas.microsoft.com/office/drawing/2014/main" id="{7EF700B6-F0E5-4333-91A6-0B8CF0454CF6}"/>
+                <a16:creationId xmlns:a16="http://schemas.microsoft.com/office/drawing/2014/main" xmlns="" id="{7EF700B6-F0E5-4333-91A6-0B8CF0454CF6}"/>
               </a:ext>
             </a:extLst>
           </p:cNvPr>
@@ -3346,7 +3347,7 @@
           <a:p>
             <a:fld id="{59C7DAA9-8306-4CC9-B992-C0A037804617}" type="datetimeFigureOut">
               <a:rPr lang="zh-TW" altLang="en-US" smtClean="0"/>
-              <a:t>2019/7/7</a:t>
+              <a:t>2019/8/31</a:t>
             </a:fld>
             <a:endParaRPr lang="zh-TW" altLang="en-US"/>
           </a:p>
@@ -3357,7 +3358,7 @@
           <p:cNvPr id="5" name="頁尾版面配置區 4">
             <a:extLst>
               <a:ext uri="{FF2B5EF4-FFF2-40B4-BE49-F238E27FC236}">
-                <a16:creationId xmlns:a16="http://schemas.microsoft.com/office/drawing/2014/main" id="{52DB0C43-34A8-40DC-AA04-83D4FE0DD5C5}"/>
+                <a16:creationId xmlns:a16="http://schemas.microsoft.com/office/drawing/2014/main" xmlns="" id="{52DB0C43-34A8-40DC-AA04-83D4FE0DD5C5}"/>
               </a:ext>
             </a:extLst>
           </p:cNvPr>
@@ -3400,7 +3401,7 @@
           <p:cNvPr id="6" name="投影片編號版面配置區 5">
             <a:extLst>
               <a:ext uri="{FF2B5EF4-FFF2-40B4-BE49-F238E27FC236}">
-                <a16:creationId xmlns:a16="http://schemas.microsoft.com/office/drawing/2014/main" id="{A7F2BED7-FCEB-44DF-8ADE-9784206D30B9}"/>
+                <a16:creationId xmlns:a16="http://schemas.microsoft.com/office/drawing/2014/main" xmlns="" id="{A7F2BED7-FCEB-44DF-8ADE-9784206D30B9}"/>
               </a:ext>
             </a:extLst>
           </p:cNvPr>
@@ -3768,7 +3769,7 @@
           <p:cNvPr id="2" name="標題 1">
             <a:extLst>
               <a:ext uri="{FF2B5EF4-FFF2-40B4-BE49-F238E27FC236}">
-                <a16:creationId xmlns:a16="http://schemas.microsoft.com/office/drawing/2014/main" id="{A9CB76CB-FE71-4A9A-AC75-C64BD48D5574}"/>
+                <a16:creationId xmlns:a16="http://schemas.microsoft.com/office/drawing/2014/main" xmlns="" id="{A9CB76CB-FE71-4A9A-AC75-C64BD48D5574}"/>
               </a:ext>
             </a:extLst>
           </p:cNvPr>
@@ -3797,7 +3798,7 @@
           <p:cNvPr id="3" name="副標題 2">
             <a:extLst>
               <a:ext uri="{FF2B5EF4-FFF2-40B4-BE49-F238E27FC236}">
-                <a16:creationId xmlns:a16="http://schemas.microsoft.com/office/drawing/2014/main" id="{0A6B0576-278E-41D7-9944-FC088424E7E4}"/>
+                <a16:creationId xmlns:a16="http://schemas.microsoft.com/office/drawing/2014/main" xmlns="" id="{0A6B0576-278E-41D7-9944-FC088424E7E4}"/>
               </a:ext>
             </a:extLst>
           </p:cNvPr>
@@ -3852,7 +3853,7 @@
           <p:cNvPr id="2" name="標題 1">
             <a:extLst>
               <a:ext uri="{FF2B5EF4-FFF2-40B4-BE49-F238E27FC236}">
-                <a16:creationId xmlns:a16="http://schemas.microsoft.com/office/drawing/2014/main" id="{D34A1095-84E8-474E-A99E-C778167B01BA}"/>
+                <a16:creationId xmlns:a16="http://schemas.microsoft.com/office/drawing/2014/main" xmlns="" id="{D34A1095-84E8-474E-A99E-C778167B01BA}"/>
               </a:ext>
             </a:extLst>
           </p:cNvPr>
@@ -3889,7 +3890,7 @@
           <p:cNvPr id="5" name="文字方塊 4">
             <a:extLst>
               <a:ext uri="{FF2B5EF4-FFF2-40B4-BE49-F238E27FC236}">
-                <a16:creationId xmlns:a16="http://schemas.microsoft.com/office/drawing/2014/main" id="{742E149B-4D70-4DD8-9AB6-CB986A4C6143}"/>
+                <a16:creationId xmlns:a16="http://schemas.microsoft.com/office/drawing/2014/main" xmlns="" id="{742E149B-4D70-4DD8-9AB6-CB986A4C6143}"/>
               </a:ext>
             </a:extLst>
           </p:cNvPr>
@@ -3941,7 +3942,7 @@
           <p:cNvPr id="24" name="文字方塊 23">
             <a:extLst>
               <a:ext uri="{FF2B5EF4-FFF2-40B4-BE49-F238E27FC236}">
-                <a16:creationId xmlns:a16="http://schemas.microsoft.com/office/drawing/2014/main" id="{24E311BC-CF98-461F-814B-7E109D5C82F9}"/>
+                <a16:creationId xmlns:a16="http://schemas.microsoft.com/office/drawing/2014/main" xmlns="" id="{24E311BC-CF98-461F-814B-7E109D5C82F9}"/>
               </a:ext>
             </a:extLst>
           </p:cNvPr>
@@ -3990,13 +3991,7 @@
       </p:sp>
       <p:grpSp>
         <p:nvGrpSpPr>
-          <p:cNvPr id="78" name="群組 77">
-            <a:extLst>
-              <a:ext uri="{FF2B5EF4-FFF2-40B4-BE49-F238E27FC236}">
-                <a16:creationId xmlns:a16="http://schemas.microsoft.com/office/drawing/2014/main" id="{AB0ACBBA-5A3B-4FE5-8ACB-730A5F244A76}"/>
-              </a:ext>
-            </a:extLst>
-          </p:cNvPr>
+          <p:cNvPr id="3" name="群組 2"/>
           <p:cNvGrpSpPr/>
           <p:nvPr/>
         </p:nvGrpSpPr>
@@ -4013,7 +4008,7 @@
             <p:cNvPr id="4" name="矩形 3">
               <a:extLst>
                 <a:ext uri="{FF2B5EF4-FFF2-40B4-BE49-F238E27FC236}">
-                  <a16:creationId xmlns:a16="http://schemas.microsoft.com/office/drawing/2014/main" id="{54121B23-9C6A-46DE-927F-49CFDF8596E2}"/>
+                  <a16:creationId xmlns:a16="http://schemas.microsoft.com/office/drawing/2014/main" xmlns="" id="{54121B23-9C6A-46DE-927F-49CFDF8596E2}"/>
                 </a:ext>
               </a:extLst>
             </p:cNvPr>
@@ -4101,7 +4096,7 @@
             <p:cNvPr id="8" name="直線單箭頭接點 7">
               <a:extLst>
                 <a:ext uri="{FF2B5EF4-FFF2-40B4-BE49-F238E27FC236}">
-                  <a16:creationId xmlns:a16="http://schemas.microsoft.com/office/drawing/2014/main" id="{A2924F2B-BAF2-4F69-9B2F-0226FD0A1410}"/>
+                  <a16:creationId xmlns:a16="http://schemas.microsoft.com/office/drawing/2014/main" xmlns="" id="{A2924F2B-BAF2-4F69-9B2F-0226FD0A1410}"/>
                 </a:ext>
               </a:extLst>
             </p:cNvPr>
@@ -4146,7 +4141,7 @@
             <p:cNvPr id="9" name="菱形 8">
               <a:extLst>
                 <a:ext uri="{FF2B5EF4-FFF2-40B4-BE49-F238E27FC236}">
-                  <a16:creationId xmlns:a16="http://schemas.microsoft.com/office/drawing/2014/main" id="{36101DE4-A20A-480A-9A7F-6EAFAFEF8131}"/>
+                  <a16:creationId xmlns:a16="http://schemas.microsoft.com/office/drawing/2014/main" xmlns="" id="{36101DE4-A20A-480A-9A7F-6EAFAFEF8131}"/>
                 </a:ext>
               </a:extLst>
             </p:cNvPr>
@@ -4210,7 +4205,7 @@
             <p:cNvPr id="12" name="直線單箭頭接點 11">
               <a:extLst>
                 <a:ext uri="{FF2B5EF4-FFF2-40B4-BE49-F238E27FC236}">
-                  <a16:creationId xmlns:a16="http://schemas.microsoft.com/office/drawing/2014/main" id="{6AD4E8C0-67CD-4C61-9F57-6FA20D4DAEED}"/>
+                  <a16:creationId xmlns:a16="http://schemas.microsoft.com/office/drawing/2014/main" xmlns="" id="{6AD4E8C0-67CD-4C61-9F57-6FA20D4DAEED}"/>
                 </a:ext>
               </a:extLst>
             </p:cNvPr>
@@ -4256,7 +4251,7 @@
             <p:cNvPr id="17" name="矩形 16">
               <a:extLst>
                 <a:ext uri="{FF2B5EF4-FFF2-40B4-BE49-F238E27FC236}">
-                  <a16:creationId xmlns:a16="http://schemas.microsoft.com/office/drawing/2014/main" id="{4D1A1250-84E8-4312-BBE3-DBB340C390B4}"/>
+                  <a16:creationId xmlns:a16="http://schemas.microsoft.com/office/drawing/2014/main" xmlns="" id="{4D1A1250-84E8-4312-BBE3-DBB340C390B4}"/>
                 </a:ext>
               </a:extLst>
             </p:cNvPr>
@@ -4320,7 +4315,7 @@
             <p:cNvPr id="20" name="文字方塊 19">
               <a:extLst>
                 <a:ext uri="{FF2B5EF4-FFF2-40B4-BE49-F238E27FC236}">
-                  <a16:creationId xmlns:a16="http://schemas.microsoft.com/office/drawing/2014/main" id="{DB954364-904E-4768-96AD-F662A18A25E1}"/>
+                  <a16:creationId xmlns:a16="http://schemas.microsoft.com/office/drawing/2014/main" xmlns="" id="{DB954364-904E-4768-96AD-F662A18A25E1}"/>
                 </a:ext>
               </a:extLst>
             </p:cNvPr>
@@ -4356,7 +4351,7 @@
             <p:cNvPr id="21" name="文字方塊 20">
               <a:extLst>
                 <a:ext uri="{FF2B5EF4-FFF2-40B4-BE49-F238E27FC236}">
-                  <a16:creationId xmlns:a16="http://schemas.microsoft.com/office/drawing/2014/main" id="{090D3404-C21C-4353-865B-F89AED6854A1}"/>
+                  <a16:creationId xmlns:a16="http://schemas.microsoft.com/office/drawing/2014/main" xmlns="" id="{090D3404-C21C-4353-865B-F89AED6854A1}"/>
                 </a:ext>
               </a:extLst>
             </p:cNvPr>
@@ -4392,7 +4387,7 @@
             <p:cNvPr id="25" name="矩形 24">
               <a:extLst>
                 <a:ext uri="{FF2B5EF4-FFF2-40B4-BE49-F238E27FC236}">
-                  <a16:creationId xmlns:a16="http://schemas.microsoft.com/office/drawing/2014/main" id="{4D1B714A-EF98-4861-8F96-D6A29B196549}"/>
+                  <a16:creationId xmlns:a16="http://schemas.microsoft.com/office/drawing/2014/main" xmlns="" id="{4D1B714A-EF98-4861-8F96-D6A29B196549}"/>
                 </a:ext>
               </a:extLst>
             </p:cNvPr>
@@ -4456,7 +4451,7 @@
             <p:cNvPr id="28" name="直線單箭頭接點 27">
               <a:extLst>
                 <a:ext uri="{FF2B5EF4-FFF2-40B4-BE49-F238E27FC236}">
-                  <a16:creationId xmlns:a16="http://schemas.microsoft.com/office/drawing/2014/main" id="{D6212E94-363D-4066-9EC9-AE1F73ABD614}"/>
+                  <a16:creationId xmlns:a16="http://schemas.microsoft.com/office/drawing/2014/main" xmlns="" id="{D6212E94-363D-4066-9EC9-AE1F73ABD614}"/>
                 </a:ext>
               </a:extLst>
             </p:cNvPr>
@@ -4502,7 +4497,7 @@
             <p:cNvPr id="36" name="接點: 肘形 35">
               <a:extLst>
                 <a:ext uri="{FF2B5EF4-FFF2-40B4-BE49-F238E27FC236}">
-                  <a16:creationId xmlns:a16="http://schemas.microsoft.com/office/drawing/2014/main" id="{437C143D-297A-4228-9C51-19493288CBF2}"/>
+                  <a16:creationId xmlns:a16="http://schemas.microsoft.com/office/drawing/2014/main" xmlns="" id="{437C143D-297A-4228-9C51-19493288CBF2}"/>
                 </a:ext>
               </a:extLst>
             </p:cNvPr>
@@ -4550,7 +4545,7 @@
             <p:cNvPr id="18" name="矩形 17">
               <a:extLst>
                 <a:ext uri="{FF2B5EF4-FFF2-40B4-BE49-F238E27FC236}">
-                  <a16:creationId xmlns:a16="http://schemas.microsoft.com/office/drawing/2014/main" id="{FABDA4C0-6255-4A1A-8252-AF987408F1C0}"/>
+                  <a16:creationId xmlns:a16="http://schemas.microsoft.com/office/drawing/2014/main" xmlns="" id="{FABDA4C0-6255-4A1A-8252-AF987408F1C0}"/>
                 </a:ext>
               </a:extLst>
             </p:cNvPr>
@@ -4614,7 +4609,7 @@
             <p:cNvPr id="22" name="菱形 21">
               <a:extLst>
                 <a:ext uri="{FF2B5EF4-FFF2-40B4-BE49-F238E27FC236}">
-                  <a16:creationId xmlns:a16="http://schemas.microsoft.com/office/drawing/2014/main" id="{6EF627EE-48A4-4B4A-A28A-E2C63D6C2149}"/>
+                  <a16:creationId xmlns:a16="http://schemas.microsoft.com/office/drawing/2014/main" xmlns="" id="{6EF627EE-48A4-4B4A-A28A-E2C63D6C2149}"/>
                 </a:ext>
               </a:extLst>
             </p:cNvPr>
@@ -4678,7 +4673,7 @@
             <p:cNvPr id="23" name="接點: 肘形 22">
               <a:extLst>
                 <a:ext uri="{FF2B5EF4-FFF2-40B4-BE49-F238E27FC236}">
-                  <a16:creationId xmlns:a16="http://schemas.microsoft.com/office/drawing/2014/main" id="{97D14BAA-E92C-4245-8CC9-F1A5FF29341C}"/>
+                  <a16:creationId xmlns:a16="http://schemas.microsoft.com/office/drawing/2014/main" xmlns="" id="{97D14BAA-E92C-4245-8CC9-F1A5FF29341C}"/>
                 </a:ext>
               </a:extLst>
             </p:cNvPr>
@@ -4724,7 +4719,7 @@
             <p:cNvPr id="40" name="接點: 肘形 39">
               <a:extLst>
                 <a:ext uri="{FF2B5EF4-FFF2-40B4-BE49-F238E27FC236}">
-                  <a16:creationId xmlns:a16="http://schemas.microsoft.com/office/drawing/2014/main" id="{8E1BB32D-E65C-4CD9-BFE0-9EEBDADE904D}"/>
+                  <a16:creationId xmlns:a16="http://schemas.microsoft.com/office/drawing/2014/main" xmlns="" id="{8E1BB32D-E65C-4CD9-BFE0-9EEBDADE904D}"/>
                 </a:ext>
               </a:extLst>
             </p:cNvPr>
@@ -4769,7 +4764,7 @@
             <p:cNvPr id="43" name="文字方塊 42">
               <a:extLst>
                 <a:ext uri="{FF2B5EF4-FFF2-40B4-BE49-F238E27FC236}">
-                  <a16:creationId xmlns:a16="http://schemas.microsoft.com/office/drawing/2014/main" id="{DE437A75-1F9F-46FC-8C5E-69D17EDE0291}"/>
+                  <a16:creationId xmlns:a16="http://schemas.microsoft.com/office/drawing/2014/main" xmlns="" id="{DE437A75-1F9F-46FC-8C5E-69D17EDE0291}"/>
                 </a:ext>
               </a:extLst>
             </p:cNvPr>
@@ -4805,7 +4800,7 @@
             <p:cNvPr id="44" name="接點: 肘形 43">
               <a:extLst>
                 <a:ext uri="{FF2B5EF4-FFF2-40B4-BE49-F238E27FC236}">
-                  <a16:creationId xmlns:a16="http://schemas.microsoft.com/office/drawing/2014/main" id="{4E3CBDD9-4AE0-4601-954F-01478892CDC2}"/>
+                  <a16:creationId xmlns:a16="http://schemas.microsoft.com/office/drawing/2014/main" xmlns="" id="{4E3CBDD9-4AE0-4601-954F-01478892CDC2}"/>
                 </a:ext>
               </a:extLst>
             </p:cNvPr>
@@ -4851,7 +4846,7 @@
             <p:cNvPr id="48" name="文字方塊 47">
               <a:extLst>
                 <a:ext uri="{FF2B5EF4-FFF2-40B4-BE49-F238E27FC236}">
-                  <a16:creationId xmlns:a16="http://schemas.microsoft.com/office/drawing/2014/main" id="{DB9C473C-AA63-4083-B70B-F2BD3C33A323}"/>
+                  <a16:creationId xmlns:a16="http://schemas.microsoft.com/office/drawing/2014/main" xmlns="" id="{DB9C473C-AA63-4083-B70B-F2BD3C33A323}"/>
                 </a:ext>
               </a:extLst>
             </p:cNvPr>
@@ -4887,7 +4882,7 @@
             <p:cNvPr id="50" name="矩形 49">
               <a:extLst>
                 <a:ext uri="{FF2B5EF4-FFF2-40B4-BE49-F238E27FC236}">
-                  <a16:creationId xmlns:a16="http://schemas.microsoft.com/office/drawing/2014/main" id="{8378BDF9-3729-4BE3-80FA-D9C996450B55}"/>
+                  <a16:creationId xmlns:a16="http://schemas.microsoft.com/office/drawing/2014/main" xmlns="" id="{8378BDF9-3729-4BE3-80FA-D9C996450B55}"/>
                 </a:ext>
               </a:extLst>
             </p:cNvPr>
@@ -4951,7 +4946,7 @@
             <p:cNvPr id="51" name="直線單箭頭接點 50">
               <a:extLst>
                 <a:ext uri="{FF2B5EF4-FFF2-40B4-BE49-F238E27FC236}">
-                  <a16:creationId xmlns:a16="http://schemas.microsoft.com/office/drawing/2014/main" id="{934C0B8D-165C-4422-888A-09D06CC0816E}"/>
+                  <a16:creationId xmlns:a16="http://schemas.microsoft.com/office/drawing/2014/main" xmlns="" id="{934C0B8D-165C-4422-888A-09D06CC0816E}"/>
                 </a:ext>
               </a:extLst>
             </p:cNvPr>
@@ -4997,7 +4992,7 @@
             <p:cNvPr id="72" name="直線單箭頭接點 71">
               <a:extLst>
                 <a:ext uri="{FF2B5EF4-FFF2-40B4-BE49-F238E27FC236}">
-                  <a16:creationId xmlns:a16="http://schemas.microsoft.com/office/drawing/2014/main" id="{11F36B25-AD3A-4D2E-8501-CCF281119381}"/>
+                  <a16:creationId xmlns:a16="http://schemas.microsoft.com/office/drawing/2014/main" xmlns="" id="{11F36B25-AD3A-4D2E-8501-CCF281119381}"/>
                 </a:ext>
               </a:extLst>
             </p:cNvPr>
@@ -5042,7 +5037,7 @@
             <p:cNvPr id="75" name="直線單箭頭接點 74">
               <a:extLst>
                 <a:ext uri="{FF2B5EF4-FFF2-40B4-BE49-F238E27FC236}">
-                  <a16:creationId xmlns:a16="http://schemas.microsoft.com/office/drawing/2014/main" id="{D9633314-7D3C-44E3-898D-7479AA45A7AD}"/>
+                  <a16:creationId xmlns:a16="http://schemas.microsoft.com/office/drawing/2014/main" xmlns="" id="{D9633314-7D3C-44E3-898D-7479AA45A7AD}"/>
                 </a:ext>
               </a:extLst>
             </p:cNvPr>
@@ -5088,7 +5083,7 @@
           <p:cNvPr id="111" name="群組 110">
             <a:extLst>
               <a:ext uri="{FF2B5EF4-FFF2-40B4-BE49-F238E27FC236}">
-                <a16:creationId xmlns:a16="http://schemas.microsoft.com/office/drawing/2014/main" id="{AB4CEEEC-C554-4887-9BB7-A0552066925A}"/>
+                <a16:creationId xmlns:a16="http://schemas.microsoft.com/office/drawing/2014/main" xmlns="" id="{AB4CEEEC-C554-4887-9BB7-A0552066925A}"/>
               </a:ext>
             </a:extLst>
           </p:cNvPr>
@@ -5108,7 +5103,7 @@
             <p:cNvPr id="27" name="矩形 26">
               <a:extLst>
                 <a:ext uri="{FF2B5EF4-FFF2-40B4-BE49-F238E27FC236}">
-                  <a16:creationId xmlns:a16="http://schemas.microsoft.com/office/drawing/2014/main" id="{6B855020-FA30-4780-908C-1E0CFF7FCC18}"/>
+                  <a16:creationId xmlns:a16="http://schemas.microsoft.com/office/drawing/2014/main" xmlns="" id="{6B855020-FA30-4780-908C-1E0CFF7FCC18}"/>
                 </a:ext>
               </a:extLst>
             </p:cNvPr>
@@ -5207,7 +5202,7 @@
             <p:cNvPr id="29" name="直線單箭頭接點 28">
               <a:extLst>
                 <a:ext uri="{FF2B5EF4-FFF2-40B4-BE49-F238E27FC236}">
-                  <a16:creationId xmlns:a16="http://schemas.microsoft.com/office/drawing/2014/main" id="{C66C8EE0-6781-41B5-8813-390A27C0ABBA}"/>
+                  <a16:creationId xmlns:a16="http://schemas.microsoft.com/office/drawing/2014/main" xmlns="" id="{C66C8EE0-6781-41B5-8813-390A27C0ABBA}"/>
                 </a:ext>
               </a:extLst>
             </p:cNvPr>
@@ -5253,7 +5248,7 @@
             <p:cNvPr id="30" name="菱形 29">
               <a:extLst>
                 <a:ext uri="{FF2B5EF4-FFF2-40B4-BE49-F238E27FC236}">
-                  <a16:creationId xmlns:a16="http://schemas.microsoft.com/office/drawing/2014/main" id="{06B3870A-A040-4857-87E0-5971AC623529}"/>
+                  <a16:creationId xmlns:a16="http://schemas.microsoft.com/office/drawing/2014/main" xmlns="" id="{06B3870A-A040-4857-87E0-5971AC623529}"/>
                 </a:ext>
               </a:extLst>
             </p:cNvPr>
@@ -5317,7 +5312,7 @@
             <p:cNvPr id="33" name="文字方塊 32">
               <a:extLst>
                 <a:ext uri="{FF2B5EF4-FFF2-40B4-BE49-F238E27FC236}">
-                  <a16:creationId xmlns:a16="http://schemas.microsoft.com/office/drawing/2014/main" id="{2342B696-3865-40C4-B984-6DA76D5977A0}"/>
+                  <a16:creationId xmlns:a16="http://schemas.microsoft.com/office/drawing/2014/main" xmlns="" id="{2342B696-3865-40C4-B984-6DA76D5977A0}"/>
                 </a:ext>
               </a:extLst>
             </p:cNvPr>
@@ -5353,7 +5348,7 @@
             <p:cNvPr id="34" name="文字方塊 33">
               <a:extLst>
                 <a:ext uri="{FF2B5EF4-FFF2-40B4-BE49-F238E27FC236}">
-                  <a16:creationId xmlns:a16="http://schemas.microsoft.com/office/drawing/2014/main" id="{06B75FEB-B4CE-469F-89B6-265C83E9908F}"/>
+                  <a16:creationId xmlns:a16="http://schemas.microsoft.com/office/drawing/2014/main" xmlns="" id="{06B75FEB-B4CE-469F-89B6-265C83E9908F}"/>
                 </a:ext>
               </a:extLst>
             </p:cNvPr>
@@ -5389,7 +5384,7 @@
             <p:cNvPr id="35" name="矩形 34">
               <a:extLst>
                 <a:ext uri="{FF2B5EF4-FFF2-40B4-BE49-F238E27FC236}">
-                  <a16:creationId xmlns:a16="http://schemas.microsoft.com/office/drawing/2014/main" id="{9EBB5EA8-8320-4C70-B026-063D7471C3C2}"/>
+                  <a16:creationId xmlns:a16="http://schemas.microsoft.com/office/drawing/2014/main" xmlns="" id="{9EBB5EA8-8320-4C70-B026-063D7471C3C2}"/>
                 </a:ext>
               </a:extLst>
             </p:cNvPr>
@@ -5453,7 +5448,7 @@
             <p:cNvPr id="60" name="接點: 肘形 59">
               <a:extLst>
                 <a:ext uri="{FF2B5EF4-FFF2-40B4-BE49-F238E27FC236}">
-                  <a16:creationId xmlns:a16="http://schemas.microsoft.com/office/drawing/2014/main" id="{9D06D988-AC0B-471F-9ACB-7C07D21D0697}"/>
+                  <a16:creationId xmlns:a16="http://schemas.microsoft.com/office/drawing/2014/main" xmlns="" id="{9D06D988-AC0B-471F-9ACB-7C07D21D0697}"/>
                 </a:ext>
               </a:extLst>
             </p:cNvPr>
@@ -5499,7 +5494,7 @@
             <p:cNvPr id="66" name="直線單箭頭接點 65">
               <a:extLst>
                 <a:ext uri="{FF2B5EF4-FFF2-40B4-BE49-F238E27FC236}">
-                  <a16:creationId xmlns:a16="http://schemas.microsoft.com/office/drawing/2014/main" id="{C3A9BDBF-28BC-4D3F-8A56-E4B49585A1FC}"/>
+                  <a16:creationId xmlns:a16="http://schemas.microsoft.com/office/drawing/2014/main" xmlns="" id="{C3A9BDBF-28BC-4D3F-8A56-E4B49585A1FC}"/>
                 </a:ext>
               </a:extLst>
             </p:cNvPr>
@@ -5545,7 +5540,7 @@
             <p:cNvPr id="79" name="直線單箭頭接點 78">
               <a:extLst>
                 <a:ext uri="{FF2B5EF4-FFF2-40B4-BE49-F238E27FC236}">
-                  <a16:creationId xmlns:a16="http://schemas.microsoft.com/office/drawing/2014/main" id="{C09EA6CD-389F-4B0F-A82D-1914D466BE1E}"/>
+                  <a16:creationId xmlns:a16="http://schemas.microsoft.com/office/drawing/2014/main" xmlns="" id="{C09EA6CD-389F-4B0F-A82D-1914D466BE1E}"/>
                 </a:ext>
               </a:extLst>
             </p:cNvPr>
@@ -5590,7 +5585,7 @@
             <p:cNvPr id="84" name="直線單箭頭接點 83">
               <a:extLst>
                 <a:ext uri="{FF2B5EF4-FFF2-40B4-BE49-F238E27FC236}">
-                  <a16:creationId xmlns:a16="http://schemas.microsoft.com/office/drawing/2014/main" id="{F5931E76-863E-471A-80F0-F62D852D23F5}"/>
+                  <a16:creationId xmlns:a16="http://schemas.microsoft.com/office/drawing/2014/main" xmlns="" id="{F5931E76-863E-471A-80F0-F62D852D23F5}"/>
                 </a:ext>
               </a:extLst>
             </p:cNvPr>
@@ -5636,7 +5631,7 @@
             <p:cNvPr id="87" name="矩形 86">
               <a:extLst>
                 <a:ext uri="{FF2B5EF4-FFF2-40B4-BE49-F238E27FC236}">
-                  <a16:creationId xmlns:a16="http://schemas.microsoft.com/office/drawing/2014/main" id="{C1D846B3-D8BA-4C1E-937A-6B752B5D5B35}"/>
+                  <a16:creationId xmlns:a16="http://schemas.microsoft.com/office/drawing/2014/main" xmlns="" id="{C1D846B3-D8BA-4C1E-937A-6B752B5D5B35}"/>
                 </a:ext>
               </a:extLst>
             </p:cNvPr>
@@ -5700,7 +5695,7 @@
             <p:cNvPr id="89" name="矩形 88">
               <a:extLst>
                 <a:ext uri="{FF2B5EF4-FFF2-40B4-BE49-F238E27FC236}">
-                  <a16:creationId xmlns:a16="http://schemas.microsoft.com/office/drawing/2014/main" id="{9DE1E879-8791-4B81-AE21-765A2D76FBF4}"/>
+                  <a16:creationId xmlns:a16="http://schemas.microsoft.com/office/drawing/2014/main" xmlns="" id="{9DE1E879-8791-4B81-AE21-765A2D76FBF4}"/>
                 </a:ext>
               </a:extLst>
             </p:cNvPr>
@@ -5764,7 +5759,7 @@
             <p:cNvPr id="99" name="直線單箭頭接點 98">
               <a:extLst>
                 <a:ext uri="{FF2B5EF4-FFF2-40B4-BE49-F238E27FC236}">
-                  <a16:creationId xmlns:a16="http://schemas.microsoft.com/office/drawing/2014/main" id="{00FF4D21-D839-4150-8A7C-DB7F7A32E334}"/>
+                  <a16:creationId xmlns:a16="http://schemas.microsoft.com/office/drawing/2014/main" xmlns="" id="{00FF4D21-D839-4150-8A7C-DB7F7A32E334}"/>
                 </a:ext>
               </a:extLst>
             </p:cNvPr>
@@ -5809,7 +5804,7 @@
             <p:cNvPr id="104" name="接點: 肘形 103">
               <a:extLst>
                 <a:ext uri="{FF2B5EF4-FFF2-40B4-BE49-F238E27FC236}">
-                  <a16:creationId xmlns:a16="http://schemas.microsoft.com/office/drawing/2014/main" id="{C8B07251-3037-4FE8-A8C6-366CCF68138B}"/>
+                  <a16:creationId xmlns:a16="http://schemas.microsoft.com/office/drawing/2014/main" xmlns="" id="{C8B07251-3037-4FE8-A8C6-366CCF68138B}"/>
                 </a:ext>
               </a:extLst>
             </p:cNvPr>
@@ -5860,6 +5855,2091 @@
   <p:clrMapOvr>
     <a:masterClrMapping/>
   </p:clrMapOvr>
+  <p:timing>
+    <p:tnLst>
+      <p:par>
+        <p:cTn id="1" dur="indefinite" restart="never" nodeType="tmRoot"/>
+      </p:par>
+    </p:tnLst>
+  </p:timing>
+</p:sld>
+</file>
+
+<file path=ppt/slides/slide3.xml><?xml version="1.0" encoding="utf-8"?>
+<p:sld xmlns:a="http://schemas.openxmlformats.org/drawingml/2006/main" xmlns:r="http://schemas.openxmlformats.org/officeDocument/2006/relationships" xmlns:p="http://schemas.openxmlformats.org/presentationml/2006/main">
+  <p:cSld>
+    <p:spTree>
+      <p:nvGrpSpPr>
+        <p:cNvPr id="1" name=""/>
+        <p:cNvGrpSpPr/>
+        <p:nvPr/>
+      </p:nvGrpSpPr>
+      <p:grpSpPr>
+        <a:xfrm>
+          <a:off x="0" y="0"/>
+          <a:ext cx="0" cy="0"/>
+          <a:chOff x="0" y="0"/>
+          <a:chExt cx="0" cy="0"/>
+        </a:xfrm>
+      </p:grpSpPr>
+      <p:grpSp>
+        <p:nvGrpSpPr>
+          <p:cNvPr id="29" name="群組 28"/>
+          <p:cNvGrpSpPr/>
+          <p:nvPr/>
+        </p:nvGrpSpPr>
+        <p:grpSpPr>
+          <a:xfrm>
+            <a:off x="1363648" y="343187"/>
+            <a:ext cx="3722158" cy="2336844"/>
+            <a:chOff x="1363648" y="343187"/>
+            <a:chExt cx="3722158" cy="2336844"/>
+          </a:xfrm>
+        </p:grpSpPr>
+        <p:sp>
+          <p:nvSpPr>
+            <p:cNvPr id="4" name="矩形 3">
+              <a:extLst>
+                <a:ext uri="{FF2B5EF4-FFF2-40B4-BE49-F238E27FC236}">
+                  <a16:creationId xmlns:a16="http://schemas.microsoft.com/office/drawing/2014/main" xmlns="" id="{54121B23-9C6A-46DE-927F-49CFDF8596E2}"/>
+                </a:ext>
+              </a:extLst>
+            </p:cNvPr>
+            <p:cNvSpPr/>
+            <p:nvPr/>
+          </p:nvSpPr>
+          <p:spPr>
+            <a:xfrm>
+              <a:off x="1363648" y="343187"/>
+              <a:ext cx="3722158" cy="353387"/>
+            </a:xfrm>
+            <a:prstGeom prst="rect">
+              <a:avLst/>
+            </a:prstGeom>
+            <a:noFill/>
+            <a:ln w="38100">
+              <a:solidFill>
+                <a:schemeClr val="tx1"/>
+              </a:solidFill>
+            </a:ln>
+          </p:spPr>
+          <p:style>
+            <a:lnRef idx="2">
+              <a:schemeClr val="accent1">
+                <a:shade val="50000"/>
+              </a:schemeClr>
+            </a:lnRef>
+            <a:fillRef idx="1">
+              <a:schemeClr val="accent1"/>
+            </a:fillRef>
+            <a:effectRef idx="0">
+              <a:schemeClr val="accent1"/>
+            </a:effectRef>
+            <a:fontRef idx="minor">
+              <a:schemeClr val="lt1"/>
+            </a:fontRef>
+          </p:style>
+          <p:txBody>
+            <a:bodyPr rtlCol="0" anchor="ctr"/>
+            <a:lstStyle/>
+            <a:p>
+              <a:pPr algn="ctr"/>
+              <a:r>
+                <a:rPr lang="en-US" altLang="zh-TW" sz="1000" dirty="0" smtClean="0">
+                  <a:solidFill>
+                    <a:schemeClr val="tx1"/>
+                  </a:solidFill>
+                </a:rPr>
+                <a:t>For each direction light and spot light, do  Shadow Render Pass.</a:t>
+              </a:r>
+              <a:endParaRPr lang="zh-TW" altLang="en-US" sz="1000" dirty="0">
+                <a:solidFill>
+                  <a:schemeClr val="tx1"/>
+                </a:solidFill>
+              </a:endParaRPr>
+            </a:p>
+          </p:txBody>
+        </p:sp>
+        <p:cxnSp>
+          <p:nvCxnSpPr>
+            <p:cNvPr id="7" name="直線單箭頭接點 6">
+              <a:extLst>
+                <a:ext uri="{FF2B5EF4-FFF2-40B4-BE49-F238E27FC236}">
+                  <a16:creationId xmlns:a16="http://schemas.microsoft.com/office/drawing/2014/main" xmlns="" id="{A2924F2B-BAF2-4F69-9B2F-0226FD0A1410}"/>
+                </a:ext>
+              </a:extLst>
+            </p:cNvPr>
+            <p:cNvCxnSpPr>
+              <a:cxnSpLocks/>
+              <a:stCxn id="4" idx="2"/>
+            </p:cNvCxnSpPr>
+            <p:nvPr/>
+          </p:nvCxnSpPr>
+          <p:spPr>
+            <a:xfrm>
+              <a:off x="3224727" y="696574"/>
+              <a:ext cx="0" cy="270208"/>
+            </a:xfrm>
+            <a:prstGeom prst="straightConnector1">
+              <a:avLst/>
+            </a:prstGeom>
+            <a:ln w="38100">
+              <a:solidFill>
+                <a:schemeClr val="tx1"/>
+              </a:solidFill>
+              <a:tailEnd type="triangle"/>
+            </a:ln>
+          </p:spPr>
+          <p:style>
+            <a:lnRef idx="1">
+              <a:schemeClr val="accent1"/>
+            </a:lnRef>
+            <a:fillRef idx="0">
+              <a:schemeClr val="accent1"/>
+            </a:fillRef>
+            <a:effectRef idx="0">
+              <a:schemeClr val="accent1"/>
+            </a:effectRef>
+            <a:fontRef idx="minor">
+              <a:schemeClr val="tx1"/>
+            </a:fontRef>
+          </p:style>
+        </p:cxnSp>
+        <p:sp>
+          <p:nvSpPr>
+            <p:cNvPr id="11" name="矩形 10">
+              <a:extLst>
+                <a:ext uri="{FF2B5EF4-FFF2-40B4-BE49-F238E27FC236}">
+                  <a16:creationId xmlns:a16="http://schemas.microsoft.com/office/drawing/2014/main" xmlns="" id="{54121B23-9C6A-46DE-927F-49CFDF8596E2}"/>
+                </a:ext>
+              </a:extLst>
+            </p:cNvPr>
+            <p:cNvSpPr/>
+            <p:nvPr/>
+          </p:nvSpPr>
+          <p:spPr>
+            <a:xfrm>
+              <a:off x="1363648" y="966782"/>
+              <a:ext cx="3722158" cy="353387"/>
+            </a:xfrm>
+            <a:prstGeom prst="rect">
+              <a:avLst/>
+            </a:prstGeom>
+            <a:noFill/>
+            <a:ln w="38100">
+              <a:solidFill>
+                <a:schemeClr val="tx1"/>
+              </a:solidFill>
+            </a:ln>
+          </p:spPr>
+          <p:style>
+            <a:lnRef idx="2">
+              <a:schemeClr val="accent1">
+                <a:shade val="50000"/>
+              </a:schemeClr>
+            </a:lnRef>
+            <a:fillRef idx="1">
+              <a:schemeClr val="accent1"/>
+            </a:fillRef>
+            <a:effectRef idx="0">
+              <a:schemeClr val="accent1"/>
+            </a:effectRef>
+            <a:fontRef idx="minor">
+              <a:schemeClr val="lt1"/>
+            </a:fontRef>
+          </p:style>
+          <p:txBody>
+            <a:bodyPr rtlCol="0" anchor="ctr"/>
+            <a:lstStyle/>
+            <a:p>
+              <a:pPr algn="ctr"/>
+              <a:r>
+                <a:rPr lang="en-US" altLang="zh-TW" sz="1000" dirty="0" smtClean="0">
+                  <a:solidFill>
+                    <a:schemeClr val="tx1"/>
+                  </a:solidFill>
+                </a:rPr>
+                <a:t>For each secondary camera, do Forwar</a:t>
+              </a:r>
+              <a:r>
+                <a:rPr lang="en-US" altLang="zh-TW" sz="1000" dirty="0" smtClean="0">
+                  <a:solidFill>
+                    <a:schemeClr val="tx1"/>
+                  </a:solidFill>
+                </a:rPr>
+                <a:t>d or </a:t>
+              </a:r>
+              <a:r>
+                <a:rPr lang="en-US" altLang="zh-TW" sz="1000" dirty="0">
+                  <a:solidFill>
+                    <a:schemeClr val="tx1"/>
+                  </a:solidFill>
+                </a:rPr>
+                <a:t>D</a:t>
+              </a:r>
+              <a:r>
+                <a:rPr lang="en-US" altLang="zh-TW" sz="1000" dirty="0" smtClean="0">
+                  <a:solidFill>
+                    <a:schemeClr val="tx1"/>
+                  </a:solidFill>
+                </a:rPr>
+                <a:t>efer </a:t>
+              </a:r>
+              <a:r>
+                <a:rPr lang="en-US" altLang="zh-TW" sz="1000" dirty="0">
+                  <a:solidFill>
+                    <a:schemeClr val="tx1"/>
+                  </a:solidFill>
+                </a:rPr>
+                <a:t>R</a:t>
+              </a:r>
+              <a:r>
+                <a:rPr lang="en-US" altLang="zh-TW" sz="1000" dirty="0" smtClean="0">
+                  <a:solidFill>
+                    <a:schemeClr val="tx1"/>
+                  </a:solidFill>
+                </a:rPr>
+                <a:t>ender </a:t>
+              </a:r>
+              <a:r>
+                <a:rPr lang="en-US" altLang="zh-TW" sz="1000" dirty="0">
+                  <a:solidFill>
+                    <a:schemeClr val="tx1"/>
+                  </a:solidFill>
+                </a:rPr>
+                <a:t>P</a:t>
+              </a:r>
+              <a:r>
+                <a:rPr lang="en-US" altLang="zh-TW" sz="1000" dirty="0" smtClean="0">
+                  <a:solidFill>
+                    <a:schemeClr val="tx1"/>
+                  </a:solidFill>
+                </a:rPr>
+                <a:t>ass.</a:t>
+              </a:r>
+              <a:r>
+                <a:rPr lang="en-US" altLang="zh-TW" sz="1000" dirty="0" smtClean="0">
+                  <a:solidFill>
+                    <a:schemeClr val="tx1"/>
+                  </a:solidFill>
+                </a:rPr>
+                <a:t> </a:t>
+              </a:r>
+              <a:endParaRPr lang="zh-TW" altLang="en-US" sz="1000" dirty="0">
+                <a:solidFill>
+                  <a:schemeClr val="tx1"/>
+                </a:solidFill>
+              </a:endParaRPr>
+            </a:p>
+          </p:txBody>
+        </p:sp>
+        <p:cxnSp>
+          <p:nvCxnSpPr>
+            <p:cNvPr id="15" name="直線單箭頭接點 14">
+              <a:extLst>
+                <a:ext uri="{FF2B5EF4-FFF2-40B4-BE49-F238E27FC236}">
+                  <a16:creationId xmlns:a16="http://schemas.microsoft.com/office/drawing/2014/main" xmlns="" id="{A2924F2B-BAF2-4F69-9B2F-0226FD0A1410}"/>
+                </a:ext>
+              </a:extLst>
+            </p:cNvPr>
+            <p:cNvCxnSpPr>
+              <a:cxnSpLocks/>
+              <a:stCxn id="11" idx="2"/>
+              <a:endCxn id="19" idx="0"/>
+            </p:cNvCxnSpPr>
+            <p:nvPr/>
+          </p:nvCxnSpPr>
+          <p:spPr>
+            <a:xfrm>
+              <a:off x="3224727" y="1320169"/>
+              <a:ext cx="0" cy="217696"/>
+            </a:xfrm>
+            <a:prstGeom prst="straightConnector1">
+              <a:avLst/>
+            </a:prstGeom>
+            <a:ln w="38100">
+              <a:solidFill>
+                <a:schemeClr val="tx1"/>
+              </a:solidFill>
+              <a:tailEnd type="triangle"/>
+            </a:ln>
+          </p:spPr>
+          <p:style>
+            <a:lnRef idx="1">
+              <a:schemeClr val="accent1"/>
+            </a:lnRef>
+            <a:fillRef idx="0">
+              <a:schemeClr val="accent1"/>
+            </a:fillRef>
+            <a:effectRef idx="0">
+              <a:schemeClr val="accent1"/>
+            </a:effectRef>
+            <a:fontRef idx="minor">
+              <a:schemeClr val="tx1"/>
+            </a:fontRef>
+          </p:style>
+        </p:cxnSp>
+        <p:sp>
+          <p:nvSpPr>
+            <p:cNvPr id="19" name="矩形 18">
+              <a:extLst>
+                <a:ext uri="{FF2B5EF4-FFF2-40B4-BE49-F238E27FC236}">
+                  <a16:creationId xmlns:a16="http://schemas.microsoft.com/office/drawing/2014/main" xmlns="" id="{54121B23-9C6A-46DE-927F-49CFDF8596E2}"/>
+                </a:ext>
+              </a:extLst>
+            </p:cNvPr>
+            <p:cNvSpPr/>
+            <p:nvPr/>
+          </p:nvSpPr>
+          <p:spPr>
+            <a:xfrm>
+              <a:off x="1363648" y="1537865"/>
+              <a:ext cx="3722158" cy="353387"/>
+            </a:xfrm>
+            <a:prstGeom prst="rect">
+              <a:avLst/>
+            </a:prstGeom>
+            <a:noFill/>
+            <a:ln w="38100">
+              <a:solidFill>
+                <a:schemeClr val="tx1"/>
+              </a:solidFill>
+            </a:ln>
+          </p:spPr>
+          <p:style>
+            <a:lnRef idx="2">
+              <a:schemeClr val="accent1">
+                <a:shade val="50000"/>
+              </a:schemeClr>
+            </a:lnRef>
+            <a:fillRef idx="1">
+              <a:schemeClr val="accent1"/>
+            </a:fillRef>
+            <a:effectRef idx="0">
+              <a:schemeClr val="accent1"/>
+            </a:effectRef>
+            <a:fontRef idx="minor">
+              <a:schemeClr val="lt1"/>
+            </a:fontRef>
+          </p:style>
+          <p:txBody>
+            <a:bodyPr rtlCol="0" anchor="ctr"/>
+            <a:lstStyle/>
+            <a:p>
+              <a:pPr algn="ctr"/>
+              <a:r>
+                <a:rPr lang="en-US" altLang="zh-TW" sz="1000" dirty="0" smtClean="0">
+                  <a:solidFill>
+                    <a:schemeClr val="tx1"/>
+                  </a:solidFill>
+                </a:rPr>
+                <a:t>For mainly camera, </a:t>
+              </a:r>
+              <a:r>
+                <a:rPr lang="en-US" altLang="zh-TW" sz="1000" dirty="0">
+                  <a:solidFill>
+                    <a:schemeClr val="tx1"/>
+                  </a:solidFill>
+                </a:rPr>
+                <a:t>do Forward or Defer Render Pass.</a:t>
+              </a:r>
+              <a:endParaRPr lang="zh-TW" altLang="en-US" sz="1000" dirty="0">
+                <a:solidFill>
+                  <a:schemeClr val="tx1"/>
+                </a:solidFill>
+              </a:endParaRPr>
+            </a:p>
+          </p:txBody>
+        </p:sp>
+        <p:cxnSp>
+          <p:nvCxnSpPr>
+            <p:cNvPr id="22" name="直線單箭頭接點 21">
+              <a:extLst>
+                <a:ext uri="{FF2B5EF4-FFF2-40B4-BE49-F238E27FC236}">
+                  <a16:creationId xmlns:a16="http://schemas.microsoft.com/office/drawing/2014/main" xmlns="" id="{A2924F2B-BAF2-4F69-9B2F-0226FD0A1410}"/>
+                </a:ext>
+              </a:extLst>
+            </p:cNvPr>
+            <p:cNvCxnSpPr>
+              <a:cxnSpLocks/>
+            </p:cNvCxnSpPr>
+            <p:nvPr/>
+          </p:nvCxnSpPr>
+          <p:spPr>
+            <a:xfrm>
+              <a:off x="3222928" y="1891252"/>
+              <a:ext cx="0" cy="217696"/>
+            </a:xfrm>
+            <a:prstGeom prst="straightConnector1">
+              <a:avLst/>
+            </a:prstGeom>
+            <a:ln w="38100">
+              <a:solidFill>
+                <a:schemeClr val="tx1"/>
+              </a:solidFill>
+              <a:tailEnd type="triangle"/>
+            </a:ln>
+          </p:spPr>
+          <p:style>
+            <a:lnRef idx="1">
+              <a:schemeClr val="accent1"/>
+            </a:lnRef>
+            <a:fillRef idx="0">
+              <a:schemeClr val="accent1"/>
+            </a:fillRef>
+            <a:effectRef idx="0">
+              <a:schemeClr val="accent1"/>
+            </a:effectRef>
+            <a:fontRef idx="minor">
+              <a:schemeClr val="tx1"/>
+            </a:fontRef>
+          </p:style>
+        </p:cxnSp>
+        <p:cxnSp>
+          <p:nvCxnSpPr>
+            <p:cNvPr id="23" name="直線單箭頭接點 22">
+              <a:extLst>
+                <a:ext uri="{FF2B5EF4-FFF2-40B4-BE49-F238E27FC236}">
+                  <a16:creationId xmlns:a16="http://schemas.microsoft.com/office/drawing/2014/main" xmlns="" id="{A2924F2B-BAF2-4F69-9B2F-0226FD0A1410}"/>
+                </a:ext>
+              </a:extLst>
+            </p:cNvPr>
+            <p:cNvCxnSpPr>
+              <a:cxnSpLocks/>
+            </p:cNvCxnSpPr>
+            <p:nvPr/>
+          </p:nvCxnSpPr>
+          <p:spPr>
+            <a:xfrm>
+              <a:off x="3224727" y="2462335"/>
+              <a:ext cx="0" cy="217696"/>
+            </a:xfrm>
+            <a:prstGeom prst="straightConnector1">
+              <a:avLst/>
+            </a:prstGeom>
+            <a:ln w="38100">
+              <a:solidFill>
+                <a:schemeClr val="tx1"/>
+              </a:solidFill>
+              <a:tailEnd type="triangle"/>
+            </a:ln>
+          </p:spPr>
+          <p:style>
+            <a:lnRef idx="1">
+              <a:schemeClr val="accent1"/>
+            </a:lnRef>
+            <a:fillRef idx="0">
+              <a:schemeClr val="accent1"/>
+            </a:fillRef>
+            <a:effectRef idx="0">
+              <a:schemeClr val="accent1"/>
+            </a:effectRef>
+            <a:fontRef idx="minor">
+              <a:schemeClr val="tx1"/>
+            </a:fontRef>
+          </p:style>
+        </p:cxnSp>
+        <p:sp>
+          <p:nvSpPr>
+            <p:cNvPr id="24" name="矩形 23">
+              <a:extLst>
+                <a:ext uri="{FF2B5EF4-FFF2-40B4-BE49-F238E27FC236}">
+                  <a16:creationId xmlns:a16="http://schemas.microsoft.com/office/drawing/2014/main" xmlns="" id="{54121B23-9C6A-46DE-927F-49CFDF8596E2}"/>
+                </a:ext>
+              </a:extLst>
+            </p:cNvPr>
+            <p:cNvSpPr/>
+            <p:nvPr/>
+          </p:nvSpPr>
+          <p:spPr>
+            <a:xfrm>
+              <a:off x="1363648" y="2108948"/>
+              <a:ext cx="3722158" cy="353387"/>
+            </a:xfrm>
+            <a:prstGeom prst="rect">
+              <a:avLst/>
+            </a:prstGeom>
+            <a:noFill/>
+            <a:ln w="38100">
+              <a:solidFill>
+                <a:schemeClr val="tx1"/>
+              </a:solidFill>
+            </a:ln>
+          </p:spPr>
+          <p:style>
+            <a:lnRef idx="2">
+              <a:schemeClr val="accent1">
+                <a:shade val="50000"/>
+              </a:schemeClr>
+            </a:lnRef>
+            <a:fillRef idx="1">
+              <a:schemeClr val="accent1"/>
+            </a:fillRef>
+            <a:effectRef idx="0">
+              <a:schemeClr val="accent1"/>
+            </a:effectRef>
+            <a:fontRef idx="minor">
+              <a:schemeClr val="lt1"/>
+            </a:fontRef>
+          </p:style>
+          <p:txBody>
+            <a:bodyPr rtlCol="0" anchor="ctr"/>
+            <a:lstStyle/>
+            <a:p>
+              <a:pPr algn="ctr"/>
+              <a:r>
+                <a:rPr lang="en-US" altLang="zh-TW" sz="1000" dirty="0" smtClean="0">
+                  <a:solidFill>
+                    <a:schemeClr val="tx1"/>
+                  </a:solidFill>
+                </a:rPr>
+                <a:t>Compose color buffer of main camera </a:t>
+              </a:r>
+              <a:r>
+                <a:rPr lang="en-US" altLang="zh-TW" sz="1000" dirty="0" smtClean="0">
+                  <a:solidFill>
+                    <a:schemeClr val="tx1"/>
+                  </a:solidFill>
+                </a:rPr>
+                <a:t>.</a:t>
+              </a:r>
+              <a:r>
+                <a:rPr lang="en-US" altLang="zh-TW" sz="1000" dirty="0" smtClean="0">
+                  <a:solidFill>
+                    <a:schemeClr val="tx1"/>
+                  </a:solidFill>
+                </a:rPr>
+                <a:t> </a:t>
+              </a:r>
+              <a:endParaRPr lang="zh-TW" altLang="en-US" sz="1000" dirty="0">
+                <a:solidFill>
+                  <a:schemeClr val="tx1"/>
+                </a:solidFill>
+              </a:endParaRPr>
+            </a:p>
+          </p:txBody>
+        </p:sp>
+      </p:grpSp>
+      <p:grpSp>
+        <p:nvGrpSpPr>
+          <p:cNvPr id="131" name="群組 130"/>
+          <p:cNvGrpSpPr/>
+          <p:nvPr/>
+        </p:nvGrpSpPr>
+        <p:grpSpPr>
+          <a:xfrm>
+            <a:off x="6309028" y="301597"/>
+            <a:ext cx="5230065" cy="5598491"/>
+            <a:chOff x="6309028" y="301597"/>
+            <a:chExt cx="5230065" cy="5598491"/>
+          </a:xfrm>
+        </p:grpSpPr>
+        <p:sp>
+          <p:nvSpPr>
+            <p:cNvPr id="30" name="矩形 29">
+              <a:extLst>
+                <a:ext uri="{FF2B5EF4-FFF2-40B4-BE49-F238E27FC236}">
+                  <a16:creationId xmlns:a16="http://schemas.microsoft.com/office/drawing/2014/main" xmlns="" id="{54121B23-9C6A-46DE-927F-49CFDF8596E2}"/>
+                </a:ext>
+              </a:extLst>
+            </p:cNvPr>
+            <p:cNvSpPr/>
+            <p:nvPr/>
+          </p:nvSpPr>
+          <p:spPr>
+            <a:xfrm>
+              <a:off x="6309028" y="301597"/>
+              <a:ext cx="2972132" cy="315623"/>
+            </a:xfrm>
+            <a:prstGeom prst="rect">
+              <a:avLst/>
+            </a:prstGeom>
+            <a:noFill/>
+            <a:ln w="38100">
+              <a:solidFill>
+                <a:schemeClr val="tx1"/>
+              </a:solidFill>
+            </a:ln>
+          </p:spPr>
+          <p:style>
+            <a:lnRef idx="2">
+              <a:schemeClr val="accent1">
+                <a:shade val="50000"/>
+              </a:schemeClr>
+            </a:lnRef>
+            <a:fillRef idx="1">
+              <a:schemeClr val="accent1"/>
+            </a:fillRef>
+            <a:effectRef idx="0">
+              <a:schemeClr val="accent1"/>
+            </a:effectRef>
+            <a:fontRef idx="minor">
+              <a:schemeClr val="lt1"/>
+            </a:fontRef>
+          </p:style>
+          <p:txBody>
+            <a:bodyPr rtlCol="0" anchor="ctr"/>
+            <a:lstStyle/>
+            <a:p>
+              <a:pPr algn="ctr"/>
+              <a:r>
+                <a:rPr lang="en-US" altLang="zh-TW" sz="1000" dirty="0" smtClean="0">
+                  <a:solidFill>
+                    <a:schemeClr val="tx1"/>
+                  </a:solidFill>
+                </a:rPr>
+                <a:t>Make shadow maps for each direction and spot light</a:t>
+              </a:r>
+              <a:endParaRPr lang="zh-TW" altLang="en-US" sz="1000" dirty="0">
+                <a:solidFill>
+                  <a:schemeClr val="tx1"/>
+                </a:solidFill>
+              </a:endParaRPr>
+            </a:p>
+          </p:txBody>
+        </p:sp>
+        <p:sp>
+          <p:nvSpPr>
+            <p:cNvPr id="31" name="菱形 30">
+              <a:extLst>
+                <a:ext uri="{FF2B5EF4-FFF2-40B4-BE49-F238E27FC236}">
+                  <a16:creationId xmlns:a16="http://schemas.microsoft.com/office/drawing/2014/main" xmlns="" id="{36101DE4-A20A-480A-9A7F-6EAFAFEF8131}"/>
+                </a:ext>
+              </a:extLst>
+            </p:cNvPr>
+            <p:cNvSpPr/>
+            <p:nvPr/>
+          </p:nvSpPr>
+          <p:spPr>
+            <a:xfrm>
+              <a:off x="6661015" y="858517"/>
+              <a:ext cx="2284865" cy="679348"/>
+            </a:xfrm>
+            <a:prstGeom prst="diamond">
+              <a:avLst/>
+            </a:prstGeom>
+            <a:noFill/>
+            <a:ln w="38100">
+              <a:solidFill>
+                <a:schemeClr val="tx1"/>
+              </a:solidFill>
+            </a:ln>
+          </p:spPr>
+          <p:style>
+            <a:lnRef idx="2">
+              <a:schemeClr val="accent1">
+                <a:shade val="50000"/>
+              </a:schemeClr>
+            </a:lnRef>
+            <a:fillRef idx="1">
+              <a:schemeClr val="accent1"/>
+            </a:fillRef>
+            <a:effectRef idx="0">
+              <a:schemeClr val="accent1"/>
+            </a:effectRef>
+            <a:fontRef idx="minor">
+              <a:schemeClr val="lt1"/>
+            </a:fontRef>
+          </p:style>
+          <p:txBody>
+            <a:bodyPr rtlCol="0" anchor="ctr"/>
+            <a:lstStyle/>
+            <a:p>
+              <a:pPr algn="ctr"/>
+              <a:r>
+                <a:rPr lang="en-US" altLang="zh-TW" sz="1000" dirty="0">
+                  <a:solidFill>
+                    <a:schemeClr val="tx1"/>
+                  </a:solidFill>
+                </a:rPr>
+                <a:t>H</a:t>
+              </a:r>
+              <a:r>
+                <a:rPr lang="en-US" altLang="zh-TW" sz="1000" dirty="0" smtClean="0">
+                  <a:solidFill>
+                    <a:schemeClr val="tx1"/>
+                  </a:solidFill>
+                </a:rPr>
+                <a:t>as drawn shadow maps for all lights?</a:t>
+              </a:r>
+              <a:endParaRPr lang="zh-TW" altLang="en-US" sz="1000" dirty="0">
+                <a:solidFill>
+                  <a:schemeClr val="tx1"/>
+                </a:solidFill>
+              </a:endParaRPr>
+            </a:p>
+          </p:txBody>
+        </p:sp>
+        <p:cxnSp>
+          <p:nvCxnSpPr>
+            <p:cNvPr id="32" name="直線單箭頭接點 31">
+              <a:extLst>
+                <a:ext uri="{FF2B5EF4-FFF2-40B4-BE49-F238E27FC236}">
+                  <a16:creationId xmlns:a16="http://schemas.microsoft.com/office/drawing/2014/main" xmlns="" id="{A2924F2B-BAF2-4F69-9B2F-0226FD0A1410}"/>
+                </a:ext>
+              </a:extLst>
+            </p:cNvPr>
+            <p:cNvCxnSpPr>
+              <a:cxnSpLocks/>
+              <a:stCxn id="30" idx="2"/>
+              <a:endCxn id="31" idx="0"/>
+            </p:cNvCxnSpPr>
+            <p:nvPr/>
+          </p:nvCxnSpPr>
+          <p:spPr>
+            <a:xfrm>
+              <a:off x="7795094" y="617220"/>
+              <a:ext cx="8354" cy="241297"/>
+            </a:xfrm>
+            <a:prstGeom prst="straightConnector1">
+              <a:avLst/>
+            </a:prstGeom>
+            <a:ln w="38100">
+              <a:solidFill>
+                <a:schemeClr val="tx1"/>
+              </a:solidFill>
+              <a:tailEnd type="triangle"/>
+            </a:ln>
+          </p:spPr>
+          <p:style>
+            <a:lnRef idx="1">
+              <a:schemeClr val="accent1"/>
+            </a:lnRef>
+            <a:fillRef idx="0">
+              <a:schemeClr val="accent1"/>
+            </a:fillRef>
+            <a:effectRef idx="0">
+              <a:schemeClr val="accent1"/>
+            </a:effectRef>
+            <a:fontRef idx="minor">
+              <a:schemeClr val="tx1"/>
+            </a:fontRef>
+          </p:style>
+        </p:cxnSp>
+        <p:cxnSp>
+          <p:nvCxnSpPr>
+            <p:cNvPr id="36" name="接點: 肘形 59">
+              <a:extLst>
+                <a:ext uri="{FF2B5EF4-FFF2-40B4-BE49-F238E27FC236}">
+                  <a16:creationId xmlns:a16="http://schemas.microsoft.com/office/drawing/2014/main" xmlns="" id="{9D06D988-AC0B-471F-9ACB-7C07D21D0697}"/>
+                </a:ext>
+              </a:extLst>
+            </p:cNvPr>
+            <p:cNvCxnSpPr>
+              <a:cxnSpLocks/>
+              <a:stCxn id="31" idx="3"/>
+              <a:endCxn id="39" idx="0"/>
+            </p:cNvCxnSpPr>
+            <p:nvPr/>
+          </p:nvCxnSpPr>
+          <p:spPr>
+            <a:xfrm>
+              <a:off x="8945880" y="1198191"/>
+              <a:ext cx="773430" cy="221754"/>
+            </a:xfrm>
+            <a:prstGeom prst="bentConnector2">
+              <a:avLst/>
+            </a:prstGeom>
+            <a:ln w="38100">
+              <a:solidFill>
+                <a:schemeClr val="tx1"/>
+              </a:solidFill>
+              <a:tailEnd type="triangle"/>
+            </a:ln>
+          </p:spPr>
+          <p:style>
+            <a:lnRef idx="1">
+              <a:schemeClr val="accent1"/>
+            </a:lnRef>
+            <a:fillRef idx="0">
+              <a:schemeClr val="accent1"/>
+            </a:fillRef>
+            <a:effectRef idx="0">
+              <a:schemeClr val="accent1"/>
+            </a:effectRef>
+            <a:fontRef idx="minor">
+              <a:schemeClr val="tx1"/>
+            </a:fontRef>
+          </p:style>
+        </p:cxnSp>
+        <p:sp>
+          <p:nvSpPr>
+            <p:cNvPr id="39" name="矩形 38">
+              <a:extLst>
+                <a:ext uri="{FF2B5EF4-FFF2-40B4-BE49-F238E27FC236}">
+                  <a16:creationId xmlns:a16="http://schemas.microsoft.com/office/drawing/2014/main" xmlns="" id="{54121B23-9C6A-46DE-927F-49CFDF8596E2}"/>
+                </a:ext>
+              </a:extLst>
+            </p:cNvPr>
+            <p:cNvSpPr/>
+            <p:nvPr/>
+          </p:nvSpPr>
+          <p:spPr>
+            <a:xfrm>
+              <a:off x="8907780" y="1419945"/>
+              <a:ext cx="1623060" cy="315623"/>
+            </a:xfrm>
+            <a:prstGeom prst="rect">
+              <a:avLst/>
+            </a:prstGeom>
+            <a:noFill/>
+            <a:ln w="38100">
+              <a:solidFill>
+                <a:schemeClr val="tx1"/>
+              </a:solidFill>
+            </a:ln>
+          </p:spPr>
+          <p:style>
+            <a:lnRef idx="2">
+              <a:schemeClr val="accent1">
+                <a:shade val="50000"/>
+              </a:schemeClr>
+            </a:lnRef>
+            <a:fillRef idx="1">
+              <a:schemeClr val="accent1"/>
+            </a:fillRef>
+            <a:effectRef idx="0">
+              <a:schemeClr val="accent1"/>
+            </a:effectRef>
+            <a:fontRef idx="minor">
+              <a:schemeClr val="lt1"/>
+            </a:fontRef>
+          </p:style>
+          <p:txBody>
+            <a:bodyPr rtlCol="0" anchor="ctr"/>
+            <a:lstStyle/>
+            <a:p>
+              <a:pPr algn="ctr"/>
+              <a:r>
+                <a:rPr lang="en-US" altLang="zh-TW" sz="1000" dirty="0" smtClean="0">
+                  <a:solidFill>
+                    <a:schemeClr val="tx1"/>
+                  </a:solidFill>
+                </a:rPr>
+                <a:t>For each cascade, make shadow map.</a:t>
+              </a:r>
+              <a:endParaRPr lang="zh-TW" altLang="en-US" sz="1000" dirty="0">
+                <a:solidFill>
+                  <a:schemeClr val="tx1"/>
+                </a:solidFill>
+              </a:endParaRPr>
+            </a:p>
+          </p:txBody>
+        </p:sp>
+        <p:cxnSp>
+          <p:nvCxnSpPr>
+            <p:cNvPr id="45" name="直線單箭頭接點 44">
+              <a:extLst>
+                <a:ext uri="{FF2B5EF4-FFF2-40B4-BE49-F238E27FC236}">
+                  <a16:creationId xmlns:a16="http://schemas.microsoft.com/office/drawing/2014/main" xmlns="" id="{A2924F2B-BAF2-4F69-9B2F-0226FD0A1410}"/>
+                </a:ext>
+              </a:extLst>
+            </p:cNvPr>
+            <p:cNvCxnSpPr>
+              <a:cxnSpLocks/>
+              <a:stCxn id="39" idx="2"/>
+              <a:endCxn id="49" idx="0"/>
+            </p:cNvCxnSpPr>
+            <p:nvPr/>
+          </p:nvCxnSpPr>
+          <p:spPr>
+            <a:xfrm>
+              <a:off x="9719310" y="1735568"/>
+              <a:ext cx="1" cy="208665"/>
+            </a:xfrm>
+            <a:prstGeom prst="straightConnector1">
+              <a:avLst/>
+            </a:prstGeom>
+            <a:ln w="38100">
+              <a:solidFill>
+                <a:schemeClr val="tx1"/>
+              </a:solidFill>
+              <a:tailEnd type="triangle"/>
+            </a:ln>
+          </p:spPr>
+          <p:style>
+            <a:lnRef idx="1">
+              <a:schemeClr val="accent1"/>
+            </a:lnRef>
+            <a:fillRef idx="0">
+              <a:schemeClr val="accent1"/>
+            </a:fillRef>
+            <a:effectRef idx="0">
+              <a:schemeClr val="accent1"/>
+            </a:effectRef>
+            <a:fontRef idx="minor">
+              <a:schemeClr val="tx1"/>
+            </a:fontRef>
+          </p:style>
+        </p:cxnSp>
+        <p:sp>
+          <p:nvSpPr>
+            <p:cNvPr id="49" name="菱形 48">
+              <a:extLst>
+                <a:ext uri="{FF2B5EF4-FFF2-40B4-BE49-F238E27FC236}">
+                  <a16:creationId xmlns:a16="http://schemas.microsoft.com/office/drawing/2014/main" xmlns="" id="{36101DE4-A20A-480A-9A7F-6EAFAFEF8131}"/>
+                </a:ext>
+              </a:extLst>
+            </p:cNvPr>
+            <p:cNvSpPr/>
+            <p:nvPr/>
+          </p:nvSpPr>
+          <p:spPr>
+            <a:xfrm>
+              <a:off x="8282941" y="1944233"/>
+              <a:ext cx="2872740" cy="679348"/>
+            </a:xfrm>
+            <a:prstGeom prst="diamond">
+              <a:avLst/>
+            </a:prstGeom>
+            <a:noFill/>
+            <a:ln w="38100">
+              <a:solidFill>
+                <a:schemeClr val="tx1"/>
+              </a:solidFill>
+            </a:ln>
+          </p:spPr>
+          <p:style>
+            <a:lnRef idx="2">
+              <a:schemeClr val="accent1">
+                <a:shade val="50000"/>
+              </a:schemeClr>
+            </a:lnRef>
+            <a:fillRef idx="1">
+              <a:schemeClr val="accent1"/>
+            </a:fillRef>
+            <a:effectRef idx="0">
+              <a:schemeClr val="accent1"/>
+            </a:effectRef>
+            <a:fontRef idx="minor">
+              <a:schemeClr val="lt1"/>
+            </a:fontRef>
+          </p:style>
+          <p:txBody>
+            <a:bodyPr rtlCol="0" anchor="ctr"/>
+            <a:lstStyle/>
+            <a:p>
+              <a:pPr algn="ctr"/>
+              <a:r>
+                <a:rPr lang="en-US" altLang="zh-TW" sz="1000" dirty="0" smtClean="0">
+                  <a:solidFill>
+                    <a:schemeClr val="tx1"/>
+                  </a:solidFill>
+                </a:rPr>
+                <a:t>Has drawn shadow maps for all cascades in this light?</a:t>
+              </a:r>
+              <a:endParaRPr lang="zh-TW" altLang="en-US" sz="1000" dirty="0">
+                <a:solidFill>
+                  <a:schemeClr val="tx1"/>
+                </a:solidFill>
+              </a:endParaRPr>
+            </a:p>
+          </p:txBody>
+        </p:sp>
+        <p:cxnSp>
+          <p:nvCxnSpPr>
+            <p:cNvPr id="55" name="直線單箭頭接點 54">
+              <a:extLst>
+                <a:ext uri="{FF2B5EF4-FFF2-40B4-BE49-F238E27FC236}">
+                  <a16:creationId xmlns:a16="http://schemas.microsoft.com/office/drawing/2014/main" xmlns="" id="{A2924F2B-BAF2-4F69-9B2F-0226FD0A1410}"/>
+                </a:ext>
+              </a:extLst>
+            </p:cNvPr>
+            <p:cNvCxnSpPr>
+              <a:cxnSpLocks/>
+              <a:stCxn id="49" idx="2"/>
+              <a:endCxn id="58" idx="0"/>
+            </p:cNvCxnSpPr>
+            <p:nvPr/>
+          </p:nvCxnSpPr>
+          <p:spPr>
+            <a:xfrm flipH="1">
+              <a:off x="9719310" y="2623581"/>
+              <a:ext cx="1" cy="206064"/>
+            </a:xfrm>
+            <a:prstGeom prst="straightConnector1">
+              <a:avLst/>
+            </a:prstGeom>
+            <a:ln w="38100">
+              <a:solidFill>
+                <a:schemeClr val="tx1"/>
+              </a:solidFill>
+              <a:tailEnd type="triangle"/>
+            </a:ln>
+          </p:spPr>
+          <p:style>
+            <a:lnRef idx="1">
+              <a:schemeClr val="accent1"/>
+            </a:lnRef>
+            <a:fillRef idx="0">
+              <a:schemeClr val="accent1"/>
+            </a:fillRef>
+            <a:effectRef idx="0">
+              <a:schemeClr val="accent1"/>
+            </a:effectRef>
+            <a:fontRef idx="minor">
+              <a:schemeClr val="tx1"/>
+            </a:fontRef>
+          </p:style>
+        </p:cxnSp>
+        <p:sp>
+          <p:nvSpPr>
+            <p:cNvPr id="58" name="矩形 57">
+              <a:extLst>
+                <a:ext uri="{FF2B5EF4-FFF2-40B4-BE49-F238E27FC236}">
+                  <a16:creationId xmlns:a16="http://schemas.microsoft.com/office/drawing/2014/main" xmlns="" id="{54121B23-9C6A-46DE-927F-49CFDF8596E2}"/>
+                </a:ext>
+              </a:extLst>
+            </p:cNvPr>
+            <p:cNvSpPr/>
+            <p:nvPr/>
+          </p:nvSpPr>
+          <p:spPr>
+            <a:xfrm>
+              <a:off x="8907780" y="2829645"/>
+              <a:ext cx="1623060" cy="315623"/>
+            </a:xfrm>
+            <a:prstGeom prst="rect">
+              <a:avLst/>
+            </a:prstGeom>
+            <a:noFill/>
+            <a:ln w="38100">
+              <a:solidFill>
+                <a:schemeClr val="tx1"/>
+              </a:solidFill>
+            </a:ln>
+          </p:spPr>
+          <p:style>
+            <a:lnRef idx="2">
+              <a:schemeClr val="accent1">
+                <a:shade val="50000"/>
+              </a:schemeClr>
+            </a:lnRef>
+            <a:fillRef idx="1">
+              <a:schemeClr val="accent1"/>
+            </a:fillRef>
+            <a:effectRef idx="0">
+              <a:schemeClr val="accent1"/>
+            </a:effectRef>
+            <a:fontRef idx="minor">
+              <a:schemeClr val="lt1"/>
+            </a:fontRef>
+          </p:style>
+          <p:txBody>
+            <a:bodyPr rtlCol="0" anchor="ctr"/>
+            <a:lstStyle/>
+            <a:p>
+              <a:pPr algn="ctr"/>
+              <a:r>
+                <a:rPr lang="en-US" altLang="zh-TW" sz="1000" dirty="0" smtClean="0">
+                  <a:solidFill>
+                    <a:schemeClr val="tx1"/>
+                  </a:solidFill>
+                </a:rPr>
+                <a:t>Calculate view volume of this cascade</a:t>
+              </a:r>
+              <a:endParaRPr lang="zh-TW" altLang="en-US" sz="1000" dirty="0">
+                <a:solidFill>
+                  <a:schemeClr val="tx1"/>
+                </a:solidFill>
+              </a:endParaRPr>
+            </a:p>
+          </p:txBody>
+        </p:sp>
+        <p:sp>
+          <p:nvSpPr>
+            <p:cNvPr id="60" name="矩形 59">
+              <a:extLst>
+                <a:ext uri="{FF2B5EF4-FFF2-40B4-BE49-F238E27FC236}">
+                  <a16:creationId xmlns:a16="http://schemas.microsoft.com/office/drawing/2014/main" xmlns="" id="{54121B23-9C6A-46DE-927F-49CFDF8596E2}"/>
+                </a:ext>
+              </a:extLst>
+            </p:cNvPr>
+            <p:cNvSpPr/>
+            <p:nvPr/>
+          </p:nvSpPr>
+          <p:spPr>
+            <a:xfrm>
+              <a:off x="8907780" y="3370665"/>
+              <a:ext cx="1623060" cy="315623"/>
+            </a:xfrm>
+            <a:prstGeom prst="rect">
+              <a:avLst/>
+            </a:prstGeom>
+            <a:noFill/>
+            <a:ln w="38100">
+              <a:solidFill>
+                <a:schemeClr val="tx1"/>
+              </a:solidFill>
+            </a:ln>
+          </p:spPr>
+          <p:style>
+            <a:lnRef idx="2">
+              <a:schemeClr val="accent1">
+                <a:shade val="50000"/>
+              </a:schemeClr>
+            </a:lnRef>
+            <a:fillRef idx="1">
+              <a:schemeClr val="accent1"/>
+            </a:fillRef>
+            <a:effectRef idx="0">
+              <a:schemeClr val="accent1"/>
+            </a:effectRef>
+            <a:fontRef idx="minor">
+              <a:schemeClr val="lt1"/>
+            </a:fontRef>
+          </p:style>
+          <p:txBody>
+            <a:bodyPr rtlCol="0" anchor="ctr"/>
+            <a:lstStyle/>
+            <a:p>
+              <a:pPr algn="ctr"/>
+              <a:r>
+                <a:rPr lang="en-US" altLang="zh-TW" sz="1000" dirty="0" smtClean="0">
+                  <a:solidFill>
+                    <a:schemeClr val="tx1"/>
+                  </a:solidFill>
+                </a:rPr>
+                <a:t>Draw all objects with its shadow material.</a:t>
+              </a:r>
+              <a:endParaRPr lang="zh-TW" altLang="en-US" sz="1000" dirty="0">
+                <a:solidFill>
+                  <a:schemeClr val="tx1"/>
+                </a:solidFill>
+              </a:endParaRPr>
+            </a:p>
+          </p:txBody>
+        </p:sp>
+        <p:cxnSp>
+          <p:nvCxnSpPr>
+            <p:cNvPr id="61" name="直線單箭頭接點 60">
+              <a:extLst>
+                <a:ext uri="{FF2B5EF4-FFF2-40B4-BE49-F238E27FC236}">
+                  <a16:creationId xmlns:a16="http://schemas.microsoft.com/office/drawing/2014/main" xmlns="" id="{A2924F2B-BAF2-4F69-9B2F-0226FD0A1410}"/>
+                </a:ext>
+              </a:extLst>
+            </p:cNvPr>
+            <p:cNvCxnSpPr>
+              <a:cxnSpLocks/>
+              <a:stCxn id="58" idx="2"/>
+              <a:endCxn id="60" idx="0"/>
+            </p:cNvCxnSpPr>
+            <p:nvPr/>
+          </p:nvCxnSpPr>
+          <p:spPr>
+            <a:xfrm>
+              <a:off x="9719310" y="3145268"/>
+              <a:ext cx="0" cy="225397"/>
+            </a:xfrm>
+            <a:prstGeom prst="straightConnector1">
+              <a:avLst/>
+            </a:prstGeom>
+            <a:ln w="38100">
+              <a:solidFill>
+                <a:schemeClr val="tx1"/>
+              </a:solidFill>
+              <a:tailEnd type="triangle"/>
+            </a:ln>
+          </p:spPr>
+          <p:style>
+            <a:lnRef idx="1">
+              <a:schemeClr val="accent1"/>
+            </a:lnRef>
+            <a:fillRef idx="0">
+              <a:schemeClr val="accent1"/>
+            </a:fillRef>
+            <a:effectRef idx="0">
+              <a:schemeClr val="accent1"/>
+            </a:effectRef>
+            <a:fontRef idx="minor">
+              <a:schemeClr val="tx1"/>
+            </a:fontRef>
+          </p:style>
+        </p:cxnSp>
+        <p:cxnSp>
+          <p:nvCxnSpPr>
+            <p:cNvPr id="69" name="接點: 肘形 59">
+              <a:extLst>
+                <a:ext uri="{FF2B5EF4-FFF2-40B4-BE49-F238E27FC236}">
+                  <a16:creationId xmlns:a16="http://schemas.microsoft.com/office/drawing/2014/main" xmlns="" id="{9D06D988-AC0B-471F-9ACB-7C07D21D0697}"/>
+                </a:ext>
+              </a:extLst>
+            </p:cNvPr>
+            <p:cNvCxnSpPr>
+              <a:cxnSpLocks/>
+              <a:stCxn id="105" idx="3"/>
+              <a:endCxn id="49" idx="3"/>
+            </p:cNvCxnSpPr>
+            <p:nvPr/>
+          </p:nvCxnSpPr>
+          <p:spPr>
+            <a:xfrm flipV="1">
+              <a:off x="10530842" y="2283907"/>
+              <a:ext cx="624839" cy="3458370"/>
+            </a:xfrm>
+            <a:prstGeom prst="bentConnector3">
+              <a:avLst>
+                <a:gd name="adj1" fmla="val 136585"/>
+              </a:avLst>
+            </a:prstGeom>
+            <a:ln w="38100">
+              <a:solidFill>
+                <a:schemeClr val="tx1"/>
+              </a:solidFill>
+              <a:tailEnd type="triangle"/>
+            </a:ln>
+          </p:spPr>
+          <p:style>
+            <a:lnRef idx="1">
+              <a:schemeClr val="accent1"/>
+            </a:lnRef>
+            <a:fillRef idx="0">
+              <a:schemeClr val="accent1"/>
+            </a:fillRef>
+            <a:effectRef idx="0">
+              <a:schemeClr val="accent1"/>
+            </a:effectRef>
+            <a:fontRef idx="minor">
+              <a:schemeClr val="tx1"/>
+            </a:fontRef>
+          </p:style>
+        </p:cxnSp>
+        <p:cxnSp>
+          <p:nvCxnSpPr>
+            <p:cNvPr id="78" name="接點: 肘形 59">
+              <a:extLst>
+                <a:ext uri="{FF2B5EF4-FFF2-40B4-BE49-F238E27FC236}">
+                  <a16:creationId xmlns:a16="http://schemas.microsoft.com/office/drawing/2014/main" xmlns="" id="{9D06D988-AC0B-471F-9ACB-7C07D21D0697}"/>
+                </a:ext>
+              </a:extLst>
+            </p:cNvPr>
+            <p:cNvCxnSpPr>
+              <a:cxnSpLocks/>
+              <a:stCxn id="49" idx="1"/>
+              <a:endCxn id="31" idx="2"/>
+            </p:cNvCxnSpPr>
+            <p:nvPr/>
+          </p:nvCxnSpPr>
+          <p:spPr>
+            <a:xfrm rot="10800000">
+              <a:off x="7803449" y="1537865"/>
+              <a:ext cx="479493" cy="746042"/>
+            </a:xfrm>
+            <a:prstGeom prst="bentConnector2">
+              <a:avLst/>
+            </a:prstGeom>
+            <a:ln w="38100">
+              <a:solidFill>
+                <a:schemeClr val="tx1"/>
+              </a:solidFill>
+              <a:tailEnd type="triangle"/>
+            </a:ln>
+          </p:spPr>
+          <p:style>
+            <a:lnRef idx="1">
+              <a:schemeClr val="accent1"/>
+            </a:lnRef>
+            <a:fillRef idx="0">
+              <a:schemeClr val="accent1"/>
+            </a:fillRef>
+            <a:effectRef idx="0">
+              <a:schemeClr val="accent1"/>
+            </a:effectRef>
+            <a:fontRef idx="minor">
+              <a:schemeClr val="tx1"/>
+            </a:fontRef>
+          </p:style>
+        </p:cxnSp>
+        <p:sp>
+          <p:nvSpPr>
+            <p:cNvPr id="81" name="文字方塊 80">
+              <a:extLst>
+                <a:ext uri="{FF2B5EF4-FFF2-40B4-BE49-F238E27FC236}">
+                  <a16:creationId xmlns:a16="http://schemas.microsoft.com/office/drawing/2014/main" xmlns="" id="{2342B696-3865-40C4-B984-6DA76D5977A0}"/>
+                </a:ext>
+              </a:extLst>
+            </p:cNvPr>
+            <p:cNvSpPr txBox="1"/>
+            <p:nvPr/>
+          </p:nvSpPr>
+          <p:spPr>
+            <a:xfrm>
+              <a:off x="8847710" y="966782"/>
+              <a:ext cx="484885" cy="246221"/>
+            </a:xfrm>
+            <a:prstGeom prst="rect">
+              <a:avLst/>
+            </a:prstGeom>
+            <a:noFill/>
+          </p:spPr>
+          <p:txBody>
+            <a:bodyPr wrap="square" rtlCol="0">
+              <a:spAutoFit/>
+            </a:bodyPr>
+            <a:lstStyle/>
+            <a:p>
+              <a:r>
+                <a:rPr lang="en-US" altLang="zh-TW" sz="1000" dirty="0" smtClean="0"/>
+                <a:t>No</a:t>
+              </a:r>
+              <a:endParaRPr lang="zh-TW" altLang="en-US" sz="1000" dirty="0"/>
+            </a:p>
+          </p:txBody>
+        </p:sp>
+        <p:sp>
+          <p:nvSpPr>
+            <p:cNvPr id="82" name="文字方塊 81">
+              <a:extLst>
+                <a:ext uri="{FF2B5EF4-FFF2-40B4-BE49-F238E27FC236}">
+                  <a16:creationId xmlns:a16="http://schemas.microsoft.com/office/drawing/2014/main" xmlns="" id="{2342B696-3865-40C4-B984-6DA76D5977A0}"/>
+                </a:ext>
+              </a:extLst>
+            </p:cNvPr>
+            <p:cNvSpPr txBox="1"/>
+            <p:nvPr/>
+          </p:nvSpPr>
+          <p:spPr>
+            <a:xfrm>
+              <a:off x="9742172" y="2614614"/>
+              <a:ext cx="484885" cy="246221"/>
+            </a:xfrm>
+            <a:prstGeom prst="rect">
+              <a:avLst/>
+            </a:prstGeom>
+            <a:noFill/>
+          </p:spPr>
+          <p:txBody>
+            <a:bodyPr wrap="square" rtlCol="0">
+              <a:spAutoFit/>
+            </a:bodyPr>
+            <a:lstStyle/>
+            <a:p>
+              <a:r>
+                <a:rPr lang="en-US" altLang="zh-TW" sz="1000" dirty="0" smtClean="0"/>
+                <a:t>No</a:t>
+              </a:r>
+              <a:endParaRPr lang="zh-TW" altLang="en-US" sz="1000" dirty="0"/>
+            </a:p>
+          </p:txBody>
+        </p:sp>
+        <p:sp>
+          <p:nvSpPr>
+            <p:cNvPr id="83" name="文字方塊 82">
+              <a:extLst>
+                <a:ext uri="{FF2B5EF4-FFF2-40B4-BE49-F238E27FC236}">
+                  <a16:creationId xmlns:a16="http://schemas.microsoft.com/office/drawing/2014/main" xmlns="" id="{DE437A75-1F9F-46FC-8C5E-69D17EDE0291}"/>
+                </a:ext>
+              </a:extLst>
+            </p:cNvPr>
+            <p:cNvSpPr txBox="1"/>
+            <p:nvPr/>
+          </p:nvSpPr>
+          <p:spPr>
+            <a:xfrm>
+              <a:off x="8040498" y="2040561"/>
+              <a:ext cx="484885" cy="246221"/>
+            </a:xfrm>
+            <a:prstGeom prst="rect">
+              <a:avLst/>
+            </a:prstGeom>
+            <a:noFill/>
+          </p:spPr>
+          <p:txBody>
+            <a:bodyPr wrap="square" rtlCol="0">
+              <a:spAutoFit/>
+            </a:bodyPr>
+            <a:lstStyle/>
+            <a:p>
+              <a:r>
+                <a:rPr lang="en-US" altLang="zh-TW" sz="1000" dirty="0" smtClean="0"/>
+                <a:t>Yes</a:t>
+              </a:r>
+              <a:endParaRPr lang="zh-TW" altLang="en-US" sz="1000" dirty="0"/>
+            </a:p>
+          </p:txBody>
+        </p:sp>
+        <p:cxnSp>
+          <p:nvCxnSpPr>
+            <p:cNvPr id="88" name="接點: 肘形 59">
+              <a:extLst>
+                <a:ext uri="{FF2B5EF4-FFF2-40B4-BE49-F238E27FC236}">
+                  <a16:creationId xmlns:a16="http://schemas.microsoft.com/office/drawing/2014/main" xmlns="" id="{9D06D988-AC0B-471F-9ACB-7C07D21D0697}"/>
+                </a:ext>
+              </a:extLst>
+            </p:cNvPr>
+            <p:cNvCxnSpPr>
+              <a:cxnSpLocks/>
+              <a:stCxn id="31" idx="1"/>
+            </p:cNvCxnSpPr>
+            <p:nvPr/>
+          </p:nvCxnSpPr>
+          <p:spPr>
+            <a:xfrm rot="10800000" flipV="1">
+              <a:off x="6553771" y="1198190"/>
+              <a:ext cx="107244" cy="4478709"/>
+            </a:xfrm>
+            <a:prstGeom prst="bentConnector2">
+              <a:avLst/>
+            </a:prstGeom>
+            <a:ln w="38100">
+              <a:solidFill>
+                <a:schemeClr val="tx1"/>
+              </a:solidFill>
+              <a:tailEnd type="triangle"/>
+            </a:ln>
+          </p:spPr>
+          <p:style>
+            <a:lnRef idx="1">
+              <a:schemeClr val="accent1"/>
+            </a:lnRef>
+            <a:fillRef idx="0">
+              <a:schemeClr val="accent1"/>
+            </a:fillRef>
+            <a:effectRef idx="0">
+              <a:schemeClr val="accent1"/>
+            </a:effectRef>
+            <a:fontRef idx="minor">
+              <a:schemeClr val="tx1"/>
+            </a:fontRef>
+          </p:style>
+        </p:cxnSp>
+        <p:sp>
+          <p:nvSpPr>
+            <p:cNvPr id="90" name="文字方塊 89">
+              <a:extLst>
+                <a:ext uri="{FF2B5EF4-FFF2-40B4-BE49-F238E27FC236}">
+                  <a16:creationId xmlns:a16="http://schemas.microsoft.com/office/drawing/2014/main" xmlns="" id="{DE437A75-1F9F-46FC-8C5E-69D17EDE0291}"/>
+                </a:ext>
+              </a:extLst>
+            </p:cNvPr>
+            <p:cNvSpPr txBox="1"/>
+            <p:nvPr/>
+          </p:nvSpPr>
+          <p:spPr>
+            <a:xfrm>
+              <a:off x="6418573" y="943392"/>
+              <a:ext cx="484885" cy="246221"/>
+            </a:xfrm>
+            <a:prstGeom prst="rect">
+              <a:avLst/>
+            </a:prstGeom>
+            <a:noFill/>
+          </p:spPr>
+          <p:txBody>
+            <a:bodyPr wrap="square" rtlCol="0">
+              <a:spAutoFit/>
+            </a:bodyPr>
+            <a:lstStyle/>
+            <a:p>
+              <a:r>
+                <a:rPr lang="en-US" altLang="zh-TW" sz="1000" dirty="0" smtClean="0"/>
+                <a:t>Yes</a:t>
+              </a:r>
+              <a:endParaRPr lang="zh-TW" altLang="en-US" sz="1000" dirty="0"/>
+            </a:p>
+          </p:txBody>
+        </p:sp>
+        <p:sp>
+          <p:nvSpPr>
+            <p:cNvPr id="96" name="菱形 95">
+              <a:extLst>
+                <a:ext uri="{FF2B5EF4-FFF2-40B4-BE49-F238E27FC236}">
+                  <a16:creationId xmlns:a16="http://schemas.microsoft.com/office/drawing/2014/main" xmlns="" id="{36101DE4-A20A-480A-9A7F-6EAFAFEF8131}"/>
+                </a:ext>
+              </a:extLst>
+            </p:cNvPr>
+            <p:cNvSpPr/>
+            <p:nvPr/>
+          </p:nvSpPr>
+          <p:spPr>
+            <a:xfrm>
+              <a:off x="8282942" y="3885032"/>
+              <a:ext cx="2872740" cy="679348"/>
+            </a:xfrm>
+            <a:prstGeom prst="diamond">
+              <a:avLst/>
+            </a:prstGeom>
+            <a:noFill/>
+            <a:ln w="38100">
+              <a:solidFill>
+                <a:schemeClr val="tx1"/>
+              </a:solidFill>
+            </a:ln>
+          </p:spPr>
+          <p:style>
+            <a:lnRef idx="2">
+              <a:schemeClr val="accent1">
+                <a:shade val="50000"/>
+              </a:schemeClr>
+            </a:lnRef>
+            <a:fillRef idx="1">
+              <a:schemeClr val="accent1"/>
+            </a:fillRef>
+            <a:effectRef idx="0">
+              <a:schemeClr val="accent1"/>
+            </a:effectRef>
+            <a:fontRef idx="minor">
+              <a:schemeClr val="lt1"/>
+            </a:fontRef>
+          </p:style>
+          <p:txBody>
+            <a:bodyPr rtlCol="0" anchor="ctr"/>
+            <a:lstStyle/>
+            <a:p>
+              <a:pPr algn="ctr"/>
+              <a:r>
+                <a:rPr lang="en-US" altLang="zh-TW" sz="1000" dirty="0" smtClean="0">
+                  <a:solidFill>
+                    <a:schemeClr val="tx1"/>
+                  </a:solidFill>
+                </a:rPr>
+                <a:t>Has drawn all objects or this object?  </a:t>
+              </a:r>
+              <a:endParaRPr lang="zh-TW" altLang="en-US" sz="1000" dirty="0">
+                <a:solidFill>
+                  <a:schemeClr val="tx1"/>
+                </a:solidFill>
+              </a:endParaRPr>
+            </a:p>
+          </p:txBody>
+        </p:sp>
+        <p:cxnSp>
+          <p:nvCxnSpPr>
+            <p:cNvPr id="98" name="直線單箭頭接點 97">
+              <a:extLst>
+                <a:ext uri="{FF2B5EF4-FFF2-40B4-BE49-F238E27FC236}">
+                  <a16:creationId xmlns:a16="http://schemas.microsoft.com/office/drawing/2014/main" xmlns="" id="{A2924F2B-BAF2-4F69-9B2F-0226FD0A1410}"/>
+                </a:ext>
+              </a:extLst>
+            </p:cNvPr>
+            <p:cNvCxnSpPr>
+              <a:cxnSpLocks/>
+              <a:stCxn id="60" idx="2"/>
+              <a:endCxn id="96" idx="0"/>
+            </p:cNvCxnSpPr>
+            <p:nvPr/>
+          </p:nvCxnSpPr>
+          <p:spPr>
+            <a:xfrm>
+              <a:off x="9719310" y="3686288"/>
+              <a:ext cx="2" cy="198744"/>
+            </a:xfrm>
+            <a:prstGeom prst="straightConnector1">
+              <a:avLst/>
+            </a:prstGeom>
+            <a:ln w="38100">
+              <a:solidFill>
+                <a:schemeClr val="tx1"/>
+              </a:solidFill>
+              <a:tailEnd type="triangle"/>
+            </a:ln>
+          </p:spPr>
+          <p:style>
+            <a:lnRef idx="1">
+              <a:schemeClr val="accent1"/>
+            </a:lnRef>
+            <a:fillRef idx="0">
+              <a:schemeClr val="accent1"/>
+            </a:fillRef>
+            <a:effectRef idx="0">
+              <a:schemeClr val="accent1"/>
+            </a:effectRef>
+            <a:fontRef idx="minor">
+              <a:schemeClr val="tx1"/>
+            </a:fontRef>
+          </p:style>
+        </p:cxnSp>
+        <p:sp>
+          <p:nvSpPr>
+            <p:cNvPr id="105" name="矩形 104">
+              <a:extLst>
+                <a:ext uri="{FF2B5EF4-FFF2-40B4-BE49-F238E27FC236}">
+                  <a16:creationId xmlns:a16="http://schemas.microsoft.com/office/drawing/2014/main" xmlns="" id="{54121B23-9C6A-46DE-927F-49CFDF8596E2}"/>
+                </a:ext>
+              </a:extLst>
+            </p:cNvPr>
+            <p:cNvSpPr/>
+            <p:nvPr/>
+          </p:nvSpPr>
+          <p:spPr>
+            <a:xfrm>
+              <a:off x="8907782" y="5584465"/>
+              <a:ext cx="1623060" cy="315623"/>
+            </a:xfrm>
+            <a:prstGeom prst="rect">
+              <a:avLst/>
+            </a:prstGeom>
+            <a:noFill/>
+            <a:ln w="38100">
+              <a:solidFill>
+                <a:schemeClr val="tx1"/>
+              </a:solidFill>
+            </a:ln>
+          </p:spPr>
+          <p:style>
+            <a:lnRef idx="2">
+              <a:schemeClr val="accent1">
+                <a:shade val="50000"/>
+              </a:schemeClr>
+            </a:lnRef>
+            <a:fillRef idx="1">
+              <a:schemeClr val="accent1"/>
+            </a:fillRef>
+            <a:effectRef idx="0">
+              <a:schemeClr val="accent1"/>
+            </a:effectRef>
+            <a:fontRef idx="minor">
+              <a:schemeClr val="lt1"/>
+            </a:fontRef>
+          </p:style>
+          <p:txBody>
+            <a:bodyPr rtlCol="0" anchor="ctr"/>
+            <a:lstStyle/>
+            <a:p>
+              <a:pPr algn="ctr"/>
+              <a:r>
+                <a:rPr lang="en-US" altLang="zh-TW" sz="1000" dirty="0" smtClean="0">
+                  <a:solidFill>
+                    <a:schemeClr val="tx1"/>
+                  </a:solidFill>
+                </a:rPr>
+                <a:t>Draw </a:t>
+              </a:r>
+              <a:r>
+                <a:rPr lang="en-US" altLang="zh-TW" sz="1000" dirty="0">
+                  <a:solidFill>
+                    <a:schemeClr val="tx1"/>
+                  </a:solidFill>
+                </a:rPr>
+                <a:t>this object with its shadow </a:t>
+              </a:r>
+              <a:r>
+                <a:rPr lang="en-US" altLang="zh-TW" sz="1000" dirty="0" smtClean="0">
+                  <a:solidFill>
+                    <a:schemeClr val="tx1"/>
+                  </a:solidFill>
+                </a:rPr>
+                <a:t>material.</a:t>
+              </a:r>
+              <a:endParaRPr lang="zh-TW" altLang="en-US" sz="1000" dirty="0">
+                <a:solidFill>
+                  <a:schemeClr val="tx1"/>
+                </a:solidFill>
+              </a:endParaRPr>
+            </a:p>
+          </p:txBody>
+        </p:sp>
+        <p:sp>
+          <p:nvSpPr>
+            <p:cNvPr id="111" name="文字方塊 110">
+              <a:extLst>
+                <a:ext uri="{FF2B5EF4-FFF2-40B4-BE49-F238E27FC236}">
+                  <a16:creationId xmlns:a16="http://schemas.microsoft.com/office/drawing/2014/main" xmlns="" id="{2342B696-3865-40C4-B984-6DA76D5977A0}"/>
+                </a:ext>
+              </a:extLst>
+            </p:cNvPr>
+            <p:cNvSpPr txBox="1"/>
+            <p:nvPr/>
+          </p:nvSpPr>
+          <p:spPr>
+            <a:xfrm>
+              <a:off x="9823070" y="4532211"/>
+              <a:ext cx="484885" cy="246221"/>
+            </a:xfrm>
+            <a:prstGeom prst="rect">
+              <a:avLst/>
+            </a:prstGeom>
+            <a:noFill/>
+          </p:spPr>
+          <p:txBody>
+            <a:bodyPr wrap="square" rtlCol="0">
+              <a:spAutoFit/>
+            </a:bodyPr>
+            <a:lstStyle/>
+            <a:p>
+              <a:r>
+                <a:rPr lang="en-US" altLang="zh-TW" sz="1000" dirty="0" smtClean="0"/>
+                <a:t>No</a:t>
+              </a:r>
+              <a:endParaRPr lang="zh-TW" altLang="en-US" sz="1000" dirty="0"/>
+            </a:p>
+          </p:txBody>
+        </p:sp>
+        <p:cxnSp>
+          <p:nvCxnSpPr>
+            <p:cNvPr id="112" name="直線單箭頭接點 111">
+              <a:extLst>
+                <a:ext uri="{FF2B5EF4-FFF2-40B4-BE49-F238E27FC236}">
+                  <a16:creationId xmlns:a16="http://schemas.microsoft.com/office/drawing/2014/main" xmlns="" id="{A2924F2B-BAF2-4F69-9B2F-0226FD0A1410}"/>
+                </a:ext>
+              </a:extLst>
+            </p:cNvPr>
+            <p:cNvCxnSpPr>
+              <a:cxnSpLocks/>
+              <a:stCxn id="96" idx="3"/>
+            </p:cNvCxnSpPr>
+            <p:nvPr/>
+          </p:nvCxnSpPr>
+          <p:spPr>
+            <a:xfrm>
+              <a:off x="11155682" y="4224706"/>
+              <a:ext cx="281938" cy="0"/>
+            </a:xfrm>
+            <a:prstGeom prst="straightConnector1">
+              <a:avLst/>
+            </a:prstGeom>
+            <a:ln w="38100">
+              <a:solidFill>
+                <a:schemeClr val="tx1"/>
+              </a:solidFill>
+              <a:tailEnd type="triangle"/>
+            </a:ln>
+          </p:spPr>
+          <p:style>
+            <a:lnRef idx="1">
+              <a:schemeClr val="accent1"/>
+            </a:lnRef>
+            <a:fillRef idx="0">
+              <a:schemeClr val="accent1"/>
+            </a:fillRef>
+            <a:effectRef idx="0">
+              <a:schemeClr val="accent1"/>
+            </a:effectRef>
+            <a:fontRef idx="minor">
+              <a:schemeClr val="tx1"/>
+            </a:fontRef>
+          </p:style>
+        </p:cxnSp>
+        <p:sp>
+          <p:nvSpPr>
+            <p:cNvPr id="115" name="文字方塊 114">
+              <a:extLst>
+                <a:ext uri="{FF2B5EF4-FFF2-40B4-BE49-F238E27FC236}">
+                  <a16:creationId xmlns:a16="http://schemas.microsoft.com/office/drawing/2014/main" xmlns="" id="{DE437A75-1F9F-46FC-8C5E-69D17EDE0291}"/>
+                </a:ext>
+              </a:extLst>
+            </p:cNvPr>
+            <p:cNvSpPr txBox="1"/>
+            <p:nvPr/>
+          </p:nvSpPr>
+          <p:spPr>
+            <a:xfrm>
+              <a:off x="11054208" y="3978485"/>
+              <a:ext cx="484885" cy="246221"/>
+            </a:xfrm>
+            <a:prstGeom prst="rect">
+              <a:avLst/>
+            </a:prstGeom>
+            <a:noFill/>
+          </p:spPr>
+          <p:txBody>
+            <a:bodyPr wrap="square" rtlCol="0">
+              <a:spAutoFit/>
+            </a:bodyPr>
+            <a:lstStyle/>
+            <a:p>
+              <a:r>
+                <a:rPr lang="en-US" altLang="zh-TW" sz="1000" dirty="0" smtClean="0"/>
+                <a:t>Yes</a:t>
+              </a:r>
+              <a:endParaRPr lang="zh-TW" altLang="en-US" sz="1000" dirty="0"/>
+            </a:p>
+          </p:txBody>
+        </p:sp>
+        <p:sp>
+          <p:nvSpPr>
+            <p:cNvPr id="116" name="菱形 115">
+              <a:extLst>
+                <a:ext uri="{FF2B5EF4-FFF2-40B4-BE49-F238E27FC236}">
+                  <a16:creationId xmlns:a16="http://schemas.microsoft.com/office/drawing/2014/main" xmlns="" id="{36101DE4-A20A-480A-9A7F-6EAFAFEF8131}"/>
+                </a:ext>
+              </a:extLst>
+            </p:cNvPr>
+            <p:cNvSpPr/>
+            <p:nvPr/>
+          </p:nvSpPr>
+          <p:spPr>
+            <a:xfrm>
+              <a:off x="8282940" y="4733404"/>
+              <a:ext cx="2872740" cy="679348"/>
+            </a:xfrm>
+            <a:prstGeom prst="diamond">
+              <a:avLst/>
+            </a:prstGeom>
+            <a:noFill/>
+            <a:ln w="38100">
+              <a:solidFill>
+                <a:schemeClr val="tx1"/>
+              </a:solidFill>
+            </a:ln>
+          </p:spPr>
+          <p:style>
+            <a:lnRef idx="2">
+              <a:schemeClr val="accent1">
+                <a:shade val="50000"/>
+              </a:schemeClr>
+            </a:lnRef>
+            <a:fillRef idx="1">
+              <a:schemeClr val="accent1"/>
+            </a:fillRef>
+            <a:effectRef idx="0">
+              <a:schemeClr val="accent1"/>
+            </a:effectRef>
+            <a:fontRef idx="minor">
+              <a:schemeClr val="lt1"/>
+            </a:fontRef>
+          </p:style>
+          <p:txBody>
+            <a:bodyPr rtlCol="0" anchor="ctr"/>
+            <a:lstStyle/>
+            <a:p>
+              <a:pPr algn="ctr"/>
+              <a:r>
+                <a:rPr lang="en-US" altLang="zh-TW" sz="1000" dirty="0" smtClean="0">
+                  <a:solidFill>
+                    <a:schemeClr val="tx1"/>
+                  </a:solidFill>
+                </a:rPr>
+                <a:t>Do we need to make shadow for this object? </a:t>
+              </a:r>
+              <a:endParaRPr lang="zh-TW" altLang="en-US" sz="1000" dirty="0">
+                <a:solidFill>
+                  <a:schemeClr val="tx1"/>
+                </a:solidFill>
+              </a:endParaRPr>
+            </a:p>
+          </p:txBody>
+        </p:sp>
+        <p:cxnSp>
+          <p:nvCxnSpPr>
+            <p:cNvPr id="117" name="直線單箭頭接點 116">
+              <a:extLst>
+                <a:ext uri="{FF2B5EF4-FFF2-40B4-BE49-F238E27FC236}">
+                  <a16:creationId xmlns:a16="http://schemas.microsoft.com/office/drawing/2014/main" xmlns="" id="{A2924F2B-BAF2-4F69-9B2F-0226FD0A1410}"/>
+                </a:ext>
+              </a:extLst>
+            </p:cNvPr>
+            <p:cNvCxnSpPr>
+              <a:cxnSpLocks/>
+              <a:stCxn id="96" idx="2"/>
+              <a:endCxn id="116" idx="0"/>
+            </p:cNvCxnSpPr>
+            <p:nvPr/>
+          </p:nvCxnSpPr>
+          <p:spPr>
+            <a:xfrm flipH="1">
+              <a:off x="9719310" y="4564380"/>
+              <a:ext cx="2" cy="169024"/>
+            </a:xfrm>
+            <a:prstGeom prst="straightConnector1">
+              <a:avLst/>
+            </a:prstGeom>
+            <a:ln w="38100">
+              <a:solidFill>
+                <a:schemeClr val="tx1"/>
+              </a:solidFill>
+              <a:tailEnd type="triangle"/>
+            </a:ln>
+          </p:spPr>
+          <p:style>
+            <a:lnRef idx="1">
+              <a:schemeClr val="accent1"/>
+            </a:lnRef>
+            <a:fillRef idx="0">
+              <a:schemeClr val="accent1"/>
+            </a:fillRef>
+            <a:effectRef idx="0">
+              <a:schemeClr val="accent1"/>
+            </a:effectRef>
+            <a:fontRef idx="minor">
+              <a:schemeClr val="tx1"/>
+            </a:fontRef>
+          </p:style>
+        </p:cxnSp>
+        <p:cxnSp>
+          <p:nvCxnSpPr>
+            <p:cNvPr id="122" name="直線單箭頭接點 121">
+              <a:extLst>
+                <a:ext uri="{FF2B5EF4-FFF2-40B4-BE49-F238E27FC236}">
+                  <a16:creationId xmlns:a16="http://schemas.microsoft.com/office/drawing/2014/main" xmlns="" id="{A2924F2B-BAF2-4F69-9B2F-0226FD0A1410}"/>
+                </a:ext>
+              </a:extLst>
+            </p:cNvPr>
+            <p:cNvCxnSpPr>
+              <a:cxnSpLocks/>
+              <a:stCxn id="116" idx="2"/>
+              <a:endCxn id="105" idx="0"/>
+            </p:cNvCxnSpPr>
+            <p:nvPr/>
+          </p:nvCxnSpPr>
+          <p:spPr>
+            <a:xfrm>
+              <a:off x="9719310" y="5412752"/>
+              <a:ext cx="2" cy="171713"/>
+            </a:xfrm>
+            <a:prstGeom prst="straightConnector1">
+              <a:avLst/>
+            </a:prstGeom>
+            <a:ln w="38100">
+              <a:solidFill>
+                <a:schemeClr val="tx1"/>
+              </a:solidFill>
+              <a:tailEnd type="triangle"/>
+            </a:ln>
+          </p:spPr>
+          <p:style>
+            <a:lnRef idx="1">
+              <a:schemeClr val="accent1"/>
+            </a:lnRef>
+            <a:fillRef idx="0">
+              <a:schemeClr val="accent1"/>
+            </a:fillRef>
+            <a:effectRef idx="0">
+              <a:schemeClr val="accent1"/>
+            </a:effectRef>
+            <a:fontRef idx="minor">
+              <a:schemeClr val="tx1"/>
+            </a:fontRef>
+          </p:style>
+        </p:cxnSp>
+        <p:sp>
+          <p:nvSpPr>
+            <p:cNvPr id="125" name="文字方塊 124">
+              <a:extLst>
+                <a:ext uri="{FF2B5EF4-FFF2-40B4-BE49-F238E27FC236}">
+                  <a16:creationId xmlns:a16="http://schemas.microsoft.com/office/drawing/2014/main" xmlns="" id="{2342B696-3865-40C4-B984-6DA76D5977A0}"/>
+                </a:ext>
+              </a:extLst>
+            </p:cNvPr>
+            <p:cNvSpPr txBox="1"/>
+            <p:nvPr/>
+          </p:nvSpPr>
+          <p:spPr>
+            <a:xfrm>
+              <a:off x="9797861" y="5375495"/>
+              <a:ext cx="387730" cy="246221"/>
+            </a:xfrm>
+            <a:prstGeom prst="rect">
+              <a:avLst/>
+            </a:prstGeom>
+            <a:noFill/>
+          </p:spPr>
+          <p:txBody>
+            <a:bodyPr wrap="square" rtlCol="0">
+              <a:spAutoFit/>
+            </a:bodyPr>
+            <a:lstStyle/>
+            <a:p>
+              <a:r>
+                <a:rPr lang="en-US" altLang="zh-TW" sz="1000" dirty="0" smtClean="0"/>
+                <a:t>Yes</a:t>
+              </a:r>
+              <a:endParaRPr lang="zh-TW" altLang="en-US" sz="1000" dirty="0"/>
+            </a:p>
+          </p:txBody>
+        </p:sp>
+        <p:cxnSp>
+          <p:nvCxnSpPr>
+            <p:cNvPr id="127" name="接點: 肘形 59">
+              <a:extLst>
+                <a:ext uri="{FF2B5EF4-FFF2-40B4-BE49-F238E27FC236}">
+                  <a16:creationId xmlns:a16="http://schemas.microsoft.com/office/drawing/2014/main" xmlns="" id="{9D06D988-AC0B-471F-9ACB-7C07D21D0697}"/>
+                </a:ext>
+              </a:extLst>
+            </p:cNvPr>
+            <p:cNvCxnSpPr>
+              <a:cxnSpLocks/>
+              <a:stCxn id="116" idx="1"/>
+              <a:endCxn id="96" idx="1"/>
+            </p:cNvCxnSpPr>
+            <p:nvPr/>
+          </p:nvCxnSpPr>
+          <p:spPr>
+            <a:xfrm rot="10800000" flipH="1">
+              <a:off x="8282940" y="4224706"/>
+              <a:ext cx="2" cy="848372"/>
+            </a:xfrm>
+            <a:prstGeom prst="bentConnector3">
+              <a:avLst>
+                <a:gd name="adj1" fmla="val -11430000000"/>
+              </a:avLst>
+            </a:prstGeom>
+            <a:ln w="38100">
+              <a:solidFill>
+                <a:schemeClr val="tx1"/>
+              </a:solidFill>
+              <a:tailEnd type="triangle"/>
+            </a:ln>
+          </p:spPr>
+          <p:style>
+            <a:lnRef idx="1">
+              <a:schemeClr val="accent1"/>
+            </a:lnRef>
+            <a:fillRef idx="0">
+              <a:schemeClr val="accent1"/>
+            </a:fillRef>
+            <a:effectRef idx="0">
+              <a:schemeClr val="accent1"/>
+            </a:effectRef>
+            <a:fontRef idx="minor">
+              <a:schemeClr val="tx1"/>
+            </a:fontRef>
+          </p:style>
+        </p:cxnSp>
+        <p:sp>
+          <p:nvSpPr>
+            <p:cNvPr id="130" name="文字方塊 129">
+              <a:extLst>
+                <a:ext uri="{FF2B5EF4-FFF2-40B4-BE49-F238E27FC236}">
+                  <a16:creationId xmlns:a16="http://schemas.microsoft.com/office/drawing/2014/main" xmlns="" id="{2342B696-3865-40C4-B984-6DA76D5977A0}"/>
+                </a:ext>
+              </a:extLst>
+            </p:cNvPr>
+            <p:cNvSpPr txBox="1"/>
+            <p:nvPr/>
+          </p:nvSpPr>
+          <p:spPr>
+            <a:xfrm>
+              <a:off x="8040496" y="5079010"/>
+              <a:ext cx="484885" cy="246221"/>
+            </a:xfrm>
+            <a:prstGeom prst="rect">
+              <a:avLst/>
+            </a:prstGeom>
+            <a:noFill/>
+          </p:spPr>
+          <p:txBody>
+            <a:bodyPr wrap="square" rtlCol="0">
+              <a:spAutoFit/>
+            </a:bodyPr>
+            <a:lstStyle/>
+            <a:p>
+              <a:r>
+                <a:rPr lang="en-US" altLang="zh-TW" sz="1000" dirty="0" smtClean="0"/>
+                <a:t>No</a:t>
+              </a:r>
+              <a:endParaRPr lang="zh-TW" altLang="en-US" sz="1000" dirty="0"/>
+            </a:p>
+          </p:txBody>
+        </p:sp>
+      </p:grpSp>
+    </p:spTree>
+    <p:extLst>
+      <p:ext uri="{BB962C8B-B14F-4D97-AF65-F5344CB8AC3E}">
+        <p14:creationId xmlns:p14="http://schemas.microsoft.com/office/powerpoint/2010/main" val="592349904"/>
+      </p:ext>
+    </p:extLst>
+  </p:cSld>
+  <p:clrMapOvr>
+    <a:masterClrMapping/>
+  </p:clrMapOvr>
+  <p:timing>
+    <p:tnLst>
+      <p:par>
+        <p:cTn id="1" dur="indefinite" restart="never" nodeType="tmRoot"/>
+      </p:par>
+    </p:tnLst>
+  </p:timing>
 </p:sld>
 </file>
 
@@ -5906,7 +7986,7 @@
     </a:clrScheme>
     <a:fontScheme name="Office">
       <a:majorFont>
-        <a:latin typeface="Calibri Light" panose="020F0302020204030204"/>
+        <a:latin typeface="Calibri Light"/>
         <a:ea typeface=""/>
         <a:cs typeface=""/>
         <a:font script="Jpan" typeface="游ゴシック Light"/>
@@ -5958,7 +8038,7 @@
         <a:font script="Tfng" typeface="Ebrima"/>
       </a:majorFont>
       <a:minorFont>
-        <a:latin typeface="Calibri" panose="020F0502020204030204"/>
+        <a:latin typeface="Calibri"/>
         <a:ea typeface=""/>
         <a:cs typeface=""/>
         <a:font script="Jpan" typeface="游ゴシック"/>
@@ -6152,7 +8232,7 @@
   <a:extraClrSchemeLst/>
   <a:extLst>
     <a:ext uri="{05A4C25C-085E-4340-85A3-A5531E510DB2}">
-      <thm15:themeFamily xmlns:thm15="http://schemas.microsoft.com/office/thememl/2012/main" name="Office Theme" id="{62F939B6-93AF-4DB8-9C6B-D6C7DFDC589F}" vid="{4A3C46E8-61CC-4603-A589-7422A47A8E4A}"/>
+      <thm15:themeFamily xmlns:thm15="http://schemas.microsoft.com/office/thememl/2012/main" xmlns="" name="Office Theme" id="{62F939B6-93AF-4DB8-9C6B-D6C7DFDC589F}" vid="{4A3C46E8-61CC-4603-A589-7422A47A8E4A}"/>
     </a:ext>
   </a:extLst>
 </a:theme>
@@ -6201,7 +8281,7 @@
     </a:clrScheme>
     <a:fontScheme name="Office">
       <a:majorFont>
-        <a:latin typeface="Calibri Light" panose="020F0302020204030204"/>
+        <a:latin typeface="Calibri Light"/>
         <a:ea typeface=""/>
         <a:cs typeface=""/>
         <a:font script="Jpan" typeface="游ゴシック Light"/>
@@ -6253,7 +8333,7 @@
         <a:font script="Tfng" typeface="Ebrima"/>
       </a:majorFont>
       <a:minorFont>
-        <a:latin typeface="Calibri" panose="020F0502020204030204"/>
+        <a:latin typeface="Calibri"/>
         <a:ea typeface=""/>
         <a:cs typeface=""/>
         <a:font script="Jpan" typeface="游ゴシック"/>
@@ -6447,7 +8527,7 @@
   <a:extraClrSchemeLst/>
   <a:extLst>
     <a:ext uri="{05A4C25C-085E-4340-85A3-A5531E510DB2}">
-      <thm15:themeFamily xmlns:thm15="http://schemas.microsoft.com/office/thememl/2012/main" name="Office Theme" id="{62F939B6-93AF-4DB8-9C6B-D6C7DFDC589F}" vid="{4A3C46E8-61CC-4603-A589-7422A47A8E4A}"/>
+      <thm15:themeFamily xmlns:thm15="http://schemas.microsoft.com/office/thememl/2012/main" xmlns="" name="Office Theme" id="{62F939B6-93AF-4DB8-9C6B-D6C7DFDC589F}" vid="{4A3C46E8-61CC-4603-A589-7422A47A8E4A}"/>
     </a:ext>
   </a:extLst>
 </a:theme>

</xml_diff>

<commit_message>
[add] Design for RenderFlow.
</commit_message>
<xml_diff>
--- a/Doc/Note/Design/EngineDesign.pptx
+++ b/Doc/Note/Design/EngineDesign.pptx
@@ -5,12 +5,13 @@
     <p:sldMasterId id="2147483648" r:id="rId1"/>
   </p:sldMasterIdLst>
   <p:notesMasterIdLst>
-    <p:notesMasterId r:id="rId5"/>
+    <p:notesMasterId r:id="rId6"/>
   </p:notesMasterIdLst>
   <p:sldIdLst>
     <p:sldId id="256" r:id="rId2"/>
     <p:sldId id="257" r:id="rId3"/>
     <p:sldId id="258" r:id="rId4"/>
+    <p:sldId id="259" r:id="rId5"/>
   </p:sldIdLst>
   <p:sldSz cx="12192000" cy="6858000"/>
   <p:notesSz cx="6858000" cy="9144000"/>
@@ -111,7 +112,18 @@
   </p:defaultTextStyle>
   <p:extLst>
     <p:ext uri="{EFAFB233-063F-42B5-8137-9DF3F51BA10A}">
-      <p15:sldGuideLst xmlns:p15="http://schemas.microsoft.com/office/powerpoint/2012/main" xmlns=""/>
+      <p15:sldGuideLst xmlns:p15="http://schemas.microsoft.com/office/powerpoint/2012/main">
+        <p15:guide id="1" orient="horz" pos="2160">
+          <p15:clr>
+            <a:srgbClr val="A4A3A4"/>
+          </p15:clr>
+        </p15:guide>
+        <p15:guide id="2" pos="3840">
+          <p15:clr>
+            <a:srgbClr val="A4A3A4"/>
+          </p15:clr>
+        </p15:guide>
+      </p15:sldGuideLst>
     </p:ext>
   </p:extLst>
 </p:presentation>
@@ -199,7 +211,7 @@
           <a:p>
             <a:fld id="{8550266C-EB3A-46FF-9DFF-1D300318D93B}" type="datetimeFigureOut">
               <a:rPr lang="zh-TW" altLang="en-US" smtClean="0"/>
-              <a:t>2019/8/31</a:t>
+              <a:t>2020/1/30</a:t>
             </a:fld>
             <a:endParaRPr lang="zh-TW" altLang="en-US"/>
           </a:p>
@@ -572,7 +584,7 @@
           <p:cNvPr id="2" name="標題 1">
             <a:extLst>
               <a:ext uri="{FF2B5EF4-FFF2-40B4-BE49-F238E27FC236}">
-                <a16:creationId xmlns:a16="http://schemas.microsoft.com/office/drawing/2014/main" xmlns="" id="{0C516B4D-3316-46BC-9344-537CC87784CB}"/>
+                <a16:creationId xmlns:a16="http://schemas.microsoft.com/office/drawing/2014/main" id="{0C516B4D-3316-46BC-9344-537CC87784CB}"/>
               </a:ext>
             </a:extLst>
           </p:cNvPr>
@@ -609,7 +621,7 @@
           <p:cNvPr id="3" name="副標題 2">
             <a:extLst>
               <a:ext uri="{FF2B5EF4-FFF2-40B4-BE49-F238E27FC236}">
-                <a16:creationId xmlns:a16="http://schemas.microsoft.com/office/drawing/2014/main" xmlns="" id="{72EE86F2-8686-4A62-A85E-07F6C9FCA25F}"/>
+                <a16:creationId xmlns:a16="http://schemas.microsoft.com/office/drawing/2014/main" id="{72EE86F2-8686-4A62-A85E-07F6C9FCA25F}"/>
               </a:ext>
             </a:extLst>
           </p:cNvPr>
@@ -679,7 +691,7 @@
           <p:cNvPr id="4" name="日期版面配置區 3">
             <a:extLst>
               <a:ext uri="{FF2B5EF4-FFF2-40B4-BE49-F238E27FC236}">
-                <a16:creationId xmlns:a16="http://schemas.microsoft.com/office/drawing/2014/main" xmlns="" id="{9C92E66C-42E5-42AA-A106-2AFD080FBDF3}"/>
+                <a16:creationId xmlns:a16="http://schemas.microsoft.com/office/drawing/2014/main" id="{9C92E66C-42E5-42AA-A106-2AFD080FBDF3}"/>
               </a:ext>
             </a:extLst>
           </p:cNvPr>
@@ -697,7 +709,7 @@
           <a:p>
             <a:fld id="{59C7DAA9-8306-4CC9-B992-C0A037804617}" type="datetimeFigureOut">
               <a:rPr lang="zh-TW" altLang="en-US" smtClean="0"/>
-              <a:t>2019/8/31</a:t>
+              <a:t>2020/1/30</a:t>
             </a:fld>
             <a:endParaRPr lang="zh-TW" altLang="en-US"/>
           </a:p>
@@ -708,7 +720,7 @@
           <p:cNvPr id="5" name="頁尾版面配置區 4">
             <a:extLst>
               <a:ext uri="{FF2B5EF4-FFF2-40B4-BE49-F238E27FC236}">
-                <a16:creationId xmlns:a16="http://schemas.microsoft.com/office/drawing/2014/main" xmlns="" id="{2CBA3547-A09E-41D2-897A-FEE4F023B01E}"/>
+                <a16:creationId xmlns:a16="http://schemas.microsoft.com/office/drawing/2014/main" id="{2CBA3547-A09E-41D2-897A-FEE4F023B01E}"/>
               </a:ext>
             </a:extLst>
           </p:cNvPr>
@@ -733,7 +745,7 @@
           <p:cNvPr id="6" name="投影片編號版面配置區 5">
             <a:extLst>
               <a:ext uri="{FF2B5EF4-FFF2-40B4-BE49-F238E27FC236}">
-                <a16:creationId xmlns:a16="http://schemas.microsoft.com/office/drawing/2014/main" xmlns="" id="{2D894FC3-461E-4527-8E46-D1FCCC62A802}"/>
+                <a16:creationId xmlns:a16="http://schemas.microsoft.com/office/drawing/2014/main" id="{2D894FC3-461E-4527-8E46-D1FCCC62A802}"/>
               </a:ext>
             </a:extLst>
           </p:cNvPr>
@@ -792,7 +804,7 @@
           <p:cNvPr id="2" name="標題 1">
             <a:extLst>
               <a:ext uri="{FF2B5EF4-FFF2-40B4-BE49-F238E27FC236}">
-                <a16:creationId xmlns:a16="http://schemas.microsoft.com/office/drawing/2014/main" xmlns="" id="{0516A69B-B404-4DD9-B723-718747C40536}"/>
+                <a16:creationId xmlns:a16="http://schemas.microsoft.com/office/drawing/2014/main" id="{0516A69B-B404-4DD9-B723-718747C40536}"/>
               </a:ext>
             </a:extLst>
           </p:cNvPr>
@@ -820,7 +832,7 @@
           <p:cNvPr id="3" name="直排文字版面配置區 2">
             <a:extLst>
               <a:ext uri="{FF2B5EF4-FFF2-40B4-BE49-F238E27FC236}">
-                <a16:creationId xmlns:a16="http://schemas.microsoft.com/office/drawing/2014/main" xmlns="" id="{1E7C6CBF-A902-4F43-A7BA-AA56411639E3}"/>
+                <a16:creationId xmlns:a16="http://schemas.microsoft.com/office/drawing/2014/main" id="{1E7C6CBF-A902-4F43-A7BA-AA56411639E3}"/>
               </a:ext>
             </a:extLst>
           </p:cNvPr>
@@ -877,7 +889,7 @@
           <p:cNvPr id="4" name="日期版面配置區 3">
             <a:extLst>
               <a:ext uri="{FF2B5EF4-FFF2-40B4-BE49-F238E27FC236}">
-                <a16:creationId xmlns:a16="http://schemas.microsoft.com/office/drawing/2014/main" xmlns="" id="{07FC21E9-751C-4844-A903-3A1C9C07576A}"/>
+                <a16:creationId xmlns:a16="http://schemas.microsoft.com/office/drawing/2014/main" id="{07FC21E9-751C-4844-A903-3A1C9C07576A}"/>
               </a:ext>
             </a:extLst>
           </p:cNvPr>
@@ -895,7 +907,7 @@
           <a:p>
             <a:fld id="{59C7DAA9-8306-4CC9-B992-C0A037804617}" type="datetimeFigureOut">
               <a:rPr lang="zh-TW" altLang="en-US" smtClean="0"/>
-              <a:t>2019/8/31</a:t>
+              <a:t>2020/1/30</a:t>
             </a:fld>
             <a:endParaRPr lang="zh-TW" altLang="en-US"/>
           </a:p>
@@ -906,7 +918,7 @@
           <p:cNvPr id="5" name="頁尾版面配置區 4">
             <a:extLst>
               <a:ext uri="{FF2B5EF4-FFF2-40B4-BE49-F238E27FC236}">
-                <a16:creationId xmlns:a16="http://schemas.microsoft.com/office/drawing/2014/main" xmlns="" id="{5C497F2D-B2AB-4692-9723-2211EAA23066}"/>
+                <a16:creationId xmlns:a16="http://schemas.microsoft.com/office/drawing/2014/main" id="{5C497F2D-B2AB-4692-9723-2211EAA23066}"/>
               </a:ext>
             </a:extLst>
           </p:cNvPr>
@@ -931,7 +943,7 @@
           <p:cNvPr id="6" name="投影片編號版面配置區 5">
             <a:extLst>
               <a:ext uri="{FF2B5EF4-FFF2-40B4-BE49-F238E27FC236}">
-                <a16:creationId xmlns:a16="http://schemas.microsoft.com/office/drawing/2014/main" xmlns="" id="{A0A32C88-0219-4558-97DA-278BE282F735}"/>
+                <a16:creationId xmlns:a16="http://schemas.microsoft.com/office/drawing/2014/main" id="{A0A32C88-0219-4558-97DA-278BE282F735}"/>
               </a:ext>
             </a:extLst>
           </p:cNvPr>
@@ -990,7 +1002,7 @@
           <p:cNvPr id="2" name="直排標題 1">
             <a:extLst>
               <a:ext uri="{FF2B5EF4-FFF2-40B4-BE49-F238E27FC236}">
-                <a16:creationId xmlns:a16="http://schemas.microsoft.com/office/drawing/2014/main" xmlns="" id="{4AE2E3AC-4F7A-4EBF-AB50-4D0F889F0C8E}"/>
+                <a16:creationId xmlns:a16="http://schemas.microsoft.com/office/drawing/2014/main" id="{4AE2E3AC-4F7A-4EBF-AB50-4D0F889F0C8E}"/>
               </a:ext>
             </a:extLst>
           </p:cNvPr>
@@ -1023,7 +1035,7 @@
           <p:cNvPr id="3" name="直排文字版面配置區 2">
             <a:extLst>
               <a:ext uri="{FF2B5EF4-FFF2-40B4-BE49-F238E27FC236}">
-                <a16:creationId xmlns:a16="http://schemas.microsoft.com/office/drawing/2014/main" xmlns="" id="{D64421F3-D7B4-429B-A87F-90C18ED39F13}"/>
+                <a16:creationId xmlns:a16="http://schemas.microsoft.com/office/drawing/2014/main" id="{D64421F3-D7B4-429B-A87F-90C18ED39F13}"/>
               </a:ext>
             </a:extLst>
           </p:cNvPr>
@@ -1085,7 +1097,7 @@
           <p:cNvPr id="4" name="日期版面配置區 3">
             <a:extLst>
               <a:ext uri="{FF2B5EF4-FFF2-40B4-BE49-F238E27FC236}">
-                <a16:creationId xmlns:a16="http://schemas.microsoft.com/office/drawing/2014/main" xmlns="" id="{E868421B-0C98-4ED7-8AA9-C0A086F08CBC}"/>
+                <a16:creationId xmlns:a16="http://schemas.microsoft.com/office/drawing/2014/main" id="{E868421B-0C98-4ED7-8AA9-C0A086F08CBC}"/>
               </a:ext>
             </a:extLst>
           </p:cNvPr>
@@ -1103,7 +1115,7 @@
           <a:p>
             <a:fld id="{59C7DAA9-8306-4CC9-B992-C0A037804617}" type="datetimeFigureOut">
               <a:rPr lang="zh-TW" altLang="en-US" smtClean="0"/>
-              <a:t>2019/8/31</a:t>
+              <a:t>2020/1/30</a:t>
             </a:fld>
             <a:endParaRPr lang="zh-TW" altLang="en-US"/>
           </a:p>
@@ -1114,7 +1126,7 @@
           <p:cNvPr id="5" name="頁尾版面配置區 4">
             <a:extLst>
               <a:ext uri="{FF2B5EF4-FFF2-40B4-BE49-F238E27FC236}">
-                <a16:creationId xmlns:a16="http://schemas.microsoft.com/office/drawing/2014/main" xmlns="" id="{BA234719-FA55-440E-BDDE-C6585C904A61}"/>
+                <a16:creationId xmlns:a16="http://schemas.microsoft.com/office/drawing/2014/main" id="{BA234719-FA55-440E-BDDE-C6585C904A61}"/>
               </a:ext>
             </a:extLst>
           </p:cNvPr>
@@ -1139,7 +1151,7 @@
           <p:cNvPr id="6" name="投影片編號版面配置區 5">
             <a:extLst>
               <a:ext uri="{FF2B5EF4-FFF2-40B4-BE49-F238E27FC236}">
-                <a16:creationId xmlns:a16="http://schemas.microsoft.com/office/drawing/2014/main" xmlns="" id="{7AB382A4-D21C-418E-AA80-261EC0B5A4E3}"/>
+                <a16:creationId xmlns:a16="http://schemas.microsoft.com/office/drawing/2014/main" id="{7AB382A4-D21C-418E-AA80-261EC0B5A4E3}"/>
               </a:ext>
             </a:extLst>
           </p:cNvPr>
@@ -1198,7 +1210,7 @@
           <p:cNvPr id="2" name="標題 1">
             <a:extLst>
               <a:ext uri="{FF2B5EF4-FFF2-40B4-BE49-F238E27FC236}">
-                <a16:creationId xmlns:a16="http://schemas.microsoft.com/office/drawing/2014/main" xmlns="" id="{4A82D6DB-CDCC-4D3A-9710-721D3CB7A649}"/>
+                <a16:creationId xmlns:a16="http://schemas.microsoft.com/office/drawing/2014/main" id="{4A82D6DB-CDCC-4D3A-9710-721D3CB7A649}"/>
               </a:ext>
             </a:extLst>
           </p:cNvPr>
@@ -1226,7 +1238,7 @@
           <p:cNvPr id="3" name="內容版面配置區 2">
             <a:extLst>
               <a:ext uri="{FF2B5EF4-FFF2-40B4-BE49-F238E27FC236}">
-                <a16:creationId xmlns:a16="http://schemas.microsoft.com/office/drawing/2014/main" xmlns="" id="{9CEB30C5-0321-46CC-8009-A1516B0FAE17}"/>
+                <a16:creationId xmlns:a16="http://schemas.microsoft.com/office/drawing/2014/main" id="{9CEB30C5-0321-46CC-8009-A1516B0FAE17}"/>
               </a:ext>
             </a:extLst>
           </p:cNvPr>
@@ -1283,7 +1295,7 @@
           <p:cNvPr id="4" name="日期版面配置區 3">
             <a:extLst>
               <a:ext uri="{FF2B5EF4-FFF2-40B4-BE49-F238E27FC236}">
-                <a16:creationId xmlns:a16="http://schemas.microsoft.com/office/drawing/2014/main" xmlns="" id="{CBF96F2D-C0CA-47F6-901F-1198C6331300}"/>
+                <a16:creationId xmlns:a16="http://schemas.microsoft.com/office/drawing/2014/main" id="{CBF96F2D-C0CA-47F6-901F-1198C6331300}"/>
               </a:ext>
             </a:extLst>
           </p:cNvPr>
@@ -1301,7 +1313,7 @@
           <a:p>
             <a:fld id="{59C7DAA9-8306-4CC9-B992-C0A037804617}" type="datetimeFigureOut">
               <a:rPr lang="zh-TW" altLang="en-US" smtClean="0"/>
-              <a:t>2019/8/31</a:t>
+              <a:t>2020/1/30</a:t>
             </a:fld>
             <a:endParaRPr lang="zh-TW" altLang="en-US"/>
           </a:p>
@@ -1312,7 +1324,7 @@
           <p:cNvPr id="5" name="頁尾版面配置區 4">
             <a:extLst>
               <a:ext uri="{FF2B5EF4-FFF2-40B4-BE49-F238E27FC236}">
-                <a16:creationId xmlns:a16="http://schemas.microsoft.com/office/drawing/2014/main" xmlns="" id="{E0255B2D-C3E2-4484-8EC4-3ACF4220C2A9}"/>
+                <a16:creationId xmlns:a16="http://schemas.microsoft.com/office/drawing/2014/main" id="{E0255B2D-C3E2-4484-8EC4-3ACF4220C2A9}"/>
               </a:ext>
             </a:extLst>
           </p:cNvPr>
@@ -1337,7 +1349,7 @@
           <p:cNvPr id="6" name="投影片編號版面配置區 5">
             <a:extLst>
               <a:ext uri="{FF2B5EF4-FFF2-40B4-BE49-F238E27FC236}">
-                <a16:creationId xmlns:a16="http://schemas.microsoft.com/office/drawing/2014/main" xmlns="" id="{26B801E0-F738-449C-8EE0-BC427D33679C}"/>
+                <a16:creationId xmlns:a16="http://schemas.microsoft.com/office/drawing/2014/main" id="{26B801E0-F738-449C-8EE0-BC427D33679C}"/>
               </a:ext>
             </a:extLst>
           </p:cNvPr>
@@ -1396,7 +1408,7 @@
           <p:cNvPr id="2" name="標題 1">
             <a:extLst>
               <a:ext uri="{FF2B5EF4-FFF2-40B4-BE49-F238E27FC236}">
-                <a16:creationId xmlns:a16="http://schemas.microsoft.com/office/drawing/2014/main" xmlns="" id="{09D3F9C8-F6E2-46B1-ACC2-BA074F37FEAE}"/>
+                <a16:creationId xmlns:a16="http://schemas.microsoft.com/office/drawing/2014/main" id="{09D3F9C8-F6E2-46B1-ACC2-BA074F37FEAE}"/>
               </a:ext>
             </a:extLst>
           </p:cNvPr>
@@ -1433,7 +1445,7 @@
           <p:cNvPr id="3" name="文字版面配置區 2">
             <a:extLst>
               <a:ext uri="{FF2B5EF4-FFF2-40B4-BE49-F238E27FC236}">
-                <a16:creationId xmlns:a16="http://schemas.microsoft.com/office/drawing/2014/main" xmlns="" id="{4F104A6A-7161-4D98-B4FB-3DB3E061F756}"/>
+                <a16:creationId xmlns:a16="http://schemas.microsoft.com/office/drawing/2014/main" id="{4F104A6A-7161-4D98-B4FB-3DB3E061F756}"/>
               </a:ext>
             </a:extLst>
           </p:cNvPr>
@@ -1558,7 +1570,7 @@
           <p:cNvPr id="4" name="日期版面配置區 3">
             <a:extLst>
               <a:ext uri="{FF2B5EF4-FFF2-40B4-BE49-F238E27FC236}">
-                <a16:creationId xmlns:a16="http://schemas.microsoft.com/office/drawing/2014/main" xmlns="" id="{BB88AF4B-F516-421D-888B-1D89035B3709}"/>
+                <a16:creationId xmlns:a16="http://schemas.microsoft.com/office/drawing/2014/main" id="{BB88AF4B-F516-421D-888B-1D89035B3709}"/>
               </a:ext>
             </a:extLst>
           </p:cNvPr>
@@ -1576,7 +1588,7 @@
           <a:p>
             <a:fld id="{59C7DAA9-8306-4CC9-B992-C0A037804617}" type="datetimeFigureOut">
               <a:rPr lang="zh-TW" altLang="en-US" smtClean="0"/>
-              <a:t>2019/8/31</a:t>
+              <a:t>2020/1/30</a:t>
             </a:fld>
             <a:endParaRPr lang="zh-TW" altLang="en-US"/>
           </a:p>
@@ -1587,7 +1599,7 @@
           <p:cNvPr id="5" name="頁尾版面配置區 4">
             <a:extLst>
               <a:ext uri="{FF2B5EF4-FFF2-40B4-BE49-F238E27FC236}">
-                <a16:creationId xmlns:a16="http://schemas.microsoft.com/office/drawing/2014/main" xmlns="" id="{41C9937E-90BD-4DDF-87FF-A2654D97BE36}"/>
+                <a16:creationId xmlns:a16="http://schemas.microsoft.com/office/drawing/2014/main" id="{41C9937E-90BD-4DDF-87FF-A2654D97BE36}"/>
               </a:ext>
             </a:extLst>
           </p:cNvPr>
@@ -1612,7 +1624,7 @@
           <p:cNvPr id="6" name="投影片編號版面配置區 5">
             <a:extLst>
               <a:ext uri="{FF2B5EF4-FFF2-40B4-BE49-F238E27FC236}">
-                <a16:creationId xmlns:a16="http://schemas.microsoft.com/office/drawing/2014/main" xmlns="" id="{269F0460-86E4-452D-9A62-2FE381039E38}"/>
+                <a16:creationId xmlns:a16="http://schemas.microsoft.com/office/drawing/2014/main" id="{269F0460-86E4-452D-9A62-2FE381039E38}"/>
               </a:ext>
             </a:extLst>
           </p:cNvPr>
@@ -1671,7 +1683,7 @@
           <p:cNvPr id="2" name="標題 1">
             <a:extLst>
               <a:ext uri="{FF2B5EF4-FFF2-40B4-BE49-F238E27FC236}">
-                <a16:creationId xmlns:a16="http://schemas.microsoft.com/office/drawing/2014/main" xmlns="" id="{B9965988-71B4-4438-AB9C-E946BCF3AFD0}"/>
+                <a16:creationId xmlns:a16="http://schemas.microsoft.com/office/drawing/2014/main" id="{B9965988-71B4-4438-AB9C-E946BCF3AFD0}"/>
               </a:ext>
             </a:extLst>
           </p:cNvPr>
@@ -1699,7 +1711,7 @@
           <p:cNvPr id="3" name="內容版面配置區 2">
             <a:extLst>
               <a:ext uri="{FF2B5EF4-FFF2-40B4-BE49-F238E27FC236}">
-                <a16:creationId xmlns:a16="http://schemas.microsoft.com/office/drawing/2014/main" xmlns="" id="{BCF54ED3-1742-49E2-A3B0-8088FAF212BE}"/>
+                <a16:creationId xmlns:a16="http://schemas.microsoft.com/office/drawing/2014/main" id="{BCF54ED3-1742-49E2-A3B0-8088FAF212BE}"/>
               </a:ext>
             </a:extLst>
           </p:cNvPr>
@@ -1761,7 +1773,7 @@
           <p:cNvPr id="4" name="內容版面配置區 3">
             <a:extLst>
               <a:ext uri="{FF2B5EF4-FFF2-40B4-BE49-F238E27FC236}">
-                <a16:creationId xmlns:a16="http://schemas.microsoft.com/office/drawing/2014/main" xmlns="" id="{F802AAC5-4AEE-428D-B1E0-4121001506DB}"/>
+                <a16:creationId xmlns:a16="http://schemas.microsoft.com/office/drawing/2014/main" id="{F802AAC5-4AEE-428D-B1E0-4121001506DB}"/>
               </a:ext>
             </a:extLst>
           </p:cNvPr>
@@ -1823,7 +1835,7 @@
           <p:cNvPr id="5" name="日期版面配置區 4">
             <a:extLst>
               <a:ext uri="{FF2B5EF4-FFF2-40B4-BE49-F238E27FC236}">
-                <a16:creationId xmlns:a16="http://schemas.microsoft.com/office/drawing/2014/main" xmlns="" id="{C5942496-D4C1-4F4B-8D37-B5BA79EC3F26}"/>
+                <a16:creationId xmlns:a16="http://schemas.microsoft.com/office/drawing/2014/main" id="{C5942496-D4C1-4F4B-8D37-B5BA79EC3F26}"/>
               </a:ext>
             </a:extLst>
           </p:cNvPr>
@@ -1841,7 +1853,7 @@
           <a:p>
             <a:fld id="{59C7DAA9-8306-4CC9-B992-C0A037804617}" type="datetimeFigureOut">
               <a:rPr lang="zh-TW" altLang="en-US" smtClean="0"/>
-              <a:t>2019/8/31</a:t>
+              <a:t>2020/1/30</a:t>
             </a:fld>
             <a:endParaRPr lang="zh-TW" altLang="en-US"/>
           </a:p>
@@ -1852,7 +1864,7 @@
           <p:cNvPr id="6" name="頁尾版面配置區 5">
             <a:extLst>
               <a:ext uri="{FF2B5EF4-FFF2-40B4-BE49-F238E27FC236}">
-                <a16:creationId xmlns:a16="http://schemas.microsoft.com/office/drawing/2014/main" xmlns="" id="{986F8353-E73C-4FA6-A7BE-D8598C83CA4F}"/>
+                <a16:creationId xmlns:a16="http://schemas.microsoft.com/office/drawing/2014/main" id="{986F8353-E73C-4FA6-A7BE-D8598C83CA4F}"/>
               </a:ext>
             </a:extLst>
           </p:cNvPr>
@@ -1877,7 +1889,7 @@
           <p:cNvPr id="7" name="投影片編號版面配置區 6">
             <a:extLst>
               <a:ext uri="{FF2B5EF4-FFF2-40B4-BE49-F238E27FC236}">
-                <a16:creationId xmlns:a16="http://schemas.microsoft.com/office/drawing/2014/main" xmlns="" id="{5048B33D-4B8A-4D30-864B-38D1AC0A1B72}"/>
+                <a16:creationId xmlns:a16="http://schemas.microsoft.com/office/drawing/2014/main" id="{5048B33D-4B8A-4D30-864B-38D1AC0A1B72}"/>
               </a:ext>
             </a:extLst>
           </p:cNvPr>
@@ -1936,7 +1948,7 @@
           <p:cNvPr id="2" name="標題 1">
             <a:extLst>
               <a:ext uri="{FF2B5EF4-FFF2-40B4-BE49-F238E27FC236}">
-                <a16:creationId xmlns:a16="http://schemas.microsoft.com/office/drawing/2014/main" xmlns="" id="{40747F3A-4449-4E3B-8666-C12CE98E33B5}"/>
+                <a16:creationId xmlns:a16="http://schemas.microsoft.com/office/drawing/2014/main" id="{40747F3A-4449-4E3B-8666-C12CE98E33B5}"/>
               </a:ext>
             </a:extLst>
           </p:cNvPr>
@@ -1969,7 +1981,7 @@
           <p:cNvPr id="3" name="文字版面配置區 2">
             <a:extLst>
               <a:ext uri="{FF2B5EF4-FFF2-40B4-BE49-F238E27FC236}">
-                <a16:creationId xmlns:a16="http://schemas.microsoft.com/office/drawing/2014/main" xmlns="" id="{2BD40F0D-44FE-463E-808C-92C8751EC3FB}"/>
+                <a16:creationId xmlns:a16="http://schemas.microsoft.com/office/drawing/2014/main" id="{2BD40F0D-44FE-463E-808C-92C8751EC3FB}"/>
               </a:ext>
             </a:extLst>
           </p:cNvPr>
@@ -2040,7 +2052,7 @@
           <p:cNvPr id="4" name="內容版面配置區 3">
             <a:extLst>
               <a:ext uri="{FF2B5EF4-FFF2-40B4-BE49-F238E27FC236}">
-                <a16:creationId xmlns:a16="http://schemas.microsoft.com/office/drawing/2014/main" xmlns="" id="{902B8175-1DD8-4A3C-8638-9AF79BDEDBC8}"/>
+                <a16:creationId xmlns:a16="http://schemas.microsoft.com/office/drawing/2014/main" id="{902B8175-1DD8-4A3C-8638-9AF79BDEDBC8}"/>
               </a:ext>
             </a:extLst>
           </p:cNvPr>
@@ -2102,7 +2114,7 @@
           <p:cNvPr id="5" name="文字版面配置區 4">
             <a:extLst>
               <a:ext uri="{FF2B5EF4-FFF2-40B4-BE49-F238E27FC236}">
-                <a16:creationId xmlns:a16="http://schemas.microsoft.com/office/drawing/2014/main" xmlns="" id="{258B2401-E620-4DE6-8DEE-A79D2E9F0D77}"/>
+                <a16:creationId xmlns:a16="http://schemas.microsoft.com/office/drawing/2014/main" id="{258B2401-E620-4DE6-8DEE-A79D2E9F0D77}"/>
               </a:ext>
             </a:extLst>
           </p:cNvPr>
@@ -2173,7 +2185,7 @@
           <p:cNvPr id="6" name="內容版面配置區 5">
             <a:extLst>
               <a:ext uri="{FF2B5EF4-FFF2-40B4-BE49-F238E27FC236}">
-                <a16:creationId xmlns:a16="http://schemas.microsoft.com/office/drawing/2014/main" xmlns="" id="{621FCFEF-3E9E-4BEE-A71E-DE2AC2E932C8}"/>
+                <a16:creationId xmlns:a16="http://schemas.microsoft.com/office/drawing/2014/main" id="{621FCFEF-3E9E-4BEE-A71E-DE2AC2E932C8}"/>
               </a:ext>
             </a:extLst>
           </p:cNvPr>
@@ -2235,7 +2247,7 @@
           <p:cNvPr id="7" name="日期版面配置區 6">
             <a:extLst>
               <a:ext uri="{FF2B5EF4-FFF2-40B4-BE49-F238E27FC236}">
-                <a16:creationId xmlns:a16="http://schemas.microsoft.com/office/drawing/2014/main" xmlns="" id="{8C3BE562-AB3E-4C84-B8F6-8D0A9447582C}"/>
+                <a16:creationId xmlns:a16="http://schemas.microsoft.com/office/drawing/2014/main" id="{8C3BE562-AB3E-4C84-B8F6-8D0A9447582C}"/>
               </a:ext>
             </a:extLst>
           </p:cNvPr>
@@ -2253,7 +2265,7 @@
           <a:p>
             <a:fld id="{59C7DAA9-8306-4CC9-B992-C0A037804617}" type="datetimeFigureOut">
               <a:rPr lang="zh-TW" altLang="en-US" smtClean="0"/>
-              <a:t>2019/8/31</a:t>
+              <a:t>2020/1/30</a:t>
             </a:fld>
             <a:endParaRPr lang="zh-TW" altLang="en-US"/>
           </a:p>
@@ -2264,7 +2276,7 @@
           <p:cNvPr id="8" name="頁尾版面配置區 7">
             <a:extLst>
               <a:ext uri="{FF2B5EF4-FFF2-40B4-BE49-F238E27FC236}">
-                <a16:creationId xmlns:a16="http://schemas.microsoft.com/office/drawing/2014/main" xmlns="" id="{15951EF1-1194-4466-9809-8F2A7F42BB06}"/>
+                <a16:creationId xmlns:a16="http://schemas.microsoft.com/office/drawing/2014/main" id="{15951EF1-1194-4466-9809-8F2A7F42BB06}"/>
               </a:ext>
             </a:extLst>
           </p:cNvPr>
@@ -2289,7 +2301,7 @@
           <p:cNvPr id="9" name="投影片編號版面配置區 8">
             <a:extLst>
               <a:ext uri="{FF2B5EF4-FFF2-40B4-BE49-F238E27FC236}">
-                <a16:creationId xmlns:a16="http://schemas.microsoft.com/office/drawing/2014/main" xmlns="" id="{4953749B-2C91-4D7B-868E-A27F4E9ED8D6}"/>
+                <a16:creationId xmlns:a16="http://schemas.microsoft.com/office/drawing/2014/main" id="{4953749B-2C91-4D7B-868E-A27F4E9ED8D6}"/>
               </a:ext>
             </a:extLst>
           </p:cNvPr>
@@ -2348,7 +2360,7 @@
           <p:cNvPr id="2" name="標題 1">
             <a:extLst>
               <a:ext uri="{FF2B5EF4-FFF2-40B4-BE49-F238E27FC236}">
-                <a16:creationId xmlns:a16="http://schemas.microsoft.com/office/drawing/2014/main" xmlns="" id="{CDB10691-DE01-4CAE-B91F-AD4A0EF2BD1A}"/>
+                <a16:creationId xmlns:a16="http://schemas.microsoft.com/office/drawing/2014/main" id="{CDB10691-DE01-4CAE-B91F-AD4A0EF2BD1A}"/>
               </a:ext>
             </a:extLst>
           </p:cNvPr>
@@ -2376,7 +2388,7 @@
           <p:cNvPr id="3" name="日期版面配置區 2">
             <a:extLst>
               <a:ext uri="{FF2B5EF4-FFF2-40B4-BE49-F238E27FC236}">
-                <a16:creationId xmlns:a16="http://schemas.microsoft.com/office/drawing/2014/main" xmlns="" id="{3DC68FB3-F31D-4B9A-9E35-CE8B8A174EB1}"/>
+                <a16:creationId xmlns:a16="http://schemas.microsoft.com/office/drawing/2014/main" id="{3DC68FB3-F31D-4B9A-9E35-CE8B8A174EB1}"/>
               </a:ext>
             </a:extLst>
           </p:cNvPr>
@@ -2394,7 +2406,7 @@
           <a:p>
             <a:fld id="{59C7DAA9-8306-4CC9-B992-C0A037804617}" type="datetimeFigureOut">
               <a:rPr lang="zh-TW" altLang="en-US" smtClean="0"/>
-              <a:t>2019/8/31</a:t>
+              <a:t>2020/1/30</a:t>
             </a:fld>
             <a:endParaRPr lang="zh-TW" altLang="en-US"/>
           </a:p>
@@ -2405,7 +2417,7 @@
           <p:cNvPr id="4" name="頁尾版面配置區 3">
             <a:extLst>
               <a:ext uri="{FF2B5EF4-FFF2-40B4-BE49-F238E27FC236}">
-                <a16:creationId xmlns:a16="http://schemas.microsoft.com/office/drawing/2014/main" xmlns="" id="{6F2668D9-B4DB-4C06-8126-771783812945}"/>
+                <a16:creationId xmlns:a16="http://schemas.microsoft.com/office/drawing/2014/main" id="{6F2668D9-B4DB-4C06-8126-771783812945}"/>
               </a:ext>
             </a:extLst>
           </p:cNvPr>
@@ -2430,7 +2442,7 @@
           <p:cNvPr id="5" name="投影片編號版面配置區 4">
             <a:extLst>
               <a:ext uri="{FF2B5EF4-FFF2-40B4-BE49-F238E27FC236}">
-                <a16:creationId xmlns:a16="http://schemas.microsoft.com/office/drawing/2014/main" xmlns="" id="{62B11C53-DBA8-44E3-B8ED-14688E97438C}"/>
+                <a16:creationId xmlns:a16="http://schemas.microsoft.com/office/drawing/2014/main" id="{62B11C53-DBA8-44E3-B8ED-14688E97438C}"/>
               </a:ext>
             </a:extLst>
           </p:cNvPr>
@@ -2489,7 +2501,7 @@
           <p:cNvPr id="2" name="日期版面配置區 1">
             <a:extLst>
               <a:ext uri="{FF2B5EF4-FFF2-40B4-BE49-F238E27FC236}">
-                <a16:creationId xmlns:a16="http://schemas.microsoft.com/office/drawing/2014/main" xmlns="" id="{DAAEBBB1-06E9-4666-A914-28CCD284A0DB}"/>
+                <a16:creationId xmlns:a16="http://schemas.microsoft.com/office/drawing/2014/main" id="{DAAEBBB1-06E9-4666-A914-28CCD284A0DB}"/>
               </a:ext>
             </a:extLst>
           </p:cNvPr>
@@ -2507,7 +2519,7 @@
           <a:p>
             <a:fld id="{59C7DAA9-8306-4CC9-B992-C0A037804617}" type="datetimeFigureOut">
               <a:rPr lang="zh-TW" altLang="en-US" smtClean="0"/>
-              <a:t>2019/8/31</a:t>
+              <a:t>2020/1/30</a:t>
             </a:fld>
             <a:endParaRPr lang="zh-TW" altLang="en-US"/>
           </a:p>
@@ -2518,7 +2530,7 @@
           <p:cNvPr id="3" name="頁尾版面配置區 2">
             <a:extLst>
               <a:ext uri="{FF2B5EF4-FFF2-40B4-BE49-F238E27FC236}">
-                <a16:creationId xmlns:a16="http://schemas.microsoft.com/office/drawing/2014/main" xmlns="" id="{2DBFBC50-ACC6-4172-89C9-E07D9A15BC53}"/>
+                <a16:creationId xmlns:a16="http://schemas.microsoft.com/office/drawing/2014/main" id="{2DBFBC50-ACC6-4172-89C9-E07D9A15BC53}"/>
               </a:ext>
             </a:extLst>
           </p:cNvPr>
@@ -2543,7 +2555,7 @@
           <p:cNvPr id="4" name="投影片編號版面配置區 3">
             <a:extLst>
               <a:ext uri="{FF2B5EF4-FFF2-40B4-BE49-F238E27FC236}">
-                <a16:creationId xmlns:a16="http://schemas.microsoft.com/office/drawing/2014/main" xmlns="" id="{3C36042B-6960-413D-89ED-09F613BB854C}"/>
+                <a16:creationId xmlns:a16="http://schemas.microsoft.com/office/drawing/2014/main" id="{3C36042B-6960-413D-89ED-09F613BB854C}"/>
               </a:ext>
             </a:extLst>
           </p:cNvPr>
@@ -2602,7 +2614,7 @@
           <p:cNvPr id="2" name="標題 1">
             <a:extLst>
               <a:ext uri="{FF2B5EF4-FFF2-40B4-BE49-F238E27FC236}">
-                <a16:creationId xmlns:a16="http://schemas.microsoft.com/office/drawing/2014/main" xmlns="" id="{9524E8F1-5ED5-4ECB-A966-E28072C10118}"/>
+                <a16:creationId xmlns:a16="http://schemas.microsoft.com/office/drawing/2014/main" id="{9524E8F1-5ED5-4ECB-A966-E28072C10118}"/>
               </a:ext>
             </a:extLst>
           </p:cNvPr>
@@ -2639,7 +2651,7 @@
           <p:cNvPr id="3" name="內容版面配置區 2">
             <a:extLst>
               <a:ext uri="{FF2B5EF4-FFF2-40B4-BE49-F238E27FC236}">
-                <a16:creationId xmlns:a16="http://schemas.microsoft.com/office/drawing/2014/main" xmlns="" id="{DC285F6C-EF86-43D1-8009-A028CEEC1612}"/>
+                <a16:creationId xmlns:a16="http://schemas.microsoft.com/office/drawing/2014/main" id="{DC285F6C-EF86-43D1-8009-A028CEEC1612}"/>
               </a:ext>
             </a:extLst>
           </p:cNvPr>
@@ -2729,7 +2741,7 @@
           <p:cNvPr id="4" name="文字版面配置區 3">
             <a:extLst>
               <a:ext uri="{FF2B5EF4-FFF2-40B4-BE49-F238E27FC236}">
-                <a16:creationId xmlns:a16="http://schemas.microsoft.com/office/drawing/2014/main" xmlns="" id="{44560070-00D6-4C16-A46D-633D564FCD93}"/>
+                <a16:creationId xmlns:a16="http://schemas.microsoft.com/office/drawing/2014/main" id="{44560070-00D6-4C16-A46D-633D564FCD93}"/>
               </a:ext>
             </a:extLst>
           </p:cNvPr>
@@ -2800,7 +2812,7 @@
           <p:cNvPr id="5" name="日期版面配置區 4">
             <a:extLst>
               <a:ext uri="{FF2B5EF4-FFF2-40B4-BE49-F238E27FC236}">
-                <a16:creationId xmlns:a16="http://schemas.microsoft.com/office/drawing/2014/main" xmlns="" id="{879CA0D0-60C5-4326-BCE3-7376887FC928}"/>
+                <a16:creationId xmlns:a16="http://schemas.microsoft.com/office/drawing/2014/main" id="{879CA0D0-60C5-4326-BCE3-7376887FC928}"/>
               </a:ext>
             </a:extLst>
           </p:cNvPr>
@@ -2818,7 +2830,7 @@
           <a:p>
             <a:fld id="{59C7DAA9-8306-4CC9-B992-C0A037804617}" type="datetimeFigureOut">
               <a:rPr lang="zh-TW" altLang="en-US" smtClean="0"/>
-              <a:t>2019/8/31</a:t>
+              <a:t>2020/1/30</a:t>
             </a:fld>
             <a:endParaRPr lang="zh-TW" altLang="en-US"/>
           </a:p>
@@ -2829,7 +2841,7 @@
           <p:cNvPr id="6" name="頁尾版面配置區 5">
             <a:extLst>
               <a:ext uri="{FF2B5EF4-FFF2-40B4-BE49-F238E27FC236}">
-                <a16:creationId xmlns:a16="http://schemas.microsoft.com/office/drawing/2014/main" xmlns="" id="{ADF3FDCD-DE9D-4610-91A4-BDF87D53713B}"/>
+                <a16:creationId xmlns:a16="http://schemas.microsoft.com/office/drawing/2014/main" id="{ADF3FDCD-DE9D-4610-91A4-BDF87D53713B}"/>
               </a:ext>
             </a:extLst>
           </p:cNvPr>
@@ -2854,7 +2866,7 @@
           <p:cNvPr id="7" name="投影片編號版面配置區 6">
             <a:extLst>
               <a:ext uri="{FF2B5EF4-FFF2-40B4-BE49-F238E27FC236}">
-                <a16:creationId xmlns:a16="http://schemas.microsoft.com/office/drawing/2014/main" xmlns="" id="{B1D1DBB4-BE93-4F57-A9BF-79D6F82668EF}"/>
+                <a16:creationId xmlns:a16="http://schemas.microsoft.com/office/drawing/2014/main" id="{B1D1DBB4-BE93-4F57-A9BF-79D6F82668EF}"/>
               </a:ext>
             </a:extLst>
           </p:cNvPr>
@@ -2913,7 +2925,7 @@
           <p:cNvPr id="2" name="標題 1">
             <a:extLst>
               <a:ext uri="{FF2B5EF4-FFF2-40B4-BE49-F238E27FC236}">
-                <a16:creationId xmlns:a16="http://schemas.microsoft.com/office/drawing/2014/main" xmlns="" id="{FB4B43BA-3855-41E0-B63B-0B529EB2021A}"/>
+                <a16:creationId xmlns:a16="http://schemas.microsoft.com/office/drawing/2014/main" id="{FB4B43BA-3855-41E0-B63B-0B529EB2021A}"/>
               </a:ext>
             </a:extLst>
           </p:cNvPr>
@@ -2950,7 +2962,7 @@
           <p:cNvPr id="3" name="圖片版面配置區 2">
             <a:extLst>
               <a:ext uri="{FF2B5EF4-FFF2-40B4-BE49-F238E27FC236}">
-                <a16:creationId xmlns:a16="http://schemas.microsoft.com/office/drawing/2014/main" xmlns="" id="{E0978B20-E708-4CBC-B256-908A8D8B7104}"/>
+                <a16:creationId xmlns:a16="http://schemas.microsoft.com/office/drawing/2014/main" id="{E0978B20-E708-4CBC-B256-908A8D8B7104}"/>
               </a:ext>
             </a:extLst>
           </p:cNvPr>
@@ -3017,7 +3029,7 @@
           <p:cNvPr id="4" name="文字版面配置區 3">
             <a:extLst>
               <a:ext uri="{FF2B5EF4-FFF2-40B4-BE49-F238E27FC236}">
-                <a16:creationId xmlns:a16="http://schemas.microsoft.com/office/drawing/2014/main" xmlns="" id="{6F910D0E-630F-4E34-88E9-E11DD0353E91}"/>
+                <a16:creationId xmlns:a16="http://schemas.microsoft.com/office/drawing/2014/main" id="{6F910D0E-630F-4E34-88E9-E11DD0353E91}"/>
               </a:ext>
             </a:extLst>
           </p:cNvPr>
@@ -3088,7 +3100,7 @@
           <p:cNvPr id="5" name="日期版面配置區 4">
             <a:extLst>
               <a:ext uri="{FF2B5EF4-FFF2-40B4-BE49-F238E27FC236}">
-                <a16:creationId xmlns:a16="http://schemas.microsoft.com/office/drawing/2014/main" xmlns="" id="{5DCA3F04-E960-4402-B854-F134203E69E7}"/>
+                <a16:creationId xmlns:a16="http://schemas.microsoft.com/office/drawing/2014/main" id="{5DCA3F04-E960-4402-B854-F134203E69E7}"/>
               </a:ext>
             </a:extLst>
           </p:cNvPr>
@@ -3106,7 +3118,7 @@
           <a:p>
             <a:fld id="{59C7DAA9-8306-4CC9-B992-C0A037804617}" type="datetimeFigureOut">
               <a:rPr lang="zh-TW" altLang="en-US" smtClean="0"/>
-              <a:t>2019/8/31</a:t>
+              <a:t>2020/1/30</a:t>
             </a:fld>
             <a:endParaRPr lang="zh-TW" altLang="en-US"/>
           </a:p>
@@ -3117,7 +3129,7 @@
           <p:cNvPr id="6" name="頁尾版面配置區 5">
             <a:extLst>
               <a:ext uri="{FF2B5EF4-FFF2-40B4-BE49-F238E27FC236}">
-                <a16:creationId xmlns:a16="http://schemas.microsoft.com/office/drawing/2014/main" xmlns="" id="{E7A58D44-BA13-4C92-B385-450E5965AD66}"/>
+                <a16:creationId xmlns:a16="http://schemas.microsoft.com/office/drawing/2014/main" id="{E7A58D44-BA13-4C92-B385-450E5965AD66}"/>
               </a:ext>
             </a:extLst>
           </p:cNvPr>
@@ -3142,7 +3154,7 @@
           <p:cNvPr id="7" name="投影片編號版面配置區 6">
             <a:extLst>
               <a:ext uri="{FF2B5EF4-FFF2-40B4-BE49-F238E27FC236}">
-                <a16:creationId xmlns:a16="http://schemas.microsoft.com/office/drawing/2014/main" xmlns="" id="{A1589C99-E582-49FA-B9A6-4EF7BAF02426}"/>
+                <a16:creationId xmlns:a16="http://schemas.microsoft.com/office/drawing/2014/main" id="{A1589C99-E582-49FA-B9A6-4EF7BAF02426}"/>
               </a:ext>
             </a:extLst>
           </p:cNvPr>
@@ -3206,7 +3218,7 @@
           <p:cNvPr id="2" name="標題版面配置區 1">
             <a:extLst>
               <a:ext uri="{FF2B5EF4-FFF2-40B4-BE49-F238E27FC236}">
-                <a16:creationId xmlns:a16="http://schemas.microsoft.com/office/drawing/2014/main" xmlns="" id="{F0A41766-EBFF-444D-AAAE-F1468069A306}"/>
+                <a16:creationId xmlns:a16="http://schemas.microsoft.com/office/drawing/2014/main" id="{F0A41766-EBFF-444D-AAAE-F1468069A306}"/>
               </a:ext>
             </a:extLst>
           </p:cNvPr>
@@ -3244,7 +3256,7 @@
           <p:cNvPr id="3" name="文字版面配置區 2">
             <a:extLst>
               <a:ext uri="{FF2B5EF4-FFF2-40B4-BE49-F238E27FC236}">
-                <a16:creationId xmlns:a16="http://schemas.microsoft.com/office/drawing/2014/main" xmlns="" id="{1651DCAF-343D-4DC9-AFCA-3B97C4E9C45E}"/>
+                <a16:creationId xmlns:a16="http://schemas.microsoft.com/office/drawing/2014/main" id="{1651DCAF-343D-4DC9-AFCA-3B97C4E9C45E}"/>
               </a:ext>
             </a:extLst>
           </p:cNvPr>
@@ -3311,7 +3323,7 @@
           <p:cNvPr id="4" name="日期版面配置區 3">
             <a:extLst>
               <a:ext uri="{FF2B5EF4-FFF2-40B4-BE49-F238E27FC236}">
-                <a16:creationId xmlns:a16="http://schemas.microsoft.com/office/drawing/2014/main" xmlns="" id="{7EF700B6-F0E5-4333-91A6-0B8CF0454CF6}"/>
+                <a16:creationId xmlns:a16="http://schemas.microsoft.com/office/drawing/2014/main" id="{7EF700B6-F0E5-4333-91A6-0B8CF0454CF6}"/>
               </a:ext>
             </a:extLst>
           </p:cNvPr>
@@ -3347,7 +3359,7 @@
           <a:p>
             <a:fld id="{59C7DAA9-8306-4CC9-B992-C0A037804617}" type="datetimeFigureOut">
               <a:rPr lang="zh-TW" altLang="en-US" smtClean="0"/>
-              <a:t>2019/8/31</a:t>
+              <a:t>2020/1/30</a:t>
             </a:fld>
             <a:endParaRPr lang="zh-TW" altLang="en-US"/>
           </a:p>
@@ -3358,7 +3370,7 @@
           <p:cNvPr id="5" name="頁尾版面配置區 4">
             <a:extLst>
               <a:ext uri="{FF2B5EF4-FFF2-40B4-BE49-F238E27FC236}">
-                <a16:creationId xmlns:a16="http://schemas.microsoft.com/office/drawing/2014/main" xmlns="" id="{52DB0C43-34A8-40DC-AA04-83D4FE0DD5C5}"/>
+                <a16:creationId xmlns:a16="http://schemas.microsoft.com/office/drawing/2014/main" id="{52DB0C43-34A8-40DC-AA04-83D4FE0DD5C5}"/>
               </a:ext>
             </a:extLst>
           </p:cNvPr>
@@ -3401,7 +3413,7 @@
           <p:cNvPr id="6" name="投影片編號版面配置區 5">
             <a:extLst>
               <a:ext uri="{FF2B5EF4-FFF2-40B4-BE49-F238E27FC236}">
-                <a16:creationId xmlns:a16="http://schemas.microsoft.com/office/drawing/2014/main" xmlns="" id="{A7F2BED7-FCEB-44DF-8ADE-9784206D30B9}"/>
+                <a16:creationId xmlns:a16="http://schemas.microsoft.com/office/drawing/2014/main" id="{A7F2BED7-FCEB-44DF-8ADE-9784206D30B9}"/>
               </a:ext>
             </a:extLst>
           </p:cNvPr>
@@ -3769,7 +3781,7 @@
           <p:cNvPr id="2" name="標題 1">
             <a:extLst>
               <a:ext uri="{FF2B5EF4-FFF2-40B4-BE49-F238E27FC236}">
-                <a16:creationId xmlns:a16="http://schemas.microsoft.com/office/drawing/2014/main" xmlns="" id="{A9CB76CB-FE71-4A9A-AC75-C64BD48D5574}"/>
+                <a16:creationId xmlns:a16="http://schemas.microsoft.com/office/drawing/2014/main" id="{A9CB76CB-FE71-4A9A-AC75-C64BD48D5574}"/>
               </a:ext>
             </a:extLst>
           </p:cNvPr>
@@ -3798,7 +3810,7 @@
           <p:cNvPr id="3" name="副標題 2">
             <a:extLst>
               <a:ext uri="{FF2B5EF4-FFF2-40B4-BE49-F238E27FC236}">
-                <a16:creationId xmlns:a16="http://schemas.microsoft.com/office/drawing/2014/main" xmlns="" id="{0A6B0576-278E-41D7-9944-FC088424E7E4}"/>
+                <a16:creationId xmlns:a16="http://schemas.microsoft.com/office/drawing/2014/main" id="{0A6B0576-278E-41D7-9944-FC088424E7E4}"/>
               </a:ext>
             </a:extLst>
           </p:cNvPr>
@@ -3853,7 +3865,7 @@
           <p:cNvPr id="2" name="標題 1">
             <a:extLst>
               <a:ext uri="{FF2B5EF4-FFF2-40B4-BE49-F238E27FC236}">
-                <a16:creationId xmlns:a16="http://schemas.microsoft.com/office/drawing/2014/main" xmlns="" id="{D34A1095-84E8-474E-A99E-C778167B01BA}"/>
+                <a16:creationId xmlns:a16="http://schemas.microsoft.com/office/drawing/2014/main" id="{D34A1095-84E8-474E-A99E-C778167B01BA}"/>
               </a:ext>
             </a:extLst>
           </p:cNvPr>
@@ -3890,7 +3902,7 @@
           <p:cNvPr id="5" name="文字方塊 4">
             <a:extLst>
               <a:ext uri="{FF2B5EF4-FFF2-40B4-BE49-F238E27FC236}">
-                <a16:creationId xmlns:a16="http://schemas.microsoft.com/office/drawing/2014/main" xmlns="" id="{742E149B-4D70-4DD8-9AB6-CB986A4C6143}"/>
+                <a16:creationId xmlns:a16="http://schemas.microsoft.com/office/drawing/2014/main" id="{742E149B-4D70-4DD8-9AB6-CB986A4C6143}"/>
               </a:ext>
             </a:extLst>
           </p:cNvPr>
@@ -3942,7 +3954,7 @@
           <p:cNvPr id="24" name="文字方塊 23">
             <a:extLst>
               <a:ext uri="{FF2B5EF4-FFF2-40B4-BE49-F238E27FC236}">
-                <a16:creationId xmlns:a16="http://schemas.microsoft.com/office/drawing/2014/main" xmlns="" id="{24E311BC-CF98-461F-814B-7E109D5C82F9}"/>
+                <a16:creationId xmlns:a16="http://schemas.microsoft.com/office/drawing/2014/main" id="{24E311BC-CF98-461F-814B-7E109D5C82F9}"/>
               </a:ext>
             </a:extLst>
           </p:cNvPr>
@@ -4008,7 +4020,7 @@
             <p:cNvPr id="4" name="矩形 3">
               <a:extLst>
                 <a:ext uri="{FF2B5EF4-FFF2-40B4-BE49-F238E27FC236}">
-                  <a16:creationId xmlns:a16="http://schemas.microsoft.com/office/drawing/2014/main" xmlns="" id="{54121B23-9C6A-46DE-927F-49CFDF8596E2}"/>
+                  <a16:creationId xmlns:a16="http://schemas.microsoft.com/office/drawing/2014/main" id="{54121B23-9C6A-46DE-927F-49CFDF8596E2}"/>
                 </a:ext>
               </a:extLst>
             </p:cNvPr>
@@ -4096,7 +4108,7 @@
             <p:cNvPr id="8" name="直線單箭頭接點 7">
               <a:extLst>
                 <a:ext uri="{FF2B5EF4-FFF2-40B4-BE49-F238E27FC236}">
-                  <a16:creationId xmlns:a16="http://schemas.microsoft.com/office/drawing/2014/main" xmlns="" id="{A2924F2B-BAF2-4F69-9B2F-0226FD0A1410}"/>
+                  <a16:creationId xmlns:a16="http://schemas.microsoft.com/office/drawing/2014/main" id="{A2924F2B-BAF2-4F69-9B2F-0226FD0A1410}"/>
                 </a:ext>
               </a:extLst>
             </p:cNvPr>
@@ -4141,7 +4153,7 @@
             <p:cNvPr id="9" name="菱形 8">
               <a:extLst>
                 <a:ext uri="{FF2B5EF4-FFF2-40B4-BE49-F238E27FC236}">
-                  <a16:creationId xmlns:a16="http://schemas.microsoft.com/office/drawing/2014/main" xmlns="" id="{36101DE4-A20A-480A-9A7F-6EAFAFEF8131}"/>
+                  <a16:creationId xmlns:a16="http://schemas.microsoft.com/office/drawing/2014/main" id="{36101DE4-A20A-480A-9A7F-6EAFAFEF8131}"/>
                 </a:ext>
               </a:extLst>
             </p:cNvPr>
@@ -4205,7 +4217,7 @@
             <p:cNvPr id="12" name="直線單箭頭接點 11">
               <a:extLst>
                 <a:ext uri="{FF2B5EF4-FFF2-40B4-BE49-F238E27FC236}">
-                  <a16:creationId xmlns:a16="http://schemas.microsoft.com/office/drawing/2014/main" xmlns="" id="{6AD4E8C0-67CD-4C61-9F57-6FA20D4DAEED}"/>
+                  <a16:creationId xmlns:a16="http://schemas.microsoft.com/office/drawing/2014/main" id="{6AD4E8C0-67CD-4C61-9F57-6FA20D4DAEED}"/>
                 </a:ext>
               </a:extLst>
             </p:cNvPr>
@@ -4251,7 +4263,7 @@
             <p:cNvPr id="17" name="矩形 16">
               <a:extLst>
                 <a:ext uri="{FF2B5EF4-FFF2-40B4-BE49-F238E27FC236}">
-                  <a16:creationId xmlns:a16="http://schemas.microsoft.com/office/drawing/2014/main" xmlns="" id="{4D1A1250-84E8-4312-BBE3-DBB340C390B4}"/>
+                  <a16:creationId xmlns:a16="http://schemas.microsoft.com/office/drawing/2014/main" id="{4D1A1250-84E8-4312-BBE3-DBB340C390B4}"/>
                 </a:ext>
               </a:extLst>
             </p:cNvPr>
@@ -4315,7 +4327,7 @@
             <p:cNvPr id="20" name="文字方塊 19">
               <a:extLst>
                 <a:ext uri="{FF2B5EF4-FFF2-40B4-BE49-F238E27FC236}">
-                  <a16:creationId xmlns:a16="http://schemas.microsoft.com/office/drawing/2014/main" xmlns="" id="{DB954364-904E-4768-96AD-F662A18A25E1}"/>
+                  <a16:creationId xmlns:a16="http://schemas.microsoft.com/office/drawing/2014/main" id="{DB954364-904E-4768-96AD-F662A18A25E1}"/>
                 </a:ext>
               </a:extLst>
             </p:cNvPr>
@@ -4351,7 +4363,7 @@
             <p:cNvPr id="21" name="文字方塊 20">
               <a:extLst>
                 <a:ext uri="{FF2B5EF4-FFF2-40B4-BE49-F238E27FC236}">
-                  <a16:creationId xmlns:a16="http://schemas.microsoft.com/office/drawing/2014/main" xmlns="" id="{090D3404-C21C-4353-865B-F89AED6854A1}"/>
+                  <a16:creationId xmlns:a16="http://schemas.microsoft.com/office/drawing/2014/main" id="{090D3404-C21C-4353-865B-F89AED6854A1}"/>
                 </a:ext>
               </a:extLst>
             </p:cNvPr>
@@ -4387,7 +4399,7 @@
             <p:cNvPr id="25" name="矩形 24">
               <a:extLst>
                 <a:ext uri="{FF2B5EF4-FFF2-40B4-BE49-F238E27FC236}">
-                  <a16:creationId xmlns:a16="http://schemas.microsoft.com/office/drawing/2014/main" xmlns="" id="{4D1B714A-EF98-4861-8F96-D6A29B196549}"/>
+                  <a16:creationId xmlns:a16="http://schemas.microsoft.com/office/drawing/2014/main" id="{4D1B714A-EF98-4861-8F96-D6A29B196549}"/>
                 </a:ext>
               </a:extLst>
             </p:cNvPr>
@@ -4451,7 +4463,7 @@
             <p:cNvPr id="28" name="直線單箭頭接點 27">
               <a:extLst>
                 <a:ext uri="{FF2B5EF4-FFF2-40B4-BE49-F238E27FC236}">
-                  <a16:creationId xmlns:a16="http://schemas.microsoft.com/office/drawing/2014/main" xmlns="" id="{D6212E94-363D-4066-9EC9-AE1F73ABD614}"/>
+                  <a16:creationId xmlns:a16="http://schemas.microsoft.com/office/drawing/2014/main" id="{D6212E94-363D-4066-9EC9-AE1F73ABD614}"/>
                 </a:ext>
               </a:extLst>
             </p:cNvPr>
@@ -4497,7 +4509,7 @@
             <p:cNvPr id="36" name="接點: 肘形 35">
               <a:extLst>
                 <a:ext uri="{FF2B5EF4-FFF2-40B4-BE49-F238E27FC236}">
-                  <a16:creationId xmlns:a16="http://schemas.microsoft.com/office/drawing/2014/main" xmlns="" id="{437C143D-297A-4228-9C51-19493288CBF2}"/>
+                  <a16:creationId xmlns:a16="http://schemas.microsoft.com/office/drawing/2014/main" id="{437C143D-297A-4228-9C51-19493288CBF2}"/>
                 </a:ext>
               </a:extLst>
             </p:cNvPr>
@@ -4545,7 +4557,7 @@
             <p:cNvPr id="18" name="矩形 17">
               <a:extLst>
                 <a:ext uri="{FF2B5EF4-FFF2-40B4-BE49-F238E27FC236}">
-                  <a16:creationId xmlns:a16="http://schemas.microsoft.com/office/drawing/2014/main" xmlns="" id="{FABDA4C0-6255-4A1A-8252-AF987408F1C0}"/>
+                  <a16:creationId xmlns:a16="http://schemas.microsoft.com/office/drawing/2014/main" id="{FABDA4C0-6255-4A1A-8252-AF987408F1C0}"/>
                 </a:ext>
               </a:extLst>
             </p:cNvPr>
@@ -4609,7 +4621,7 @@
             <p:cNvPr id="22" name="菱形 21">
               <a:extLst>
                 <a:ext uri="{FF2B5EF4-FFF2-40B4-BE49-F238E27FC236}">
-                  <a16:creationId xmlns:a16="http://schemas.microsoft.com/office/drawing/2014/main" xmlns="" id="{6EF627EE-48A4-4B4A-A28A-E2C63D6C2149}"/>
+                  <a16:creationId xmlns:a16="http://schemas.microsoft.com/office/drawing/2014/main" id="{6EF627EE-48A4-4B4A-A28A-E2C63D6C2149}"/>
                 </a:ext>
               </a:extLst>
             </p:cNvPr>
@@ -4673,7 +4685,7 @@
             <p:cNvPr id="23" name="接點: 肘形 22">
               <a:extLst>
                 <a:ext uri="{FF2B5EF4-FFF2-40B4-BE49-F238E27FC236}">
-                  <a16:creationId xmlns:a16="http://schemas.microsoft.com/office/drawing/2014/main" xmlns="" id="{97D14BAA-E92C-4245-8CC9-F1A5FF29341C}"/>
+                  <a16:creationId xmlns:a16="http://schemas.microsoft.com/office/drawing/2014/main" id="{97D14BAA-E92C-4245-8CC9-F1A5FF29341C}"/>
                 </a:ext>
               </a:extLst>
             </p:cNvPr>
@@ -4719,7 +4731,7 @@
             <p:cNvPr id="40" name="接點: 肘形 39">
               <a:extLst>
                 <a:ext uri="{FF2B5EF4-FFF2-40B4-BE49-F238E27FC236}">
-                  <a16:creationId xmlns:a16="http://schemas.microsoft.com/office/drawing/2014/main" xmlns="" id="{8E1BB32D-E65C-4CD9-BFE0-9EEBDADE904D}"/>
+                  <a16:creationId xmlns:a16="http://schemas.microsoft.com/office/drawing/2014/main" id="{8E1BB32D-E65C-4CD9-BFE0-9EEBDADE904D}"/>
                 </a:ext>
               </a:extLst>
             </p:cNvPr>
@@ -4764,7 +4776,7 @@
             <p:cNvPr id="43" name="文字方塊 42">
               <a:extLst>
                 <a:ext uri="{FF2B5EF4-FFF2-40B4-BE49-F238E27FC236}">
-                  <a16:creationId xmlns:a16="http://schemas.microsoft.com/office/drawing/2014/main" xmlns="" id="{DE437A75-1F9F-46FC-8C5E-69D17EDE0291}"/>
+                  <a16:creationId xmlns:a16="http://schemas.microsoft.com/office/drawing/2014/main" id="{DE437A75-1F9F-46FC-8C5E-69D17EDE0291}"/>
                 </a:ext>
               </a:extLst>
             </p:cNvPr>
@@ -4800,7 +4812,7 @@
             <p:cNvPr id="44" name="接點: 肘形 43">
               <a:extLst>
                 <a:ext uri="{FF2B5EF4-FFF2-40B4-BE49-F238E27FC236}">
-                  <a16:creationId xmlns:a16="http://schemas.microsoft.com/office/drawing/2014/main" xmlns="" id="{4E3CBDD9-4AE0-4601-954F-01478892CDC2}"/>
+                  <a16:creationId xmlns:a16="http://schemas.microsoft.com/office/drawing/2014/main" id="{4E3CBDD9-4AE0-4601-954F-01478892CDC2}"/>
                 </a:ext>
               </a:extLst>
             </p:cNvPr>
@@ -4846,7 +4858,7 @@
             <p:cNvPr id="48" name="文字方塊 47">
               <a:extLst>
                 <a:ext uri="{FF2B5EF4-FFF2-40B4-BE49-F238E27FC236}">
-                  <a16:creationId xmlns:a16="http://schemas.microsoft.com/office/drawing/2014/main" xmlns="" id="{DB9C473C-AA63-4083-B70B-F2BD3C33A323}"/>
+                  <a16:creationId xmlns:a16="http://schemas.microsoft.com/office/drawing/2014/main" id="{DB9C473C-AA63-4083-B70B-F2BD3C33A323}"/>
                 </a:ext>
               </a:extLst>
             </p:cNvPr>
@@ -4882,7 +4894,7 @@
             <p:cNvPr id="50" name="矩形 49">
               <a:extLst>
                 <a:ext uri="{FF2B5EF4-FFF2-40B4-BE49-F238E27FC236}">
-                  <a16:creationId xmlns:a16="http://schemas.microsoft.com/office/drawing/2014/main" xmlns="" id="{8378BDF9-3729-4BE3-80FA-D9C996450B55}"/>
+                  <a16:creationId xmlns:a16="http://schemas.microsoft.com/office/drawing/2014/main" id="{8378BDF9-3729-4BE3-80FA-D9C996450B55}"/>
                 </a:ext>
               </a:extLst>
             </p:cNvPr>
@@ -4946,7 +4958,7 @@
             <p:cNvPr id="51" name="直線單箭頭接點 50">
               <a:extLst>
                 <a:ext uri="{FF2B5EF4-FFF2-40B4-BE49-F238E27FC236}">
-                  <a16:creationId xmlns:a16="http://schemas.microsoft.com/office/drawing/2014/main" xmlns="" id="{934C0B8D-165C-4422-888A-09D06CC0816E}"/>
+                  <a16:creationId xmlns:a16="http://schemas.microsoft.com/office/drawing/2014/main" id="{934C0B8D-165C-4422-888A-09D06CC0816E}"/>
                 </a:ext>
               </a:extLst>
             </p:cNvPr>
@@ -4992,7 +5004,7 @@
             <p:cNvPr id="72" name="直線單箭頭接點 71">
               <a:extLst>
                 <a:ext uri="{FF2B5EF4-FFF2-40B4-BE49-F238E27FC236}">
-                  <a16:creationId xmlns:a16="http://schemas.microsoft.com/office/drawing/2014/main" xmlns="" id="{11F36B25-AD3A-4D2E-8501-CCF281119381}"/>
+                  <a16:creationId xmlns:a16="http://schemas.microsoft.com/office/drawing/2014/main" id="{11F36B25-AD3A-4D2E-8501-CCF281119381}"/>
                 </a:ext>
               </a:extLst>
             </p:cNvPr>
@@ -5037,7 +5049,7 @@
             <p:cNvPr id="75" name="直線單箭頭接點 74">
               <a:extLst>
                 <a:ext uri="{FF2B5EF4-FFF2-40B4-BE49-F238E27FC236}">
-                  <a16:creationId xmlns:a16="http://schemas.microsoft.com/office/drawing/2014/main" xmlns="" id="{D9633314-7D3C-44E3-898D-7479AA45A7AD}"/>
+                  <a16:creationId xmlns:a16="http://schemas.microsoft.com/office/drawing/2014/main" id="{D9633314-7D3C-44E3-898D-7479AA45A7AD}"/>
                 </a:ext>
               </a:extLst>
             </p:cNvPr>
@@ -5083,7 +5095,7 @@
           <p:cNvPr id="111" name="群組 110">
             <a:extLst>
               <a:ext uri="{FF2B5EF4-FFF2-40B4-BE49-F238E27FC236}">
-                <a16:creationId xmlns:a16="http://schemas.microsoft.com/office/drawing/2014/main" xmlns="" id="{AB4CEEEC-C554-4887-9BB7-A0552066925A}"/>
+                <a16:creationId xmlns:a16="http://schemas.microsoft.com/office/drawing/2014/main" id="{AB4CEEEC-C554-4887-9BB7-A0552066925A}"/>
               </a:ext>
             </a:extLst>
           </p:cNvPr>
@@ -5103,7 +5115,7 @@
             <p:cNvPr id="27" name="矩形 26">
               <a:extLst>
                 <a:ext uri="{FF2B5EF4-FFF2-40B4-BE49-F238E27FC236}">
-                  <a16:creationId xmlns:a16="http://schemas.microsoft.com/office/drawing/2014/main" xmlns="" id="{6B855020-FA30-4780-908C-1E0CFF7FCC18}"/>
+                  <a16:creationId xmlns:a16="http://schemas.microsoft.com/office/drawing/2014/main" id="{6B855020-FA30-4780-908C-1E0CFF7FCC18}"/>
                 </a:ext>
               </a:extLst>
             </p:cNvPr>
@@ -5202,7 +5214,7 @@
             <p:cNvPr id="29" name="直線單箭頭接點 28">
               <a:extLst>
                 <a:ext uri="{FF2B5EF4-FFF2-40B4-BE49-F238E27FC236}">
-                  <a16:creationId xmlns:a16="http://schemas.microsoft.com/office/drawing/2014/main" xmlns="" id="{C66C8EE0-6781-41B5-8813-390A27C0ABBA}"/>
+                  <a16:creationId xmlns:a16="http://schemas.microsoft.com/office/drawing/2014/main" id="{C66C8EE0-6781-41B5-8813-390A27C0ABBA}"/>
                 </a:ext>
               </a:extLst>
             </p:cNvPr>
@@ -5248,7 +5260,7 @@
             <p:cNvPr id="30" name="菱形 29">
               <a:extLst>
                 <a:ext uri="{FF2B5EF4-FFF2-40B4-BE49-F238E27FC236}">
-                  <a16:creationId xmlns:a16="http://schemas.microsoft.com/office/drawing/2014/main" xmlns="" id="{06B3870A-A040-4857-87E0-5971AC623529}"/>
+                  <a16:creationId xmlns:a16="http://schemas.microsoft.com/office/drawing/2014/main" id="{06B3870A-A040-4857-87E0-5971AC623529}"/>
                 </a:ext>
               </a:extLst>
             </p:cNvPr>
@@ -5312,7 +5324,7 @@
             <p:cNvPr id="33" name="文字方塊 32">
               <a:extLst>
                 <a:ext uri="{FF2B5EF4-FFF2-40B4-BE49-F238E27FC236}">
-                  <a16:creationId xmlns:a16="http://schemas.microsoft.com/office/drawing/2014/main" xmlns="" id="{2342B696-3865-40C4-B984-6DA76D5977A0}"/>
+                  <a16:creationId xmlns:a16="http://schemas.microsoft.com/office/drawing/2014/main" id="{2342B696-3865-40C4-B984-6DA76D5977A0}"/>
                 </a:ext>
               </a:extLst>
             </p:cNvPr>
@@ -5348,7 +5360,7 @@
             <p:cNvPr id="34" name="文字方塊 33">
               <a:extLst>
                 <a:ext uri="{FF2B5EF4-FFF2-40B4-BE49-F238E27FC236}">
-                  <a16:creationId xmlns:a16="http://schemas.microsoft.com/office/drawing/2014/main" xmlns="" id="{06B75FEB-B4CE-469F-89B6-265C83E9908F}"/>
+                  <a16:creationId xmlns:a16="http://schemas.microsoft.com/office/drawing/2014/main" id="{06B75FEB-B4CE-469F-89B6-265C83E9908F}"/>
                 </a:ext>
               </a:extLst>
             </p:cNvPr>
@@ -5384,7 +5396,7 @@
             <p:cNvPr id="35" name="矩形 34">
               <a:extLst>
                 <a:ext uri="{FF2B5EF4-FFF2-40B4-BE49-F238E27FC236}">
-                  <a16:creationId xmlns:a16="http://schemas.microsoft.com/office/drawing/2014/main" xmlns="" id="{9EBB5EA8-8320-4C70-B026-063D7471C3C2}"/>
+                  <a16:creationId xmlns:a16="http://schemas.microsoft.com/office/drawing/2014/main" id="{9EBB5EA8-8320-4C70-B026-063D7471C3C2}"/>
                 </a:ext>
               </a:extLst>
             </p:cNvPr>
@@ -5448,7 +5460,7 @@
             <p:cNvPr id="60" name="接點: 肘形 59">
               <a:extLst>
                 <a:ext uri="{FF2B5EF4-FFF2-40B4-BE49-F238E27FC236}">
-                  <a16:creationId xmlns:a16="http://schemas.microsoft.com/office/drawing/2014/main" xmlns="" id="{9D06D988-AC0B-471F-9ACB-7C07D21D0697}"/>
+                  <a16:creationId xmlns:a16="http://schemas.microsoft.com/office/drawing/2014/main" id="{9D06D988-AC0B-471F-9ACB-7C07D21D0697}"/>
                 </a:ext>
               </a:extLst>
             </p:cNvPr>
@@ -5494,7 +5506,7 @@
             <p:cNvPr id="66" name="直線單箭頭接點 65">
               <a:extLst>
                 <a:ext uri="{FF2B5EF4-FFF2-40B4-BE49-F238E27FC236}">
-                  <a16:creationId xmlns:a16="http://schemas.microsoft.com/office/drawing/2014/main" xmlns="" id="{C3A9BDBF-28BC-4D3F-8A56-E4B49585A1FC}"/>
+                  <a16:creationId xmlns:a16="http://schemas.microsoft.com/office/drawing/2014/main" id="{C3A9BDBF-28BC-4D3F-8A56-E4B49585A1FC}"/>
                 </a:ext>
               </a:extLst>
             </p:cNvPr>
@@ -5540,7 +5552,7 @@
             <p:cNvPr id="79" name="直線單箭頭接點 78">
               <a:extLst>
                 <a:ext uri="{FF2B5EF4-FFF2-40B4-BE49-F238E27FC236}">
-                  <a16:creationId xmlns:a16="http://schemas.microsoft.com/office/drawing/2014/main" xmlns="" id="{C09EA6CD-389F-4B0F-A82D-1914D466BE1E}"/>
+                  <a16:creationId xmlns:a16="http://schemas.microsoft.com/office/drawing/2014/main" id="{C09EA6CD-389F-4B0F-A82D-1914D466BE1E}"/>
                 </a:ext>
               </a:extLst>
             </p:cNvPr>
@@ -5585,7 +5597,7 @@
             <p:cNvPr id="84" name="直線單箭頭接點 83">
               <a:extLst>
                 <a:ext uri="{FF2B5EF4-FFF2-40B4-BE49-F238E27FC236}">
-                  <a16:creationId xmlns:a16="http://schemas.microsoft.com/office/drawing/2014/main" xmlns="" id="{F5931E76-863E-471A-80F0-F62D852D23F5}"/>
+                  <a16:creationId xmlns:a16="http://schemas.microsoft.com/office/drawing/2014/main" id="{F5931E76-863E-471A-80F0-F62D852D23F5}"/>
                 </a:ext>
               </a:extLst>
             </p:cNvPr>
@@ -5631,7 +5643,7 @@
             <p:cNvPr id="87" name="矩形 86">
               <a:extLst>
                 <a:ext uri="{FF2B5EF4-FFF2-40B4-BE49-F238E27FC236}">
-                  <a16:creationId xmlns:a16="http://schemas.microsoft.com/office/drawing/2014/main" xmlns="" id="{C1D846B3-D8BA-4C1E-937A-6B752B5D5B35}"/>
+                  <a16:creationId xmlns:a16="http://schemas.microsoft.com/office/drawing/2014/main" id="{C1D846B3-D8BA-4C1E-937A-6B752B5D5B35}"/>
                 </a:ext>
               </a:extLst>
             </p:cNvPr>
@@ -5695,7 +5707,7 @@
             <p:cNvPr id="89" name="矩形 88">
               <a:extLst>
                 <a:ext uri="{FF2B5EF4-FFF2-40B4-BE49-F238E27FC236}">
-                  <a16:creationId xmlns:a16="http://schemas.microsoft.com/office/drawing/2014/main" xmlns="" id="{9DE1E879-8791-4B81-AE21-765A2D76FBF4}"/>
+                  <a16:creationId xmlns:a16="http://schemas.microsoft.com/office/drawing/2014/main" id="{9DE1E879-8791-4B81-AE21-765A2D76FBF4}"/>
                 </a:ext>
               </a:extLst>
             </p:cNvPr>
@@ -5759,7 +5771,7 @@
             <p:cNvPr id="99" name="直線單箭頭接點 98">
               <a:extLst>
                 <a:ext uri="{FF2B5EF4-FFF2-40B4-BE49-F238E27FC236}">
-                  <a16:creationId xmlns:a16="http://schemas.microsoft.com/office/drawing/2014/main" xmlns="" id="{00FF4D21-D839-4150-8A7C-DB7F7A32E334}"/>
+                  <a16:creationId xmlns:a16="http://schemas.microsoft.com/office/drawing/2014/main" id="{00FF4D21-D839-4150-8A7C-DB7F7A32E334}"/>
                 </a:ext>
               </a:extLst>
             </p:cNvPr>
@@ -5804,7 +5816,7 @@
             <p:cNvPr id="104" name="接點: 肘形 103">
               <a:extLst>
                 <a:ext uri="{FF2B5EF4-FFF2-40B4-BE49-F238E27FC236}">
-                  <a16:creationId xmlns:a16="http://schemas.microsoft.com/office/drawing/2014/main" xmlns="" id="{C8B07251-3037-4FE8-A8C6-366CCF68138B}"/>
+                  <a16:creationId xmlns:a16="http://schemas.microsoft.com/office/drawing/2014/main" id="{C8B07251-3037-4FE8-A8C6-366CCF68138B}"/>
                 </a:ext>
               </a:extLst>
             </p:cNvPr>
@@ -5855,13 +5867,6 @@
   <p:clrMapOvr>
     <a:masterClrMapping/>
   </p:clrMapOvr>
-  <p:timing>
-    <p:tnLst>
-      <p:par>
-        <p:cTn id="1" dur="indefinite" restart="never" nodeType="tmRoot"/>
-      </p:par>
-    </p:tnLst>
-  </p:timing>
 </p:sld>
 </file>
 
@@ -5901,7 +5906,7 @@
             <p:cNvPr id="4" name="矩形 3">
               <a:extLst>
                 <a:ext uri="{FF2B5EF4-FFF2-40B4-BE49-F238E27FC236}">
-                  <a16:creationId xmlns:a16="http://schemas.microsoft.com/office/drawing/2014/main" xmlns="" id="{54121B23-9C6A-46DE-927F-49CFDF8596E2}"/>
+                  <a16:creationId xmlns:a16="http://schemas.microsoft.com/office/drawing/2014/main" id="{54121B23-9C6A-46DE-927F-49CFDF8596E2}"/>
                 </a:ext>
               </a:extLst>
             </p:cNvPr>
@@ -5945,7 +5950,7 @@
             <a:p>
               <a:pPr algn="ctr"/>
               <a:r>
-                <a:rPr lang="en-US" altLang="zh-TW" sz="1000" dirty="0" smtClean="0">
+                <a:rPr lang="en-US" altLang="zh-TW" sz="1000" dirty="0">
                   <a:solidFill>
                     <a:schemeClr val="tx1"/>
                   </a:solidFill>
@@ -5965,7 +5970,7 @@
             <p:cNvPr id="7" name="直線單箭頭接點 6">
               <a:extLst>
                 <a:ext uri="{FF2B5EF4-FFF2-40B4-BE49-F238E27FC236}">
-                  <a16:creationId xmlns:a16="http://schemas.microsoft.com/office/drawing/2014/main" xmlns="" id="{A2924F2B-BAF2-4F69-9B2F-0226FD0A1410}"/>
+                  <a16:creationId xmlns:a16="http://schemas.microsoft.com/office/drawing/2014/main" id="{A2924F2B-BAF2-4F69-9B2F-0226FD0A1410}"/>
                 </a:ext>
               </a:extLst>
             </p:cNvPr>
@@ -6010,7 +6015,7 @@
             <p:cNvPr id="11" name="矩形 10">
               <a:extLst>
                 <a:ext uri="{FF2B5EF4-FFF2-40B4-BE49-F238E27FC236}">
-                  <a16:creationId xmlns:a16="http://schemas.microsoft.com/office/drawing/2014/main" xmlns="" id="{54121B23-9C6A-46DE-927F-49CFDF8596E2}"/>
+                  <a16:creationId xmlns:a16="http://schemas.microsoft.com/office/drawing/2014/main" id="{54121B23-9C6A-46DE-927F-49CFDF8596E2}"/>
                 </a:ext>
               </a:extLst>
             </p:cNvPr>
@@ -6054,76 +6059,12 @@
             <a:p>
               <a:pPr algn="ctr"/>
               <a:r>
-                <a:rPr lang="en-US" altLang="zh-TW" sz="1000" dirty="0" smtClean="0">
-                  <a:solidFill>
-                    <a:schemeClr val="tx1"/>
-                  </a:solidFill>
-                </a:rPr>
-                <a:t>For each secondary camera, do Forwar</a:t>
-              </a:r>
-              <a:r>
-                <a:rPr lang="en-US" altLang="zh-TW" sz="1000" dirty="0" smtClean="0">
-                  <a:solidFill>
-                    <a:schemeClr val="tx1"/>
-                  </a:solidFill>
-                </a:rPr>
-                <a:t>d or </a:t>
-              </a:r>
-              <a:r>
                 <a:rPr lang="en-US" altLang="zh-TW" sz="1000" dirty="0">
                   <a:solidFill>
                     <a:schemeClr val="tx1"/>
                   </a:solidFill>
                 </a:rPr>
-                <a:t>D</a:t>
-              </a:r>
-              <a:r>
-                <a:rPr lang="en-US" altLang="zh-TW" sz="1000" dirty="0" smtClean="0">
-                  <a:solidFill>
-                    <a:schemeClr val="tx1"/>
-                  </a:solidFill>
-                </a:rPr>
-                <a:t>efer </a:t>
-              </a:r>
-              <a:r>
-                <a:rPr lang="en-US" altLang="zh-TW" sz="1000" dirty="0">
-                  <a:solidFill>
-                    <a:schemeClr val="tx1"/>
-                  </a:solidFill>
-                </a:rPr>
-                <a:t>R</a:t>
-              </a:r>
-              <a:r>
-                <a:rPr lang="en-US" altLang="zh-TW" sz="1000" dirty="0" smtClean="0">
-                  <a:solidFill>
-                    <a:schemeClr val="tx1"/>
-                  </a:solidFill>
-                </a:rPr>
-                <a:t>ender </a:t>
-              </a:r>
-              <a:r>
-                <a:rPr lang="en-US" altLang="zh-TW" sz="1000" dirty="0">
-                  <a:solidFill>
-                    <a:schemeClr val="tx1"/>
-                  </a:solidFill>
-                </a:rPr>
-                <a:t>P</a:t>
-              </a:r>
-              <a:r>
-                <a:rPr lang="en-US" altLang="zh-TW" sz="1000" dirty="0" smtClean="0">
-                  <a:solidFill>
-                    <a:schemeClr val="tx1"/>
-                  </a:solidFill>
-                </a:rPr>
-                <a:t>ass.</a:t>
-              </a:r>
-              <a:r>
-                <a:rPr lang="en-US" altLang="zh-TW" sz="1000" dirty="0" smtClean="0">
-                  <a:solidFill>
-                    <a:schemeClr val="tx1"/>
-                  </a:solidFill>
-                </a:rPr>
-                <a:t> </a:t>
+                <a:t>For each secondary camera, do Forward or Defer Render Pass. </a:t>
               </a:r>
               <a:endParaRPr lang="zh-TW" altLang="en-US" sz="1000" dirty="0">
                 <a:solidFill>
@@ -6138,7 +6079,7 @@
             <p:cNvPr id="15" name="直線單箭頭接點 14">
               <a:extLst>
                 <a:ext uri="{FF2B5EF4-FFF2-40B4-BE49-F238E27FC236}">
-                  <a16:creationId xmlns:a16="http://schemas.microsoft.com/office/drawing/2014/main" xmlns="" id="{A2924F2B-BAF2-4F69-9B2F-0226FD0A1410}"/>
+                  <a16:creationId xmlns:a16="http://schemas.microsoft.com/office/drawing/2014/main" id="{A2924F2B-BAF2-4F69-9B2F-0226FD0A1410}"/>
                 </a:ext>
               </a:extLst>
             </p:cNvPr>
@@ -6184,7 +6125,7 @@
             <p:cNvPr id="19" name="矩形 18">
               <a:extLst>
                 <a:ext uri="{FF2B5EF4-FFF2-40B4-BE49-F238E27FC236}">
-                  <a16:creationId xmlns:a16="http://schemas.microsoft.com/office/drawing/2014/main" xmlns="" id="{54121B23-9C6A-46DE-927F-49CFDF8596E2}"/>
+                  <a16:creationId xmlns:a16="http://schemas.microsoft.com/office/drawing/2014/main" id="{54121B23-9C6A-46DE-927F-49CFDF8596E2}"/>
                 </a:ext>
               </a:extLst>
             </p:cNvPr>
@@ -6228,20 +6169,12 @@
             <a:p>
               <a:pPr algn="ctr"/>
               <a:r>
-                <a:rPr lang="en-US" altLang="zh-TW" sz="1000" dirty="0" smtClean="0">
-                  <a:solidFill>
-                    <a:schemeClr val="tx1"/>
-                  </a:solidFill>
-                </a:rPr>
-                <a:t>For mainly camera, </a:t>
-              </a:r>
-              <a:r>
                 <a:rPr lang="en-US" altLang="zh-TW" sz="1000" dirty="0">
                   <a:solidFill>
                     <a:schemeClr val="tx1"/>
                   </a:solidFill>
                 </a:rPr>
-                <a:t>do Forward or Defer Render Pass.</a:t>
+                <a:t>For mainly camera, do Forward or Defer Render Pass.</a:t>
               </a:r>
               <a:endParaRPr lang="zh-TW" altLang="en-US" sz="1000" dirty="0">
                 <a:solidFill>
@@ -6256,7 +6189,7 @@
             <p:cNvPr id="22" name="直線單箭頭接點 21">
               <a:extLst>
                 <a:ext uri="{FF2B5EF4-FFF2-40B4-BE49-F238E27FC236}">
-                  <a16:creationId xmlns:a16="http://schemas.microsoft.com/office/drawing/2014/main" xmlns="" id="{A2924F2B-BAF2-4F69-9B2F-0226FD0A1410}"/>
+                  <a16:creationId xmlns:a16="http://schemas.microsoft.com/office/drawing/2014/main" id="{A2924F2B-BAF2-4F69-9B2F-0226FD0A1410}"/>
                 </a:ext>
               </a:extLst>
             </p:cNvPr>
@@ -6300,7 +6233,7 @@
             <p:cNvPr id="23" name="直線單箭頭接點 22">
               <a:extLst>
                 <a:ext uri="{FF2B5EF4-FFF2-40B4-BE49-F238E27FC236}">
-                  <a16:creationId xmlns:a16="http://schemas.microsoft.com/office/drawing/2014/main" xmlns="" id="{A2924F2B-BAF2-4F69-9B2F-0226FD0A1410}"/>
+                  <a16:creationId xmlns:a16="http://schemas.microsoft.com/office/drawing/2014/main" id="{A2924F2B-BAF2-4F69-9B2F-0226FD0A1410}"/>
                 </a:ext>
               </a:extLst>
             </p:cNvPr>
@@ -6344,7 +6277,7 @@
             <p:cNvPr id="24" name="矩形 23">
               <a:extLst>
                 <a:ext uri="{FF2B5EF4-FFF2-40B4-BE49-F238E27FC236}">
-                  <a16:creationId xmlns:a16="http://schemas.microsoft.com/office/drawing/2014/main" xmlns="" id="{54121B23-9C6A-46DE-927F-49CFDF8596E2}"/>
+                  <a16:creationId xmlns:a16="http://schemas.microsoft.com/office/drawing/2014/main" id="{54121B23-9C6A-46DE-927F-49CFDF8596E2}"/>
                 </a:ext>
               </a:extLst>
             </p:cNvPr>
@@ -6388,28 +6321,12 @@
             <a:p>
               <a:pPr algn="ctr"/>
               <a:r>
-                <a:rPr lang="en-US" altLang="zh-TW" sz="1000" dirty="0" smtClean="0">
+                <a:rPr lang="en-US" altLang="zh-TW" sz="1000" dirty="0">
                   <a:solidFill>
                     <a:schemeClr val="tx1"/>
                   </a:solidFill>
                 </a:rPr>
-                <a:t>Compose color buffer of main camera </a:t>
-              </a:r>
-              <a:r>
-                <a:rPr lang="en-US" altLang="zh-TW" sz="1000" dirty="0" smtClean="0">
-                  <a:solidFill>
-                    <a:schemeClr val="tx1"/>
-                  </a:solidFill>
-                </a:rPr>
-                <a:t>.</a:t>
-              </a:r>
-              <a:r>
-                <a:rPr lang="en-US" altLang="zh-TW" sz="1000" dirty="0" smtClean="0">
-                  <a:solidFill>
-                    <a:schemeClr val="tx1"/>
-                  </a:solidFill>
-                </a:rPr>
-                <a:t> </a:t>
+                <a:t>Compose color buffer of main camera . </a:t>
               </a:r>
               <a:endParaRPr lang="zh-TW" altLang="en-US" sz="1000" dirty="0">
                 <a:solidFill>
@@ -6439,7 +6356,7 @@
             <p:cNvPr id="30" name="矩形 29">
               <a:extLst>
                 <a:ext uri="{FF2B5EF4-FFF2-40B4-BE49-F238E27FC236}">
-                  <a16:creationId xmlns:a16="http://schemas.microsoft.com/office/drawing/2014/main" xmlns="" id="{54121B23-9C6A-46DE-927F-49CFDF8596E2}"/>
+                  <a16:creationId xmlns:a16="http://schemas.microsoft.com/office/drawing/2014/main" id="{54121B23-9C6A-46DE-927F-49CFDF8596E2}"/>
                 </a:ext>
               </a:extLst>
             </p:cNvPr>
@@ -6483,7 +6400,7 @@
             <a:p>
               <a:pPr algn="ctr"/>
               <a:r>
-                <a:rPr lang="en-US" altLang="zh-TW" sz="1000" dirty="0" smtClean="0">
+                <a:rPr lang="en-US" altLang="zh-TW" sz="1000" dirty="0">
                   <a:solidFill>
                     <a:schemeClr val="tx1"/>
                   </a:solidFill>
@@ -6503,7 +6420,7 @@
             <p:cNvPr id="31" name="菱形 30">
               <a:extLst>
                 <a:ext uri="{FF2B5EF4-FFF2-40B4-BE49-F238E27FC236}">
-                  <a16:creationId xmlns:a16="http://schemas.microsoft.com/office/drawing/2014/main" xmlns="" id="{36101DE4-A20A-480A-9A7F-6EAFAFEF8131}"/>
+                  <a16:creationId xmlns:a16="http://schemas.microsoft.com/office/drawing/2014/main" id="{36101DE4-A20A-480A-9A7F-6EAFAFEF8131}"/>
                 </a:ext>
               </a:extLst>
             </p:cNvPr>
@@ -6552,15 +6469,7 @@
                     <a:schemeClr val="tx1"/>
                   </a:solidFill>
                 </a:rPr>
-                <a:t>H</a:t>
-              </a:r>
-              <a:r>
-                <a:rPr lang="en-US" altLang="zh-TW" sz="1000" dirty="0" smtClean="0">
-                  <a:solidFill>
-                    <a:schemeClr val="tx1"/>
-                  </a:solidFill>
-                </a:rPr>
-                <a:t>as drawn shadow maps for all lights?</a:t>
+                <a:t>Has drawn shadow maps for all lights?</a:t>
               </a:r>
               <a:endParaRPr lang="zh-TW" altLang="en-US" sz="1000" dirty="0">
                 <a:solidFill>
@@ -6575,7 +6484,7 @@
             <p:cNvPr id="32" name="直線單箭頭接點 31">
               <a:extLst>
                 <a:ext uri="{FF2B5EF4-FFF2-40B4-BE49-F238E27FC236}">
-                  <a16:creationId xmlns:a16="http://schemas.microsoft.com/office/drawing/2014/main" xmlns="" id="{A2924F2B-BAF2-4F69-9B2F-0226FD0A1410}"/>
+                  <a16:creationId xmlns:a16="http://schemas.microsoft.com/office/drawing/2014/main" id="{A2924F2B-BAF2-4F69-9B2F-0226FD0A1410}"/>
                 </a:ext>
               </a:extLst>
             </p:cNvPr>
@@ -6621,7 +6530,7 @@
             <p:cNvPr id="36" name="接點: 肘形 59">
               <a:extLst>
                 <a:ext uri="{FF2B5EF4-FFF2-40B4-BE49-F238E27FC236}">
-                  <a16:creationId xmlns:a16="http://schemas.microsoft.com/office/drawing/2014/main" xmlns="" id="{9D06D988-AC0B-471F-9ACB-7C07D21D0697}"/>
+                  <a16:creationId xmlns:a16="http://schemas.microsoft.com/office/drawing/2014/main" id="{9D06D988-AC0B-471F-9ACB-7C07D21D0697}"/>
                 </a:ext>
               </a:extLst>
             </p:cNvPr>
@@ -6667,7 +6576,7 @@
             <p:cNvPr id="39" name="矩形 38">
               <a:extLst>
                 <a:ext uri="{FF2B5EF4-FFF2-40B4-BE49-F238E27FC236}">
-                  <a16:creationId xmlns:a16="http://schemas.microsoft.com/office/drawing/2014/main" xmlns="" id="{54121B23-9C6A-46DE-927F-49CFDF8596E2}"/>
+                  <a16:creationId xmlns:a16="http://schemas.microsoft.com/office/drawing/2014/main" id="{54121B23-9C6A-46DE-927F-49CFDF8596E2}"/>
                 </a:ext>
               </a:extLst>
             </p:cNvPr>
@@ -6711,7 +6620,7 @@
             <a:p>
               <a:pPr algn="ctr"/>
               <a:r>
-                <a:rPr lang="en-US" altLang="zh-TW" sz="1000" dirty="0" smtClean="0">
+                <a:rPr lang="en-US" altLang="zh-TW" sz="1000" dirty="0">
                   <a:solidFill>
                     <a:schemeClr val="tx1"/>
                   </a:solidFill>
@@ -6731,7 +6640,7 @@
             <p:cNvPr id="45" name="直線單箭頭接點 44">
               <a:extLst>
                 <a:ext uri="{FF2B5EF4-FFF2-40B4-BE49-F238E27FC236}">
-                  <a16:creationId xmlns:a16="http://schemas.microsoft.com/office/drawing/2014/main" xmlns="" id="{A2924F2B-BAF2-4F69-9B2F-0226FD0A1410}"/>
+                  <a16:creationId xmlns:a16="http://schemas.microsoft.com/office/drawing/2014/main" id="{A2924F2B-BAF2-4F69-9B2F-0226FD0A1410}"/>
                 </a:ext>
               </a:extLst>
             </p:cNvPr>
@@ -6777,7 +6686,7 @@
             <p:cNvPr id="49" name="菱形 48">
               <a:extLst>
                 <a:ext uri="{FF2B5EF4-FFF2-40B4-BE49-F238E27FC236}">
-                  <a16:creationId xmlns:a16="http://schemas.microsoft.com/office/drawing/2014/main" xmlns="" id="{36101DE4-A20A-480A-9A7F-6EAFAFEF8131}"/>
+                  <a16:creationId xmlns:a16="http://schemas.microsoft.com/office/drawing/2014/main" id="{36101DE4-A20A-480A-9A7F-6EAFAFEF8131}"/>
                 </a:ext>
               </a:extLst>
             </p:cNvPr>
@@ -6821,7 +6730,7 @@
             <a:p>
               <a:pPr algn="ctr"/>
               <a:r>
-                <a:rPr lang="en-US" altLang="zh-TW" sz="1000" dirty="0" smtClean="0">
+                <a:rPr lang="en-US" altLang="zh-TW" sz="1000" dirty="0">
                   <a:solidFill>
                     <a:schemeClr val="tx1"/>
                   </a:solidFill>
@@ -6841,7 +6750,7 @@
             <p:cNvPr id="55" name="直線單箭頭接點 54">
               <a:extLst>
                 <a:ext uri="{FF2B5EF4-FFF2-40B4-BE49-F238E27FC236}">
-                  <a16:creationId xmlns:a16="http://schemas.microsoft.com/office/drawing/2014/main" xmlns="" id="{A2924F2B-BAF2-4F69-9B2F-0226FD0A1410}"/>
+                  <a16:creationId xmlns:a16="http://schemas.microsoft.com/office/drawing/2014/main" id="{A2924F2B-BAF2-4F69-9B2F-0226FD0A1410}"/>
                 </a:ext>
               </a:extLst>
             </p:cNvPr>
@@ -6887,7 +6796,7 @@
             <p:cNvPr id="58" name="矩形 57">
               <a:extLst>
                 <a:ext uri="{FF2B5EF4-FFF2-40B4-BE49-F238E27FC236}">
-                  <a16:creationId xmlns:a16="http://schemas.microsoft.com/office/drawing/2014/main" xmlns="" id="{54121B23-9C6A-46DE-927F-49CFDF8596E2}"/>
+                  <a16:creationId xmlns:a16="http://schemas.microsoft.com/office/drawing/2014/main" id="{54121B23-9C6A-46DE-927F-49CFDF8596E2}"/>
                 </a:ext>
               </a:extLst>
             </p:cNvPr>
@@ -6931,7 +6840,7 @@
             <a:p>
               <a:pPr algn="ctr"/>
               <a:r>
-                <a:rPr lang="en-US" altLang="zh-TW" sz="1000" dirty="0" smtClean="0">
+                <a:rPr lang="en-US" altLang="zh-TW" sz="1000" dirty="0">
                   <a:solidFill>
                     <a:schemeClr val="tx1"/>
                   </a:solidFill>
@@ -6951,7 +6860,7 @@
             <p:cNvPr id="60" name="矩形 59">
               <a:extLst>
                 <a:ext uri="{FF2B5EF4-FFF2-40B4-BE49-F238E27FC236}">
-                  <a16:creationId xmlns:a16="http://schemas.microsoft.com/office/drawing/2014/main" xmlns="" id="{54121B23-9C6A-46DE-927F-49CFDF8596E2}"/>
+                  <a16:creationId xmlns:a16="http://schemas.microsoft.com/office/drawing/2014/main" id="{54121B23-9C6A-46DE-927F-49CFDF8596E2}"/>
                 </a:ext>
               </a:extLst>
             </p:cNvPr>
@@ -6995,7 +6904,7 @@
             <a:p>
               <a:pPr algn="ctr"/>
               <a:r>
-                <a:rPr lang="en-US" altLang="zh-TW" sz="1000" dirty="0" smtClean="0">
+                <a:rPr lang="en-US" altLang="zh-TW" sz="1000" dirty="0">
                   <a:solidFill>
                     <a:schemeClr val="tx1"/>
                   </a:solidFill>
@@ -7015,7 +6924,7 @@
             <p:cNvPr id="61" name="直線單箭頭接點 60">
               <a:extLst>
                 <a:ext uri="{FF2B5EF4-FFF2-40B4-BE49-F238E27FC236}">
-                  <a16:creationId xmlns:a16="http://schemas.microsoft.com/office/drawing/2014/main" xmlns="" id="{A2924F2B-BAF2-4F69-9B2F-0226FD0A1410}"/>
+                  <a16:creationId xmlns:a16="http://schemas.microsoft.com/office/drawing/2014/main" id="{A2924F2B-BAF2-4F69-9B2F-0226FD0A1410}"/>
                 </a:ext>
               </a:extLst>
             </p:cNvPr>
@@ -7061,7 +6970,7 @@
             <p:cNvPr id="69" name="接點: 肘形 59">
               <a:extLst>
                 <a:ext uri="{FF2B5EF4-FFF2-40B4-BE49-F238E27FC236}">
-                  <a16:creationId xmlns:a16="http://schemas.microsoft.com/office/drawing/2014/main" xmlns="" id="{9D06D988-AC0B-471F-9ACB-7C07D21D0697}"/>
+                  <a16:creationId xmlns:a16="http://schemas.microsoft.com/office/drawing/2014/main" id="{9D06D988-AC0B-471F-9ACB-7C07D21D0697}"/>
                 </a:ext>
               </a:extLst>
             </p:cNvPr>
@@ -7109,7 +7018,7 @@
             <p:cNvPr id="78" name="接點: 肘形 59">
               <a:extLst>
                 <a:ext uri="{FF2B5EF4-FFF2-40B4-BE49-F238E27FC236}">
-                  <a16:creationId xmlns:a16="http://schemas.microsoft.com/office/drawing/2014/main" xmlns="" id="{9D06D988-AC0B-471F-9ACB-7C07D21D0697}"/>
+                  <a16:creationId xmlns:a16="http://schemas.microsoft.com/office/drawing/2014/main" id="{9D06D988-AC0B-471F-9ACB-7C07D21D0697}"/>
                 </a:ext>
               </a:extLst>
             </p:cNvPr>
@@ -7155,7 +7064,7 @@
             <p:cNvPr id="81" name="文字方塊 80">
               <a:extLst>
                 <a:ext uri="{FF2B5EF4-FFF2-40B4-BE49-F238E27FC236}">
-                  <a16:creationId xmlns:a16="http://schemas.microsoft.com/office/drawing/2014/main" xmlns="" id="{2342B696-3865-40C4-B984-6DA76D5977A0}"/>
+                  <a16:creationId xmlns:a16="http://schemas.microsoft.com/office/drawing/2014/main" id="{2342B696-3865-40C4-B984-6DA76D5977A0}"/>
                 </a:ext>
               </a:extLst>
             </p:cNvPr>
@@ -7179,7 +7088,7 @@
             <a:lstStyle/>
             <a:p>
               <a:r>
-                <a:rPr lang="en-US" altLang="zh-TW" sz="1000" dirty="0" smtClean="0"/>
+                <a:rPr lang="en-US" altLang="zh-TW" sz="1000" dirty="0"/>
                 <a:t>No</a:t>
               </a:r>
               <a:endParaRPr lang="zh-TW" altLang="en-US" sz="1000" dirty="0"/>
@@ -7191,7 +7100,7 @@
             <p:cNvPr id="82" name="文字方塊 81">
               <a:extLst>
                 <a:ext uri="{FF2B5EF4-FFF2-40B4-BE49-F238E27FC236}">
-                  <a16:creationId xmlns:a16="http://schemas.microsoft.com/office/drawing/2014/main" xmlns="" id="{2342B696-3865-40C4-B984-6DA76D5977A0}"/>
+                  <a16:creationId xmlns:a16="http://schemas.microsoft.com/office/drawing/2014/main" id="{2342B696-3865-40C4-B984-6DA76D5977A0}"/>
                 </a:ext>
               </a:extLst>
             </p:cNvPr>
@@ -7215,7 +7124,7 @@
             <a:lstStyle/>
             <a:p>
               <a:r>
-                <a:rPr lang="en-US" altLang="zh-TW" sz="1000" dirty="0" smtClean="0"/>
+                <a:rPr lang="en-US" altLang="zh-TW" sz="1000" dirty="0"/>
                 <a:t>No</a:t>
               </a:r>
               <a:endParaRPr lang="zh-TW" altLang="en-US" sz="1000" dirty="0"/>
@@ -7227,7 +7136,7 @@
             <p:cNvPr id="83" name="文字方塊 82">
               <a:extLst>
                 <a:ext uri="{FF2B5EF4-FFF2-40B4-BE49-F238E27FC236}">
-                  <a16:creationId xmlns:a16="http://schemas.microsoft.com/office/drawing/2014/main" xmlns="" id="{DE437A75-1F9F-46FC-8C5E-69D17EDE0291}"/>
+                  <a16:creationId xmlns:a16="http://schemas.microsoft.com/office/drawing/2014/main" id="{DE437A75-1F9F-46FC-8C5E-69D17EDE0291}"/>
                 </a:ext>
               </a:extLst>
             </p:cNvPr>
@@ -7251,7 +7160,7 @@
             <a:lstStyle/>
             <a:p>
               <a:r>
-                <a:rPr lang="en-US" altLang="zh-TW" sz="1000" dirty="0" smtClean="0"/>
+                <a:rPr lang="en-US" altLang="zh-TW" sz="1000" dirty="0"/>
                 <a:t>Yes</a:t>
               </a:r>
               <a:endParaRPr lang="zh-TW" altLang="en-US" sz="1000" dirty="0"/>
@@ -7263,7 +7172,7 @@
             <p:cNvPr id="88" name="接點: 肘形 59">
               <a:extLst>
                 <a:ext uri="{FF2B5EF4-FFF2-40B4-BE49-F238E27FC236}">
-                  <a16:creationId xmlns:a16="http://schemas.microsoft.com/office/drawing/2014/main" xmlns="" id="{9D06D988-AC0B-471F-9ACB-7C07D21D0697}"/>
+                  <a16:creationId xmlns:a16="http://schemas.microsoft.com/office/drawing/2014/main" id="{9D06D988-AC0B-471F-9ACB-7C07D21D0697}"/>
                 </a:ext>
               </a:extLst>
             </p:cNvPr>
@@ -7308,7 +7217,7 @@
             <p:cNvPr id="90" name="文字方塊 89">
               <a:extLst>
                 <a:ext uri="{FF2B5EF4-FFF2-40B4-BE49-F238E27FC236}">
-                  <a16:creationId xmlns:a16="http://schemas.microsoft.com/office/drawing/2014/main" xmlns="" id="{DE437A75-1F9F-46FC-8C5E-69D17EDE0291}"/>
+                  <a16:creationId xmlns:a16="http://schemas.microsoft.com/office/drawing/2014/main" id="{DE437A75-1F9F-46FC-8C5E-69D17EDE0291}"/>
                 </a:ext>
               </a:extLst>
             </p:cNvPr>
@@ -7332,7 +7241,7 @@
             <a:lstStyle/>
             <a:p>
               <a:r>
-                <a:rPr lang="en-US" altLang="zh-TW" sz="1000" dirty="0" smtClean="0"/>
+                <a:rPr lang="en-US" altLang="zh-TW" sz="1000" dirty="0"/>
                 <a:t>Yes</a:t>
               </a:r>
               <a:endParaRPr lang="zh-TW" altLang="en-US" sz="1000" dirty="0"/>
@@ -7344,7 +7253,7 @@
             <p:cNvPr id="96" name="菱形 95">
               <a:extLst>
                 <a:ext uri="{FF2B5EF4-FFF2-40B4-BE49-F238E27FC236}">
-                  <a16:creationId xmlns:a16="http://schemas.microsoft.com/office/drawing/2014/main" xmlns="" id="{36101DE4-A20A-480A-9A7F-6EAFAFEF8131}"/>
+                  <a16:creationId xmlns:a16="http://schemas.microsoft.com/office/drawing/2014/main" id="{36101DE4-A20A-480A-9A7F-6EAFAFEF8131}"/>
                 </a:ext>
               </a:extLst>
             </p:cNvPr>
@@ -7388,7 +7297,7 @@
             <a:p>
               <a:pPr algn="ctr"/>
               <a:r>
-                <a:rPr lang="en-US" altLang="zh-TW" sz="1000" dirty="0" smtClean="0">
+                <a:rPr lang="en-US" altLang="zh-TW" sz="1000" dirty="0">
                   <a:solidFill>
                     <a:schemeClr val="tx1"/>
                   </a:solidFill>
@@ -7408,7 +7317,7 @@
             <p:cNvPr id="98" name="直線單箭頭接點 97">
               <a:extLst>
                 <a:ext uri="{FF2B5EF4-FFF2-40B4-BE49-F238E27FC236}">
-                  <a16:creationId xmlns:a16="http://schemas.microsoft.com/office/drawing/2014/main" xmlns="" id="{A2924F2B-BAF2-4F69-9B2F-0226FD0A1410}"/>
+                  <a16:creationId xmlns:a16="http://schemas.microsoft.com/office/drawing/2014/main" id="{A2924F2B-BAF2-4F69-9B2F-0226FD0A1410}"/>
                 </a:ext>
               </a:extLst>
             </p:cNvPr>
@@ -7454,7 +7363,7 @@
             <p:cNvPr id="105" name="矩形 104">
               <a:extLst>
                 <a:ext uri="{FF2B5EF4-FFF2-40B4-BE49-F238E27FC236}">
-                  <a16:creationId xmlns:a16="http://schemas.microsoft.com/office/drawing/2014/main" xmlns="" id="{54121B23-9C6A-46DE-927F-49CFDF8596E2}"/>
+                  <a16:creationId xmlns:a16="http://schemas.microsoft.com/office/drawing/2014/main" id="{54121B23-9C6A-46DE-927F-49CFDF8596E2}"/>
                 </a:ext>
               </a:extLst>
             </p:cNvPr>
@@ -7498,28 +7407,12 @@
             <a:p>
               <a:pPr algn="ctr"/>
               <a:r>
-                <a:rPr lang="en-US" altLang="zh-TW" sz="1000" dirty="0" smtClean="0">
-                  <a:solidFill>
-                    <a:schemeClr val="tx1"/>
-                  </a:solidFill>
-                </a:rPr>
-                <a:t>Draw </a:t>
-              </a:r>
-              <a:r>
                 <a:rPr lang="en-US" altLang="zh-TW" sz="1000" dirty="0">
                   <a:solidFill>
                     <a:schemeClr val="tx1"/>
                   </a:solidFill>
                 </a:rPr>
-                <a:t>this object with its shadow </a:t>
-              </a:r>
-              <a:r>
-                <a:rPr lang="en-US" altLang="zh-TW" sz="1000" dirty="0" smtClean="0">
-                  <a:solidFill>
-                    <a:schemeClr val="tx1"/>
-                  </a:solidFill>
-                </a:rPr>
-                <a:t>material.</a:t>
+                <a:t>Draw this object with its shadow material.</a:t>
               </a:r>
               <a:endParaRPr lang="zh-TW" altLang="en-US" sz="1000" dirty="0">
                 <a:solidFill>
@@ -7534,7 +7427,7 @@
             <p:cNvPr id="111" name="文字方塊 110">
               <a:extLst>
                 <a:ext uri="{FF2B5EF4-FFF2-40B4-BE49-F238E27FC236}">
-                  <a16:creationId xmlns:a16="http://schemas.microsoft.com/office/drawing/2014/main" xmlns="" id="{2342B696-3865-40C4-B984-6DA76D5977A0}"/>
+                  <a16:creationId xmlns:a16="http://schemas.microsoft.com/office/drawing/2014/main" id="{2342B696-3865-40C4-B984-6DA76D5977A0}"/>
                 </a:ext>
               </a:extLst>
             </p:cNvPr>
@@ -7558,7 +7451,7 @@
             <a:lstStyle/>
             <a:p>
               <a:r>
-                <a:rPr lang="en-US" altLang="zh-TW" sz="1000" dirty="0" smtClean="0"/>
+                <a:rPr lang="en-US" altLang="zh-TW" sz="1000" dirty="0"/>
                 <a:t>No</a:t>
               </a:r>
               <a:endParaRPr lang="zh-TW" altLang="en-US" sz="1000" dirty="0"/>
@@ -7570,7 +7463,7 @@
             <p:cNvPr id="112" name="直線單箭頭接點 111">
               <a:extLst>
                 <a:ext uri="{FF2B5EF4-FFF2-40B4-BE49-F238E27FC236}">
-                  <a16:creationId xmlns:a16="http://schemas.microsoft.com/office/drawing/2014/main" xmlns="" id="{A2924F2B-BAF2-4F69-9B2F-0226FD0A1410}"/>
+                  <a16:creationId xmlns:a16="http://schemas.microsoft.com/office/drawing/2014/main" id="{A2924F2B-BAF2-4F69-9B2F-0226FD0A1410}"/>
                 </a:ext>
               </a:extLst>
             </p:cNvPr>
@@ -7615,7 +7508,7 @@
             <p:cNvPr id="115" name="文字方塊 114">
               <a:extLst>
                 <a:ext uri="{FF2B5EF4-FFF2-40B4-BE49-F238E27FC236}">
-                  <a16:creationId xmlns:a16="http://schemas.microsoft.com/office/drawing/2014/main" xmlns="" id="{DE437A75-1F9F-46FC-8C5E-69D17EDE0291}"/>
+                  <a16:creationId xmlns:a16="http://schemas.microsoft.com/office/drawing/2014/main" id="{DE437A75-1F9F-46FC-8C5E-69D17EDE0291}"/>
                 </a:ext>
               </a:extLst>
             </p:cNvPr>
@@ -7639,7 +7532,7 @@
             <a:lstStyle/>
             <a:p>
               <a:r>
-                <a:rPr lang="en-US" altLang="zh-TW" sz="1000" dirty="0" smtClean="0"/>
+                <a:rPr lang="en-US" altLang="zh-TW" sz="1000" dirty="0"/>
                 <a:t>Yes</a:t>
               </a:r>
               <a:endParaRPr lang="zh-TW" altLang="en-US" sz="1000" dirty="0"/>
@@ -7651,7 +7544,7 @@
             <p:cNvPr id="116" name="菱形 115">
               <a:extLst>
                 <a:ext uri="{FF2B5EF4-FFF2-40B4-BE49-F238E27FC236}">
-                  <a16:creationId xmlns:a16="http://schemas.microsoft.com/office/drawing/2014/main" xmlns="" id="{36101DE4-A20A-480A-9A7F-6EAFAFEF8131}"/>
+                  <a16:creationId xmlns:a16="http://schemas.microsoft.com/office/drawing/2014/main" id="{36101DE4-A20A-480A-9A7F-6EAFAFEF8131}"/>
                 </a:ext>
               </a:extLst>
             </p:cNvPr>
@@ -7695,7 +7588,7 @@
             <a:p>
               <a:pPr algn="ctr"/>
               <a:r>
-                <a:rPr lang="en-US" altLang="zh-TW" sz="1000" dirty="0" smtClean="0">
+                <a:rPr lang="en-US" altLang="zh-TW" sz="1000" dirty="0">
                   <a:solidFill>
                     <a:schemeClr val="tx1"/>
                   </a:solidFill>
@@ -7715,7 +7608,7 @@
             <p:cNvPr id="117" name="直線單箭頭接點 116">
               <a:extLst>
                 <a:ext uri="{FF2B5EF4-FFF2-40B4-BE49-F238E27FC236}">
-                  <a16:creationId xmlns:a16="http://schemas.microsoft.com/office/drawing/2014/main" xmlns="" id="{A2924F2B-BAF2-4F69-9B2F-0226FD0A1410}"/>
+                  <a16:creationId xmlns:a16="http://schemas.microsoft.com/office/drawing/2014/main" id="{A2924F2B-BAF2-4F69-9B2F-0226FD0A1410}"/>
                 </a:ext>
               </a:extLst>
             </p:cNvPr>
@@ -7761,7 +7654,7 @@
             <p:cNvPr id="122" name="直線單箭頭接點 121">
               <a:extLst>
                 <a:ext uri="{FF2B5EF4-FFF2-40B4-BE49-F238E27FC236}">
-                  <a16:creationId xmlns:a16="http://schemas.microsoft.com/office/drawing/2014/main" xmlns="" id="{A2924F2B-BAF2-4F69-9B2F-0226FD0A1410}"/>
+                  <a16:creationId xmlns:a16="http://schemas.microsoft.com/office/drawing/2014/main" id="{A2924F2B-BAF2-4F69-9B2F-0226FD0A1410}"/>
                 </a:ext>
               </a:extLst>
             </p:cNvPr>
@@ -7807,7 +7700,7 @@
             <p:cNvPr id="125" name="文字方塊 124">
               <a:extLst>
                 <a:ext uri="{FF2B5EF4-FFF2-40B4-BE49-F238E27FC236}">
-                  <a16:creationId xmlns:a16="http://schemas.microsoft.com/office/drawing/2014/main" xmlns="" id="{2342B696-3865-40C4-B984-6DA76D5977A0}"/>
+                  <a16:creationId xmlns:a16="http://schemas.microsoft.com/office/drawing/2014/main" id="{2342B696-3865-40C4-B984-6DA76D5977A0}"/>
                 </a:ext>
               </a:extLst>
             </p:cNvPr>
@@ -7831,7 +7724,7 @@
             <a:lstStyle/>
             <a:p>
               <a:r>
-                <a:rPr lang="en-US" altLang="zh-TW" sz="1000" dirty="0" smtClean="0"/>
+                <a:rPr lang="en-US" altLang="zh-TW" sz="1000" dirty="0"/>
                 <a:t>Yes</a:t>
               </a:r>
               <a:endParaRPr lang="zh-TW" altLang="en-US" sz="1000" dirty="0"/>
@@ -7843,7 +7736,7 @@
             <p:cNvPr id="127" name="接點: 肘形 59">
               <a:extLst>
                 <a:ext uri="{FF2B5EF4-FFF2-40B4-BE49-F238E27FC236}">
-                  <a16:creationId xmlns:a16="http://schemas.microsoft.com/office/drawing/2014/main" xmlns="" id="{9D06D988-AC0B-471F-9ACB-7C07D21D0697}"/>
+                  <a16:creationId xmlns:a16="http://schemas.microsoft.com/office/drawing/2014/main" id="{9D06D988-AC0B-471F-9ACB-7C07D21D0697}"/>
                 </a:ext>
               </a:extLst>
             </p:cNvPr>
@@ -7891,7 +7784,7 @@
             <p:cNvPr id="130" name="文字方塊 129">
               <a:extLst>
                 <a:ext uri="{FF2B5EF4-FFF2-40B4-BE49-F238E27FC236}">
-                  <a16:creationId xmlns:a16="http://schemas.microsoft.com/office/drawing/2014/main" xmlns="" id="{2342B696-3865-40C4-B984-6DA76D5977A0}"/>
+                  <a16:creationId xmlns:a16="http://schemas.microsoft.com/office/drawing/2014/main" id="{2342B696-3865-40C4-B984-6DA76D5977A0}"/>
                 </a:ext>
               </a:extLst>
             </p:cNvPr>
@@ -7915,7 +7808,7 @@
             <a:lstStyle/>
             <a:p>
               <a:r>
-                <a:rPr lang="en-US" altLang="zh-TW" sz="1000" dirty="0" smtClean="0"/>
+                <a:rPr lang="en-US" altLang="zh-TW" sz="1000" dirty="0"/>
                 <a:t>No</a:t>
               </a:r>
               <a:endParaRPr lang="zh-TW" altLang="en-US" sz="1000" dirty="0"/>
@@ -7933,13 +7826,1319 @@
   <p:clrMapOvr>
     <a:masterClrMapping/>
   </p:clrMapOvr>
-  <p:timing>
-    <p:tnLst>
-      <p:par>
-        <p:cTn id="1" dur="indefinite" restart="never" nodeType="tmRoot"/>
-      </p:par>
-    </p:tnLst>
-  </p:timing>
+</p:sld>
+</file>
+
+<file path=ppt/slides/slide4.xml><?xml version="1.0" encoding="utf-8"?>
+<p:sld xmlns:a="http://schemas.openxmlformats.org/drawingml/2006/main" xmlns:r="http://schemas.openxmlformats.org/officeDocument/2006/relationships" xmlns:p="http://schemas.openxmlformats.org/presentationml/2006/main">
+  <p:cSld>
+    <p:spTree>
+      <p:nvGrpSpPr>
+        <p:cNvPr id="1" name=""/>
+        <p:cNvGrpSpPr/>
+        <p:nvPr/>
+      </p:nvGrpSpPr>
+      <p:grpSpPr>
+        <a:xfrm>
+          <a:off x="0" y="0"/>
+          <a:ext cx="0" cy="0"/>
+          <a:chOff x="0" y="0"/>
+          <a:chExt cx="0" cy="0"/>
+        </a:xfrm>
+      </p:grpSpPr>
+      <p:sp>
+        <p:nvSpPr>
+          <p:cNvPr id="4" name="標題 1">
+            <a:extLst>
+              <a:ext uri="{FF2B5EF4-FFF2-40B4-BE49-F238E27FC236}">
+                <a16:creationId xmlns:a16="http://schemas.microsoft.com/office/drawing/2014/main" id="{09C70412-D534-4844-B24D-75EACF2DBD10}"/>
+              </a:ext>
+            </a:extLst>
+          </p:cNvPr>
+          <p:cNvSpPr>
+            <a:spLocks noGrp="1"/>
+          </p:cNvSpPr>
+          <p:nvPr>
+            <p:ph type="title"/>
+          </p:nvPr>
+        </p:nvSpPr>
+        <p:spPr>
+          <a:xfrm>
+            <a:off x="838200" y="187572"/>
+            <a:ext cx="10515600" cy="229679"/>
+          </a:xfrm>
+        </p:spPr>
+        <p:txBody>
+          <a:bodyPr>
+            <a:noAutofit/>
+          </a:bodyPr>
+          <a:lstStyle/>
+          <a:p>
+            <a:pPr algn="ctr"/>
+            <a:r>
+              <a:rPr lang="en-US" altLang="zh-TW" sz="2000" dirty="0"/>
+              <a:t>2. </a:t>
+            </a:r>
+            <a:r>
+              <a:rPr lang="en-US" altLang="zh-TW" sz="2000" dirty="0" err="1"/>
+              <a:t>RenderFlow</a:t>
+            </a:r>
+            <a:endParaRPr lang="zh-TW" altLang="en-US" sz="2000" dirty="0"/>
+          </a:p>
+        </p:txBody>
+      </p:sp>
+      <p:sp>
+        <p:nvSpPr>
+          <p:cNvPr id="5" name="矩形 4">
+            <a:extLst>
+              <a:ext uri="{FF2B5EF4-FFF2-40B4-BE49-F238E27FC236}">
+                <a16:creationId xmlns:a16="http://schemas.microsoft.com/office/drawing/2014/main" id="{EB3214F5-AE3E-4953-8631-726AC1736300}"/>
+              </a:ext>
+            </a:extLst>
+          </p:cNvPr>
+          <p:cNvSpPr/>
+          <p:nvPr/>
+        </p:nvSpPr>
+        <p:spPr>
+          <a:xfrm>
+            <a:off x="6661122" y="696101"/>
+            <a:ext cx="4607241" cy="929497"/>
+          </a:xfrm>
+          <a:prstGeom prst="rect">
+            <a:avLst/>
+          </a:prstGeom>
+          <a:ln w="38100"/>
+        </p:spPr>
+        <p:style>
+          <a:lnRef idx="2">
+            <a:schemeClr val="dk1"/>
+          </a:lnRef>
+          <a:fillRef idx="1">
+            <a:schemeClr val="lt1"/>
+          </a:fillRef>
+          <a:effectRef idx="0">
+            <a:schemeClr val="dk1"/>
+          </a:effectRef>
+          <a:fontRef idx="minor">
+            <a:schemeClr val="dk1"/>
+          </a:fontRef>
+        </p:style>
+        <p:txBody>
+          <a:bodyPr rtlCol="0" anchor="ctr"/>
+          <a:lstStyle/>
+          <a:p>
+            <a:pPr algn="ctr"/>
+            <a:endParaRPr lang="zh-TW" altLang="en-US" dirty="0"/>
+          </a:p>
+        </p:txBody>
+      </p:sp>
+      <p:sp>
+        <p:nvSpPr>
+          <p:cNvPr id="6" name="文字方塊 5">
+            <a:extLst>
+              <a:ext uri="{FF2B5EF4-FFF2-40B4-BE49-F238E27FC236}">
+                <a16:creationId xmlns:a16="http://schemas.microsoft.com/office/drawing/2014/main" id="{89640EE8-5B60-448B-95BD-4CEF3C77A3C3}"/>
+              </a:ext>
+            </a:extLst>
+          </p:cNvPr>
+          <p:cNvSpPr txBox="1"/>
+          <p:nvPr/>
+        </p:nvSpPr>
+        <p:spPr>
+          <a:xfrm>
+            <a:off x="8357026" y="695693"/>
+            <a:ext cx="1339272" cy="338554"/>
+          </a:xfrm>
+          <a:prstGeom prst="rect">
+            <a:avLst/>
+          </a:prstGeom>
+          <a:noFill/>
+        </p:spPr>
+        <p:txBody>
+          <a:bodyPr wrap="square" rtlCol="0">
+            <a:spAutoFit/>
+          </a:bodyPr>
+          <a:lstStyle/>
+          <a:p>
+            <a:r>
+              <a:rPr lang="en-US" altLang="zh-TW" sz="1600" dirty="0"/>
+              <a:t>Render</a:t>
+            </a:r>
+            <a:r>
+              <a:rPr lang="zh-TW" altLang="en-US" sz="1600" dirty="0"/>
+              <a:t> </a:t>
+            </a:r>
+            <a:r>
+              <a:rPr lang="en-US" altLang="zh-TW" sz="1600" dirty="0"/>
+              <a:t>Pass</a:t>
+            </a:r>
+            <a:endParaRPr lang="zh-TW" altLang="en-US" sz="1600" dirty="0"/>
+          </a:p>
+        </p:txBody>
+      </p:sp>
+      <p:cxnSp>
+        <p:nvCxnSpPr>
+          <p:cNvPr id="8" name="直線單箭頭接點 7">
+            <a:extLst>
+              <a:ext uri="{FF2B5EF4-FFF2-40B4-BE49-F238E27FC236}">
+                <a16:creationId xmlns:a16="http://schemas.microsoft.com/office/drawing/2014/main" id="{85E31300-D6FF-4B42-8D45-221D97E6C56D}"/>
+              </a:ext>
+            </a:extLst>
+          </p:cNvPr>
+          <p:cNvCxnSpPr>
+            <a:cxnSpLocks/>
+            <a:stCxn id="5" idx="2"/>
+            <a:endCxn id="15" idx="0"/>
+          </p:cNvCxnSpPr>
+          <p:nvPr/>
+        </p:nvCxnSpPr>
+        <p:spPr>
+          <a:xfrm>
+            <a:off x="8964743" y="1625598"/>
+            <a:ext cx="1463111" cy="1182702"/>
+          </a:xfrm>
+          <a:prstGeom prst="straightConnector1">
+            <a:avLst/>
+          </a:prstGeom>
+          <a:ln w="38100">
+            <a:solidFill>
+              <a:schemeClr val="tx1"/>
+            </a:solidFill>
+            <a:tailEnd type="triangle"/>
+          </a:ln>
+        </p:spPr>
+        <p:style>
+          <a:lnRef idx="1">
+            <a:schemeClr val="accent1"/>
+          </a:lnRef>
+          <a:fillRef idx="0">
+            <a:schemeClr val="accent1"/>
+          </a:fillRef>
+          <a:effectRef idx="0">
+            <a:schemeClr val="accent1"/>
+          </a:effectRef>
+          <a:fontRef idx="minor">
+            <a:schemeClr val="tx1"/>
+          </a:fontRef>
+        </p:style>
+      </p:cxnSp>
+      <p:sp>
+        <p:nvSpPr>
+          <p:cNvPr id="11" name="文字方塊 10">
+            <a:extLst>
+              <a:ext uri="{FF2B5EF4-FFF2-40B4-BE49-F238E27FC236}">
+                <a16:creationId xmlns:a16="http://schemas.microsoft.com/office/drawing/2014/main" id="{496993C6-C425-4FEC-98D5-330DCFCBBF9A}"/>
+              </a:ext>
+            </a:extLst>
+          </p:cNvPr>
+          <p:cNvSpPr txBox="1"/>
+          <p:nvPr/>
+        </p:nvSpPr>
+        <p:spPr>
+          <a:xfrm>
+            <a:off x="6677892" y="1010134"/>
+            <a:ext cx="4590471" cy="600164"/>
+          </a:xfrm>
+          <a:prstGeom prst="rect">
+            <a:avLst/>
+          </a:prstGeom>
+          <a:noFill/>
+        </p:spPr>
+        <p:txBody>
+          <a:bodyPr wrap="square" rtlCol="0">
+            <a:spAutoFit/>
+          </a:bodyPr>
+          <a:lstStyle/>
+          <a:p>
+            <a:r>
+              <a:rPr lang="en-US" altLang="zh-TW" sz="1100" dirty="0"/>
+              <a:t>1. Describe how many attachments and their </a:t>
+            </a:r>
+            <a:r>
+              <a:rPr lang="en-US" altLang="zh-TW" sz="1100" dirty="0" err="1"/>
+              <a:t>infos</a:t>
+            </a:r>
+            <a:r>
+              <a:rPr lang="en-US" altLang="zh-TW" sz="1100" dirty="0"/>
+              <a:t>(attachment kind).</a:t>
+            </a:r>
+          </a:p>
+          <a:p>
+            <a:r>
+              <a:rPr lang="en-US" altLang="zh-TW" sz="1100" dirty="0"/>
+              <a:t>2. </a:t>
+            </a:r>
+            <a:r>
+              <a:rPr lang="en-US" altLang="zh-TW" sz="1100" dirty="0" err="1"/>
+              <a:t>Descirbe</a:t>
+            </a:r>
+            <a:r>
+              <a:rPr lang="en-US" altLang="zh-TW" sz="1100" dirty="0"/>
+              <a:t> how many steps in this render pass.</a:t>
+            </a:r>
+          </a:p>
+          <a:p>
+            <a:r>
+              <a:rPr lang="en-US" altLang="zh-TW" sz="1100" dirty="0"/>
+              <a:t>3. Will be register to  class </a:t>
+            </a:r>
+            <a:r>
+              <a:rPr lang="en-US" altLang="zh-TW" sz="1100" dirty="0" err="1"/>
+              <a:t>RenderFlow</a:t>
+            </a:r>
+            <a:r>
+              <a:rPr lang="en-US" altLang="zh-TW" sz="1100" dirty="0"/>
+              <a:t> for pairing with </a:t>
+            </a:r>
+            <a:r>
+              <a:rPr lang="en-US" altLang="zh-TW" sz="1100" dirty="0" err="1"/>
+              <a:t>FrameBufferGroup</a:t>
+            </a:r>
+            <a:r>
+              <a:rPr lang="en-US" altLang="zh-TW" sz="1100" dirty="0"/>
+              <a:t>.</a:t>
+            </a:r>
+          </a:p>
+        </p:txBody>
+      </p:sp>
+      <p:sp>
+        <p:nvSpPr>
+          <p:cNvPr id="15" name="矩形 14">
+            <a:extLst>
+              <a:ext uri="{FF2B5EF4-FFF2-40B4-BE49-F238E27FC236}">
+                <a16:creationId xmlns:a16="http://schemas.microsoft.com/office/drawing/2014/main" id="{B678375D-0130-4F96-A07F-686646D59ABB}"/>
+              </a:ext>
+            </a:extLst>
+          </p:cNvPr>
+          <p:cNvSpPr/>
+          <p:nvPr/>
+        </p:nvSpPr>
+        <p:spPr>
+          <a:xfrm>
+            <a:off x="8802254" y="2808300"/>
+            <a:ext cx="3251200" cy="683046"/>
+          </a:xfrm>
+          <a:prstGeom prst="rect">
+            <a:avLst/>
+          </a:prstGeom>
+          <a:ln w="25400"/>
+        </p:spPr>
+        <p:style>
+          <a:lnRef idx="2">
+            <a:schemeClr val="dk1"/>
+          </a:lnRef>
+          <a:fillRef idx="1">
+            <a:schemeClr val="lt1"/>
+          </a:fillRef>
+          <a:effectRef idx="0">
+            <a:schemeClr val="dk1"/>
+          </a:effectRef>
+          <a:fontRef idx="minor">
+            <a:schemeClr val="dk1"/>
+          </a:fontRef>
+        </p:style>
+        <p:txBody>
+          <a:bodyPr rtlCol="0" anchor="ctr"/>
+          <a:lstStyle/>
+          <a:p>
+            <a:pPr algn="ctr"/>
+            <a:endParaRPr lang="zh-TW" altLang="en-US" dirty="0"/>
+          </a:p>
+        </p:txBody>
+      </p:sp>
+      <p:sp>
+        <p:nvSpPr>
+          <p:cNvPr id="17" name="文字方塊 16">
+            <a:extLst>
+              <a:ext uri="{FF2B5EF4-FFF2-40B4-BE49-F238E27FC236}">
+                <a16:creationId xmlns:a16="http://schemas.microsoft.com/office/drawing/2014/main" id="{4001B418-C9D9-4149-9DE1-1B59F07CB23F}"/>
+              </a:ext>
+            </a:extLst>
+          </p:cNvPr>
+          <p:cNvSpPr txBox="1"/>
+          <p:nvPr/>
+        </p:nvSpPr>
+        <p:spPr>
+          <a:xfrm>
+            <a:off x="9662939" y="2770111"/>
+            <a:ext cx="1703258" cy="307777"/>
+          </a:xfrm>
+          <a:prstGeom prst="rect">
+            <a:avLst/>
+          </a:prstGeom>
+          <a:noFill/>
+        </p:spPr>
+        <p:txBody>
+          <a:bodyPr wrap="square" rtlCol="0">
+            <a:spAutoFit/>
+          </a:bodyPr>
+          <a:lstStyle/>
+          <a:p>
+            <a:r>
+              <a:rPr lang="en-US" altLang="zh-TW" sz="1400" dirty="0" err="1"/>
+              <a:t>Subpass</a:t>
+            </a:r>
+            <a:r>
+              <a:rPr lang="en-US" altLang="zh-TW" sz="1400" dirty="0"/>
+              <a:t> Description</a:t>
+            </a:r>
+            <a:endParaRPr lang="zh-TW" altLang="en-US" sz="1400" dirty="0"/>
+          </a:p>
+        </p:txBody>
+      </p:sp>
+      <p:sp>
+        <p:nvSpPr>
+          <p:cNvPr id="18" name="文字方塊 17">
+            <a:extLst>
+              <a:ext uri="{FF2B5EF4-FFF2-40B4-BE49-F238E27FC236}">
+                <a16:creationId xmlns:a16="http://schemas.microsoft.com/office/drawing/2014/main" id="{0FA47ABA-FCA5-4199-A757-1527F48EF641}"/>
+              </a:ext>
+            </a:extLst>
+          </p:cNvPr>
+          <p:cNvSpPr txBox="1"/>
+          <p:nvPr/>
+        </p:nvSpPr>
+        <p:spPr>
+          <a:xfrm>
+            <a:off x="8802254" y="2986010"/>
+            <a:ext cx="3251200" cy="261610"/>
+          </a:xfrm>
+          <a:prstGeom prst="rect">
+            <a:avLst/>
+          </a:prstGeom>
+          <a:noFill/>
+        </p:spPr>
+        <p:txBody>
+          <a:bodyPr wrap="square" rtlCol="0">
+            <a:spAutoFit/>
+          </a:bodyPr>
+          <a:lstStyle/>
+          <a:p>
+            <a:r>
+              <a:rPr lang="en-US" altLang="zh-TW" sz="1100" dirty="0"/>
+              <a:t>1. Description which attachments we will use.</a:t>
+            </a:r>
+          </a:p>
+        </p:txBody>
+      </p:sp>
+      <p:cxnSp>
+        <p:nvCxnSpPr>
+          <p:cNvPr id="22" name="直線單箭頭接點 21">
+            <a:extLst>
+              <a:ext uri="{FF2B5EF4-FFF2-40B4-BE49-F238E27FC236}">
+                <a16:creationId xmlns:a16="http://schemas.microsoft.com/office/drawing/2014/main" id="{B9C8A940-F8F4-4558-BC90-DB01A5A4632B}"/>
+              </a:ext>
+            </a:extLst>
+          </p:cNvPr>
+          <p:cNvCxnSpPr>
+            <a:cxnSpLocks/>
+            <a:stCxn id="5" idx="2"/>
+            <a:endCxn id="27" idx="0"/>
+          </p:cNvCxnSpPr>
+          <p:nvPr/>
+        </p:nvCxnSpPr>
+        <p:spPr>
+          <a:xfrm flipH="1">
+            <a:off x="8395853" y="1625598"/>
+            <a:ext cx="568890" cy="2233269"/>
+          </a:xfrm>
+          <a:prstGeom prst="straightConnector1">
+            <a:avLst/>
+          </a:prstGeom>
+          <a:ln w="38100">
+            <a:solidFill>
+              <a:schemeClr val="tx1"/>
+            </a:solidFill>
+            <a:tailEnd type="triangle"/>
+          </a:ln>
+        </p:spPr>
+        <p:style>
+          <a:lnRef idx="1">
+            <a:schemeClr val="accent1"/>
+          </a:lnRef>
+          <a:fillRef idx="0">
+            <a:schemeClr val="accent1"/>
+          </a:fillRef>
+          <a:effectRef idx="0">
+            <a:schemeClr val="accent1"/>
+          </a:effectRef>
+          <a:fontRef idx="minor">
+            <a:schemeClr val="tx1"/>
+          </a:fontRef>
+        </p:style>
+      </p:cxnSp>
+      <p:sp>
+        <p:nvSpPr>
+          <p:cNvPr id="27" name="矩形 26">
+            <a:extLst>
+              <a:ext uri="{FF2B5EF4-FFF2-40B4-BE49-F238E27FC236}">
+                <a16:creationId xmlns:a16="http://schemas.microsoft.com/office/drawing/2014/main" id="{A3B48F00-BE89-4DA0-9FC8-D77BFDD86BC0}"/>
+              </a:ext>
+            </a:extLst>
+          </p:cNvPr>
+          <p:cNvSpPr/>
+          <p:nvPr/>
+        </p:nvSpPr>
+        <p:spPr>
+          <a:xfrm>
+            <a:off x="6770253" y="3858867"/>
+            <a:ext cx="3251200" cy="683046"/>
+          </a:xfrm>
+          <a:prstGeom prst="rect">
+            <a:avLst/>
+          </a:prstGeom>
+          <a:ln w="25400"/>
+        </p:spPr>
+        <p:style>
+          <a:lnRef idx="2">
+            <a:schemeClr val="dk1"/>
+          </a:lnRef>
+          <a:fillRef idx="1">
+            <a:schemeClr val="lt1"/>
+          </a:fillRef>
+          <a:effectRef idx="0">
+            <a:schemeClr val="dk1"/>
+          </a:effectRef>
+          <a:fontRef idx="minor">
+            <a:schemeClr val="dk1"/>
+          </a:fontRef>
+        </p:style>
+        <p:txBody>
+          <a:bodyPr rtlCol="0" anchor="ctr"/>
+          <a:lstStyle/>
+          <a:p>
+            <a:pPr algn="ctr"/>
+            <a:endParaRPr lang="zh-TW" altLang="en-US" dirty="0"/>
+          </a:p>
+        </p:txBody>
+      </p:sp>
+      <p:sp>
+        <p:nvSpPr>
+          <p:cNvPr id="30" name="文字方塊 29">
+            <a:extLst>
+              <a:ext uri="{FF2B5EF4-FFF2-40B4-BE49-F238E27FC236}">
+                <a16:creationId xmlns:a16="http://schemas.microsoft.com/office/drawing/2014/main" id="{51AB9ACD-149B-42C2-BC9A-E0AFC215DDC5}"/>
+              </a:ext>
+            </a:extLst>
+          </p:cNvPr>
+          <p:cNvSpPr txBox="1"/>
+          <p:nvPr/>
+        </p:nvSpPr>
+        <p:spPr>
+          <a:xfrm>
+            <a:off x="7432231" y="3820678"/>
+            <a:ext cx="1927244" cy="307777"/>
+          </a:xfrm>
+          <a:prstGeom prst="rect">
+            <a:avLst/>
+          </a:prstGeom>
+          <a:noFill/>
+        </p:spPr>
+        <p:txBody>
+          <a:bodyPr wrap="square" rtlCol="0">
+            <a:spAutoFit/>
+          </a:bodyPr>
+          <a:lstStyle/>
+          <a:p>
+            <a:r>
+              <a:rPr lang="en-US" altLang="zh-TW" sz="1400" dirty="0"/>
+              <a:t>Attachment Description</a:t>
+            </a:r>
+            <a:endParaRPr lang="zh-TW" altLang="en-US" sz="1400" dirty="0"/>
+          </a:p>
+        </p:txBody>
+      </p:sp>
+      <p:sp>
+        <p:nvSpPr>
+          <p:cNvPr id="31" name="文字方塊 30">
+            <a:extLst>
+              <a:ext uri="{FF2B5EF4-FFF2-40B4-BE49-F238E27FC236}">
+                <a16:creationId xmlns:a16="http://schemas.microsoft.com/office/drawing/2014/main" id="{91080E07-BDF8-4FB8-B17A-E582F81CB8FF}"/>
+              </a:ext>
+            </a:extLst>
+          </p:cNvPr>
+          <p:cNvSpPr txBox="1"/>
+          <p:nvPr/>
+        </p:nvSpPr>
+        <p:spPr>
+          <a:xfrm>
+            <a:off x="6770252" y="4079410"/>
+            <a:ext cx="3251199" cy="261610"/>
+          </a:xfrm>
+          <a:prstGeom prst="rect">
+            <a:avLst/>
+          </a:prstGeom>
+          <a:noFill/>
+        </p:spPr>
+        <p:txBody>
+          <a:bodyPr wrap="square" rtlCol="0">
+            <a:spAutoFit/>
+          </a:bodyPr>
+          <a:lstStyle/>
+          <a:p>
+            <a:r>
+              <a:rPr lang="en-US" altLang="zh-TW" sz="1100" dirty="0"/>
+              <a:t>1. Description attachment information.</a:t>
+            </a:r>
+          </a:p>
+        </p:txBody>
+      </p:sp>
+      <p:sp>
+        <p:nvSpPr>
+          <p:cNvPr id="34" name="文字方塊 33">
+            <a:extLst>
+              <a:ext uri="{FF2B5EF4-FFF2-40B4-BE49-F238E27FC236}">
+                <a16:creationId xmlns:a16="http://schemas.microsoft.com/office/drawing/2014/main" id="{DFE60182-10BA-4D1D-9907-CB4B989CFCF6}"/>
+              </a:ext>
+            </a:extLst>
+          </p:cNvPr>
+          <p:cNvSpPr txBox="1"/>
+          <p:nvPr/>
+        </p:nvSpPr>
+        <p:spPr>
+          <a:xfrm>
+            <a:off x="8540812" y="2150915"/>
+            <a:ext cx="526472" cy="246221"/>
+          </a:xfrm>
+          <a:prstGeom prst="rect">
+            <a:avLst/>
+          </a:prstGeom>
+          <a:noFill/>
+        </p:spPr>
+        <p:txBody>
+          <a:bodyPr wrap="square" rtlCol="0">
+            <a:spAutoFit/>
+          </a:bodyPr>
+          <a:lstStyle/>
+          <a:p>
+            <a:r>
+              <a:rPr lang="en-US" altLang="zh-TW" sz="1000" dirty="0"/>
+              <a:t>1 …. n</a:t>
+            </a:r>
+            <a:endParaRPr lang="zh-TW" altLang="en-US" sz="1000" dirty="0"/>
+          </a:p>
+        </p:txBody>
+      </p:sp>
+      <p:sp>
+        <p:nvSpPr>
+          <p:cNvPr id="35" name="文字方塊 34">
+            <a:extLst>
+              <a:ext uri="{FF2B5EF4-FFF2-40B4-BE49-F238E27FC236}">
+                <a16:creationId xmlns:a16="http://schemas.microsoft.com/office/drawing/2014/main" id="{F601148C-8733-4142-82BE-E528538FAE58}"/>
+              </a:ext>
+            </a:extLst>
+          </p:cNvPr>
+          <p:cNvSpPr txBox="1"/>
+          <p:nvPr/>
+        </p:nvSpPr>
+        <p:spPr>
+          <a:xfrm>
+            <a:off x="9558517" y="2172542"/>
+            <a:ext cx="526472" cy="246221"/>
+          </a:xfrm>
+          <a:prstGeom prst="rect">
+            <a:avLst/>
+          </a:prstGeom>
+          <a:noFill/>
+        </p:spPr>
+        <p:txBody>
+          <a:bodyPr wrap="square" rtlCol="0">
+            <a:spAutoFit/>
+          </a:bodyPr>
+          <a:lstStyle/>
+          <a:p>
+            <a:r>
+              <a:rPr lang="en-US" altLang="zh-TW" sz="1000" dirty="0"/>
+              <a:t>1 …. n</a:t>
+            </a:r>
+            <a:endParaRPr lang="zh-TW" altLang="en-US" sz="1000" dirty="0"/>
+          </a:p>
+        </p:txBody>
+      </p:sp>
+      <p:sp>
+        <p:nvSpPr>
+          <p:cNvPr id="38" name="矩形 37">
+            <a:extLst>
+              <a:ext uri="{FF2B5EF4-FFF2-40B4-BE49-F238E27FC236}">
+                <a16:creationId xmlns:a16="http://schemas.microsoft.com/office/drawing/2014/main" id="{680E2A2C-C9F8-435F-829B-F5E3B0E91164}"/>
+              </a:ext>
+            </a:extLst>
+          </p:cNvPr>
+          <p:cNvSpPr/>
+          <p:nvPr/>
+        </p:nvSpPr>
+        <p:spPr>
+          <a:xfrm>
+            <a:off x="154104" y="1707793"/>
+            <a:ext cx="4607241" cy="761689"/>
+          </a:xfrm>
+          <a:prstGeom prst="rect">
+            <a:avLst/>
+          </a:prstGeom>
+          <a:ln w="38100"/>
+        </p:spPr>
+        <p:style>
+          <a:lnRef idx="2">
+            <a:schemeClr val="dk1"/>
+          </a:lnRef>
+          <a:fillRef idx="1">
+            <a:schemeClr val="lt1"/>
+          </a:fillRef>
+          <a:effectRef idx="0">
+            <a:schemeClr val="dk1"/>
+          </a:effectRef>
+          <a:fontRef idx="minor">
+            <a:schemeClr val="dk1"/>
+          </a:fontRef>
+        </p:style>
+        <p:txBody>
+          <a:bodyPr rtlCol="0" anchor="ctr"/>
+          <a:lstStyle/>
+          <a:p>
+            <a:pPr algn="ctr"/>
+            <a:endParaRPr lang="zh-TW" altLang="en-US" dirty="0"/>
+          </a:p>
+        </p:txBody>
+      </p:sp>
+      <p:sp>
+        <p:nvSpPr>
+          <p:cNvPr id="39" name="文字方塊 38">
+            <a:extLst>
+              <a:ext uri="{FF2B5EF4-FFF2-40B4-BE49-F238E27FC236}">
+                <a16:creationId xmlns:a16="http://schemas.microsoft.com/office/drawing/2014/main" id="{A336D37F-B1A8-41CC-86C0-93425A0BE140}"/>
+              </a:ext>
+            </a:extLst>
+          </p:cNvPr>
+          <p:cNvSpPr txBox="1"/>
+          <p:nvPr/>
+        </p:nvSpPr>
+        <p:spPr>
+          <a:xfrm>
+            <a:off x="1764146" y="1720200"/>
+            <a:ext cx="1436254" cy="369332"/>
+          </a:xfrm>
+          <a:prstGeom prst="rect">
+            <a:avLst/>
+          </a:prstGeom>
+          <a:noFill/>
+        </p:spPr>
+        <p:txBody>
+          <a:bodyPr wrap="square" rtlCol="0">
+            <a:spAutoFit/>
+          </a:bodyPr>
+          <a:lstStyle/>
+          <a:p>
+            <a:r>
+              <a:rPr lang="en-US" altLang="zh-TW" dirty="0"/>
+              <a:t>Render</a:t>
+            </a:r>
+            <a:r>
+              <a:rPr lang="zh-TW" altLang="en-US" dirty="0"/>
+              <a:t> </a:t>
+            </a:r>
+            <a:r>
+              <a:rPr lang="en-US" altLang="zh-TW" dirty="0"/>
+              <a:t>Flow</a:t>
+            </a:r>
+            <a:endParaRPr lang="zh-TW" altLang="en-US" dirty="0"/>
+          </a:p>
+        </p:txBody>
+      </p:sp>
+      <p:sp>
+        <p:nvSpPr>
+          <p:cNvPr id="40" name="文字方塊 39">
+            <a:extLst>
+              <a:ext uri="{FF2B5EF4-FFF2-40B4-BE49-F238E27FC236}">
+                <a16:creationId xmlns:a16="http://schemas.microsoft.com/office/drawing/2014/main" id="{6E71C174-69B5-47D1-8227-ADCD752ED91F}"/>
+              </a:ext>
+            </a:extLst>
+          </p:cNvPr>
+          <p:cNvSpPr txBox="1"/>
+          <p:nvPr/>
+        </p:nvSpPr>
+        <p:spPr>
+          <a:xfrm>
+            <a:off x="154104" y="2038595"/>
+            <a:ext cx="4590471" cy="430887"/>
+          </a:xfrm>
+          <a:prstGeom prst="rect">
+            <a:avLst/>
+          </a:prstGeom>
+          <a:noFill/>
+        </p:spPr>
+        <p:txBody>
+          <a:bodyPr wrap="square" rtlCol="0">
+            <a:spAutoFit/>
+          </a:bodyPr>
+          <a:lstStyle/>
+          <a:p>
+            <a:r>
+              <a:rPr lang="en-US" altLang="zh-TW" sz="1100" dirty="0"/>
+              <a:t>1. Used to render step by step.</a:t>
+            </a:r>
+          </a:p>
+          <a:p>
+            <a:r>
+              <a:rPr lang="en-US" altLang="zh-TW" sz="1100" dirty="0"/>
+              <a:t>2. Create </a:t>
+            </a:r>
+            <a:r>
+              <a:rPr lang="en-US" altLang="zh-TW" sz="1100" dirty="0" err="1"/>
+              <a:t>FrameBufferGroup</a:t>
+            </a:r>
+            <a:r>
+              <a:rPr lang="en-US" altLang="zh-TW" sz="1100" dirty="0"/>
+              <a:t> after </a:t>
+            </a:r>
+            <a:r>
+              <a:rPr lang="en-US" altLang="zh-TW" sz="1100" dirty="0" err="1"/>
+              <a:t>RenderPass</a:t>
+            </a:r>
+            <a:r>
+              <a:rPr lang="en-US" altLang="zh-TW" sz="1100" dirty="0"/>
+              <a:t> registered.</a:t>
+            </a:r>
+          </a:p>
+        </p:txBody>
+      </p:sp>
+      <p:cxnSp>
+        <p:nvCxnSpPr>
+          <p:cNvPr id="41" name="直線單箭頭接點 40">
+            <a:extLst>
+              <a:ext uri="{FF2B5EF4-FFF2-40B4-BE49-F238E27FC236}">
+                <a16:creationId xmlns:a16="http://schemas.microsoft.com/office/drawing/2014/main" id="{2E67C30F-97F2-4974-97C3-9FA91A2FDDD9}"/>
+              </a:ext>
+            </a:extLst>
+          </p:cNvPr>
+          <p:cNvCxnSpPr>
+            <a:cxnSpLocks/>
+            <a:endCxn id="5" idx="1"/>
+          </p:cNvCxnSpPr>
+          <p:nvPr/>
+        </p:nvCxnSpPr>
+        <p:spPr>
+          <a:xfrm flipV="1">
+            <a:off x="4761345" y="1160850"/>
+            <a:ext cx="1899777" cy="990066"/>
+          </a:xfrm>
+          <a:prstGeom prst="straightConnector1">
+            <a:avLst/>
+          </a:prstGeom>
+          <a:ln w="38100">
+            <a:solidFill>
+              <a:schemeClr val="tx1"/>
+            </a:solidFill>
+            <a:tailEnd type="triangle"/>
+          </a:ln>
+        </p:spPr>
+        <p:style>
+          <a:lnRef idx="1">
+            <a:schemeClr val="accent1"/>
+          </a:lnRef>
+          <a:fillRef idx="0">
+            <a:schemeClr val="accent1"/>
+          </a:fillRef>
+          <a:effectRef idx="0">
+            <a:schemeClr val="accent1"/>
+          </a:effectRef>
+          <a:fontRef idx="minor">
+            <a:schemeClr val="tx1"/>
+          </a:fontRef>
+        </p:style>
+      </p:cxnSp>
+      <p:sp>
+        <p:nvSpPr>
+          <p:cNvPr id="45" name="文字方塊 44">
+            <a:extLst>
+              <a:ext uri="{FF2B5EF4-FFF2-40B4-BE49-F238E27FC236}">
+                <a16:creationId xmlns:a16="http://schemas.microsoft.com/office/drawing/2014/main" id="{7B6D17C3-CBAB-4653-9D3B-83857623E72C}"/>
+              </a:ext>
+            </a:extLst>
+          </p:cNvPr>
+          <p:cNvSpPr txBox="1"/>
+          <p:nvPr/>
+        </p:nvSpPr>
+        <p:spPr>
+          <a:xfrm>
+            <a:off x="4810442" y="2005141"/>
+            <a:ext cx="2439469" cy="246221"/>
+          </a:xfrm>
+          <a:prstGeom prst="rect">
+            <a:avLst/>
+          </a:prstGeom>
+          <a:noFill/>
+        </p:spPr>
+        <p:txBody>
+          <a:bodyPr wrap="square" rtlCol="0">
+            <a:spAutoFit/>
+          </a:bodyPr>
+          <a:lstStyle/>
+          <a:p>
+            <a:r>
+              <a:rPr lang="en-US" altLang="zh-TW" sz="1000" dirty="0"/>
+              <a:t>1 …….…. 1 (Register Render pass to Flow)</a:t>
+            </a:r>
+            <a:endParaRPr lang="zh-TW" altLang="en-US" sz="1000" dirty="0"/>
+          </a:p>
+        </p:txBody>
+      </p:sp>
+      <p:sp>
+        <p:nvSpPr>
+          <p:cNvPr id="46" name="矩形 45">
+            <a:extLst>
+              <a:ext uri="{FF2B5EF4-FFF2-40B4-BE49-F238E27FC236}">
+                <a16:creationId xmlns:a16="http://schemas.microsoft.com/office/drawing/2014/main" id="{CF23898A-C963-4AA9-B128-7965BE259D10}"/>
+              </a:ext>
+            </a:extLst>
+          </p:cNvPr>
+          <p:cNvSpPr/>
+          <p:nvPr/>
+        </p:nvSpPr>
+        <p:spPr>
+          <a:xfrm>
+            <a:off x="137455" y="3256614"/>
+            <a:ext cx="4607241" cy="602253"/>
+          </a:xfrm>
+          <a:prstGeom prst="rect">
+            <a:avLst/>
+          </a:prstGeom>
+          <a:ln w="38100"/>
+        </p:spPr>
+        <p:style>
+          <a:lnRef idx="2">
+            <a:schemeClr val="dk1"/>
+          </a:lnRef>
+          <a:fillRef idx="1">
+            <a:schemeClr val="lt1"/>
+          </a:fillRef>
+          <a:effectRef idx="0">
+            <a:schemeClr val="dk1"/>
+          </a:effectRef>
+          <a:fontRef idx="minor">
+            <a:schemeClr val="dk1"/>
+          </a:fontRef>
+        </p:style>
+        <p:txBody>
+          <a:bodyPr rtlCol="0" anchor="ctr"/>
+          <a:lstStyle/>
+          <a:p>
+            <a:pPr algn="ctr"/>
+            <a:endParaRPr lang="zh-TW" altLang="en-US" dirty="0"/>
+          </a:p>
+        </p:txBody>
+      </p:sp>
+      <p:sp>
+        <p:nvSpPr>
+          <p:cNvPr id="47" name="文字方塊 46">
+            <a:extLst>
+              <a:ext uri="{FF2B5EF4-FFF2-40B4-BE49-F238E27FC236}">
+                <a16:creationId xmlns:a16="http://schemas.microsoft.com/office/drawing/2014/main" id="{36957DDA-F364-45A7-84D3-23B3133687B9}"/>
+              </a:ext>
+            </a:extLst>
+          </p:cNvPr>
+          <p:cNvSpPr txBox="1"/>
+          <p:nvPr/>
+        </p:nvSpPr>
+        <p:spPr>
+          <a:xfrm>
+            <a:off x="1512183" y="3229758"/>
+            <a:ext cx="1841013" cy="338554"/>
+          </a:xfrm>
+          <a:prstGeom prst="rect">
+            <a:avLst/>
+          </a:prstGeom>
+          <a:noFill/>
+        </p:spPr>
+        <p:txBody>
+          <a:bodyPr wrap="square" rtlCol="0">
+            <a:spAutoFit/>
+          </a:bodyPr>
+          <a:lstStyle/>
+          <a:p>
+            <a:r>
+              <a:rPr lang="en-US" altLang="zh-TW" sz="1600" dirty="0"/>
+              <a:t>Frame Buffer Group</a:t>
+            </a:r>
+            <a:endParaRPr lang="zh-TW" altLang="en-US" sz="1600" dirty="0"/>
+          </a:p>
+        </p:txBody>
+      </p:sp>
+      <p:sp>
+        <p:nvSpPr>
+          <p:cNvPr id="48" name="文字方塊 47">
+            <a:extLst>
+              <a:ext uri="{FF2B5EF4-FFF2-40B4-BE49-F238E27FC236}">
+                <a16:creationId xmlns:a16="http://schemas.microsoft.com/office/drawing/2014/main" id="{6C6983C9-B6AD-4AA1-9880-37D7C110D84E}"/>
+              </a:ext>
+            </a:extLst>
+          </p:cNvPr>
+          <p:cNvSpPr txBox="1"/>
+          <p:nvPr/>
+        </p:nvSpPr>
+        <p:spPr>
+          <a:xfrm>
+            <a:off x="137455" y="3568312"/>
+            <a:ext cx="4590471" cy="261610"/>
+          </a:xfrm>
+          <a:prstGeom prst="rect">
+            <a:avLst/>
+          </a:prstGeom>
+          <a:noFill/>
+        </p:spPr>
+        <p:txBody>
+          <a:bodyPr wrap="square" rtlCol="0">
+            <a:spAutoFit/>
+          </a:bodyPr>
+          <a:lstStyle/>
+          <a:p>
+            <a:r>
+              <a:rPr lang="en-US" altLang="zh-TW" sz="1100" dirty="0"/>
+              <a:t>1. Keep buffer weak ref for each steps.</a:t>
+            </a:r>
+          </a:p>
+        </p:txBody>
+      </p:sp>
+      <p:cxnSp>
+        <p:nvCxnSpPr>
+          <p:cNvPr id="49" name="直線單箭頭接點 48">
+            <a:extLst>
+              <a:ext uri="{FF2B5EF4-FFF2-40B4-BE49-F238E27FC236}">
+                <a16:creationId xmlns:a16="http://schemas.microsoft.com/office/drawing/2014/main" id="{5E0B7D35-AA87-4E68-9310-83A5B5BABCBD}"/>
+              </a:ext>
+            </a:extLst>
+          </p:cNvPr>
+          <p:cNvCxnSpPr>
+            <a:cxnSpLocks/>
+            <a:stCxn id="40" idx="2"/>
+            <a:endCxn id="46" idx="0"/>
+          </p:cNvCxnSpPr>
+          <p:nvPr/>
+        </p:nvCxnSpPr>
+        <p:spPr>
+          <a:xfrm flipH="1">
+            <a:off x="2441076" y="2469482"/>
+            <a:ext cx="8264" cy="787132"/>
+          </a:xfrm>
+          <a:prstGeom prst="straightConnector1">
+            <a:avLst/>
+          </a:prstGeom>
+          <a:ln w="38100">
+            <a:solidFill>
+              <a:schemeClr val="tx1"/>
+            </a:solidFill>
+            <a:tailEnd type="triangle"/>
+          </a:ln>
+        </p:spPr>
+        <p:style>
+          <a:lnRef idx="1">
+            <a:schemeClr val="accent1"/>
+          </a:lnRef>
+          <a:fillRef idx="0">
+            <a:schemeClr val="accent1"/>
+          </a:fillRef>
+          <a:effectRef idx="0">
+            <a:schemeClr val="accent1"/>
+          </a:effectRef>
+          <a:fontRef idx="minor">
+            <a:schemeClr val="tx1"/>
+          </a:fontRef>
+        </p:style>
+      </p:cxnSp>
+      <p:sp>
+        <p:nvSpPr>
+          <p:cNvPr id="56" name="矩形 55">
+            <a:extLst>
+              <a:ext uri="{FF2B5EF4-FFF2-40B4-BE49-F238E27FC236}">
+                <a16:creationId xmlns:a16="http://schemas.microsoft.com/office/drawing/2014/main" id="{2FAFBD71-7E13-458B-BEE7-2438909DFAB5}"/>
+              </a:ext>
+            </a:extLst>
+          </p:cNvPr>
+          <p:cNvSpPr/>
+          <p:nvPr/>
+        </p:nvSpPr>
+        <p:spPr>
+          <a:xfrm>
+            <a:off x="933177" y="322947"/>
+            <a:ext cx="5504264" cy="369332"/>
+          </a:xfrm>
+          <a:prstGeom prst="rect">
+            <a:avLst/>
+          </a:prstGeom>
+        </p:spPr>
+        <p:txBody>
+          <a:bodyPr wrap="none">
+            <a:spAutoFit/>
+          </a:bodyPr>
+          <a:lstStyle/>
+          <a:p>
+            <a:r>
+              <a:rPr lang="en-US" altLang="zh-TW" dirty="0"/>
+              <a:t>2. Describe which buffer reference to which attachments</a:t>
+            </a:r>
+            <a:endParaRPr lang="zh-TW" altLang="en-US" dirty="0"/>
+          </a:p>
+        </p:txBody>
+      </p:sp>
+      <p:sp>
+        <p:nvSpPr>
+          <p:cNvPr id="57" name="矩形 56">
+            <a:extLst>
+              <a:ext uri="{FF2B5EF4-FFF2-40B4-BE49-F238E27FC236}">
+                <a16:creationId xmlns:a16="http://schemas.microsoft.com/office/drawing/2014/main" id="{AAE726F4-9FB7-4AD8-ACD0-C94CE4E5242C}"/>
+              </a:ext>
+            </a:extLst>
+          </p:cNvPr>
+          <p:cNvSpPr/>
+          <p:nvPr/>
+        </p:nvSpPr>
+        <p:spPr>
+          <a:xfrm>
+            <a:off x="137455" y="4328588"/>
+            <a:ext cx="4623890" cy="761689"/>
+          </a:xfrm>
+          <a:prstGeom prst="rect">
+            <a:avLst/>
+          </a:prstGeom>
+          <a:ln w="38100"/>
+        </p:spPr>
+        <p:style>
+          <a:lnRef idx="2">
+            <a:schemeClr val="dk1"/>
+          </a:lnRef>
+          <a:fillRef idx="1">
+            <a:schemeClr val="lt1"/>
+          </a:fillRef>
+          <a:effectRef idx="0">
+            <a:schemeClr val="dk1"/>
+          </a:effectRef>
+          <a:fontRef idx="minor">
+            <a:schemeClr val="dk1"/>
+          </a:fontRef>
+        </p:style>
+        <p:txBody>
+          <a:bodyPr rtlCol="0" anchor="ctr"/>
+          <a:lstStyle/>
+          <a:p>
+            <a:pPr algn="ctr"/>
+            <a:endParaRPr lang="zh-TW" altLang="en-US" dirty="0"/>
+          </a:p>
+        </p:txBody>
+      </p:sp>
+      <p:cxnSp>
+        <p:nvCxnSpPr>
+          <p:cNvPr id="59" name="直線單箭頭接點 58">
+            <a:extLst>
+              <a:ext uri="{FF2B5EF4-FFF2-40B4-BE49-F238E27FC236}">
+                <a16:creationId xmlns:a16="http://schemas.microsoft.com/office/drawing/2014/main" id="{18F7EF1F-15E1-4A46-AAE4-156C008BE4BC}"/>
+              </a:ext>
+            </a:extLst>
+          </p:cNvPr>
+          <p:cNvCxnSpPr>
+            <a:cxnSpLocks/>
+            <a:stCxn id="46" idx="2"/>
+            <a:endCxn id="57" idx="0"/>
+          </p:cNvCxnSpPr>
+          <p:nvPr/>
+        </p:nvCxnSpPr>
+        <p:spPr>
+          <a:xfrm>
+            <a:off x="2441076" y="3858867"/>
+            <a:ext cx="8324" cy="469721"/>
+          </a:xfrm>
+          <a:prstGeom prst="straightConnector1">
+            <a:avLst/>
+          </a:prstGeom>
+          <a:ln w="38100">
+            <a:solidFill>
+              <a:schemeClr val="tx1"/>
+            </a:solidFill>
+            <a:tailEnd type="triangle"/>
+          </a:ln>
+        </p:spPr>
+        <p:style>
+          <a:lnRef idx="1">
+            <a:schemeClr val="accent1"/>
+          </a:lnRef>
+          <a:fillRef idx="0">
+            <a:schemeClr val="accent1"/>
+          </a:fillRef>
+          <a:effectRef idx="0">
+            <a:schemeClr val="accent1"/>
+          </a:effectRef>
+          <a:fontRef idx="minor">
+            <a:schemeClr val="tx1"/>
+          </a:fontRef>
+        </p:style>
+      </p:cxnSp>
+      <p:sp>
+        <p:nvSpPr>
+          <p:cNvPr id="62" name="文字方塊 61">
+            <a:extLst>
+              <a:ext uri="{FF2B5EF4-FFF2-40B4-BE49-F238E27FC236}">
+                <a16:creationId xmlns:a16="http://schemas.microsoft.com/office/drawing/2014/main" id="{2225462A-3A7C-4912-8B6A-4DDB93C5C250}"/>
+              </a:ext>
+            </a:extLst>
+          </p:cNvPr>
+          <p:cNvSpPr txBox="1"/>
+          <p:nvPr/>
+        </p:nvSpPr>
+        <p:spPr>
+          <a:xfrm>
+            <a:off x="1816267" y="4325321"/>
+            <a:ext cx="1232843" cy="338554"/>
+          </a:xfrm>
+          <a:prstGeom prst="rect">
+            <a:avLst/>
+          </a:prstGeom>
+          <a:noFill/>
+        </p:spPr>
+        <p:txBody>
+          <a:bodyPr wrap="square" rtlCol="0">
+            <a:spAutoFit/>
+          </a:bodyPr>
+          <a:lstStyle/>
+          <a:p>
+            <a:r>
+              <a:rPr lang="en-US" altLang="zh-TW" sz="1600" dirty="0"/>
+              <a:t>Framebuffer</a:t>
+            </a:r>
+            <a:endParaRPr lang="zh-TW" altLang="en-US" sz="1600" dirty="0"/>
+          </a:p>
+        </p:txBody>
+      </p:sp>
+      <p:sp>
+        <p:nvSpPr>
+          <p:cNvPr id="63" name="文字方塊 62">
+            <a:extLst>
+              <a:ext uri="{FF2B5EF4-FFF2-40B4-BE49-F238E27FC236}">
+                <a16:creationId xmlns:a16="http://schemas.microsoft.com/office/drawing/2014/main" id="{C4A8E71F-A5A2-4ED7-B404-F2B7A1252C8A}"/>
+              </a:ext>
+            </a:extLst>
+          </p:cNvPr>
+          <p:cNvSpPr txBox="1"/>
+          <p:nvPr/>
+        </p:nvSpPr>
+        <p:spPr>
+          <a:xfrm>
+            <a:off x="137452" y="4746271"/>
+            <a:ext cx="4590471" cy="261610"/>
+          </a:xfrm>
+          <a:prstGeom prst="rect">
+            <a:avLst/>
+          </a:prstGeom>
+          <a:noFill/>
+        </p:spPr>
+        <p:txBody>
+          <a:bodyPr wrap="square" rtlCol="0">
+            <a:spAutoFit/>
+          </a:bodyPr>
+          <a:lstStyle/>
+          <a:p>
+            <a:r>
+              <a:rPr lang="en-US" altLang="zh-TW" sz="1100" dirty="0"/>
+              <a:t>1. Describe relationship between color buffer and </a:t>
+            </a:r>
+            <a:r>
+              <a:rPr lang="en-US" altLang="zh-TW" sz="1100" dirty="0" err="1"/>
+              <a:t>attachement</a:t>
+            </a:r>
+            <a:r>
+              <a:rPr lang="en-US" altLang="zh-TW" sz="1100" dirty="0"/>
+              <a:t>.</a:t>
+            </a:r>
+          </a:p>
+        </p:txBody>
+      </p:sp>
+      <p:sp>
+        <p:nvSpPr>
+          <p:cNvPr id="64" name="文字方塊 63">
+            <a:extLst>
+              <a:ext uri="{FF2B5EF4-FFF2-40B4-BE49-F238E27FC236}">
+                <a16:creationId xmlns:a16="http://schemas.microsoft.com/office/drawing/2014/main" id="{664D1B0F-5ABE-47AB-AFD3-B8451D4391A2}"/>
+              </a:ext>
+            </a:extLst>
+          </p:cNvPr>
+          <p:cNvSpPr txBox="1"/>
+          <p:nvPr/>
+        </p:nvSpPr>
+        <p:spPr>
+          <a:xfrm>
+            <a:off x="2101742" y="2726321"/>
+            <a:ext cx="3299588" cy="246221"/>
+          </a:xfrm>
+          <a:prstGeom prst="rect">
+            <a:avLst/>
+          </a:prstGeom>
+          <a:noFill/>
+        </p:spPr>
+        <p:txBody>
+          <a:bodyPr wrap="square" rtlCol="0">
+            <a:spAutoFit/>
+          </a:bodyPr>
+          <a:lstStyle/>
+          <a:p>
+            <a:r>
+              <a:rPr lang="en-US" altLang="zh-TW" sz="1000" dirty="0"/>
+              <a:t>1 …….…. 1 (Create </a:t>
+            </a:r>
+            <a:r>
+              <a:rPr lang="en-US" altLang="zh-TW" sz="1000" dirty="0" err="1"/>
+              <a:t>FrameBufferGroup</a:t>
+            </a:r>
+            <a:r>
+              <a:rPr lang="en-US" altLang="zh-TW" sz="1000" dirty="0"/>
+              <a:t> by  Flow)</a:t>
+            </a:r>
+            <a:endParaRPr lang="zh-TW" altLang="en-US" sz="1000" dirty="0"/>
+          </a:p>
+        </p:txBody>
+      </p:sp>
+      <p:sp>
+        <p:nvSpPr>
+          <p:cNvPr id="65" name="文字方塊 64">
+            <a:extLst>
+              <a:ext uri="{FF2B5EF4-FFF2-40B4-BE49-F238E27FC236}">
+                <a16:creationId xmlns:a16="http://schemas.microsoft.com/office/drawing/2014/main" id="{C07FFC04-B1C7-4D1C-9BAF-FA00C1A9CC9F}"/>
+              </a:ext>
+            </a:extLst>
+          </p:cNvPr>
+          <p:cNvSpPr txBox="1"/>
+          <p:nvPr/>
+        </p:nvSpPr>
+        <p:spPr>
+          <a:xfrm>
+            <a:off x="2092092" y="3893779"/>
+            <a:ext cx="780362" cy="246221"/>
+          </a:xfrm>
+          <a:prstGeom prst="rect">
+            <a:avLst/>
+          </a:prstGeom>
+          <a:noFill/>
+        </p:spPr>
+        <p:txBody>
+          <a:bodyPr wrap="square" rtlCol="0">
+            <a:spAutoFit/>
+          </a:bodyPr>
+          <a:lstStyle/>
+          <a:p>
+            <a:r>
+              <a:rPr lang="en-US" altLang="zh-TW" sz="1000" dirty="0"/>
+              <a:t>1 …….…. n</a:t>
+            </a:r>
+            <a:endParaRPr lang="zh-TW" altLang="en-US" sz="1000" dirty="0"/>
+          </a:p>
+        </p:txBody>
+      </p:sp>
+    </p:spTree>
+    <p:extLst>
+      <p:ext uri="{BB962C8B-B14F-4D97-AF65-F5344CB8AC3E}">
+        <p14:creationId xmlns:p14="http://schemas.microsoft.com/office/powerpoint/2010/main" val="1696986995"/>
+      </p:ext>
+    </p:extLst>
+  </p:cSld>
+  <p:clrMapOvr>
+    <a:masterClrMapping/>
+  </p:clrMapOvr>
 </p:sld>
 </file>
 
@@ -8232,7 +9431,7 @@
   <a:extraClrSchemeLst/>
   <a:extLst>
     <a:ext uri="{05A4C25C-085E-4340-85A3-A5531E510DB2}">
-      <thm15:themeFamily xmlns:thm15="http://schemas.microsoft.com/office/thememl/2012/main" xmlns="" name="Office Theme" id="{62F939B6-93AF-4DB8-9C6B-D6C7DFDC589F}" vid="{4A3C46E8-61CC-4603-A589-7422A47A8E4A}"/>
+      <thm15:themeFamily xmlns:thm15="http://schemas.microsoft.com/office/thememl/2012/main" name="Office Theme" id="{62F939B6-93AF-4DB8-9C6B-D6C7DFDC589F}" vid="{4A3C46E8-61CC-4603-A589-7422A47A8E4A}"/>
     </a:ext>
   </a:extLst>
 </a:theme>
@@ -8527,7 +9726,7 @@
   <a:extraClrSchemeLst/>
   <a:extLst>
     <a:ext uri="{05A4C25C-085E-4340-85A3-A5531E510DB2}">
-      <thm15:themeFamily xmlns:thm15="http://schemas.microsoft.com/office/thememl/2012/main" xmlns="" name="Office Theme" id="{62F939B6-93AF-4DB8-9C6B-D6C7DFDC589F}" vid="{4A3C46E8-61CC-4603-A589-7422A47A8E4A}"/>
+      <thm15:themeFamily xmlns:thm15="http://schemas.microsoft.com/office/thememl/2012/main" name="Office Theme" id="{62F939B6-93AF-4DB8-9C6B-D6C7DFDC589F}" vid="{4A3C46E8-61CC-4603-A589-7422A47A8E4A}"/>
     </a:ext>
   </a:extLst>
 </a:theme>

</xml_diff>

<commit_message>
[add] RenderFlow system and add initialize flow for graphics manager.
</commit_message>
<xml_diff>
--- a/Doc/Note/Design/EngineDesign.pptx
+++ b/Doc/Note/Design/EngineDesign.pptx
@@ -211,7 +211,7 @@
           <a:p>
             <a:fld id="{8550266C-EB3A-46FF-9DFF-1D300318D93B}" type="datetimeFigureOut">
               <a:rPr lang="zh-TW" altLang="en-US" smtClean="0"/>
-              <a:t>2020/1/30</a:t>
+              <a:t>2020/1/31</a:t>
             </a:fld>
             <a:endParaRPr lang="zh-TW" altLang="en-US"/>
           </a:p>
@@ -709,7 +709,7 @@
           <a:p>
             <a:fld id="{59C7DAA9-8306-4CC9-B992-C0A037804617}" type="datetimeFigureOut">
               <a:rPr lang="zh-TW" altLang="en-US" smtClean="0"/>
-              <a:t>2020/1/30</a:t>
+              <a:t>2020/1/31</a:t>
             </a:fld>
             <a:endParaRPr lang="zh-TW" altLang="en-US"/>
           </a:p>
@@ -907,7 +907,7 @@
           <a:p>
             <a:fld id="{59C7DAA9-8306-4CC9-B992-C0A037804617}" type="datetimeFigureOut">
               <a:rPr lang="zh-TW" altLang="en-US" smtClean="0"/>
-              <a:t>2020/1/30</a:t>
+              <a:t>2020/1/31</a:t>
             </a:fld>
             <a:endParaRPr lang="zh-TW" altLang="en-US"/>
           </a:p>
@@ -1115,7 +1115,7 @@
           <a:p>
             <a:fld id="{59C7DAA9-8306-4CC9-B992-C0A037804617}" type="datetimeFigureOut">
               <a:rPr lang="zh-TW" altLang="en-US" smtClean="0"/>
-              <a:t>2020/1/30</a:t>
+              <a:t>2020/1/31</a:t>
             </a:fld>
             <a:endParaRPr lang="zh-TW" altLang="en-US"/>
           </a:p>
@@ -1313,7 +1313,7 @@
           <a:p>
             <a:fld id="{59C7DAA9-8306-4CC9-B992-C0A037804617}" type="datetimeFigureOut">
               <a:rPr lang="zh-TW" altLang="en-US" smtClean="0"/>
-              <a:t>2020/1/30</a:t>
+              <a:t>2020/1/31</a:t>
             </a:fld>
             <a:endParaRPr lang="zh-TW" altLang="en-US"/>
           </a:p>
@@ -1588,7 +1588,7 @@
           <a:p>
             <a:fld id="{59C7DAA9-8306-4CC9-B992-C0A037804617}" type="datetimeFigureOut">
               <a:rPr lang="zh-TW" altLang="en-US" smtClean="0"/>
-              <a:t>2020/1/30</a:t>
+              <a:t>2020/1/31</a:t>
             </a:fld>
             <a:endParaRPr lang="zh-TW" altLang="en-US"/>
           </a:p>
@@ -1853,7 +1853,7 @@
           <a:p>
             <a:fld id="{59C7DAA9-8306-4CC9-B992-C0A037804617}" type="datetimeFigureOut">
               <a:rPr lang="zh-TW" altLang="en-US" smtClean="0"/>
-              <a:t>2020/1/30</a:t>
+              <a:t>2020/1/31</a:t>
             </a:fld>
             <a:endParaRPr lang="zh-TW" altLang="en-US"/>
           </a:p>
@@ -2265,7 +2265,7 @@
           <a:p>
             <a:fld id="{59C7DAA9-8306-4CC9-B992-C0A037804617}" type="datetimeFigureOut">
               <a:rPr lang="zh-TW" altLang="en-US" smtClean="0"/>
-              <a:t>2020/1/30</a:t>
+              <a:t>2020/1/31</a:t>
             </a:fld>
             <a:endParaRPr lang="zh-TW" altLang="en-US"/>
           </a:p>
@@ -2406,7 +2406,7 @@
           <a:p>
             <a:fld id="{59C7DAA9-8306-4CC9-B992-C0A037804617}" type="datetimeFigureOut">
               <a:rPr lang="zh-TW" altLang="en-US" smtClean="0"/>
-              <a:t>2020/1/30</a:t>
+              <a:t>2020/1/31</a:t>
             </a:fld>
             <a:endParaRPr lang="zh-TW" altLang="en-US"/>
           </a:p>
@@ -2519,7 +2519,7 @@
           <a:p>
             <a:fld id="{59C7DAA9-8306-4CC9-B992-C0A037804617}" type="datetimeFigureOut">
               <a:rPr lang="zh-TW" altLang="en-US" smtClean="0"/>
-              <a:t>2020/1/30</a:t>
+              <a:t>2020/1/31</a:t>
             </a:fld>
             <a:endParaRPr lang="zh-TW" altLang="en-US"/>
           </a:p>
@@ -2830,7 +2830,7 @@
           <a:p>
             <a:fld id="{59C7DAA9-8306-4CC9-B992-C0A037804617}" type="datetimeFigureOut">
               <a:rPr lang="zh-TW" altLang="en-US" smtClean="0"/>
-              <a:t>2020/1/30</a:t>
+              <a:t>2020/1/31</a:t>
             </a:fld>
             <a:endParaRPr lang="zh-TW" altLang="en-US"/>
           </a:p>
@@ -3118,7 +3118,7 @@
           <a:p>
             <a:fld id="{59C7DAA9-8306-4CC9-B992-C0A037804617}" type="datetimeFigureOut">
               <a:rPr lang="zh-TW" altLang="en-US" smtClean="0"/>
-              <a:t>2020/1/30</a:t>
+              <a:t>2020/1/31</a:t>
             </a:fld>
             <a:endParaRPr lang="zh-TW" altLang="en-US"/>
           </a:p>
@@ -3359,7 +3359,7 @@
           <a:p>
             <a:fld id="{59C7DAA9-8306-4CC9-B992-C0A037804617}" type="datetimeFigureOut">
               <a:rPr lang="zh-TW" altLang="en-US" smtClean="0"/>
-              <a:t>2020/1/30</a:t>
+              <a:t>2020/1/31</a:t>
             </a:fld>
             <a:endParaRPr lang="zh-TW" altLang="en-US"/>
           </a:p>
@@ -7961,16 +7961,8 @@
           <a:lstStyle/>
           <a:p>
             <a:r>
-              <a:rPr lang="en-US" altLang="zh-TW" sz="1600" dirty="0"/>
-              <a:t>Render</a:t>
-            </a:r>
-            <a:r>
-              <a:rPr lang="zh-TW" altLang="en-US" sz="1600" dirty="0"/>
-              <a:t> </a:t>
-            </a:r>
-            <a:r>
-              <a:rPr lang="en-US" altLang="zh-TW" sz="1600" dirty="0"/>
-              <a:t>Pass</a:t>
+              <a:rPr lang="en-US" altLang="zh-TW" sz="1600" dirty="0" err="1"/>
+              <a:t>RenderPass</a:t>
             </a:r>
             <a:endParaRPr lang="zh-TW" altLang="en-US" sz="1600" dirty="0"/>
           </a:p>
@@ -8176,11 +8168,7 @@
           <a:p>
             <a:r>
               <a:rPr lang="en-US" altLang="zh-TW" sz="1400" dirty="0" err="1"/>
-              <a:t>Subpass</a:t>
-            </a:r>
-            <a:r>
-              <a:rPr lang="en-US" altLang="zh-TW" sz="1400" dirty="0"/>
-              <a:t> Description</a:t>
+              <a:t>SubpassDescription</a:t>
             </a:r>
             <a:endParaRPr lang="zh-TW" altLang="en-US" sz="1400" dirty="0"/>
           </a:p>
@@ -8341,8 +8329,8 @@
           <a:lstStyle/>
           <a:p>
             <a:r>
-              <a:rPr lang="en-US" altLang="zh-TW" sz="1400" dirty="0"/>
-              <a:t>Attachment Description</a:t>
+              <a:rPr lang="en-US" altLang="zh-TW" sz="1400" dirty="0" err="1"/>
+              <a:t>AttachmentDescription</a:t>
             </a:r>
             <a:endParaRPr lang="zh-TW" altLang="en-US" sz="1400" dirty="0"/>
           </a:p>
@@ -8529,16 +8517,8 @@
           <a:lstStyle/>
           <a:p>
             <a:r>
-              <a:rPr lang="en-US" altLang="zh-TW" dirty="0"/>
-              <a:t>Render</a:t>
-            </a:r>
-            <a:r>
-              <a:rPr lang="zh-TW" altLang="en-US" dirty="0"/>
-              <a:t> </a:t>
-            </a:r>
-            <a:r>
-              <a:rPr lang="en-US" altLang="zh-TW" dirty="0"/>
-              <a:t>Flow</a:t>
+              <a:rPr lang="en-US" altLang="zh-TW" dirty="0" err="1"/>
+              <a:t>RenderFlow</a:t>
             </a:r>
             <a:endParaRPr lang="zh-TW" altLang="en-US" dirty="0"/>
           </a:p>
@@ -8741,8 +8721,8 @@
         </p:nvSpPr>
         <p:spPr>
           <a:xfrm>
-            <a:off x="1512183" y="3229758"/>
-            <a:ext cx="1841013" cy="338554"/>
+            <a:off x="1849535" y="3229758"/>
+            <a:ext cx="1266528" cy="338554"/>
           </a:xfrm>
           <a:prstGeom prst="rect">
             <a:avLst/>
@@ -8756,8 +8736,8 @@
           <a:lstStyle/>
           <a:p>
             <a:r>
-              <a:rPr lang="en-US" altLang="zh-TW" sz="1600" dirty="0"/>
-              <a:t>Frame Buffer Group</a:t>
+              <a:rPr lang="en-US" altLang="zh-TW" sz="1600" dirty="0" err="1"/>
+              <a:t>FrameBuffer</a:t>
             </a:r>
             <a:endParaRPr lang="zh-TW" altLang="en-US" sz="1600" dirty="0"/>
           </a:p>
@@ -8846,41 +8826,6 @@
       </p:cxnSp>
       <p:sp>
         <p:nvSpPr>
-          <p:cNvPr id="56" name="矩形 55">
-            <a:extLst>
-              <a:ext uri="{FF2B5EF4-FFF2-40B4-BE49-F238E27FC236}">
-                <a16:creationId xmlns:a16="http://schemas.microsoft.com/office/drawing/2014/main" id="{2FAFBD71-7E13-458B-BEE7-2438909DFAB5}"/>
-              </a:ext>
-            </a:extLst>
-          </p:cNvPr>
-          <p:cNvSpPr/>
-          <p:nvPr/>
-        </p:nvSpPr>
-        <p:spPr>
-          <a:xfrm>
-            <a:off x="933177" y="322947"/>
-            <a:ext cx="5504264" cy="369332"/>
-          </a:xfrm>
-          <a:prstGeom prst="rect">
-            <a:avLst/>
-          </a:prstGeom>
-        </p:spPr>
-        <p:txBody>
-          <a:bodyPr wrap="none">
-            <a:spAutoFit/>
-          </a:bodyPr>
-          <a:lstStyle/>
-          <a:p>
-            <a:r>
-              <a:rPr lang="en-US" altLang="zh-TW" dirty="0"/>
-              <a:t>2. Describe which buffer reference to which attachments</a:t>
-            </a:r>
-            <a:endParaRPr lang="zh-TW" altLang="en-US" dirty="0"/>
-          </a:p>
-        </p:txBody>
-      </p:sp>
-      <p:sp>
-        <p:nvSpPr>
           <p:cNvPr id="57" name="矩形 56">
             <a:extLst>
               <a:ext uri="{FF2B5EF4-FFF2-40B4-BE49-F238E27FC236}">
@@ -8984,8 +8929,8 @@
         </p:nvSpPr>
         <p:spPr>
           <a:xfrm>
-            <a:off x="1816267" y="4325321"/>
-            <a:ext cx="1232843" cy="338554"/>
+            <a:off x="1558814" y="4325321"/>
+            <a:ext cx="1947865" cy="338554"/>
           </a:xfrm>
           <a:prstGeom prst="rect">
             <a:avLst/>
@@ -8999,8 +8944,8 @@
           <a:lstStyle/>
           <a:p>
             <a:r>
-              <a:rPr lang="en-US" altLang="zh-TW" sz="1600" dirty="0"/>
-              <a:t>Framebuffer</a:t>
+              <a:rPr lang="en-US" altLang="zh-TW" sz="1600" dirty="0" err="1"/>
+              <a:t>FrameBufferGroup</a:t>
             </a:r>
             <a:endParaRPr lang="zh-TW" altLang="en-US" sz="1600" dirty="0"/>
           </a:p>

</xml_diff>